<commit_message>
--2019.02.10 Jeong-Chan Lee 설계서 수정
</commit_message>
<xml_diff>
--- a/resources/졸작설계서.pptx
+++ b/resources/졸작설계서.pptx
@@ -5,10 +5,10 @@
     <p:sldMasterId id="2147483660" r:id="rId3"/>
   </p:sldMasterIdLst>
   <p:notesMasterIdLst>
-    <p:notesMasterId r:id="rId28"/>
+    <p:notesMasterId r:id="rId31"/>
   </p:notesMasterIdLst>
   <p:handoutMasterIdLst>
-    <p:handoutMasterId r:id="rId29"/>
+    <p:handoutMasterId r:id="rId32"/>
   </p:handoutMasterIdLst>
   <p:sldIdLst>
     <p:sldId id="256" r:id="rId4"/>
@@ -18,23 +18,26 @@
     <p:sldId id="319" r:id="rId8"/>
     <p:sldId id="320" r:id="rId9"/>
     <p:sldId id="321" r:id="rId10"/>
-    <p:sldId id="273" r:id="rId11"/>
-    <p:sldId id="302" r:id="rId12"/>
-    <p:sldId id="305" r:id="rId13"/>
-    <p:sldId id="306" r:id="rId14"/>
-    <p:sldId id="315" r:id="rId15"/>
-    <p:sldId id="307" r:id="rId16"/>
-    <p:sldId id="308" r:id="rId17"/>
-    <p:sldId id="316" r:id="rId18"/>
-    <p:sldId id="309" r:id="rId19"/>
-    <p:sldId id="310" r:id="rId20"/>
-    <p:sldId id="312" r:id="rId21"/>
-    <p:sldId id="317" r:id="rId22"/>
-    <p:sldId id="270" r:id="rId23"/>
-    <p:sldId id="290" r:id="rId24"/>
-    <p:sldId id="303" r:id="rId25"/>
-    <p:sldId id="283" r:id="rId26"/>
-    <p:sldId id="261" r:id="rId27"/>
+    <p:sldId id="322" r:id="rId11"/>
+    <p:sldId id="273" r:id="rId12"/>
+    <p:sldId id="302" r:id="rId13"/>
+    <p:sldId id="305" r:id="rId14"/>
+    <p:sldId id="306" r:id="rId15"/>
+    <p:sldId id="315" r:id="rId16"/>
+    <p:sldId id="307" r:id="rId17"/>
+    <p:sldId id="308" r:id="rId18"/>
+    <p:sldId id="316" r:id="rId19"/>
+    <p:sldId id="323" r:id="rId20"/>
+    <p:sldId id="324" r:id="rId21"/>
+    <p:sldId id="309" r:id="rId22"/>
+    <p:sldId id="310" r:id="rId23"/>
+    <p:sldId id="312" r:id="rId24"/>
+    <p:sldId id="317" r:id="rId25"/>
+    <p:sldId id="270" r:id="rId26"/>
+    <p:sldId id="290" r:id="rId27"/>
+    <p:sldId id="303" r:id="rId28"/>
+    <p:sldId id="283" r:id="rId29"/>
+    <p:sldId id="261" r:id="rId30"/>
   </p:sldIdLst>
   <p:sldSz cx="9720263" cy="6858000"/>
   <p:notesSz cx="6858000" cy="9144000"/>
@@ -223,7 +226,7 @@
           <a:p>
             <a:fld id="{55C1C2EC-08DE-4AE3-9D58-8409DB890493}" type="datetimeFigureOut">
               <a:rPr lang="ko-KR" altLang="en-US" smtClean="0"/>
-              <a:t>2019-02-06</a:t>
+              <a:t>2019-02-10</a:t>
             </a:fld>
             <a:endParaRPr lang="ko-KR" altLang="en-US"/>
           </a:p>
@@ -389,7 +392,7 @@
           <a:p>
             <a:fld id="{7B0C47E4-26E9-4C74-A846-469F09AE2EBB}" type="datetimeFigureOut">
               <a:rPr lang="ko-KR" altLang="en-US" smtClean="0"/>
-              <a:t>2019-02-06</a:t>
+              <a:t>2019-02-10</a:t>
             </a:fld>
             <a:endParaRPr lang="ko-KR" altLang="en-US"/>
           </a:p>
@@ -3841,6 +3844,1065 @@
       </p:grpSpPr>
       <p:sp>
         <p:nvSpPr>
+          <p:cNvPr id="26" name="Text Box 22"/>
+          <p:cNvSpPr txBox="1">
+            <a:spLocks noChangeArrowheads="1"/>
+          </p:cNvSpPr>
+          <p:nvPr/>
+        </p:nvSpPr>
+        <p:spPr bwMode="auto">
+          <a:xfrm>
+            <a:off x="141719" y="0"/>
+            <a:ext cx="5257800" cy="503238"/>
+          </a:xfrm>
+          <a:prstGeom prst="rect">
+            <a:avLst/>
+          </a:prstGeom>
+          <a:noFill/>
+          <a:ln>
+            <a:noFill/>
+          </a:ln>
+          <a:extLst>
+            <a:ext uri="{909E8E84-426E-40DD-AFC4-6F175D3DCCD1}">
+              <a14:hiddenFill xmlns:a14="http://schemas.microsoft.com/office/drawing/2010/main">
+                <a:solidFill>
+                  <a:srgbClr val="FFFFFF"/>
+                </a:solidFill>
+              </a14:hiddenFill>
+            </a:ext>
+            <a:ext uri="{91240B29-F687-4F45-9708-019B960494DF}">
+              <a14:hiddenLine xmlns:a14="http://schemas.microsoft.com/office/drawing/2010/main" w="9525">
+                <a:solidFill>
+                  <a:srgbClr val="000000"/>
+                </a:solidFill>
+                <a:miter lim="800000"/>
+                <a:headEnd/>
+                <a:tailEnd/>
+              </a14:hiddenLine>
+            </a:ext>
+          </a:extLst>
+        </p:spPr>
+        <p:txBody>
+          <a:bodyPr>
+            <a:spAutoFit/>
+          </a:bodyPr>
+          <a:lstStyle>
+            <a:defPPr>
+              <a:defRPr lang="ko-KR"/>
+            </a:defPPr>
+            <a:lvl1pPr marL="342900" indent="-342900">
+              <a:spcBef>
+                <a:spcPct val="50000"/>
+              </a:spcBef>
+              <a:defRPr sz="4000" b="1" baseline="-25000">
+                <a:solidFill>
+                  <a:schemeClr val="accent1">
+                    <a:lumMod val="50000"/>
+                  </a:schemeClr>
+                </a:solidFill>
+                <a:latin typeface="+mj-ea"/>
+                <a:ea typeface="+mj-ea"/>
+              </a:defRPr>
+            </a:lvl1pPr>
+            <a:lvl2pPr marL="742950" indent="-285750" eaLnBrk="0" hangingPunct="0">
+              <a:defRPr b="1">
+                <a:latin typeface="Arial" panose="020B0604020202020204" pitchFamily="34" charset="0"/>
+                <a:ea typeface="SimSun" panose="02010600030101010101" pitchFamily="2" charset="-122"/>
+              </a:defRPr>
+            </a:lvl2pPr>
+            <a:lvl3pPr marL="1143000" indent="-228600" eaLnBrk="0" hangingPunct="0">
+              <a:defRPr b="1">
+                <a:latin typeface="Arial" panose="020B0604020202020204" pitchFamily="34" charset="0"/>
+                <a:ea typeface="SimSun" panose="02010600030101010101" pitchFamily="2" charset="-122"/>
+              </a:defRPr>
+            </a:lvl3pPr>
+            <a:lvl4pPr marL="1600200" indent="-228600" eaLnBrk="0" hangingPunct="0">
+              <a:defRPr b="1">
+                <a:latin typeface="Arial" panose="020B0604020202020204" pitchFamily="34" charset="0"/>
+                <a:ea typeface="SimSun" panose="02010600030101010101" pitchFamily="2" charset="-122"/>
+              </a:defRPr>
+            </a:lvl4pPr>
+            <a:lvl5pPr marL="2057400" indent="-228600" eaLnBrk="0" hangingPunct="0">
+              <a:defRPr b="1">
+                <a:latin typeface="Arial" panose="020B0604020202020204" pitchFamily="34" charset="0"/>
+                <a:ea typeface="SimSun" panose="02010600030101010101" pitchFamily="2" charset="-122"/>
+              </a:defRPr>
+            </a:lvl5pPr>
+            <a:lvl6pPr marL="2514600" indent="-228600" algn="ctr" eaLnBrk="0" fontAlgn="base" hangingPunct="0">
+              <a:spcBef>
+                <a:spcPct val="0"/>
+              </a:spcBef>
+              <a:spcAft>
+                <a:spcPct val="0"/>
+              </a:spcAft>
+              <a:defRPr b="1">
+                <a:latin typeface="Arial" panose="020B0604020202020204" pitchFamily="34" charset="0"/>
+                <a:ea typeface="SimSun" panose="02010600030101010101" pitchFamily="2" charset="-122"/>
+              </a:defRPr>
+            </a:lvl6pPr>
+            <a:lvl7pPr marL="2971800" indent="-228600" algn="ctr" eaLnBrk="0" fontAlgn="base" hangingPunct="0">
+              <a:spcBef>
+                <a:spcPct val="0"/>
+              </a:spcBef>
+              <a:spcAft>
+                <a:spcPct val="0"/>
+              </a:spcAft>
+              <a:defRPr b="1">
+                <a:latin typeface="Arial" panose="020B0604020202020204" pitchFamily="34" charset="0"/>
+                <a:ea typeface="SimSun" panose="02010600030101010101" pitchFamily="2" charset="-122"/>
+              </a:defRPr>
+            </a:lvl7pPr>
+            <a:lvl8pPr marL="3429000" indent="-228600" algn="ctr" eaLnBrk="0" fontAlgn="base" hangingPunct="0">
+              <a:spcBef>
+                <a:spcPct val="0"/>
+              </a:spcBef>
+              <a:spcAft>
+                <a:spcPct val="0"/>
+              </a:spcAft>
+              <a:defRPr b="1">
+                <a:latin typeface="Arial" panose="020B0604020202020204" pitchFamily="34" charset="0"/>
+                <a:ea typeface="SimSun" panose="02010600030101010101" pitchFamily="2" charset="-122"/>
+              </a:defRPr>
+            </a:lvl8pPr>
+            <a:lvl9pPr marL="3886200" indent="-228600" algn="ctr" eaLnBrk="0" fontAlgn="base" hangingPunct="0">
+              <a:spcBef>
+                <a:spcPct val="0"/>
+              </a:spcBef>
+              <a:spcAft>
+                <a:spcPct val="0"/>
+              </a:spcAft>
+              <a:defRPr b="1">
+                <a:latin typeface="Arial" panose="020B0604020202020204" pitchFamily="34" charset="0"/>
+                <a:ea typeface="SimSun" panose="02010600030101010101" pitchFamily="2" charset="-122"/>
+              </a:defRPr>
+            </a:lvl9pPr>
+          </a:lstStyle>
+          <a:p>
+            <a:r>
+              <a:rPr lang="en-US" dirty="0"/>
+              <a:t>1. </a:t>
+            </a:r>
+            <a:r>
+              <a:rPr lang="ko-KR" altLang="en-US" dirty="0"/>
+              <a:t>졸업 연구 </a:t>
+            </a:r>
+            <a:r>
+              <a:rPr lang="ko-KR" altLang="en-US"/>
+              <a:t>및 개요</a:t>
+            </a:r>
+            <a:endParaRPr lang="en-US" dirty="0"/>
+          </a:p>
+        </p:txBody>
+      </p:sp>
+      <p:sp>
+        <p:nvSpPr>
+          <p:cNvPr id="2" name="TextBox 1">
+            <a:extLst>
+              <a:ext uri="{FF2B5EF4-FFF2-40B4-BE49-F238E27FC236}">
+                <a16:creationId xmlns:a16="http://schemas.microsoft.com/office/drawing/2014/main" id="{8D8B05C7-87F9-43B6-A885-B4EA1EFF4CD7}"/>
+              </a:ext>
+            </a:extLst>
+          </p:cNvPr>
+          <p:cNvSpPr txBox="1"/>
+          <p:nvPr/>
+        </p:nvSpPr>
+        <p:spPr>
+          <a:xfrm>
+            <a:off x="2642485" y="2384191"/>
+            <a:ext cx="6503703" cy="369332"/>
+          </a:xfrm>
+          <a:prstGeom prst="rect">
+            <a:avLst/>
+          </a:prstGeom>
+          <a:noFill/>
+        </p:spPr>
+        <p:txBody>
+          <a:bodyPr wrap="none" rtlCol="0">
+            <a:spAutoFit/>
+          </a:bodyPr>
+          <a:lstStyle/>
+          <a:p>
+            <a:pPr marL="285750" indent="-285750">
+              <a:buFont typeface="Arial" panose="020B0604020202020204" pitchFamily="34" charset="0"/>
+              <a:buChar char="•"/>
+            </a:pPr>
+            <a:r>
+              <a:rPr lang="ko-KR" altLang="en-US" b="1" dirty="0">
+                <a:solidFill>
+                  <a:srgbClr val="6F6761"/>
+                </a:solidFill>
+                <a:sym typeface="Wingdings" panose="05000000000000000000" pitchFamily="2" charset="2"/>
+              </a:rPr>
+              <a:t>지역별 커스터마이징             </a:t>
+            </a:r>
+            <a:r>
+              <a:rPr lang="ko-KR" altLang="en-US" b="1" dirty="0">
+                <a:solidFill>
+                  <a:srgbClr val="FF0000"/>
+                </a:solidFill>
+                <a:sym typeface="Wingdings" panose="05000000000000000000" pitchFamily="2" charset="2"/>
+              </a:rPr>
+              <a:t>고객 니즈에 맞는 서비스를 제공</a:t>
+            </a:r>
+            <a:endParaRPr lang="en-US" altLang="ko-KR" b="1" dirty="0">
+              <a:solidFill>
+                <a:srgbClr val="FF0000"/>
+              </a:solidFill>
+              <a:sym typeface="Wingdings" panose="05000000000000000000" pitchFamily="2" charset="2"/>
+            </a:endParaRPr>
+          </a:p>
+        </p:txBody>
+      </p:sp>
+      <p:sp>
+        <p:nvSpPr>
+          <p:cNvPr id="23" name="TextBox 22">
+            <a:extLst>
+              <a:ext uri="{FF2B5EF4-FFF2-40B4-BE49-F238E27FC236}">
+                <a16:creationId xmlns:a16="http://schemas.microsoft.com/office/drawing/2014/main" id="{6CB960C1-5211-45F6-B8D6-371160F302A2}"/>
+              </a:ext>
+            </a:extLst>
+          </p:cNvPr>
+          <p:cNvSpPr txBox="1"/>
+          <p:nvPr/>
+        </p:nvSpPr>
+        <p:spPr>
+          <a:xfrm>
+            <a:off x="2642485" y="4362883"/>
+            <a:ext cx="6450805" cy="369332"/>
+          </a:xfrm>
+          <a:prstGeom prst="rect">
+            <a:avLst/>
+          </a:prstGeom>
+          <a:noFill/>
+        </p:spPr>
+        <p:txBody>
+          <a:bodyPr wrap="none" rtlCol="0">
+            <a:spAutoFit/>
+          </a:bodyPr>
+          <a:lstStyle/>
+          <a:p>
+            <a:pPr marL="285750" indent="-285750">
+              <a:buFont typeface="Arial" panose="020B0604020202020204" pitchFamily="34" charset="0"/>
+              <a:buChar char="•"/>
+            </a:pPr>
+            <a:r>
+              <a:rPr lang="ko-KR" altLang="en-US" b="1" dirty="0">
+                <a:solidFill>
+                  <a:srgbClr val="6F6761"/>
+                </a:solidFill>
+                <a:sym typeface="Wingdings" panose="05000000000000000000" pitchFamily="2" charset="2"/>
+              </a:rPr>
+              <a:t>또 클라이언트 고객층에 맞춘 광고            추가적인 수익상승</a:t>
+            </a:r>
+            <a:endParaRPr lang="en-US" altLang="ko-KR" b="1" dirty="0">
+              <a:solidFill>
+                <a:srgbClr val="FF0000"/>
+              </a:solidFill>
+              <a:sym typeface="Wingdings" panose="05000000000000000000" pitchFamily="2" charset="2"/>
+            </a:endParaRPr>
+          </a:p>
+        </p:txBody>
+      </p:sp>
+      <p:sp>
+        <p:nvSpPr>
+          <p:cNvPr id="19" name="TextBox 18">
+            <a:extLst>
+              <a:ext uri="{FF2B5EF4-FFF2-40B4-BE49-F238E27FC236}">
+                <a16:creationId xmlns:a16="http://schemas.microsoft.com/office/drawing/2014/main" id="{512E8FBB-C7AD-4445-8250-5095972E560E}"/>
+              </a:ext>
+            </a:extLst>
+          </p:cNvPr>
+          <p:cNvSpPr txBox="1"/>
+          <p:nvPr/>
+        </p:nvSpPr>
+        <p:spPr>
+          <a:xfrm>
+            <a:off x="2642485" y="2872917"/>
+            <a:ext cx="6803466" cy="369332"/>
+          </a:xfrm>
+          <a:prstGeom prst="rect">
+            <a:avLst/>
+          </a:prstGeom>
+          <a:noFill/>
+        </p:spPr>
+        <p:txBody>
+          <a:bodyPr wrap="none" rtlCol="0">
+            <a:spAutoFit/>
+          </a:bodyPr>
+          <a:lstStyle/>
+          <a:p>
+            <a:pPr marL="285750" indent="-285750">
+              <a:buFont typeface="Arial" panose="020B0604020202020204" pitchFamily="34" charset="0"/>
+              <a:buChar char="•"/>
+            </a:pPr>
+            <a:r>
+              <a:rPr lang="en-US" altLang="ko-KR" b="1" dirty="0">
+                <a:solidFill>
+                  <a:srgbClr val="6F6761"/>
+                </a:solidFill>
+                <a:sym typeface="Wingdings" panose="05000000000000000000" pitchFamily="2" charset="2"/>
+              </a:rPr>
+              <a:t>KBO</a:t>
+            </a:r>
+            <a:r>
+              <a:rPr lang="ko-KR" altLang="en-US" b="1" dirty="0">
+                <a:solidFill>
+                  <a:srgbClr val="6F6761"/>
+                </a:solidFill>
+                <a:sym typeface="Wingdings" panose="05000000000000000000" pitchFamily="2" charset="2"/>
+              </a:rPr>
+              <a:t>사이트 기록 기준 </a:t>
+            </a:r>
+            <a:r>
+              <a:rPr lang="en-US" altLang="ko-KR" b="1" dirty="0">
+                <a:solidFill>
+                  <a:srgbClr val="6F6761"/>
+                </a:solidFill>
+                <a:sym typeface="Wingdings" panose="05000000000000000000" pitchFamily="2" charset="2"/>
+              </a:rPr>
+              <a:t>99%</a:t>
+            </a:r>
+            <a:r>
+              <a:rPr lang="ko-KR" altLang="en-US" b="1" dirty="0">
+                <a:solidFill>
+                  <a:srgbClr val="6F6761"/>
+                </a:solidFill>
+                <a:sym typeface="Wingdings" panose="05000000000000000000" pitchFamily="2" charset="2"/>
+              </a:rPr>
+              <a:t>에 달하는 상세 기록          </a:t>
+            </a:r>
+            <a:r>
+              <a:rPr lang="ko-KR" altLang="en-US" b="1" dirty="0">
+                <a:solidFill>
+                  <a:srgbClr val="FF0000"/>
+                </a:solidFill>
+                <a:sym typeface="Wingdings" panose="05000000000000000000" pitchFamily="2" charset="2"/>
+              </a:rPr>
+              <a:t>만족도 상승</a:t>
+            </a:r>
+            <a:endParaRPr lang="en-US" altLang="ko-KR" b="1" dirty="0">
+              <a:solidFill>
+                <a:srgbClr val="FF0000"/>
+              </a:solidFill>
+              <a:sym typeface="Wingdings" panose="05000000000000000000" pitchFamily="2" charset="2"/>
+            </a:endParaRPr>
+          </a:p>
+        </p:txBody>
+      </p:sp>
+      <p:sp>
+        <p:nvSpPr>
+          <p:cNvPr id="21" name="TextBox 20">
+            <a:extLst>
+              <a:ext uri="{FF2B5EF4-FFF2-40B4-BE49-F238E27FC236}">
+                <a16:creationId xmlns:a16="http://schemas.microsoft.com/office/drawing/2014/main" id="{44222454-24C5-4396-8513-51B6512D95CF}"/>
+              </a:ext>
+            </a:extLst>
+          </p:cNvPr>
+          <p:cNvSpPr txBox="1"/>
+          <p:nvPr/>
+        </p:nvSpPr>
+        <p:spPr>
+          <a:xfrm>
+            <a:off x="2642485" y="3360644"/>
+            <a:ext cx="6147837" cy="369332"/>
+          </a:xfrm>
+          <a:prstGeom prst="rect">
+            <a:avLst/>
+          </a:prstGeom>
+          <a:noFill/>
+        </p:spPr>
+        <p:txBody>
+          <a:bodyPr wrap="none" rtlCol="0">
+            <a:spAutoFit/>
+          </a:bodyPr>
+          <a:lstStyle/>
+          <a:p>
+            <a:pPr marL="285750" indent="-285750">
+              <a:buFont typeface="Arial" panose="020B0604020202020204" pitchFamily="34" charset="0"/>
+              <a:buChar char="•"/>
+            </a:pPr>
+            <a:r>
+              <a:rPr lang="ko-KR" altLang="en-US" b="1" dirty="0">
+                <a:solidFill>
+                  <a:srgbClr val="6F6761"/>
+                </a:solidFill>
+                <a:sym typeface="Wingdings" panose="05000000000000000000" pitchFamily="2" charset="2"/>
+              </a:rPr>
+              <a:t>장시간 선수들의 데이터 누적              </a:t>
+            </a:r>
+            <a:r>
+              <a:rPr lang="ko-KR" altLang="en-US" b="1" dirty="0">
+                <a:solidFill>
+                  <a:srgbClr val="FF0000"/>
+                </a:solidFill>
+                <a:sym typeface="Wingdings" panose="05000000000000000000" pitchFamily="2" charset="2"/>
+              </a:rPr>
+              <a:t>평생 고객 유도 가능</a:t>
+            </a:r>
+            <a:endParaRPr lang="en-US" altLang="ko-KR" b="1" dirty="0">
+              <a:solidFill>
+                <a:srgbClr val="FF0000"/>
+              </a:solidFill>
+              <a:sym typeface="Wingdings" panose="05000000000000000000" pitchFamily="2" charset="2"/>
+            </a:endParaRPr>
+          </a:p>
+        </p:txBody>
+      </p:sp>
+      <p:sp>
+        <p:nvSpPr>
+          <p:cNvPr id="25" name="TextBox 24">
+            <a:extLst>
+              <a:ext uri="{FF2B5EF4-FFF2-40B4-BE49-F238E27FC236}">
+                <a16:creationId xmlns:a16="http://schemas.microsoft.com/office/drawing/2014/main" id="{04F12578-9B97-4FFE-9AED-1BC64FF59A68}"/>
+              </a:ext>
+            </a:extLst>
+          </p:cNvPr>
+          <p:cNvSpPr txBox="1"/>
+          <p:nvPr/>
+        </p:nvSpPr>
+        <p:spPr>
+          <a:xfrm>
+            <a:off x="2628274" y="4861569"/>
+            <a:ext cx="6436377" cy="369332"/>
+          </a:xfrm>
+          <a:prstGeom prst="rect">
+            <a:avLst/>
+          </a:prstGeom>
+          <a:noFill/>
+        </p:spPr>
+        <p:txBody>
+          <a:bodyPr wrap="none" rtlCol="0">
+            <a:spAutoFit/>
+          </a:bodyPr>
+          <a:lstStyle/>
+          <a:p>
+            <a:pPr marL="285750" indent="-285750">
+              <a:buFont typeface="Arial" panose="020B0604020202020204" pitchFamily="34" charset="0"/>
+              <a:buChar char="•"/>
+            </a:pPr>
+            <a:r>
+              <a:rPr lang="ko-KR" altLang="en-US" b="1" dirty="0">
+                <a:solidFill>
+                  <a:srgbClr val="6F6761"/>
+                </a:solidFill>
+                <a:sym typeface="Wingdings" panose="05000000000000000000" pitchFamily="2" charset="2"/>
+              </a:rPr>
+              <a:t>그 외적으로 야구 용품 판매와 같은 </a:t>
+            </a:r>
+            <a:r>
+              <a:rPr lang="ko-KR" altLang="en-US" b="1" dirty="0">
+                <a:solidFill>
+                  <a:srgbClr val="FF0000"/>
+                </a:solidFill>
+                <a:sym typeface="Wingdings" panose="05000000000000000000" pitchFamily="2" charset="2"/>
+              </a:rPr>
+              <a:t>사행성은 제로</a:t>
+            </a:r>
+            <a:r>
+              <a:rPr lang="ko-KR" altLang="en-US" b="1" dirty="0">
+                <a:solidFill>
+                  <a:srgbClr val="6F6761"/>
+                </a:solidFill>
+                <a:sym typeface="Wingdings" panose="05000000000000000000" pitchFamily="2" charset="2"/>
+              </a:rPr>
+              <a:t>에 가까움</a:t>
+            </a:r>
+            <a:endParaRPr lang="en-US" altLang="ko-KR" b="1" dirty="0">
+              <a:solidFill>
+                <a:srgbClr val="FF0000"/>
+              </a:solidFill>
+              <a:sym typeface="Wingdings" panose="05000000000000000000" pitchFamily="2" charset="2"/>
+            </a:endParaRPr>
+          </a:p>
+        </p:txBody>
+      </p:sp>
+      <p:sp>
+        <p:nvSpPr>
+          <p:cNvPr id="28" name="TextBox 27">
+            <a:extLst>
+              <a:ext uri="{FF2B5EF4-FFF2-40B4-BE49-F238E27FC236}">
+                <a16:creationId xmlns:a16="http://schemas.microsoft.com/office/drawing/2014/main" id="{9DE46C4F-CCA2-43FE-BDF4-D960E7341251}"/>
+              </a:ext>
+            </a:extLst>
+          </p:cNvPr>
+          <p:cNvSpPr txBox="1"/>
+          <p:nvPr/>
+        </p:nvSpPr>
+        <p:spPr>
+          <a:xfrm>
+            <a:off x="3441807" y="2384191"/>
+            <a:ext cx="45719" cy="369332"/>
+          </a:xfrm>
+          <a:prstGeom prst="rect">
+            <a:avLst/>
+          </a:prstGeom>
+          <a:noFill/>
+        </p:spPr>
+        <p:txBody>
+          <a:bodyPr wrap="square" rtlCol="0">
+            <a:spAutoFit/>
+          </a:bodyPr>
+          <a:lstStyle/>
+          <a:p>
+            <a:pPr marL="285750" indent="-285750">
+              <a:buFont typeface="Arial" panose="020B0604020202020204" pitchFamily="34" charset="0"/>
+              <a:buChar char="•"/>
+            </a:pPr>
+            <a:endParaRPr lang="ko-KR" altLang="en-US" dirty="0"/>
+          </a:p>
+        </p:txBody>
+      </p:sp>
+      <p:grpSp>
+        <p:nvGrpSpPr>
+          <p:cNvPr id="39" name="그룹 38">
+            <a:extLst>
+              <a:ext uri="{FF2B5EF4-FFF2-40B4-BE49-F238E27FC236}">
+                <a16:creationId xmlns:a16="http://schemas.microsoft.com/office/drawing/2014/main" id="{6682E081-99BB-4282-9CFC-0FA6E5709D31}"/>
+              </a:ext>
+            </a:extLst>
+          </p:cNvPr>
+          <p:cNvGrpSpPr/>
+          <p:nvPr/>
+        </p:nvGrpSpPr>
+        <p:grpSpPr>
+          <a:xfrm>
+            <a:off x="281414" y="2014859"/>
+            <a:ext cx="1794255" cy="2497706"/>
+            <a:chOff x="281414" y="2014859"/>
+            <a:chExt cx="1794255" cy="2497706"/>
+          </a:xfrm>
+        </p:grpSpPr>
+        <p:pic>
+          <p:nvPicPr>
+            <p:cNvPr id="5" name="그래픽 4" descr="교사">
+              <a:extLst>
+                <a:ext uri="{FF2B5EF4-FFF2-40B4-BE49-F238E27FC236}">
+                  <a16:creationId xmlns:a16="http://schemas.microsoft.com/office/drawing/2014/main" id="{7E3FE4B9-CD09-468A-8AD4-2E685D2F4D90}"/>
+                </a:ext>
+              </a:extLst>
+            </p:cNvPr>
+            <p:cNvPicPr>
+              <a:picLocks noChangeAspect="1"/>
+            </p:cNvPicPr>
+            <p:nvPr/>
+          </p:nvPicPr>
+          <p:blipFill>
+            <a:blip r:embed="rId2" cstate="print">
+              <a:extLst>
+                <a:ext uri="{28A0092B-C50C-407E-A947-70E740481C1C}">
+                  <a14:useLocalDpi xmlns:a14="http://schemas.microsoft.com/office/drawing/2010/main" val="0"/>
+                </a:ext>
+                <a:ext uri="{96DAC541-7B7A-43D3-8B79-37D633B846F1}">
+                  <asvg:svgBlip xmlns:asvg="http://schemas.microsoft.com/office/drawing/2016/SVG/main" r:embed="rId3"/>
+                </a:ext>
+              </a:extLst>
+            </a:blip>
+            <a:stretch>
+              <a:fillRect/>
+            </a:stretch>
+          </p:blipFill>
+          <p:spPr>
+            <a:xfrm>
+              <a:off x="281414" y="3078920"/>
+              <a:ext cx="1433645" cy="1433645"/>
+            </a:xfrm>
+            <a:prstGeom prst="rect">
+              <a:avLst/>
+            </a:prstGeom>
+          </p:spPr>
+        </p:pic>
+        <p:sp>
+          <p:nvSpPr>
+            <p:cNvPr id="29" name="TextBox 28">
+              <a:extLst>
+                <a:ext uri="{FF2B5EF4-FFF2-40B4-BE49-F238E27FC236}">
+                  <a16:creationId xmlns:a16="http://schemas.microsoft.com/office/drawing/2014/main" id="{28771099-37AB-45E0-972F-99049A789078}"/>
+                </a:ext>
+              </a:extLst>
+            </p:cNvPr>
+            <p:cNvSpPr txBox="1"/>
+            <p:nvPr/>
+          </p:nvSpPr>
+          <p:spPr>
+            <a:xfrm>
+              <a:off x="281414" y="2014859"/>
+              <a:ext cx="1794255" cy="369332"/>
+            </a:xfrm>
+            <a:prstGeom prst="rect">
+              <a:avLst/>
+            </a:prstGeom>
+            <a:noFill/>
+          </p:spPr>
+          <p:txBody>
+            <a:bodyPr wrap="square" rtlCol="0">
+              <a:spAutoFit/>
+            </a:bodyPr>
+            <a:lstStyle/>
+            <a:p>
+              <a:r>
+                <a:rPr lang="ko-KR" altLang="en-US" b="1" dirty="0">
+                  <a:effectLst>
+                    <a:outerShdw blurRad="38100" dist="38100" dir="2700000" algn="tl">
+                      <a:srgbClr val="000000">
+                        <a:alpha val="43137"/>
+                      </a:srgbClr>
+                    </a:outerShdw>
+                  </a:effectLst>
+                </a:rPr>
+                <a:t>졸업 연구 효과</a:t>
+              </a:r>
+            </a:p>
+          </p:txBody>
+        </p:sp>
+      </p:grpSp>
+      <p:sp>
+        <p:nvSpPr>
+          <p:cNvPr id="22" name="TextBox 21">
+            <a:extLst>
+              <a:ext uri="{FF2B5EF4-FFF2-40B4-BE49-F238E27FC236}">
+                <a16:creationId xmlns:a16="http://schemas.microsoft.com/office/drawing/2014/main" id="{1C55D484-41FF-4266-9078-C08A888C7E24}"/>
+              </a:ext>
+            </a:extLst>
+          </p:cNvPr>
+          <p:cNvSpPr txBox="1"/>
+          <p:nvPr/>
+        </p:nvSpPr>
+        <p:spPr>
+          <a:xfrm>
+            <a:off x="2642485" y="3843030"/>
+            <a:ext cx="6426759" cy="369332"/>
+          </a:xfrm>
+          <a:prstGeom prst="rect">
+            <a:avLst/>
+          </a:prstGeom>
+          <a:noFill/>
+        </p:spPr>
+        <p:txBody>
+          <a:bodyPr wrap="none" rtlCol="0">
+            <a:spAutoFit/>
+          </a:bodyPr>
+          <a:lstStyle/>
+          <a:p>
+            <a:pPr marL="285750" indent="-285750">
+              <a:buFont typeface="Arial" panose="020B0604020202020204" pitchFamily="34" charset="0"/>
+              <a:buChar char="•"/>
+            </a:pPr>
+            <a:r>
+              <a:rPr lang="ko-KR" altLang="en-US" b="1" dirty="0">
+                <a:solidFill>
+                  <a:srgbClr val="6F6761"/>
+                </a:solidFill>
+                <a:sym typeface="Wingdings" panose="05000000000000000000" pitchFamily="2" charset="2"/>
+              </a:rPr>
+              <a:t>회원수가 증가</a:t>
+            </a:r>
+            <a:r>
+              <a:rPr lang="en-US" altLang="ko-KR" b="1" dirty="0">
+                <a:solidFill>
+                  <a:srgbClr val="6F6761"/>
+                </a:solidFill>
+                <a:sym typeface="Wingdings" panose="05000000000000000000" pitchFamily="2" charset="2"/>
+              </a:rPr>
+              <a:t>          </a:t>
+            </a:r>
+            <a:r>
+              <a:rPr lang="ko-KR" altLang="en-US" b="1" dirty="0">
+                <a:solidFill>
+                  <a:srgbClr val="6F6761"/>
+                </a:solidFill>
+                <a:sym typeface="Wingdings" panose="05000000000000000000" pitchFamily="2" charset="2"/>
+              </a:rPr>
+              <a:t>팀 증가          리그 수 증가          수익상승</a:t>
+            </a:r>
+            <a:endParaRPr lang="en-US" altLang="ko-KR" b="1" dirty="0">
+              <a:solidFill>
+                <a:srgbClr val="FF0000"/>
+              </a:solidFill>
+              <a:sym typeface="Wingdings" panose="05000000000000000000" pitchFamily="2" charset="2"/>
+            </a:endParaRPr>
+          </a:p>
+        </p:txBody>
+      </p:sp>
+      <p:sp>
+        <p:nvSpPr>
+          <p:cNvPr id="7" name="오른쪽 화살표 6"/>
+          <p:cNvSpPr/>
+          <p:nvPr/>
+        </p:nvSpPr>
+        <p:spPr>
+          <a:xfrm>
+            <a:off x="5267995" y="2428425"/>
+            <a:ext cx="448408" cy="280863"/>
+          </a:xfrm>
+          <a:prstGeom prst="rightArrow">
+            <a:avLst/>
+          </a:prstGeom>
+        </p:spPr>
+        <p:style>
+          <a:lnRef idx="2">
+            <a:schemeClr val="accent1">
+              <a:shade val="50000"/>
+            </a:schemeClr>
+          </a:lnRef>
+          <a:fillRef idx="1">
+            <a:schemeClr val="accent1"/>
+          </a:fillRef>
+          <a:effectRef idx="0">
+            <a:schemeClr val="accent1"/>
+          </a:effectRef>
+          <a:fontRef idx="minor">
+            <a:schemeClr val="lt1"/>
+          </a:fontRef>
+        </p:style>
+        <p:txBody>
+          <a:bodyPr rtlCol="0" anchor="ctr"/>
+          <a:lstStyle/>
+          <a:p>
+            <a:pPr marL="285750" indent="-285750" algn="ctr">
+              <a:buFont typeface="Arial" panose="020B0604020202020204" pitchFamily="34" charset="0"/>
+              <a:buChar char="•"/>
+            </a:pPr>
+            <a:endParaRPr lang="ko-KR" altLang="en-US"/>
+          </a:p>
+        </p:txBody>
+      </p:sp>
+      <p:sp>
+        <p:nvSpPr>
+          <p:cNvPr id="12" name="오른쪽 화살표 11"/>
+          <p:cNvSpPr/>
+          <p:nvPr/>
+        </p:nvSpPr>
+        <p:spPr>
+          <a:xfrm>
+            <a:off x="6524075" y="4372133"/>
+            <a:ext cx="448408" cy="280863"/>
+          </a:xfrm>
+          <a:prstGeom prst="rightArrow">
+            <a:avLst/>
+          </a:prstGeom>
+        </p:spPr>
+        <p:style>
+          <a:lnRef idx="2">
+            <a:schemeClr val="accent1">
+              <a:shade val="50000"/>
+            </a:schemeClr>
+          </a:lnRef>
+          <a:fillRef idx="1">
+            <a:schemeClr val="accent1"/>
+          </a:fillRef>
+          <a:effectRef idx="0">
+            <a:schemeClr val="accent1"/>
+          </a:effectRef>
+          <a:fontRef idx="minor">
+            <a:schemeClr val="lt1"/>
+          </a:fontRef>
+        </p:style>
+        <p:txBody>
+          <a:bodyPr rtlCol="0" anchor="ctr"/>
+          <a:lstStyle/>
+          <a:p>
+            <a:pPr marL="285750" indent="-285750" algn="ctr">
+              <a:buFont typeface="Arial" panose="020B0604020202020204" pitchFamily="34" charset="0"/>
+              <a:buChar char="•"/>
+            </a:pPr>
+            <a:endParaRPr lang="ko-KR" altLang="en-US"/>
+          </a:p>
+        </p:txBody>
+      </p:sp>
+      <p:sp>
+        <p:nvSpPr>
+          <p:cNvPr id="9" name="오른쪽 화살표 8"/>
+          <p:cNvSpPr/>
+          <p:nvPr/>
+        </p:nvSpPr>
+        <p:spPr>
+          <a:xfrm>
+            <a:off x="7614809" y="2901186"/>
+            <a:ext cx="448408" cy="280863"/>
+          </a:xfrm>
+          <a:prstGeom prst="rightArrow">
+            <a:avLst/>
+          </a:prstGeom>
+        </p:spPr>
+        <p:style>
+          <a:lnRef idx="2">
+            <a:schemeClr val="accent1">
+              <a:shade val="50000"/>
+            </a:schemeClr>
+          </a:lnRef>
+          <a:fillRef idx="1">
+            <a:schemeClr val="accent1"/>
+          </a:fillRef>
+          <a:effectRef idx="0">
+            <a:schemeClr val="accent1"/>
+          </a:effectRef>
+          <a:fontRef idx="minor">
+            <a:schemeClr val="lt1"/>
+          </a:fontRef>
+        </p:style>
+        <p:txBody>
+          <a:bodyPr rtlCol="0" anchor="ctr"/>
+          <a:lstStyle/>
+          <a:p>
+            <a:pPr marL="285750" indent="-285750" algn="ctr">
+              <a:buFont typeface="Arial" panose="020B0604020202020204" pitchFamily="34" charset="0"/>
+              <a:buChar char="•"/>
+            </a:pPr>
+            <a:endParaRPr lang="ko-KR" altLang="en-US"/>
+          </a:p>
+        </p:txBody>
+      </p:sp>
+      <p:sp>
+        <p:nvSpPr>
+          <p:cNvPr id="10" name="오른쪽 화살표 9"/>
+          <p:cNvSpPr/>
+          <p:nvPr/>
+        </p:nvSpPr>
+        <p:spPr>
+          <a:xfrm>
+            <a:off x="6075667" y="3402208"/>
+            <a:ext cx="448408" cy="280863"/>
+          </a:xfrm>
+          <a:prstGeom prst="rightArrow">
+            <a:avLst/>
+          </a:prstGeom>
+        </p:spPr>
+        <p:style>
+          <a:lnRef idx="2">
+            <a:schemeClr val="accent1">
+              <a:shade val="50000"/>
+            </a:schemeClr>
+          </a:lnRef>
+          <a:fillRef idx="1">
+            <a:schemeClr val="accent1"/>
+          </a:fillRef>
+          <a:effectRef idx="0">
+            <a:schemeClr val="accent1"/>
+          </a:effectRef>
+          <a:fontRef idx="minor">
+            <a:schemeClr val="lt1"/>
+          </a:fontRef>
+        </p:style>
+        <p:txBody>
+          <a:bodyPr rtlCol="0" anchor="ctr"/>
+          <a:lstStyle/>
+          <a:p>
+            <a:pPr marL="285750" indent="-285750" algn="ctr">
+              <a:buFont typeface="Arial" panose="020B0604020202020204" pitchFamily="34" charset="0"/>
+              <a:buChar char="•"/>
+            </a:pPr>
+            <a:endParaRPr lang="ko-KR" altLang="en-US"/>
+          </a:p>
+        </p:txBody>
+      </p:sp>
+      <p:sp>
+        <p:nvSpPr>
+          <p:cNvPr id="30" name="오른쪽 화살표 10">
+            <a:extLst>
+              <a:ext uri="{FF2B5EF4-FFF2-40B4-BE49-F238E27FC236}">
+                <a16:creationId xmlns:a16="http://schemas.microsoft.com/office/drawing/2014/main" id="{77353AFD-ABD0-4DAA-A50C-EC1EF53566E6}"/>
+              </a:ext>
+            </a:extLst>
+          </p:cNvPr>
+          <p:cNvSpPr/>
+          <p:nvPr/>
+        </p:nvSpPr>
+        <p:spPr>
+          <a:xfrm>
+            <a:off x="4484580" y="3874478"/>
+            <a:ext cx="448408" cy="280863"/>
+          </a:xfrm>
+          <a:prstGeom prst="rightArrow">
+            <a:avLst/>
+          </a:prstGeom>
+        </p:spPr>
+        <p:style>
+          <a:lnRef idx="2">
+            <a:schemeClr val="accent1">
+              <a:shade val="50000"/>
+            </a:schemeClr>
+          </a:lnRef>
+          <a:fillRef idx="1">
+            <a:schemeClr val="accent1"/>
+          </a:fillRef>
+          <a:effectRef idx="0">
+            <a:schemeClr val="accent1"/>
+          </a:effectRef>
+          <a:fontRef idx="minor">
+            <a:schemeClr val="lt1"/>
+          </a:fontRef>
+        </p:style>
+        <p:txBody>
+          <a:bodyPr rtlCol="0" anchor="ctr"/>
+          <a:lstStyle/>
+          <a:p>
+            <a:pPr marL="285750" indent="-285750" algn="ctr">
+              <a:buFont typeface="Arial" panose="020B0604020202020204" pitchFamily="34" charset="0"/>
+              <a:buChar char="•"/>
+            </a:pPr>
+            <a:endParaRPr lang="ko-KR" altLang="en-US"/>
+          </a:p>
+        </p:txBody>
+      </p:sp>
+      <p:sp>
+        <p:nvSpPr>
+          <p:cNvPr id="31" name="오른쪽 화살표 10">
+            <a:extLst>
+              <a:ext uri="{FF2B5EF4-FFF2-40B4-BE49-F238E27FC236}">
+                <a16:creationId xmlns:a16="http://schemas.microsoft.com/office/drawing/2014/main" id="{03FC4268-DC3E-401B-AC95-E7E57F0FED44}"/>
+              </a:ext>
+            </a:extLst>
+          </p:cNvPr>
+          <p:cNvSpPr/>
+          <p:nvPr/>
+        </p:nvSpPr>
+        <p:spPr>
+          <a:xfrm>
+            <a:off x="5740788" y="3874478"/>
+            <a:ext cx="448408" cy="280863"/>
+          </a:xfrm>
+          <a:prstGeom prst="rightArrow">
+            <a:avLst/>
+          </a:prstGeom>
+        </p:spPr>
+        <p:style>
+          <a:lnRef idx="2">
+            <a:schemeClr val="accent1">
+              <a:shade val="50000"/>
+            </a:schemeClr>
+          </a:lnRef>
+          <a:fillRef idx="1">
+            <a:schemeClr val="accent1"/>
+          </a:fillRef>
+          <a:effectRef idx="0">
+            <a:schemeClr val="accent1"/>
+          </a:effectRef>
+          <a:fontRef idx="minor">
+            <a:schemeClr val="lt1"/>
+          </a:fontRef>
+        </p:style>
+        <p:txBody>
+          <a:bodyPr rtlCol="0" anchor="ctr"/>
+          <a:lstStyle/>
+          <a:p>
+            <a:pPr marL="285750" indent="-285750" algn="ctr">
+              <a:buFont typeface="Arial" panose="020B0604020202020204" pitchFamily="34" charset="0"/>
+              <a:buChar char="•"/>
+            </a:pPr>
+            <a:endParaRPr lang="ko-KR" altLang="en-US"/>
+          </a:p>
+        </p:txBody>
+      </p:sp>
+      <p:sp>
+        <p:nvSpPr>
+          <p:cNvPr id="32" name="오른쪽 화살표 10">
+            <a:extLst>
+              <a:ext uri="{FF2B5EF4-FFF2-40B4-BE49-F238E27FC236}">
+                <a16:creationId xmlns:a16="http://schemas.microsoft.com/office/drawing/2014/main" id="{F8BC7AC7-0797-4546-9F00-252A630579B1}"/>
+              </a:ext>
+            </a:extLst>
+          </p:cNvPr>
+          <p:cNvSpPr/>
+          <p:nvPr/>
+        </p:nvSpPr>
+        <p:spPr>
+          <a:xfrm>
+            <a:off x="7532265" y="3874478"/>
+            <a:ext cx="448408" cy="280863"/>
+          </a:xfrm>
+          <a:prstGeom prst="rightArrow">
+            <a:avLst/>
+          </a:prstGeom>
+        </p:spPr>
+        <p:style>
+          <a:lnRef idx="2">
+            <a:schemeClr val="accent1">
+              <a:shade val="50000"/>
+            </a:schemeClr>
+          </a:lnRef>
+          <a:fillRef idx="1">
+            <a:schemeClr val="accent1"/>
+          </a:fillRef>
+          <a:effectRef idx="0">
+            <a:schemeClr val="accent1"/>
+          </a:effectRef>
+          <a:fontRef idx="minor">
+            <a:schemeClr val="lt1"/>
+          </a:fontRef>
+        </p:style>
+        <p:txBody>
+          <a:bodyPr rtlCol="0" anchor="ctr"/>
+          <a:lstStyle/>
+          <a:p>
+            <a:pPr marL="285750" indent="-285750" algn="ctr">
+              <a:buFont typeface="Arial" panose="020B0604020202020204" pitchFamily="34" charset="0"/>
+              <a:buChar char="•"/>
+            </a:pPr>
+            <a:endParaRPr lang="ko-KR" altLang="en-US"/>
+          </a:p>
+        </p:txBody>
+      </p:sp>
+      <p:sp>
+        <p:nvSpPr>
+          <p:cNvPr id="3" name="슬라이드 번호 개체 틀 2">
+            <a:extLst>
+              <a:ext uri="{FF2B5EF4-FFF2-40B4-BE49-F238E27FC236}">
+                <a16:creationId xmlns:a16="http://schemas.microsoft.com/office/drawing/2014/main" id="{81BA6205-09C0-4D2F-B3F9-49AF34D6F94A}"/>
+              </a:ext>
+            </a:extLst>
+          </p:cNvPr>
+          <p:cNvSpPr>
+            <a:spLocks noGrp="1"/>
+          </p:cNvSpPr>
+          <p:nvPr>
+            <p:ph type="sldNum" sz="quarter" idx="12"/>
+          </p:nvPr>
+        </p:nvSpPr>
+        <p:spPr/>
+        <p:txBody>
+          <a:bodyPr/>
+          <a:lstStyle/>
+          <a:p>
+            <a:fld id="{EB942B9F-D695-4224-97C8-E7A171F5AE33}" type="slidenum">
+              <a:rPr lang="ko-KR" altLang="en-US" smtClean="0"/>
+              <a:t>10</a:t>
+            </a:fld>
+            <a:endParaRPr lang="ko-KR" altLang="en-US"/>
+          </a:p>
+        </p:txBody>
+      </p:sp>
+    </p:spTree>
+    <p:extLst>
+      <p:ext uri="{BB962C8B-B14F-4D97-AF65-F5344CB8AC3E}">
+        <p14:creationId xmlns:p14="http://schemas.microsoft.com/office/powerpoint/2010/main" val="3666679560"/>
+      </p:ext>
+    </p:extLst>
+  </p:cSld>
+  <p:clrMapOvr>
+    <a:masterClrMapping/>
+  </p:clrMapOvr>
+</p:sld>
+</file>
+
+<file path=ppt/slides/slide11.xml><?xml version="1.0" encoding="utf-8"?>
+<p:sld xmlns:a="http://schemas.openxmlformats.org/drawingml/2006/main" xmlns:r="http://schemas.openxmlformats.org/officeDocument/2006/relationships" xmlns:p="http://schemas.openxmlformats.org/presentationml/2006/main">
+  <p:cSld>
+    <p:spTree>
+      <p:nvGrpSpPr>
+        <p:cNvPr id="1" name=""/>
+        <p:cNvGrpSpPr/>
+        <p:nvPr/>
+      </p:nvGrpSpPr>
+      <p:grpSpPr>
+        <a:xfrm>
+          <a:off x="0" y="0"/>
+          <a:ext cx="0" cy="0"/>
+          <a:chOff x="0" y="0"/>
+          <a:chExt cx="0" cy="0"/>
+        </a:xfrm>
+      </p:grpSpPr>
+      <p:sp>
+        <p:nvSpPr>
           <p:cNvPr id="59" name="Text Box 22"/>
           <p:cNvSpPr txBox="1">
             <a:spLocks noChangeArrowheads="1"/>
@@ -4290,7 +5352,7 @@
           <a:p>
             <a:fld id="{EB942B9F-D695-4224-97C8-E7A171F5AE33}" type="slidenum">
               <a:rPr lang="ko-KR" altLang="en-US" smtClean="0"/>
-              <a:t>10</a:t>
+              <a:t>11</a:t>
             </a:fld>
             <a:endParaRPr lang="ko-KR" altLang="en-US"/>
           </a:p>
@@ -4309,7 +5371,7 @@
 </p:sld>
 </file>
 
-<file path=ppt/slides/slide11.xml><?xml version="1.0" encoding="utf-8"?>
+<file path=ppt/slides/slide12.xml><?xml version="1.0" encoding="utf-8"?>
 <p:sld xmlns:a="http://schemas.openxmlformats.org/drawingml/2006/main" xmlns:r="http://schemas.openxmlformats.org/officeDocument/2006/relationships" xmlns:p="http://schemas.openxmlformats.org/presentationml/2006/main">
   <p:cSld>
     <p:spTree>
@@ -5170,7 +6232,7 @@
           <a:p>
             <a:fld id="{EB942B9F-D695-4224-97C8-E7A171F5AE33}" type="slidenum">
               <a:rPr lang="ko-KR" altLang="en-US" smtClean="0"/>
-              <a:t>11</a:t>
+              <a:t>12</a:t>
             </a:fld>
             <a:endParaRPr lang="ko-KR" altLang="en-US"/>
           </a:p>
@@ -5189,7 +6251,7 @@
 </p:sld>
 </file>
 
-<file path=ppt/slides/slide12.xml><?xml version="1.0" encoding="utf-8"?>
+<file path=ppt/slides/slide13.xml><?xml version="1.0" encoding="utf-8"?>
 <p:sld xmlns:a="http://schemas.openxmlformats.org/drawingml/2006/main" xmlns:r="http://schemas.openxmlformats.org/officeDocument/2006/relationships" xmlns:p="http://schemas.openxmlformats.org/presentationml/2006/main">
   <p:cSld>
     <p:spTree>
@@ -7538,7 +8600,7 @@
           <a:p>
             <a:fld id="{EB942B9F-D695-4224-97C8-E7A171F5AE33}" type="slidenum">
               <a:rPr lang="ko-KR" altLang="en-US" smtClean="0"/>
-              <a:t>12</a:t>
+              <a:t>13</a:t>
             </a:fld>
             <a:endParaRPr lang="ko-KR" altLang="en-US"/>
           </a:p>
@@ -7557,7 +8619,7 @@
 </p:sld>
 </file>
 
-<file path=ppt/slides/slide13.xml><?xml version="1.0" encoding="utf-8"?>
+<file path=ppt/slides/slide14.xml><?xml version="1.0" encoding="utf-8"?>
 <p:sld xmlns:a="http://schemas.openxmlformats.org/drawingml/2006/main" xmlns:r="http://schemas.openxmlformats.org/officeDocument/2006/relationships" xmlns:p="http://schemas.openxmlformats.org/presentationml/2006/main">
   <p:cSld>
     <p:spTree>
@@ -11026,7 +12088,7 @@
           <a:p>
             <a:fld id="{EB942B9F-D695-4224-97C8-E7A171F5AE33}" type="slidenum">
               <a:rPr lang="ko-KR" altLang="en-US" smtClean="0"/>
-              <a:t>13</a:t>
+              <a:t>14</a:t>
             </a:fld>
             <a:endParaRPr lang="ko-KR" altLang="en-US"/>
           </a:p>
@@ -11045,7 +12107,7 @@
 </p:sld>
 </file>
 
-<file path=ppt/slides/slide14.xml><?xml version="1.0" encoding="utf-8"?>
+<file path=ppt/slides/slide15.xml><?xml version="1.0" encoding="utf-8"?>
 <p:sld xmlns:a="http://schemas.openxmlformats.org/drawingml/2006/main" xmlns:r="http://schemas.openxmlformats.org/officeDocument/2006/relationships" xmlns:p="http://schemas.openxmlformats.org/presentationml/2006/main">
   <p:cSld>
     <p:spTree>
@@ -13853,7 +14915,7 @@
           <a:p>
             <a:fld id="{EB942B9F-D695-4224-97C8-E7A171F5AE33}" type="slidenum">
               <a:rPr lang="ko-KR" altLang="en-US" smtClean="0"/>
-              <a:t>14</a:t>
+              <a:t>15</a:t>
             </a:fld>
             <a:endParaRPr lang="ko-KR" altLang="en-US"/>
           </a:p>
@@ -13872,7 +14934,7 @@
 </p:sld>
 </file>
 
-<file path=ppt/slides/slide15.xml><?xml version="1.0" encoding="utf-8"?>
+<file path=ppt/slides/slide16.xml><?xml version="1.0" encoding="utf-8"?>
 <p:sld xmlns:a="http://schemas.openxmlformats.org/drawingml/2006/main" xmlns:r="http://schemas.openxmlformats.org/officeDocument/2006/relationships" xmlns:p="http://schemas.openxmlformats.org/presentationml/2006/main">
   <p:cSld>
     <p:spTree>
@@ -14144,7 +15206,7 @@
           <a:p>
             <a:fld id="{EB942B9F-D695-4224-97C8-E7A171F5AE33}" type="slidenum">
               <a:rPr lang="ko-KR" altLang="en-US" smtClean="0"/>
-              <a:t>15</a:t>
+              <a:t>16</a:t>
             </a:fld>
             <a:endParaRPr lang="ko-KR" altLang="en-US"/>
           </a:p>
@@ -14163,7 +15225,950 @@
 </p:sld>
 </file>
 
-<file path=ppt/slides/slide16.xml><?xml version="1.0" encoding="utf-8"?>
+<file path=ppt/slides/slide17.xml><?xml version="1.0" encoding="utf-8"?>
+<p:sld xmlns:a="http://schemas.openxmlformats.org/drawingml/2006/main" xmlns:r="http://schemas.openxmlformats.org/officeDocument/2006/relationships" xmlns:p="http://schemas.openxmlformats.org/presentationml/2006/main">
+  <p:cSld>
+    <p:spTree>
+      <p:nvGrpSpPr>
+        <p:cNvPr id="1" name=""/>
+        <p:cNvGrpSpPr/>
+        <p:nvPr/>
+      </p:nvGrpSpPr>
+      <p:grpSpPr>
+        <a:xfrm>
+          <a:off x="0" y="0"/>
+          <a:ext cx="0" cy="0"/>
+          <a:chOff x="0" y="0"/>
+          <a:chExt cx="0" cy="0"/>
+        </a:xfrm>
+      </p:grpSpPr>
+      <p:sp>
+        <p:nvSpPr>
+          <p:cNvPr id="71" name="Text Box 22"/>
+          <p:cNvSpPr txBox="1">
+            <a:spLocks noChangeArrowheads="1"/>
+          </p:cNvSpPr>
+          <p:nvPr/>
+        </p:nvSpPr>
+        <p:spPr bwMode="auto">
+          <a:xfrm>
+            <a:off x="141719" y="0"/>
+            <a:ext cx="5257800" cy="503238"/>
+          </a:xfrm>
+          <a:prstGeom prst="rect">
+            <a:avLst/>
+          </a:prstGeom>
+          <a:noFill/>
+          <a:ln>
+            <a:noFill/>
+          </a:ln>
+          <a:extLst>
+            <a:ext uri="{909E8E84-426E-40DD-AFC4-6F175D3DCCD1}">
+              <a14:hiddenFill xmlns:a14="http://schemas.microsoft.com/office/drawing/2010/main">
+                <a:solidFill>
+                  <a:srgbClr val="FFFFFF"/>
+                </a:solidFill>
+              </a14:hiddenFill>
+            </a:ext>
+            <a:ext uri="{91240B29-F687-4F45-9708-019B960494DF}">
+              <a14:hiddenLine xmlns:a14="http://schemas.microsoft.com/office/drawing/2010/main" w="9525">
+                <a:solidFill>
+                  <a:srgbClr val="000000"/>
+                </a:solidFill>
+                <a:miter lim="800000"/>
+                <a:headEnd/>
+                <a:tailEnd/>
+              </a14:hiddenLine>
+            </a:ext>
+          </a:extLst>
+        </p:spPr>
+        <p:txBody>
+          <a:bodyPr>
+            <a:spAutoFit/>
+          </a:bodyPr>
+          <a:lstStyle>
+            <a:defPPr>
+              <a:defRPr lang="ko-KR"/>
+            </a:defPPr>
+            <a:lvl1pPr marL="342900" marR="0" lvl="0" indent="-342900" fontAlgn="auto">
+              <a:lnSpc>
+                <a:spcPct val="100000"/>
+              </a:lnSpc>
+              <a:spcBef>
+                <a:spcPct val="50000"/>
+              </a:spcBef>
+              <a:spcAft>
+                <a:spcPts val="0"/>
+              </a:spcAft>
+              <a:buClrTx/>
+              <a:buSzTx/>
+              <a:buFontTx/>
+              <a:buNone/>
+              <a:tabLst/>
+              <a:defRPr sz="4000" b="1" baseline="-25000">
+                <a:solidFill>
+                  <a:schemeClr val="accent1">
+                    <a:lumMod val="50000"/>
+                  </a:schemeClr>
+                </a:solidFill>
+                <a:latin typeface="+mj-ea"/>
+                <a:ea typeface="+mj-ea"/>
+              </a:defRPr>
+            </a:lvl1pPr>
+            <a:lvl2pPr marL="742950" indent="-285750" eaLnBrk="0" hangingPunct="0">
+              <a:defRPr b="1">
+                <a:latin typeface="Arial" panose="020B0604020202020204" pitchFamily="34" charset="0"/>
+                <a:ea typeface="SimSun" panose="02010600030101010101" pitchFamily="2" charset="-122"/>
+              </a:defRPr>
+            </a:lvl2pPr>
+            <a:lvl3pPr marL="1143000" indent="-228600" eaLnBrk="0" hangingPunct="0">
+              <a:defRPr b="1">
+                <a:latin typeface="Arial" panose="020B0604020202020204" pitchFamily="34" charset="0"/>
+                <a:ea typeface="SimSun" panose="02010600030101010101" pitchFamily="2" charset="-122"/>
+              </a:defRPr>
+            </a:lvl3pPr>
+            <a:lvl4pPr marL="1600200" indent="-228600" eaLnBrk="0" hangingPunct="0">
+              <a:defRPr b="1">
+                <a:latin typeface="Arial" panose="020B0604020202020204" pitchFamily="34" charset="0"/>
+                <a:ea typeface="SimSun" panose="02010600030101010101" pitchFamily="2" charset="-122"/>
+              </a:defRPr>
+            </a:lvl4pPr>
+            <a:lvl5pPr marL="2057400" indent="-228600" eaLnBrk="0" hangingPunct="0">
+              <a:defRPr b="1">
+                <a:latin typeface="Arial" panose="020B0604020202020204" pitchFamily="34" charset="0"/>
+                <a:ea typeface="SimSun" panose="02010600030101010101" pitchFamily="2" charset="-122"/>
+              </a:defRPr>
+            </a:lvl5pPr>
+            <a:lvl6pPr marL="2514600" indent="-228600" algn="ctr" eaLnBrk="0" fontAlgn="base" hangingPunct="0">
+              <a:spcBef>
+                <a:spcPct val="0"/>
+              </a:spcBef>
+              <a:spcAft>
+                <a:spcPct val="0"/>
+              </a:spcAft>
+              <a:defRPr b="1">
+                <a:latin typeface="Arial" panose="020B0604020202020204" pitchFamily="34" charset="0"/>
+                <a:ea typeface="SimSun" panose="02010600030101010101" pitchFamily="2" charset="-122"/>
+              </a:defRPr>
+            </a:lvl6pPr>
+            <a:lvl7pPr marL="2971800" indent="-228600" algn="ctr" eaLnBrk="0" fontAlgn="base" hangingPunct="0">
+              <a:spcBef>
+                <a:spcPct val="0"/>
+              </a:spcBef>
+              <a:spcAft>
+                <a:spcPct val="0"/>
+              </a:spcAft>
+              <a:defRPr b="1">
+                <a:latin typeface="Arial" panose="020B0604020202020204" pitchFamily="34" charset="0"/>
+                <a:ea typeface="SimSun" panose="02010600030101010101" pitchFamily="2" charset="-122"/>
+              </a:defRPr>
+            </a:lvl7pPr>
+            <a:lvl8pPr marL="3429000" indent="-228600" algn="ctr" eaLnBrk="0" fontAlgn="base" hangingPunct="0">
+              <a:spcBef>
+                <a:spcPct val="0"/>
+              </a:spcBef>
+              <a:spcAft>
+                <a:spcPct val="0"/>
+              </a:spcAft>
+              <a:defRPr b="1">
+                <a:latin typeface="Arial" panose="020B0604020202020204" pitchFamily="34" charset="0"/>
+                <a:ea typeface="SimSun" panose="02010600030101010101" pitchFamily="2" charset="-122"/>
+              </a:defRPr>
+            </a:lvl8pPr>
+            <a:lvl9pPr marL="3886200" indent="-228600" algn="ctr" eaLnBrk="0" fontAlgn="base" hangingPunct="0">
+              <a:spcBef>
+                <a:spcPct val="0"/>
+              </a:spcBef>
+              <a:spcAft>
+                <a:spcPct val="0"/>
+              </a:spcAft>
+              <a:defRPr b="1">
+                <a:latin typeface="Arial" panose="020B0604020202020204" pitchFamily="34" charset="0"/>
+                <a:ea typeface="SimSun" panose="02010600030101010101" pitchFamily="2" charset="-122"/>
+              </a:defRPr>
+            </a:lvl9pPr>
+          </a:lstStyle>
+          <a:p>
+            <a:r>
+              <a:rPr lang="en-US" dirty="0"/>
+              <a:t>5. </a:t>
+            </a:r>
+            <a:r>
+              <a:rPr lang="ko-KR" altLang="en-US" dirty="0"/>
+              <a:t>시스템 모듈 상세 설계</a:t>
+            </a:r>
+            <a:endParaRPr lang="en-US" dirty="0"/>
+          </a:p>
+        </p:txBody>
+      </p:sp>
+      <p:sp>
+        <p:nvSpPr>
+          <p:cNvPr id="2" name="슬라이드 번호 개체 틀 1">
+            <a:extLst>
+              <a:ext uri="{FF2B5EF4-FFF2-40B4-BE49-F238E27FC236}">
+                <a16:creationId xmlns:a16="http://schemas.microsoft.com/office/drawing/2014/main" id="{7A881AB0-6BA1-4F62-B570-84FF1DDEB869}"/>
+              </a:ext>
+            </a:extLst>
+          </p:cNvPr>
+          <p:cNvSpPr>
+            <a:spLocks noGrp="1"/>
+          </p:cNvSpPr>
+          <p:nvPr>
+            <p:ph type="sldNum" sz="quarter" idx="12"/>
+          </p:nvPr>
+        </p:nvSpPr>
+        <p:spPr/>
+        <p:txBody>
+          <a:bodyPr/>
+          <a:lstStyle/>
+          <a:p>
+            <a:fld id="{EB942B9F-D695-4224-97C8-E7A171F5AE33}" type="slidenum">
+              <a:rPr lang="ko-KR" altLang="en-US" smtClean="0"/>
+              <a:t>17</a:t>
+            </a:fld>
+            <a:endParaRPr lang="ko-KR" altLang="en-US"/>
+          </a:p>
+        </p:txBody>
+      </p:sp>
+      <p:sp>
+        <p:nvSpPr>
+          <p:cNvPr id="3" name="TextBox 2">
+            <a:extLst>
+              <a:ext uri="{FF2B5EF4-FFF2-40B4-BE49-F238E27FC236}">
+                <a16:creationId xmlns:a16="http://schemas.microsoft.com/office/drawing/2014/main" id="{3B13009C-4E35-4871-8905-71DCD827884B}"/>
+              </a:ext>
+            </a:extLst>
+          </p:cNvPr>
+          <p:cNvSpPr txBox="1"/>
+          <p:nvPr/>
+        </p:nvSpPr>
+        <p:spPr>
+          <a:xfrm>
+            <a:off x="284085" y="772357"/>
+            <a:ext cx="3639845" cy="400110"/>
+          </a:xfrm>
+          <a:prstGeom prst="rect">
+            <a:avLst/>
+          </a:prstGeom>
+          <a:noFill/>
+        </p:spPr>
+        <p:txBody>
+          <a:bodyPr wrap="square" rtlCol="0">
+            <a:spAutoFit/>
+          </a:bodyPr>
+          <a:lstStyle/>
+          <a:p>
+            <a:r>
+              <a:rPr lang="ko-KR" altLang="en-US" sz="2000" b="1" dirty="0"/>
+              <a:t>리그 정보 데이터베이스 모듈</a:t>
+            </a:r>
+          </a:p>
+        </p:txBody>
+      </p:sp>
+      <p:sp>
+        <p:nvSpPr>
+          <p:cNvPr id="7" name="TextBox 6">
+            <a:extLst>
+              <a:ext uri="{FF2B5EF4-FFF2-40B4-BE49-F238E27FC236}">
+                <a16:creationId xmlns:a16="http://schemas.microsoft.com/office/drawing/2014/main" id="{90D9130C-5F1A-490B-A8CC-2BBC6C73307C}"/>
+              </a:ext>
+            </a:extLst>
+          </p:cNvPr>
+          <p:cNvSpPr txBox="1"/>
+          <p:nvPr/>
+        </p:nvSpPr>
+        <p:spPr>
+          <a:xfrm>
+            <a:off x="284084" y="1410808"/>
+            <a:ext cx="9108491" cy="3416320"/>
+          </a:xfrm>
+          <a:prstGeom prst="rect">
+            <a:avLst/>
+          </a:prstGeom>
+          <a:noFill/>
+        </p:spPr>
+        <p:txBody>
+          <a:bodyPr wrap="square" rtlCol="0">
+            <a:spAutoFit/>
+          </a:bodyPr>
+          <a:lstStyle/>
+          <a:p>
+            <a:pPr marL="285750" indent="-285750">
+              <a:buFont typeface="Wingdings" panose="05000000000000000000" pitchFamily="2" charset="2"/>
+              <a:buChar char="v"/>
+            </a:pPr>
+            <a:r>
+              <a:rPr lang="ko-KR" altLang="en-US" b="1" dirty="0"/>
+              <a:t>기능</a:t>
+            </a:r>
+            <a:endParaRPr lang="en-US" altLang="ko-KR" b="1" dirty="0"/>
+          </a:p>
+          <a:p>
+            <a:pPr marL="742950" lvl="1" indent="-285750">
+              <a:buFont typeface="Wingdings" panose="05000000000000000000" pitchFamily="2" charset="2"/>
+              <a:buChar char="Ø"/>
+            </a:pPr>
+            <a:r>
+              <a:rPr lang="ko-KR" altLang="en-US" b="1" dirty="0"/>
+              <a:t>리그 관리를 위해 필요한 데이터 저장소  </a:t>
+            </a:r>
+            <a:endParaRPr lang="en-US" altLang="ko-KR" b="1" dirty="0"/>
+          </a:p>
+          <a:p>
+            <a:pPr marL="285750" indent="-285750">
+              <a:buFont typeface="Wingdings" panose="05000000000000000000" pitchFamily="2" charset="2"/>
+              <a:buChar char="v"/>
+            </a:pPr>
+            <a:endParaRPr lang="en-US" altLang="ko-KR" b="1" dirty="0"/>
+          </a:p>
+          <a:p>
+            <a:pPr marL="285750" indent="-285750">
+              <a:buFont typeface="Wingdings" panose="05000000000000000000" pitchFamily="2" charset="2"/>
+              <a:buChar char="v"/>
+            </a:pPr>
+            <a:r>
+              <a:rPr lang="ko-KR" altLang="en-US" b="1" dirty="0"/>
+              <a:t>다루는 정보</a:t>
+            </a:r>
+            <a:endParaRPr lang="en-US" altLang="ko-KR" b="1" dirty="0"/>
+          </a:p>
+          <a:p>
+            <a:pPr marL="742950" lvl="1" indent="-285750">
+              <a:buFont typeface="Wingdings" panose="05000000000000000000" pitchFamily="2" charset="2"/>
+              <a:buChar char="Ø"/>
+            </a:pPr>
+            <a:r>
+              <a:rPr lang="ko-KR" altLang="en-US" b="1" dirty="0"/>
+              <a:t>다루는 정보 작성</a:t>
+            </a:r>
+            <a:endParaRPr lang="en-US" altLang="ko-KR" b="1" dirty="0"/>
+          </a:p>
+          <a:p>
+            <a:pPr marL="285750" indent="-285750">
+              <a:buFont typeface="Wingdings" panose="05000000000000000000" pitchFamily="2" charset="2"/>
+              <a:buChar char="v"/>
+            </a:pPr>
+            <a:endParaRPr lang="en-US" altLang="ko-KR" b="1" dirty="0"/>
+          </a:p>
+          <a:p>
+            <a:pPr marL="285750" indent="-285750">
+              <a:buFont typeface="Wingdings" panose="05000000000000000000" pitchFamily="2" charset="2"/>
+              <a:buChar char="v"/>
+            </a:pPr>
+            <a:r>
+              <a:rPr lang="ko-KR" altLang="en-US" b="1" dirty="0"/>
+              <a:t>테이블 명 목록</a:t>
+            </a:r>
+            <a:endParaRPr lang="en-US" altLang="ko-KR" b="1" dirty="0"/>
+          </a:p>
+          <a:p>
+            <a:pPr marL="742950" lvl="1" indent="-285750">
+              <a:buFont typeface="Wingdings" panose="05000000000000000000" pitchFamily="2" charset="2"/>
+              <a:buChar char="Ø"/>
+            </a:pPr>
+            <a:endParaRPr lang="en-US" altLang="ko-KR" b="1" dirty="0"/>
+          </a:p>
+          <a:p>
+            <a:pPr marL="285750" indent="-285750">
+              <a:buFont typeface="Wingdings" panose="05000000000000000000" pitchFamily="2" charset="2"/>
+              <a:buChar char="v"/>
+            </a:pPr>
+            <a:endParaRPr lang="en-US" altLang="ko-KR" b="1" dirty="0"/>
+          </a:p>
+          <a:p>
+            <a:pPr marL="285750" indent="-285750">
+              <a:buFont typeface="Wingdings" panose="05000000000000000000" pitchFamily="2" charset="2"/>
+              <a:buChar char="v"/>
+            </a:pPr>
+            <a:endParaRPr lang="en-US" altLang="ko-KR" b="1" dirty="0"/>
+          </a:p>
+          <a:p>
+            <a:pPr marL="285750" indent="-285750">
+              <a:buFont typeface="Wingdings" panose="05000000000000000000" pitchFamily="2" charset="2"/>
+              <a:buChar char="v"/>
+            </a:pPr>
+            <a:endParaRPr lang="en-US" altLang="ko-KR" b="1" dirty="0"/>
+          </a:p>
+          <a:p>
+            <a:pPr marL="285750" indent="-285750">
+              <a:buFont typeface="Wingdings" panose="05000000000000000000" pitchFamily="2" charset="2"/>
+              <a:buChar char="v"/>
+            </a:pPr>
+            <a:endParaRPr lang="ko-KR" altLang="en-US" b="1" dirty="0"/>
+          </a:p>
+        </p:txBody>
+      </p:sp>
+      <p:sp>
+        <p:nvSpPr>
+          <p:cNvPr id="5" name="TextBox 4">
+            <a:extLst>
+              <a:ext uri="{FF2B5EF4-FFF2-40B4-BE49-F238E27FC236}">
+                <a16:creationId xmlns:a16="http://schemas.microsoft.com/office/drawing/2014/main" id="{B739B812-9151-4E03-94AD-C699EBDF66A8}"/>
+              </a:ext>
+            </a:extLst>
+          </p:cNvPr>
+          <p:cNvSpPr txBox="1"/>
+          <p:nvPr/>
+        </p:nvSpPr>
+        <p:spPr>
+          <a:xfrm>
+            <a:off x="301055" y="3429000"/>
+            <a:ext cx="4149918" cy="3693319"/>
+          </a:xfrm>
+          <a:prstGeom prst="rect">
+            <a:avLst/>
+          </a:prstGeom>
+          <a:noFill/>
+        </p:spPr>
+        <p:txBody>
+          <a:bodyPr wrap="square" rtlCol="0">
+            <a:spAutoFit/>
+          </a:bodyPr>
+          <a:lstStyle/>
+          <a:p>
+            <a:pPr marL="742950" lvl="1" indent="-285750">
+              <a:buFont typeface="Wingdings" panose="05000000000000000000" pitchFamily="2" charset="2"/>
+              <a:buChar char="Ø"/>
+            </a:pPr>
+            <a:r>
+              <a:rPr lang="ko-KR" altLang="en-US" b="1" dirty="0"/>
+              <a:t>팀</a:t>
+            </a:r>
+            <a:r>
+              <a:rPr lang="en-US" altLang="ko-KR" b="1" dirty="0"/>
+              <a:t> </a:t>
+            </a:r>
+          </a:p>
+          <a:p>
+            <a:pPr marL="742950" lvl="1" indent="-285750">
+              <a:buFont typeface="Wingdings" panose="05000000000000000000" pitchFamily="2" charset="2"/>
+              <a:buChar char="Ø"/>
+            </a:pPr>
+            <a:r>
+              <a:rPr lang="ko-KR" altLang="en-US" b="1" dirty="0"/>
+              <a:t>팀 선수 매핑</a:t>
+            </a:r>
+            <a:endParaRPr lang="en-US" altLang="ko-KR" b="1" dirty="0"/>
+          </a:p>
+          <a:p>
+            <a:pPr marL="742950" lvl="1" indent="-285750">
+              <a:buFont typeface="Wingdings" panose="05000000000000000000" pitchFamily="2" charset="2"/>
+              <a:buChar char="Ø"/>
+            </a:pPr>
+            <a:r>
+              <a:rPr lang="ko-KR" altLang="en-US" b="1" dirty="0"/>
+              <a:t>선수</a:t>
+            </a:r>
+            <a:endParaRPr lang="en-US" altLang="ko-KR" b="1" dirty="0"/>
+          </a:p>
+          <a:p>
+            <a:pPr marL="742950" lvl="1" indent="-285750">
+              <a:buFont typeface="Wingdings" panose="05000000000000000000" pitchFamily="2" charset="2"/>
+              <a:buChar char="Ø"/>
+            </a:pPr>
+            <a:r>
+              <a:rPr lang="ko-KR" altLang="en-US" b="1" dirty="0"/>
+              <a:t>팀 리그 매핑</a:t>
+            </a:r>
+            <a:endParaRPr lang="en-US" altLang="ko-KR" b="1" dirty="0"/>
+          </a:p>
+          <a:p>
+            <a:pPr marL="742950" lvl="1" indent="-285750">
+              <a:buFont typeface="Wingdings" panose="05000000000000000000" pitchFamily="2" charset="2"/>
+              <a:buChar char="Ø"/>
+            </a:pPr>
+            <a:r>
+              <a:rPr lang="ko-KR" altLang="en-US" b="1" dirty="0"/>
+              <a:t>리그</a:t>
+            </a:r>
+            <a:endParaRPr lang="en-US" altLang="ko-KR" b="1" dirty="0"/>
+          </a:p>
+          <a:p>
+            <a:pPr marL="742950" lvl="1" indent="-285750">
+              <a:buFont typeface="Wingdings" panose="05000000000000000000" pitchFamily="2" charset="2"/>
+              <a:buChar char="Ø"/>
+            </a:pPr>
+            <a:r>
+              <a:rPr lang="ko-KR" altLang="en-US" b="1" dirty="0"/>
+              <a:t>팀별 경기결과</a:t>
+            </a:r>
+            <a:endParaRPr lang="en-US" altLang="ko-KR" b="1" dirty="0"/>
+          </a:p>
+          <a:p>
+            <a:pPr marL="742950" lvl="1" indent="-285750">
+              <a:buFont typeface="Wingdings" panose="05000000000000000000" pitchFamily="2" charset="2"/>
+              <a:buChar char="Ø"/>
+            </a:pPr>
+            <a:r>
+              <a:rPr lang="ko-KR" altLang="en-US" b="1" dirty="0"/>
+              <a:t>경기일정</a:t>
+            </a:r>
+            <a:endParaRPr lang="en-US" altLang="ko-KR" b="1" dirty="0"/>
+          </a:p>
+          <a:p>
+            <a:pPr marL="742950" lvl="1" indent="-285750">
+              <a:buFont typeface="Wingdings" panose="05000000000000000000" pitchFamily="2" charset="2"/>
+              <a:buChar char="Ø"/>
+            </a:pPr>
+            <a:r>
+              <a:rPr lang="ko-KR" altLang="en-US" b="1" dirty="0"/>
+              <a:t>구장</a:t>
+            </a:r>
+            <a:endParaRPr lang="en-US" altLang="ko-KR" b="1" dirty="0"/>
+          </a:p>
+          <a:p>
+            <a:pPr marL="742950" lvl="1" indent="-285750">
+              <a:buFont typeface="Wingdings" panose="05000000000000000000" pitchFamily="2" charset="2"/>
+              <a:buChar char="Ø"/>
+            </a:pPr>
+            <a:r>
+              <a:rPr lang="ko-KR" altLang="en-US" b="1" dirty="0"/>
+              <a:t>구장사진</a:t>
+            </a:r>
+            <a:endParaRPr lang="en-US" altLang="ko-KR" b="1" dirty="0"/>
+          </a:p>
+          <a:p>
+            <a:pPr marL="742950" lvl="1" indent="-285750">
+              <a:buFont typeface="Wingdings" panose="05000000000000000000" pitchFamily="2" charset="2"/>
+              <a:buChar char="Ø"/>
+            </a:pPr>
+            <a:r>
+              <a:rPr lang="ko-KR" altLang="en-US" b="1" dirty="0"/>
+              <a:t>개별 경기일정</a:t>
+            </a:r>
+            <a:endParaRPr lang="en-US" altLang="ko-KR" b="1" dirty="0"/>
+          </a:p>
+          <a:p>
+            <a:pPr marL="742950" lvl="1" indent="-285750">
+              <a:buFont typeface="Wingdings" panose="05000000000000000000" pitchFamily="2" charset="2"/>
+              <a:buChar char="Ø"/>
+            </a:pPr>
+            <a:r>
+              <a:rPr lang="ko-KR" altLang="en-US" b="1" dirty="0"/>
+              <a:t>개별 경기일정 동영상</a:t>
+            </a:r>
+            <a:endParaRPr lang="en-US" altLang="ko-KR" b="1" dirty="0"/>
+          </a:p>
+          <a:p>
+            <a:pPr marL="742950" lvl="1" indent="-285750">
+              <a:buFont typeface="Wingdings" panose="05000000000000000000" pitchFamily="2" charset="2"/>
+              <a:buChar char="Ø"/>
+            </a:pPr>
+            <a:r>
+              <a:rPr lang="ko-KR" altLang="en-US" b="1" dirty="0"/>
+              <a:t>개별 경기일정 동영상 히스토리</a:t>
+            </a:r>
+            <a:endParaRPr lang="en-US" altLang="ko-KR" b="1" dirty="0"/>
+          </a:p>
+          <a:p>
+            <a:endParaRPr lang="ko-KR" altLang="en-US" dirty="0"/>
+          </a:p>
+        </p:txBody>
+      </p:sp>
+      <p:sp>
+        <p:nvSpPr>
+          <p:cNvPr id="10" name="TextBox 9">
+            <a:extLst>
+              <a:ext uri="{FF2B5EF4-FFF2-40B4-BE49-F238E27FC236}">
+                <a16:creationId xmlns:a16="http://schemas.microsoft.com/office/drawing/2014/main" id="{B9A6D9C6-94CE-4145-A1A7-D3F6A46ABCB6}"/>
+              </a:ext>
+            </a:extLst>
+          </p:cNvPr>
+          <p:cNvSpPr txBox="1"/>
+          <p:nvPr/>
+        </p:nvSpPr>
+        <p:spPr>
+          <a:xfrm>
+            <a:off x="3923930" y="3391165"/>
+            <a:ext cx="4149918" cy="369332"/>
+          </a:xfrm>
+          <a:prstGeom prst="rect">
+            <a:avLst/>
+          </a:prstGeom>
+          <a:noFill/>
+        </p:spPr>
+        <p:txBody>
+          <a:bodyPr wrap="square" rtlCol="0">
+            <a:spAutoFit/>
+          </a:bodyPr>
+          <a:lstStyle/>
+          <a:p>
+            <a:pPr marL="742950" lvl="1" indent="-285750">
+              <a:buFont typeface="Wingdings" panose="05000000000000000000" pitchFamily="2" charset="2"/>
+              <a:buChar char="Ø"/>
+            </a:pPr>
+            <a:r>
+              <a:rPr lang="ko-KR" altLang="en-US" b="1" dirty="0"/>
+              <a:t>현규 테이블 이름 작성</a:t>
+            </a:r>
+            <a:endParaRPr lang="en-US" altLang="ko-KR" b="1" dirty="0"/>
+          </a:p>
+        </p:txBody>
+      </p:sp>
+    </p:spTree>
+    <p:extLst>
+      <p:ext uri="{BB962C8B-B14F-4D97-AF65-F5344CB8AC3E}">
+        <p14:creationId xmlns:p14="http://schemas.microsoft.com/office/powerpoint/2010/main" val="691964108"/>
+      </p:ext>
+    </p:extLst>
+  </p:cSld>
+  <p:clrMapOvr>
+    <a:masterClrMapping/>
+  </p:clrMapOvr>
+</p:sld>
+</file>
+
+<file path=ppt/slides/slide18.xml><?xml version="1.0" encoding="utf-8"?>
+<p:sld xmlns:a="http://schemas.openxmlformats.org/drawingml/2006/main" xmlns:r="http://schemas.openxmlformats.org/officeDocument/2006/relationships" xmlns:p="http://schemas.openxmlformats.org/presentationml/2006/main">
+  <p:cSld>
+    <p:spTree>
+      <p:nvGrpSpPr>
+        <p:cNvPr id="1" name=""/>
+        <p:cNvGrpSpPr/>
+        <p:nvPr/>
+      </p:nvGrpSpPr>
+      <p:grpSpPr>
+        <a:xfrm>
+          <a:off x="0" y="0"/>
+          <a:ext cx="0" cy="0"/>
+          <a:chOff x="0" y="0"/>
+          <a:chExt cx="0" cy="0"/>
+        </a:xfrm>
+      </p:grpSpPr>
+      <p:sp>
+        <p:nvSpPr>
+          <p:cNvPr id="71" name="Text Box 22"/>
+          <p:cNvSpPr txBox="1">
+            <a:spLocks noChangeArrowheads="1"/>
+          </p:cNvSpPr>
+          <p:nvPr/>
+        </p:nvSpPr>
+        <p:spPr bwMode="auto">
+          <a:xfrm>
+            <a:off x="141719" y="0"/>
+            <a:ext cx="5257800" cy="503238"/>
+          </a:xfrm>
+          <a:prstGeom prst="rect">
+            <a:avLst/>
+          </a:prstGeom>
+          <a:noFill/>
+          <a:ln>
+            <a:noFill/>
+          </a:ln>
+          <a:extLst>
+            <a:ext uri="{909E8E84-426E-40DD-AFC4-6F175D3DCCD1}">
+              <a14:hiddenFill xmlns:a14="http://schemas.microsoft.com/office/drawing/2010/main">
+                <a:solidFill>
+                  <a:srgbClr val="FFFFFF"/>
+                </a:solidFill>
+              </a14:hiddenFill>
+            </a:ext>
+            <a:ext uri="{91240B29-F687-4F45-9708-019B960494DF}">
+              <a14:hiddenLine xmlns:a14="http://schemas.microsoft.com/office/drawing/2010/main" w="9525">
+                <a:solidFill>
+                  <a:srgbClr val="000000"/>
+                </a:solidFill>
+                <a:miter lim="800000"/>
+                <a:headEnd/>
+                <a:tailEnd/>
+              </a14:hiddenLine>
+            </a:ext>
+          </a:extLst>
+        </p:spPr>
+        <p:txBody>
+          <a:bodyPr>
+            <a:spAutoFit/>
+          </a:bodyPr>
+          <a:lstStyle>
+            <a:defPPr>
+              <a:defRPr lang="ko-KR"/>
+            </a:defPPr>
+            <a:lvl1pPr marL="342900" marR="0" lvl="0" indent="-342900" fontAlgn="auto">
+              <a:lnSpc>
+                <a:spcPct val="100000"/>
+              </a:lnSpc>
+              <a:spcBef>
+                <a:spcPct val="50000"/>
+              </a:spcBef>
+              <a:spcAft>
+                <a:spcPts val="0"/>
+              </a:spcAft>
+              <a:buClrTx/>
+              <a:buSzTx/>
+              <a:buFontTx/>
+              <a:buNone/>
+              <a:tabLst/>
+              <a:defRPr sz="4000" b="1" baseline="-25000">
+                <a:solidFill>
+                  <a:schemeClr val="accent1">
+                    <a:lumMod val="50000"/>
+                  </a:schemeClr>
+                </a:solidFill>
+                <a:latin typeface="+mj-ea"/>
+                <a:ea typeface="+mj-ea"/>
+              </a:defRPr>
+            </a:lvl1pPr>
+            <a:lvl2pPr marL="742950" indent="-285750" eaLnBrk="0" hangingPunct="0">
+              <a:defRPr b="1">
+                <a:latin typeface="Arial" panose="020B0604020202020204" pitchFamily="34" charset="0"/>
+                <a:ea typeface="SimSun" panose="02010600030101010101" pitchFamily="2" charset="-122"/>
+              </a:defRPr>
+            </a:lvl2pPr>
+            <a:lvl3pPr marL="1143000" indent="-228600" eaLnBrk="0" hangingPunct="0">
+              <a:defRPr b="1">
+                <a:latin typeface="Arial" panose="020B0604020202020204" pitchFamily="34" charset="0"/>
+                <a:ea typeface="SimSun" panose="02010600030101010101" pitchFamily="2" charset="-122"/>
+              </a:defRPr>
+            </a:lvl3pPr>
+            <a:lvl4pPr marL="1600200" indent="-228600" eaLnBrk="0" hangingPunct="0">
+              <a:defRPr b="1">
+                <a:latin typeface="Arial" panose="020B0604020202020204" pitchFamily="34" charset="0"/>
+                <a:ea typeface="SimSun" panose="02010600030101010101" pitchFamily="2" charset="-122"/>
+              </a:defRPr>
+            </a:lvl4pPr>
+            <a:lvl5pPr marL="2057400" indent="-228600" eaLnBrk="0" hangingPunct="0">
+              <a:defRPr b="1">
+                <a:latin typeface="Arial" panose="020B0604020202020204" pitchFamily="34" charset="0"/>
+                <a:ea typeface="SimSun" panose="02010600030101010101" pitchFamily="2" charset="-122"/>
+              </a:defRPr>
+            </a:lvl5pPr>
+            <a:lvl6pPr marL="2514600" indent="-228600" algn="ctr" eaLnBrk="0" fontAlgn="base" hangingPunct="0">
+              <a:spcBef>
+                <a:spcPct val="0"/>
+              </a:spcBef>
+              <a:spcAft>
+                <a:spcPct val="0"/>
+              </a:spcAft>
+              <a:defRPr b="1">
+                <a:latin typeface="Arial" panose="020B0604020202020204" pitchFamily="34" charset="0"/>
+                <a:ea typeface="SimSun" panose="02010600030101010101" pitchFamily="2" charset="-122"/>
+              </a:defRPr>
+            </a:lvl6pPr>
+            <a:lvl7pPr marL="2971800" indent="-228600" algn="ctr" eaLnBrk="0" fontAlgn="base" hangingPunct="0">
+              <a:spcBef>
+                <a:spcPct val="0"/>
+              </a:spcBef>
+              <a:spcAft>
+                <a:spcPct val="0"/>
+              </a:spcAft>
+              <a:defRPr b="1">
+                <a:latin typeface="Arial" panose="020B0604020202020204" pitchFamily="34" charset="0"/>
+                <a:ea typeface="SimSun" panose="02010600030101010101" pitchFamily="2" charset="-122"/>
+              </a:defRPr>
+            </a:lvl7pPr>
+            <a:lvl8pPr marL="3429000" indent="-228600" algn="ctr" eaLnBrk="0" fontAlgn="base" hangingPunct="0">
+              <a:spcBef>
+                <a:spcPct val="0"/>
+              </a:spcBef>
+              <a:spcAft>
+                <a:spcPct val="0"/>
+              </a:spcAft>
+              <a:defRPr b="1">
+                <a:latin typeface="Arial" panose="020B0604020202020204" pitchFamily="34" charset="0"/>
+                <a:ea typeface="SimSun" panose="02010600030101010101" pitchFamily="2" charset="-122"/>
+              </a:defRPr>
+            </a:lvl8pPr>
+            <a:lvl9pPr marL="3886200" indent="-228600" algn="ctr" eaLnBrk="0" fontAlgn="base" hangingPunct="0">
+              <a:spcBef>
+                <a:spcPct val="0"/>
+              </a:spcBef>
+              <a:spcAft>
+                <a:spcPct val="0"/>
+              </a:spcAft>
+              <a:defRPr b="1">
+                <a:latin typeface="Arial" panose="020B0604020202020204" pitchFamily="34" charset="0"/>
+                <a:ea typeface="SimSun" panose="02010600030101010101" pitchFamily="2" charset="-122"/>
+              </a:defRPr>
+            </a:lvl9pPr>
+          </a:lstStyle>
+          <a:p>
+            <a:r>
+              <a:rPr lang="en-US" dirty="0"/>
+              <a:t>5. </a:t>
+            </a:r>
+            <a:r>
+              <a:rPr lang="ko-KR" altLang="en-US" dirty="0"/>
+              <a:t>시스템 모듈 상세 설계</a:t>
+            </a:r>
+            <a:endParaRPr lang="en-US" dirty="0"/>
+          </a:p>
+        </p:txBody>
+      </p:sp>
+      <p:sp>
+        <p:nvSpPr>
+          <p:cNvPr id="2" name="슬라이드 번호 개체 틀 1">
+            <a:extLst>
+              <a:ext uri="{FF2B5EF4-FFF2-40B4-BE49-F238E27FC236}">
+                <a16:creationId xmlns:a16="http://schemas.microsoft.com/office/drawing/2014/main" id="{7A881AB0-6BA1-4F62-B570-84FF1DDEB869}"/>
+              </a:ext>
+            </a:extLst>
+          </p:cNvPr>
+          <p:cNvSpPr>
+            <a:spLocks noGrp="1"/>
+          </p:cNvSpPr>
+          <p:nvPr>
+            <p:ph type="sldNum" sz="quarter" idx="12"/>
+          </p:nvPr>
+        </p:nvSpPr>
+        <p:spPr/>
+        <p:txBody>
+          <a:bodyPr/>
+          <a:lstStyle/>
+          <a:p>
+            <a:fld id="{EB942B9F-D695-4224-97C8-E7A171F5AE33}" type="slidenum">
+              <a:rPr lang="ko-KR" altLang="en-US" smtClean="0"/>
+              <a:t>18</a:t>
+            </a:fld>
+            <a:endParaRPr lang="ko-KR" altLang="en-US"/>
+          </a:p>
+        </p:txBody>
+      </p:sp>
+      <p:sp>
+        <p:nvSpPr>
+          <p:cNvPr id="3" name="TextBox 2">
+            <a:extLst>
+              <a:ext uri="{FF2B5EF4-FFF2-40B4-BE49-F238E27FC236}">
+                <a16:creationId xmlns:a16="http://schemas.microsoft.com/office/drawing/2014/main" id="{3B13009C-4E35-4871-8905-71DCD827884B}"/>
+              </a:ext>
+            </a:extLst>
+          </p:cNvPr>
+          <p:cNvSpPr txBox="1"/>
+          <p:nvPr/>
+        </p:nvSpPr>
+        <p:spPr>
+          <a:xfrm>
+            <a:off x="284085" y="772357"/>
+            <a:ext cx="3639845" cy="400110"/>
+          </a:xfrm>
+          <a:prstGeom prst="rect">
+            <a:avLst/>
+          </a:prstGeom>
+          <a:noFill/>
+        </p:spPr>
+        <p:txBody>
+          <a:bodyPr wrap="square" rtlCol="0">
+            <a:spAutoFit/>
+          </a:bodyPr>
+          <a:lstStyle/>
+          <a:p>
+            <a:r>
+              <a:rPr lang="ko-KR" altLang="en-US" sz="2000" b="1" dirty="0"/>
+              <a:t>리그 정보 데이터베이스 모듈</a:t>
+            </a:r>
+          </a:p>
+        </p:txBody>
+      </p:sp>
+      <p:sp>
+        <p:nvSpPr>
+          <p:cNvPr id="7" name="TextBox 6">
+            <a:extLst>
+              <a:ext uri="{FF2B5EF4-FFF2-40B4-BE49-F238E27FC236}">
+                <a16:creationId xmlns:a16="http://schemas.microsoft.com/office/drawing/2014/main" id="{90D9130C-5F1A-490B-A8CC-2BBC6C73307C}"/>
+              </a:ext>
+            </a:extLst>
+          </p:cNvPr>
+          <p:cNvSpPr txBox="1"/>
+          <p:nvPr/>
+        </p:nvSpPr>
+        <p:spPr>
+          <a:xfrm>
+            <a:off x="284084" y="1410808"/>
+            <a:ext cx="3639845" cy="1200329"/>
+          </a:xfrm>
+          <a:prstGeom prst="rect">
+            <a:avLst/>
+          </a:prstGeom>
+          <a:noFill/>
+        </p:spPr>
+        <p:txBody>
+          <a:bodyPr wrap="square" rtlCol="0">
+            <a:spAutoFit/>
+          </a:bodyPr>
+          <a:lstStyle/>
+          <a:p>
+            <a:pPr marL="285750" indent="-285750">
+              <a:buFont typeface="Wingdings" panose="05000000000000000000" pitchFamily="2" charset="2"/>
+              <a:buChar char="v"/>
+            </a:pPr>
+            <a:r>
+              <a:rPr lang="ko-KR" altLang="en-US" b="1" dirty="0"/>
+              <a:t>데이터 구조</a:t>
+            </a:r>
+            <a:endParaRPr lang="en-US" altLang="ko-KR" b="1" dirty="0"/>
+          </a:p>
+          <a:p>
+            <a:pPr marL="285750" indent="-285750">
+              <a:buFont typeface="Arial" panose="020B0604020202020204" pitchFamily="34" charset="0"/>
+              <a:buChar char="•"/>
+            </a:pPr>
+            <a:endParaRPr lang="en-US" altLang="ko-KR" b="1" dirty="0"/>
+          </a:p>
+          <a:p>
+            <a:pPr marL="285750" indent="-285750">
+              <a:buFont typeface="Arial" panose="020B0604020202020204" pitchFamily="34" charset="0"/>
+              <a:buChar char="•"/>
+            </a:pPr>
+            <a:endParaRPr lang="en-US" altLang="ko-KR" b="1" dirty="0"/>
+          </a:p>
+          <a:p>
+            <a:pPr marL="285750" indent="-285750">
+              <a:buFont typeface="Arial" panose="020B0604020202020204" pitchFamily="34" charset="0"/>
+              <a:buChar char="•"/>
+            </a:pPr>
+            <a:endParaRPr lang="ko-KR" altLang="en-US" b="1" dirty="0"/>
+          </a:p>
+        </p:txBody>
+      </p:sp>
+      <p:pic>
+        <p:nvPicPr>
+          <p:cNvPr id="5" name="그림 4">
+            <a:extLst>
+              <a:ext uri="{FF2B5EF4-FFF2-40B4-BE49-F238E27FC236}">
+                <a16:creationId xmlns:a16="http://schemas.microsoft.com/office/drawing/2014/main" id="{36DDC0FE-4B9B-44A0-8899-9792FDF67965}"/>
+              </a:ext>
+            </a:extLst>
+          </p:cNvPr>
+          <p:cNvPicPr>
+            <a:picLocks noChangeAspect="1"/>
+          </p:cNvPicPr>
+          <p:nvPr/>
+        </p:nvPicPr>
+        <p:blipFill>
+          <a:blip r:embed="rId2">
+            <a:extLst>
+              <a:ext uri="{28A0092B-C50C-407E-A947-70E740481C1C}">
+                <a14:useLocalDpi xmlns:a14="http://schemas.microsoft.com/office/drawing/2010/main" val="0"/>
+              </a:ext>
+            </a:extLst>
+          </a:blip>
+          <a:stretch>
+            <a:fillRect/>
+          </a:stretch>
+        </p:blipFill>
+        <p:spPr>
+          <a:xfrm>
+            <a:off x="522958" y="1977681"/>
+            <a:ext cx="2000791" cy="1653286"/>
+          </a:xfrm>
+          <a:prstGeom prst="rect">
+            <a:avLst/>
+          </a:prstGeom>
+        </p:spPr>
+      </p:pic>
+    </p:spTree>
+    <p:extLst>
+      <p:ext uri="{BB962C8B-B14F-4D97-AF65-F5344CB8AC3E}">
+        <p14:creationId xmlns:p14="http://schemas.microsoft.com/office/powerpoint/2010/main" val="4262247549"/>
+      </p:ext>
+    </p:extLst>
+  </p:cSld>
+  <p:clrMapOvr>
+    <a:masterClrMapping/>
+  </p:clrMapOvr>
+</p:sld>
+</file>
+
+<file path=ppt/slides/slide19.xml><?xml version="1.0" encoding="utf-8"?>
 <p:sld xmlns:a="http://schemas.openxmlformats.org/drawingml/2006/main" xmlns:r="http://schemas.openxmlformats.org/officeDocument/2006/relationships" xmlns:p="http://schemas.openxmlformats.org/presentationml/2006/main">
   <p:cSld>
     <p:spTree>
@@ -17643,7 +19648,7 @@
           <a:p>
             <a:fld id="{EB942B9F-D695-4224-97C8-E7A171F5AE33}" type="slidenum">
               <a:rPr lang="ko-KR" altLang="en-US" smtClean="0"/>
-              <a:t>16</a:t>
+              <a:t>19</a:t>
             </a:fld>
             <a:endParaRPr lang="ko-KR" altLang="en-US"/>
           </a:p>
@@ -17662,7 +19667,318 @@
 </p:sld>
 </file>
 
-<file path=ppt/slides/slide17.xml><?xml version="1.0" encoding="utf-8"?>
+<file path=ppt/slides/slide2.xml><?xml version="1.0" encoding="utf-8"?>
+<p:sld xmlns:a="http://schemas.openxmlformats.org/drawingml/2006/main" xmlns:r="http://schemas.openxmlformats.org/officeDocument/2006/relationships" xmlns:p="http://schemas.openxmlformats.org/presentationml/2006/main">
+  <p:cSld>
+    <p:spTree>
+      <p:nvGrpSpPr>
+        <p:cNvPr id="1" name=""/>
+        <p:cNvGrpSpPr/>
+        <p:nvPr/>
+      </p:nvGrpSpPr>
+      <p:grpSpPr>
+        <a:xfrm>
+          <a:off x="0" y="0"/>
+          <a:ext cx="0" cy="0"/>
+          <a:chOff x="0" y="0"/>
+          <a:chExt cx="0" cy="0"/>
+        </a:xfrm>
+      </p:grpSpPr>
+      <p:pic>
+        <p:nvPicPr>
+          <p:cNvPr id="35" name="Picture 4"/>
+          <p:cNvPicPr>
+            <a:picLocks noChangeAspect="1" noChangeArrowheads="1"/>
+          </p:cNvPicPr>
+          <p:nvPr/>
+        </p:nvPicPr>
+        <p:blipFill>
+          <a:blip r:embed="rId2" cstate="print">
+            <a:extLst>
+              <a:ext uri="{28A0092B-C50C-407E-A947-70E740481C1C}">
+                <a14:useLocalDpi xmlns:a14="http://schemas.microsoft.com/office/drawing/2010/main" val="0"/>
+              </a:ext>
+            </a:extLst>
+          </a:blip>
+          <a:srcRect/>
+          <a:stretch>
+            <a:fillRect/>
+          </a:stretch>
+        </p:blipFill>
+        <p:spPr bwMode="auto">
+          <a:xfrm flipH="1">
+            <a:off x="7701152" y="3365323"/>
+            <a:ext cx="1223950" cy="3370129"/>
+          </a:xfrm>
+          <a:prstGeom prst="rect">
+            <a:avLst/>
+          </a:prstGeom>
+          <a:noFill/>
+          <a:ln w="9525">
+            <a:noFill/>
+            <a:miter lim="800000"/>
+            <a:headEnd/>
+            <a:tailEnd/>
+          </a:ln>
+          <a:effectLst>
+            <a:outerShdw blurRad="76200" dir="13500000" sy="23000" kx="1200000" algn="br" rotWithShape="0">
+              <a:prstClr val="black">
+                <a:alpha val="10000"/>
+              </a:prstClr>
+            </a:outerShdw>
+          </a:effectLst>
+        </p:spPr>
+      </p:pic>
+      <p:sp>
+        <p:nvSpPr>
+          <p:cNvPr id="36" name="Text Box 22"/>
+          <p:cNvSpPr txBox="1">
+            <a:spLocks noChangeArrowheads="1"/>
+          </p:cNvSpPr>
+          <p:nvPr/>
+        </p:nvSpPr>
+        <p:spPr bwMode="auto">
+          <a:xfrm>
+            <a:off x="141719" y="0"/>
+            <a:ext cx="5257800" cy="503238"/>
+          </a:xfrm>
+          <a:prstGeom prst="rect">
+            <a:avLst/>
+          </a:prstGeom>
+          <a:noFill/>
+          <a:ln>
+            <a:noFill/>
+          </a:ln>
+          <a:extLst>
+            <a:ext uri="{909E8E84-426E-40DD-AFC4-6F175D3DCCD1}">
+              <a14:hiddenFill xmlns:a14="http://schemas.microsoft.com/office/drawing/2010/main">
+                <a:solidFill>
+                  <a:srgbClr val="FFFFFF"/>
+                </a:solidFill>
+              </a14:hiddenFill>
+            </a:ext>
+            <a:ext uri="{91240B29-F687-4F45-9708-019B960494DF}">
+              <a14:hiddenLine xmlns:a14="http://schemas.microsoft.com/office/drawing/2010/main" w="9525">
+                <a:solidFill>
+                  <a:srgbClr val="000000"/>
+                </a:solidFill>
+                <a:miter lim="800000"/>
+                <a:headEnd/>
+                <a:tailEnd/>
+              </a14:hiddenLine>
+            </a:ext>
+          </a:extLst>
+        </p:spPr>
+        <p:txBody>
+          <a:bodyPr>
+            <a:spAutoFit/>
+          </a:bodyPr>
+          <a:lstStyle>
+            <a:lvl1pPr marL="342900" indent="-342900" eaLnBrk="0" hangingPunct="0">
+              <a:defRPr b="1">
+                <a:solidFill>
+                  <a:schemeClr val="tx1"/>
+                </a:solidFill>
+                <a:latin typeface="Arial" panose="020B0604020202020204" pitchFamily="34" charset="0"/>
+                <a:ea typeface="SimSun" panose="02010600030101010101" pitchFamily="2" charset="-122"/>
+              </a:defRPr>
+            </a:lvl1pPr>
+            <a:lvl2pPr marL="742950" indent="-285750" eaLnBrk="0" hangingPunct="0">
+              <a:defRPr b="1">
+                <a:solidFill>
+                  <a:schemeClr val="tx1"/>
+                </a:solidFill>
+                <a:latin typeface="Arial" panose="020B0604020202020204" pitchFamily="34" charset="0"/>
+                <a:ea typeface="SimSun" panose="02010600030101010101" pitchFamily="2" charset="-122"/>
+              </a:defRPr>
+            </a:lvl2pPr>
+            <a:lvl3pPr marL="1143000" indent="-228600" eaLnBrk="0" hangingPunct="0">
+              <a:defRPr b="1">
+                <a:solidFill>
+                  <a:schemeClr val="tx1"/>
+                </a:solidFill>
+                <a:latin typeface="Arial" panose="020B0604020202020204" pitchFamily="34" charset="0"/>
+                <a:ea typeface="SimSun" panose="02010600030101010101" pitchFamily="2" charset="-122"/>
+              </a:defRPr>
+            </a:lvl3pPr>
+            <a:lvl4pPr marL="1600200" indent="-228600" eaLnBrk="0" hangingPunct="0">
+              <a:defRPr b="1">
+                <a:solidFill>
+                  <a:schemeClr val="tx1"/>
+                </a:solidFill>
+                <a:latin typeface="Arial" panose="020B0604020202020204" pitchFamily="34" charset="0"/>
+                <a:ea typeface="SimSun" panose="02010600030101010101" pitchFamily="2" charset="-122"/>
+              </a:defRPr>
+            </a:lvl4pPr>
+            <a:lvl5pPr marL="2057400" indent="-228600" eaLnBrk="0" hangingPunct="0">
+              <a:defRPr b="1">
+                <a:solidFill>
+                  <a:schemeClr val="tx1"/>
+                </a:solidFill>
+                <a:latin typeface="Arial" panose="020B0604020202020204" pitchFamily="34" charset="0"/>
+                <a:ea typeface="SimSun" panose="02010600030101010101" pitchFamily="2" charset="-122"/>
+              </a:defRPr>
+            </a:lvl5pPr>
+            <a:lvl6pPr marL="2514600" indent="-228600" algn="ctr" eaLnBrk="0" fontAlgn="base" hangingPunct="0">
+              <a:spcBef>
+                <a:spcPct val="0"/>
+              </a:spcBef>
+              <a:spcAft>
+                <a:spcPct val="0"/>
+              </a:spcAft>
+              <a:defRPr b="1">
+                <a:solidFill>
+                  <a:schemeClr val="tx1"/>
+                </a:solidFill>
+                <a:latin typeface="Arial" panose="020B0604020202020204" pitchFamily="34" charset="0"/>
+                <a:ea typeface="SimSun" panose="02010600030101010101" pitchFamily="2" charset="-122"/>
+              </a:defRPr>
+            </a:lvl6pPr>
+            <a:lvl7pPr marL="2971800" indent="-228600" algn="ctr" eaLnBrk="0" fontAlgn="base" hangingPunct="0">
+              <a:spcBef>
+                <a:spcPct val="0"/>
+              </a:spcBef>
+              <a:spcAft>
+                <a:spcPct val="0"/>
+              </a:spcAft>
+              <a:defRPr b="1">
+                <a:solidFill>
+                  <a:schemeClr val="tx1"/>
+                </a:solidFill>
+                <a:latin typeface="Arial" panose="020B0604020202020204" pitchFamily="34" charset="0"/>
+                <a:ea typeface="SimSun" panose="02010600030101010101" pitchFamily="2" charset="-122"/>
+              </a:defRPr>
+            </a:lvl7pPr>
+            <a:lvl8pPr marL="3429000" indent="-228600" algn="ctr" eaLnBrk="0" fontAlgn="base" hangingPunct="0">
+              <a:spcBef>
+                <a:spcPct val="0"/>
+              </a:spcBef>
+              <a:spcAft>
+                <a:spcPct val="0"/>
+              </a:spcAft>
+              <a:defRPr b="1">
+                <a:solidFill>
+                  <a:schemeClr val="tx1"/>
+                </a:solidFill>
+                <a:latin typeface="Arial" panose="020B0604020202020204" pitchFamily="34" charset="0"/>
+                <a:ea typeface="SimSun" panose="02010600030101010101" pitchFamily="2" charset="-122"/>
+              </a:defRPr>
+            </a:lvl8pPr>
+            <a:lvl9pPr marL="3886200" indent="-228600" algn="ctr" eaLnBrk="0" fontAlgn="base" hangingPunct="0">
+              <a:spcBef>
+                <a:spcPct val="0"/>
+              </a:spcBef>
+              <a:spcAft>
+                <a:spcPct val="0"/>
+              </a:spcAft>
+              <a:defRPr b="1">
+                <a:solidFill>
+                  <a:schemeClr val="tx1"/>
+                </a:solidFill>
+                <a:latin typeface="Arial" panose="020B0604020202020204" pitchFamily="34" charset="0"/>
+                <a:ea typeface="SimSun" panose="02010600030101010101" pitchFamily="2" charset="-122"/>
+              </a:defRPr>
+            </a:lvl9pPr>
+          </a:lstStyle>
+          <a:p>
+            <a:pPr eaLnBrk="1" hangingPunct="1">
+              <a:spcBef>
+                <a:spcPct val="50000"/>
+              </a:spcBef>
+            </a:pPr>
+            <a:r>
+              <a:rPr lang="ko-KR" altLang="en-US" sz="4000" baseline="-25000">
+                <a:solidFill>
+                  <a:schemeClr val="accent1">
+                    <a:lumMod val="50000"/>
+                  </a:schemeClr>
+                </a:solidFill>
+              </a:rPr>
+              <a:t>목차</a:t>
+            </a:r>
+            <a:endParaRPr lang="en-US" sz="4000" baseline="-25000" dirty="0">
+              <a:solidFill>
+                <a:schemeClr val="accent1">
+                  <a:lumMod val="50000"/>
+                </a:schemeClr>
+              </a:solidFill>
+            </a:endParaRPr>
+          </a:p>
+        </p:txBody>
+      </p:sp>
+      <p:pic>
+        <p:nvPicPr>
+          <p:cNvPr id="7" name="그림 6">
+            <a:extLst>
+              <a:ext uri="{FF2B5EF4-FFF2-40B4-BE49-F238E27FC236}">
+                <a16:creationId xmlns:a16="http://schemas.microsoft.com/office/drawing/2014/main" id="{40A4C828-B04A-4C88-A242-161B76BC29E9}"/>
+              </a:ext>
+            </a:extLst>
+          </p:cNvPr>
+          <p:cNvPicPr>
+            <a:picLocks noChangeAspect="1"/>
+          </p:cNvPicPr>
+          <p:nvPr/>
+        </p:nvPicPr>
+        <p:blipFill>
+          <a:blip r:embed="rId3"/>
+          <a:stretch>
+            <a:fillRect/>
+          </a:stretch>
+        </p:blipFill>
+        <p:spPr>
+          <a:xfrm>
+            <a:off x="2485533" y="804444"/>
+            <a:ext cx="4749196" cy="5249111"/>
+          </a:xfrm>
+          <a:prstGeom prst="rect">
+            <a:avLst/>
+          </a:prstGeom>
+        </p:spPr>
+      </p:pic>
+      <p:sp>
+        <p:nvSpPr>
+          <p:cNvPr id="2" name="슬라이드 번호 개체 틀 1">
+            <a:extLst>
+              <a:ext uri="{FF2B5EF4-FFF2-40B4-BE49-F238E27FC236}">
+                <a16:creationId xmlns:a16="http://schemas.microsoft.com/office/drawing/2014/main" id="{766F4043-ACB7-49CC-BE53-543784E32DB3}"/>
+              </a:ext>
+            </a:extLst>
+          </p:cNvPr>
+          <p:cNvSpPr>
+            <a:spLocks noGrp="1"/>
+          </p:cNvSpPr>
+          <p:nvPr>
+            <p:ph type="sldNum" sz="quarter" idx="12"/>
+          </p:nvPr>
+        </p:nvSpPr>
+        <p:spPr/>
+        <p:txBody>
+          <a:bodyPr/>
+          <a:lstStyle/>
+          <a:p>
+            <a:fld id="{EB942B9F-D695-4224-97C8-E7A171F5AE33}" type="slidenum">
+              <a:rPr lang="ko-KR" altLang="en-US" smtClean="0"/>
+              <a:t>2</a:t>
+            </a:fld>
+            <a:endParaRPr lang="ko-KR" altLang="en-US"/>
+          </a:p>
+        </p:txBody>
+      </p:sp>
+    </p:spTree>
+    <p:extLst>
+      <p:ext uri="{BB962C8B-B14F-4D97-AF65-F5344CB8AC3E}">
+        <p14:creationId xmlns:p14="http://schemas.microsoft.com/office/powerpoint/2010/main" val="1324767204"/>
+      </p:ext>
+    </p:extLst>
+  </p:cSld>
+  <p:clrMapOvr>
+    <a:masterClrMapping/>
+  </p:clrMapOvr>
+</p:sld>
+</file>
+
+<file path=ppt/slides/slide20.xml><?xml version="1.0" encoding="utf-8"?>
 <p:sld xmlns:a="http://schemas.openxmlformats.org/drawingml/2006/main" xmlns:r="http://schemas.openxmlformats.org/officeDocument/2006/relationships" xmlns:p="http://schemas.openxmlformats.org/presentationml/2006/main">
   <p:cSld>
     <p:spTree>
@@ -19299,7 +21615,7 @@
           <a:p>
             <a:fld id="{EB942B9F-D695-4224-97C8-E7A171F5AE33}" type="slidenum">
               <a:rPr lang="ko-KR" altLang="en-US" smtClean="0"/>
-              <a:t>17</a:t>
+              <a:t>20</a:t>
             </a:fld>
             <a:endParaRPr lang="ko-KR" altLang="en-US"/>
           </a:p>
@@ -19318,7 +21634,7 @@
 </p:sld>
 </file>
 
-<file path=ppt/slides/slide18.xml><?xml version="1.0" encoding="utf-8"?>
+<file path=ppt/slides/slide21.xml><?xml version="1.0" encoding="utf-8"?>
 <p:sld xmlns:a="http://schemas.openxmlformats.org/drawingml/2006/main" xmlns:r="http://schemas.openxmlformats.org/officeDocument/2006/relationships" xmlns:p="http://schemas.openxmlformats.org/presentationml/2006/main">
   <p:cSld>
     <p:spTree>
@@ -19982,7 +22298,7 @@
           <a:p>
             <a:fld id="{EB942B9F-D695-4224-97C8-E7A171F5AE33}" type="slidenum">
               <a:rPr lang="ko-KR" altLang="en-US" smtClean="0"/>
-              <a:t>18</a:t>
+              <a:t>21</a:t>
             </a:fld>
             <a:endParaRPr lang="ko-KR" altLang="en-US"/>
           </a:p>
@@ -20001,7 +22317,7 @@
 </p:sld>
 </file>
 
-<file path=ppt/slides/slide19.xml><?xml version="1.0" encoding="utf-8"?>
+<file path=ppt/slides/slide22.xml><?xml version="1.0" encoding="utf-8"?>
 <p:sld xmlns:a="http://schemas.openxmlformats.org/drawingml/2006/main" xmlns:r="http://schemas.openxmlformats.org/officeDocument/2006/relationships" xmlns:p="http://schemas.openxmlformats.org/presentationml/2006/main">
   <p:cSld>
     <p:spTree>
@@ -20240,7 +22556,7 @@
           <a:p>
             <a:fld id="{EB942B9F-D695-4224-97C8-E7A171F5AE33}" type="slidenum">
               <a:rPr lang="ko-KR" altLang="en-US" smtClean="0"/>
-              <a:t>19</a:t>
+              <a:t>22</a:t>
             </a:fld>
             <a:endParaRPr lang="ko-KR" altLang="en-US"/>
           </a:p>
@@ -20259,318 +22575,7 @@
 </p:sld>
 </file>
 
-<file path=ppt/slides/slide2.xml><?xml version="1.0" encoding="utf-8"?>
-<p:sld xmlns:a="http://schemas.openxmlformats.org/drawingml/2006/main" xmlns:r="http://schemas.openxmlformats.org/officeDocument/2006/relationships" xmlns:p="http://schemas.openxmlformats.org/presentationml/2006/main">
-  <p:cSld>
-    <p:spTree>
-      <p:nvGrpSpPr>
-        <p:cNvPr id="1" name=""/>
-        <p:cNvGrpSpPr/>
-        <p:nvPr/>
-      </p:nvGrpSpPr>
-      <p:grpSpPr>
-        <a:xfrm>
-          <a:off x="0" y="0"/>
-          <a:ext cx="0" cy="0"/>
-          <a:chOff x="0" y="0"/>
-          <a:chExt cx="0" cy="0"/>
-        </a:xfrm>
-      </p:grpSpPr>
-      <p:pic>
-        <p:nvPicPr>
-          <p:cNvPr id="35" name="Picture 4"/>
-          <p:cNvPicPr>
-            <a:picLocks noChangeAspect="1" noChangeArrowheads="1"/>
-          </p:cNvPicPr>
-          <p:nvPr/>
-        </p:nvPicPr>
-        <p:blipFill>
-          <a:blip r:embed="rId2" cstate="print">
-            <a:extLst>
-              <a:ext uri="{28A0092B-C50C-407E-A947-70E740481C1C}">
-                <a14:useLocalDpi xmlns:a14="http://schemas.microsoft.com/office/drawing/2010/main" val="0"/>
-              </a:ext>
-            </a:extLst>
-          </a:blip>
-          <a:srcRect/>
-          <a:stretch>
-            <a:fillRect/>
-          </a:stretch>
-        </p:blipFill>
-        <p:spPr bwMode="auto">
-          <a:xfrm flipH="1">
-            <a:off x="7701152" y="3365323"/>
-            <a:ext cx="1223950" cy="3370129"/>
-          </a:xfrm>
-          <a:prstGeom prst="rect">
-            <a:avLst/>
-          </a:prstGeom>
-          <a:noFill/>
-          <a:ln w="9525">
-            <a:noFill/>
-            <a:miter lim="800000"/>
-            <a:headEnd/>
-            <a:tailEnd/>
-          </a:ln>
-          <a:effectLst>
-            <a:outerShdw blurRad="76200" dir="13500000" sy="23000" kx="1200000" algn="br" rotWithShape="0">
-              <a:prstClr val="black">
-                <a:alpha val="10000"/>
-              </a:prstClr>
-            </a:outerShdw>
-          </a:effectLst>
-        </p:spPr>
-      </p:pic>
-      <p:sp>
-        <p:nvSpPr>
-          <p:cNvPr id="36" name="Text Box 22"/>
-          <p:cNvSpPr txBox="1">
-            <a:spLocks noChangeArrowheads="1"/>
-          </p:cNvSpPr>
-          <p:nvPr/>
-        </p:nvSpPr>
-        <p:spPr bwMode="auto">
-          <a:xfrm>
-            <a:off x="141719" y="0"/>
-            <a:ext cx="5257800" cy="503238"/>
-          </a:xfrm>
-          <a:prstGeom prst="rect">
-            <a:avLst/>
-          </a:prstGeom>
-          <a:noFill/>
-          <a:ln>
-            <a:noFill/>
-          </a:ln>
-          <a:extLst>
-            <a:ext uri="{909E8E84-426E-40DD-AFC4-6F175D3DCCD1}">
-              <a14:hiddenFill xmlns:a14="http://schemas.microsoft.com/office/drawing/2010/main">
-                <a:solidFill>
-                  <a:srgbClr val="FFFFFF"/>
-                </a:solidFill>
-              </a14:hiddenFill>
-            </a:ext>
-            <a:ext uri="{91240B29-F687-4F45-9708-019B960494DF}">
-              <a14:hiddenLine xmlns:a14="http://schemas.microsoft.com/office/drawing/2010/main" w="9525">
-                <a:solidFill>
-                  <a:srgbClr val="000000"/>
-                </a:solidFill>
-                <a:miter lim="800000"/>
-                <a:headEnd/>
-                <a:tailEnd/>
-              </a14:hiddenLine>
-            </a:ext>
-          </a:extLst>
-        </p:spPr>
-        <p:txBody>
-          <a:bodyPr>
-            <a:spAutoFit/>
-          </a:bodyPr>
-          <a:lstStyle>
-            <a:lvl1pPr marL="342900" indent="-342900" eaLnBrk="0" hangingPunct="0">
-              <a:defRPr b="1">
-                <a:solidFill>
-                  <a:schemeClr val="tx1"/>
-                </a:solidFill>
-                <a:latin typeface="Arial" panose="020B0604020202020204" pitchFamily="34" charset="0"/>
-                <a:ea typeface="SimSun" panose="02010600030101010101" pitchFamily="2" charset="-122"/>
-              </a:defRPr>
-            </a:lvl1pPr>
-            <a:lvl2pPr marL="742950" indent="-285750" eaLnBrk="0" hangingPunct="0">
-              <a:defRPr b="1">
-                <a:solidFill>
-                  <a:schemeClr val="tx1"/>
-                </a:solidFill>
-                <a:latin typeface="Arial" panose="020B0604020202020204" pitchFamily="34" charset="0"/>
-                <a:ea typeface="SimSun" panose="02010600030101010101" pitchFamily="2" charset="-122"/>
-              </a:defRPr>
-            </a:lvl2pPr>
-            <a:lvl3pPr marL="1143000" indent="-228600" eaLnBrk="0" hangingPunct="0">
-              <a:defRPr b="1">
-                <a:solidFill>
-                  <a:schemeClr val="tx1"/>
-                </a:solidFill>
-                <a:latin typeface="Arial" panose="020B0604020202020204" pitchFamily="34" charset="0"/>
-                <a:ea typeface="SimSun" panose="02010600030101010101" pitchFamily="2" charset="-122"/>
-              </a:defRPr>
-            </a:lvl3pPr>
-            <a:lvl4pPr marL="1600200" indent="-228600" eaLnBrk="0" hangingPunct="0">
-              <a:defRPr b="1">
-                <a:solidFill>
-                  <a:schemeClr val="tx1"/>
-                </a:solidFill>
-                <a:latin typeface="Arial" panose="020B0604020202020204" pitchFamily="34" charset="0"/>
-                <a:ea typeface="SimSun" panose="02010600030101010101" pitchFamily="2" charset="-122"/>
-              </a:defRPr>
-            </a:lvl4pPr>
-            <a:lvl5pPr marL="2057400" indent="-228600" eaLnBrk="0" hangingPunct="0">
-              <a:defRPr b="1">
-                <a:solidFill>
-                  <a:schemeClr val="tx1"/>
-                </a:solidFill>
-                <a:latin typeface="Arial" panose="020B0604020202020204" pitchFamily="34" charset="0"/>
-                <a:ea typeface="SimSun" panose="02010600030101010101" pitchFamily="2" charset="-122"/>
-              </a:defRPr>
-            </a:lvl5pPr>
-            <a:lvl6pPr marL="2514600" indent="-228600" algn="ctr" eaLnBrk="0" fontAlgn="base" hangingPunct="0">
-              <a:spcBef>
-                <a:spcPct val="0"/>
-              </a:spcBef>
-              <a:spcAft>
-                <a:spcPct val="0"/>
-              </a:spcAft>
-              <a:defRPr b="1">
-                <a:solidFill>
-                  <a:schemeClr val="tx1"/>
-                </a:solidFill>
-                <a:latin typeface="Arial" panose="020B0604020202020204" pitchFamily="34" charset="0"/>
-                <a:ea typeface="SimSun" panose="02010600030101010101" pitchFamily="2" charset="-122"/>
-              </a:defRPr>
-            </a:lvl6pPr>
-            <a:lvl7pPr marL="2971800" indent="-228600" algn="ctr" eaLnBrk="0" fontAlgn="base" hangingPunct="0">
-              <a:spcBef>
-                <a:spcPct val="0"/>
-              </a:spcBef>
-              <a:spcAft>
-                <a:spcPct val="0"/>
-              </a:spcAft>
-              <a:defRPr b="1">
-                <a:solidFill>
-                  <a:schemeClr val="tx1"/>
-                </a:solidFill>
-                <a:latin typeface="Arial" panose="020B0604020202020204" pitchFamily="34" charset="0"/>
-                <a:ea typeface="SimSun" panose="02010600030101010101" pitchFamily="2" charset="-122"/>
-              </a:defRPr>
-            </a:lvl7pPr>
-            <a:lvl8pPr marL="3429000" indent="-228600" algn="ctr" eaLnBrk="0" fontAlgn="base" hangingPunct="0">
-              <a:spcBef>
-                <a:spcPct val="0"/>
-              </a:spcBef>
-              <a:spcAft>
-                <a:spcPct val="0"/>
-              </a:spcAft>
-              <a:defRPr b="1">
-                <a:solidFill>
-                  <a:schemeClr val="tx1"/>
-                </a:solidFill>
-                <a:latin typeface="Arial" panose="020B0604020202020204" pitchFamily="34" charset="0"/>
-                <a:ea typeface="SimSun" panose="02010600030101010101" pitchFamily="2" charset="-122"/>
-              </a:defRPr>
-            </a:lvl8pPr>
-            <a:lvl9pPr marL="3886200" indent="-228600" algn="ctr" eaLnBrk="0" fontAlgn="base" hangingPunct="0">
-              <a:spcBef>
-                <a:spcPct val="0"/>
-              </a:spcBef>
-              <a:spcAft>
-                <a:spcPct val="0"/>
-              </a:spcAft>
-              <a:defRPr b="1">
-                <a:solidFill>
-                  <a:schemeClr val="tx1"/>
-                </a:solidFill>
-                <a:latin typeface="Arial" panose="020B0604020202020204" pitchFamily="34" charset="0"/>
-                <a:ea typeface="SimSun" panose="02010600030101010101" pitchFamily="2" charset="-122"/>
-              </a:defRPr>
-            </a:lvl9pPr>
-          </a:lstStyle>
-          <a:p>
-            <a:pPr eaLnBrk="1" hangingPunct="1">
-              <a:spcBef>
-                <a:spcPct val="50000"/>
-              </a:spcBef>
-            </a:pPr>
-            <a:r>
-              <a:rPr lang="ko-KR" altLang="en-US" sz="4000" baseline="-25000">
-                <a:solidFill>
-                  <a:schemeClr val="accent1">
-                    <a:lumMod val="50000"/>
-                  </a:schemeClr>
-                </a:solidFill>
-              </a:rPr>
-              <a:t>목차</a:t>
-            </a:r>
-            <a:endParaRPr lang="en-US" sz="4000" baseline="-25000" dirty="0">
-              <a:solidFill>
-                <a:schemeClr val="accent1">
-                  <a:lumMod val="50000"/>
-                </a:schemeClr>
-              </a:solidFill>
-            </a:endParaRPr>
-          </a:p>
-        </p:txBody>
-      </p:sp>
-      <p:pic>
-        <p:nvPicPr>
-          <p:cNvPr id="7" name="그림 6">
-            <a:extLst>
-              <a:ext uri="{FF2B5EF4-FFF2-40B4-BE49-F238E27FC236}">
-                <a16:creationId xmlns:a16="http://schemas.microsoft.com/office/drawing/2014/main" id="{40A4C828-B04A-4C88-A242-161B76BC29E9}"/>
-              </a:ext>
-            </a:extLst>
-          </p:cNvPr>
-          <p:cNvPicPr>
-            <a:picLocks noChangeAspect="1"/>
-          </p:cNvPicPr>
-          <p:nvPr/>
-        </p:nvPicPr>
-        <p:blipFill>
-          <a:blip r:embed="rId3"/>
-          <a:stretch>
-            <a:fillRect/>
-          </a:stretch>
-        </p:blipFill>
-        <p:spPr>
-          <a:xfrm>
-            <a:off x="2485533" y="804444"/>
-            <a:ext cx="4749196" cy="5249111"/>
-          </a:xfrm>
-          <a:prstGeom prst="rect">
-            <a:avLst/>
-          </a:prstGeom>
-        </p:spPr>
-      </p:pic>
-      <p:sp>
-        <p:nvSpPr>
-          <p:cNvPr id="2" name="슬라이드 번호 개체 틀 1">
-            <a:extLst>
-              <a:ext uri="{FF2B5EF4-FFF2-40B4-BE49-F238E27FC236}">
-                <a16:creationId xmlns:a16="http://schemas.microsoft.com/office/drawing/2014/main" id="{766F4043-ACB7-49CC-BE53-543784E32DB3}"/>
-              </a:ext>
-            </a:extLst>
-          </p:cNvPr>
-          <p:cNvSpPr>
-            <a:spLocks noGrp="1"/>
-          </p:cNvSpPr>
-          <p:nvPr>
-            <p:ph type="sldNum" sz="quarter" idx="12"/>
-          </p:nvPr>
-        </p:nvSpPr>
-        <p:spPr/>
-        <p:txBody>
-          <a:bodyPr/>
-          <a:lstStyle/>
-          <a:p>
-            <a:fld id="{EB942B9F-D695-4224-97C8-E7A171F5AE33}" type="slidenum">
-              <a:rPr lang="ko-KR" altLang="en-US" smtClean="0"/>
-              <a:t>2</a:t>
-            </a:fld>
-            <a:endParaRPr lang="ko-KR" altLang="en-US"/>
-          </a:p>
-        </p:txBody>
-      </p:sp>
-    </p:spTree>
-    <p:extLst>
-      <p:ext uri="{BB962C8B-B14F-4D97-AF65-F5344CB8AC3E}">
-        <p14:creationId xmlns:p14="http://schemas.microsoft.com/office/powerpoint/2010/main" val="1324767204"/>
-      </p:ext>
-    </p:extLst>
-  </p:cSld>
-  <p:clrMapOvr>
-    <a:masterClrMapping/>
-  </p:clrMapOvr>
-</p:sld>
-</file>
-
-<file path=ppt/slides/slide20.xml><?xml version="1.0" encoding="utf-8"?>
+<file path=ppt/slides/slide23.xml><?xml version="1.0" encoding="utf-8"?>
 <p:sld xmlns:a="http://schemas.openxmlformats.org/drawingml/2006/main" xmlns:r="http://schemas.openxmlformats.org/officeDocument/2006/relationships" xmlns:p="http://schemas.openxmlformats.org/presentationml/2006/main">
   <p:cSld>
     <p:spTree>
@@ -23578,7 +25583,7 @@
           <a:p>
             <a:fld id="{EB942B9F-D695-4224-97C8-E7A171F5AE33}" type="slidenum">
               <a:rPr lang="ko-KR" altLang="en-US" smtClean="0"/>
-              <a:t>20</a:t>
+              <a:t>23</a:t>
             </a:fld>
             <a:endParaRPr lang="ko-KR" altLang="en-US"/>
           </a:p>
@@ -23597,7 +25602,7 @@
 </p:sld>
 </file>
 
-<file path=ppt/slides/slide21.xml><?xml version="1.0" encoding="utf-8"?>
+<file path=ppt/slides/slide24.xml><?xml version="1.0" encoding="utf-8"?>
 <p:sld xmlns:a="http://schemas.openxmlformats.org/drawingml/2006/main" xmlns:r="http://schemas.openxmlformats.org/officeDocument/2006/relationships" xmlns:p="http://schemas.openxmlformats.org/presentationml/2006/main">
   <p:cSld>
     <p:spTree>
@@ -29980,7 +31985,7 @@
           <a:p>
             <a:fld id="{EB942B9F-D695-4224-97C8-E7A171F5AE33}" type="slidenum">
               <a:rPr lang="ko-KR" altLang="en-US" smtClean="0"/>
-              <a:t>21</a:t>
+              <a:t>24</a:t>
             </a:fld>
             <a:endParaRPr lang="ko-KR" altLang="en-US"/>
           </a:p>
@@ -29999,7 +32004,7 @@
 </p:sld>
 </file>
 
-<file path=ppt/slides/slide22.xml><?xml version="1.0" encoding="utf-8"?>
+<file path=ppt/slides/slide25.xml><?xml version="1.0" encoding="utf-8"?>
 <p:sld xmlns:a="http://schemas.openxmlformats.org/drawingml/2006/main" xmlns:r="http://schemas.openxmlformats.org/officeDocument/2006/relationships" xmlns:p="http://schemas.openxmlformats.org/presentationml/2006/main">
   <p:cSld>
     <p:spTree>
@@ -30584,7 +32589,7 @@
           <a:p>
             <a:fld id="{EB942B9F-D695-4224-97C8-E7A171F5AE33}" type="slidenum">
               <a:rPr lang="ko-KR" altLang="en-US" smtClean="0"/>
-              <a:t>22</a:t>
+              <a:t>25</a:t>
             </a:fld>
             <a:endParaRPr lang="ko-KR" altLang="en-US"/>
           </a:p>
@@ -30603,7 +32608,7 @@
 </p:sld>
 </file>
 
-<file path=ppt/slides/slide23.xml><?xml version="1.0" encoding="utf-8"?>
+<file path=ppt/slides/slide26.xml><?xml version="1.0" encoding="utf-8"?>
 <p:sld xmlns:a="http://schemas.openxmlformats.org/drawingml/2006/main" xmlns:r="http://schemas.openxmlformats.org/officeDocument/2006/relationships" xmlns:p="http://schemas.openxmlformats.org/presentationml/2006/main">
   <p:cSld>
     <p:spTree>
@@ -31194,7 +33199,7 @@
           <a:p>
             <a:fld id="{EB942B9F-D695-4224-97C8-E7A171F5AE33}" type="slidenum">
               <a:rPr lang="ko-KR" altLang="en-US" smtClean="0"/>
-              <a:t>23</a:t>
+              <a:t>26</a:t>
             </a:fld>
             <a:endParaRPr lang="ko-KR" altLang="en-US"/>
           </a:p>
@@ -31213,7 +33218,7 @@
 </p:sld>
 </file>
 
-<file path=ppt/slides/slide24.xml><?xml version="1.0" encoding="utf-8"?>
+<file path=ppt/slides/slide27.xml><?xml version="1.0" encoding="utf-8"?>
 <p:sld xmlns:a="http://schemas.openxmlformats.org/drawingml/2006/main" xmlns:r="http://schemas.openxmlformats.org/officeDocument/2006/relationships" xmlns:p="http://schemas.openxmlformats.org/presentationml/2006/main">
   <p:cSld>
     <p:spTree>
@@ -31315,7 +33320,7 @@
           <a:p>
             <a:fld id="{EB942B9F-D695-4224-97C8-E7A171F5AE33}" type="slidenum">
               <a:rPr lang="ko-KR" altLang="en-US" smtClean="0"/>
-              <a:t>24</a:t>
+              <a:t>27</a:t>
             </a:fld>
             <a:endParaRPr lang="ko-KR" altLang="en-US" dirty="0"/>
           </a:p>
@@ -34696,6 +36701,640 @@
 </file>
 
 <file path=ppt/slides/slide8.xml><?xml version="1.0" encoding="utf-8"?>
+<p:sld xmlns:a="http://schemas.openxmlformats.org/drawingml/2006/main" xmlns:r="http://schemas.openxmlformats.org/officeDocument/2006/relationships" xmlns:p="http://schemas.openxmlformats.org/presentationml/2006/main">
+  <p:cSld>
+    <p:spTree>
+      <p:nvGrpSpPr>
+        <p:cNvPr id="1" name=""/>
+        <p:cNvGrpSpPr/>
+        <p:nvPr/>
+      </p:nvGrpSpPr>
+      <p:grpSpPr>
+        <a:xfrm>
+          <a:off x="0" y="0"/>
+          <a:ext cx="0" cy="0"/>
+          <a:chOff x="0" y="0"/>
+          <a:chExt cx="0" cy="0"/>
+        </a:xfrm>
+      </p:grpSpPr>
+      <p:sp>
+        <p:nvSpPr>
+          <p:cNvPr id="2" name="Text Box 22">
+            <a:extLst>
+              <a:ext uri="{FF2B5EF4-FFF2-40B4-BE49-F238E27FC236}">
+                <a16:creationId xmlns:a16="http://schemas.microsoft.com/office/drawing/2014/main" id="{61F72C57-A937-494F-A7F0-9D10A07CFF2A}"/>
+              </a:ext>
+            </a:extLst>
+          </p:cNvPr>
+          <p:cNvSpPr txBox="1">
+            <a:spLocks noChangeArrowheads="1"/>
+          </p:cNvSpPr>
+          <p:nvPr/>
+        </p:nvSpPr>
+        <p:spPr bwMode="auto">
+          <a:xfrm>
+            <a:off x="2669616" y="4036220"/>
+            <a:ext cx="4381029" cy="727748"/>
+          </a:xfrm>
+          <a:prstGeom prst="rect">
+            <a:avLst/>
+          </a:prstGeom>
+          <a:extLst>
+            <a:ext uri="{909E8E84-426E-40DD-AFC4-6F175D3DCCD1}">
+              <a14:hiddenFill xmlns:a14="http://schemas.microsoft.com/office/drawing/2010/main">
+                <a:solidFill>
+                  <a:srgbClr val="FFFFFF"/>
+                </a:solidFill>
+              </a14:hiddenFill>
+            </a:ext>
+            <a:ext uri="{91240B29-F687-4F45-9708-019B960494DF}">
+              <a14:hiddenLine xmlns:a14="http://schemas.microsoft.com/office/drawing/2010/main" w="9525">
+                <a:solidFill>
+                  <a:srgbClr val="000000"/>
+                </a:solidFill>
+                <a:miter lim="800000"/>
+                <a:headEnd/>
+                <a:tailEnd/>
+              </a14:hiddenLine>
+            </a:ext>
+          </a:extLst>
+        </p:spPr>
+        <p:txBody>
+          <a:bodyPr vert="horz" lIns="91440" tIns="45720" rIns="91440" bIns="45720" rtlCol="0" anchor="b">
+            <a:normAutofit/>
+          </a:bodyPr>
+          <a:lstStyle>
+            <a:lvl1pPr marL="342900" indent="-342900" eaLnBrk="0" hangingPunct="0">
+              <a:defRPr b="1">
+                <a:solidFill>
+                  <a:schemeClr val="tx1"/>
+                </a:solidFill>
+                <a:latin typeface="Arial" panose="020B0604020202020204" pitchFamily="34" charset="0"/>
+                <a:ea typeface="SimSun" panose="02010600030101010101" pitchFamily="2" charset="-122"/>
+              </a:defRPr>
+            </a:lvl1pPr>
+            <a:lvl2pPr marL="742950" indent="-285750" eaLnBrk="0" hangingPunct="0">
+              <a:defRPr b="1">
+                <a:solidFill>
+                  <a:schemeClr val="tx1"/>
+                </a:solidFill>
+                <a:latin typeface="Arial" panose="020B0604020202020204" pitchFamily="34" charset="0"/>
+                <a:ea typeface="SimSun" panose="02010600030101010101" pitchFamily="2" charset="-122"/>
+              </a:defRPr>
+            </a:lvl2pPr>
+            <a:lvl3pPr marL="1143000" indent="-228600" eaLnBrk="0" hangingPunct="0">
+              <a:defRPr b="1">
+                <a:solidFill>
+                  <a:schemeClr val="tx1"/>
+                </a:solidFill>
+                <a:latin typeface="Arial" panose="020B0604020202020204" pitchFamily="34" charset="0"/>
+                <a:ea typeface="SimSun" panose="02010600030101010101" pitchFamily="2" charset="-122"/>
+              </a:defRPr>
+            </a:lvl3pPr>
+            <a:lvl4pPr marL="1600200" indent="-228600" eaLnBrk="0" hangingPunct="0">
+              <a:defRPr b="1">
+                <a:solidFill>
+                  <a:schemeClr val="tx1"/>
+                </a:solidFill>
+                <a:latin typeface="Arial" panose="020B0604020202020204" pitchFamily="34" charset="0"/>
+                <a:ea typeface="SimSun" panose="02010600030101010101" pitchFamily="2" charset="-122"/>
+              </a:defRPr>
+            </a:lvl4pPr>
+            <a:lvl5pPr marL="2057400" indent="-228600" eaLnBrk="0" hangingPunct="0">
+              <a:defRPr b="1">
+                <a:solidFill>
+                  <a:schemeClr val="tx1"/>
+                </a:solidFill>
+                <a:latin typeface="Arial" panose="020B0604020202020204" pitchFamily="34" charset="0"/>
+                <a:ea typeface="SimSun" panose="02010600030101010101" pitchFamily="2" charset="-122"/>
+              </a:defRPr>
+            </a:lvl5pPr>
+            <a:lvl6pPr marL="2514600" indent="-228600" algn="ctr" eaLnBrk="0" fontAlgn="base" hangingPunct="0">
+              <a:spcBef>
+                <a:spcPct val="0"/>
+              </a:spcBef>
+              <a:spcAft>
+                <a:spcPct val="0"/>
+              </a:spcAft>
+              <a:defRPr b="1">
+                <a:solidFill>
+                  <a:schemeClr val="tx1"/>
+                </a:solidFill>
+                <a:latin typeface="Arial" panose="020B0604020202020204" pitchFamily="34" charset="0"/>
+                <a:ea typeface="SimSun" panose="02010600030101010101" pitchFamily="2" charset="-122"/>
+              </a:defRPr>
+            </a:lvl6pPr>
+            <a:lvl7pPr marL="2971800" indent="-228600" algn="ctr" eaLnBrk="0" fontAlgn="base" hangingPunct="0">
+              <a:spcBef>
+                <a:spcPct val="0"/>
+              </a:spcBef>
+              <a:spcAft>
+                <a:spcPct val="0"/>
+              </a:spcAft>
+              <a:defRPr b="1">
+                <a:solidFill>
+                  <a:schemeClr val="tx1"/>
+                </a:solidFill>
+                <a:latin typeface="Arial" panose="020B0604020202020204" pitchFamily="34" charset="0"/>
+                <a:ea typeface="SimSun" panose="02010600030101010101" pitchFamily="2" charset="-122"/>
+              </a:defRPr>
+            </a:lvl7pPr>
+            <a:lvl8pPr marL="3429000" indent="-228600" algn="ctr" eaLnBrk="0" fontAlgn="base" hangingPunct="0">
+              <a:spcBef>
+                <a:spcPct val="0"/>
+              </a:spcBef>
+              <a:spcAft>
+                <a:spcPct val="0"/>
+              </a:spcAft>
+              <a:defRPr b="1">
+                <a:solidFill>
+                  <a:schemeClr val="tx1"/>
+                </a:solidFill>
+                <a:latin typeface="Arial" panose="020B0604020202020204" pitchFamily="34" charset="0"/>
+                <a:ea typeface="SimSun" panose="02010600030101010101" pitchFamily="2" charset="-122"/>
+              </a:defRPr>
+            </a:lvl8pPr>
+            <a:lvl9pPr marL="3886200" indent="-228600" algn="ctr" eaLnBrk="0" fontAlgn="base" hangingPunct="0">
+              <a:spcBef>
+                <a:spcPct val="0"/>
+              </a:spcBef>
+              <a:spcAft>
+                <a:spcPct val="0"/>
+              </a:spcAft>
+              <a:defRPr b="1">
+                <a:solidFill>
+                  <a:schemeClr val="tx1"/>
+                </a:solidFill>
+                <a:latin typeface="Arial" panose="020B0604020202020204" pitchFamily="34" charset="0"/>
+                <a:ea typeface="SimSun" panose="02010600030101010101" pitchFamily="2" charset="-122"/>
+              </a:defRPr>
+            </a:lvl9pPr>
+          </a:lstStyle>
+          <a:p>
+            <a:pPr algn="ctr" eaLnBrk="1" latinLnBrk="0" hangingPunct="1">
+              <a:lnSpc>
+                <a:spcPct val="90000"/>
+              </a:lnSpc>
+              <a:spcBef>
+                <a:spcPct val="0"/>
+              </a:spcBef>
+              <a:spcAft>
+                <a:spcPts val="600"/>
+              </a:spcAft>
+            </a:pPr>
+            <a:endParaRPr lang="en-US" sz="3600" kern="1200" baseline="-25000" dirty="0">
+              <a:latin typeface="+mj-lt"/>
+              <a:ea typeface="+mj-ea"/>
+              <a:cs typeface="+mj-cs"/>
+            </a:endParaRPr>
+          </a:p>
+        </p:txBody>
+      </p:sp>
+      <p:sp>
+        <p:nvSpPr>
+          <p:cNvPr id="4" name="Text Box 22">
+            <a:extLst>
+              <a:ext uri="{FF2B5EF4-FFF2-40B4-BE49-F238E27FC236}">
+                <a16:creationId xmlns:a16="http://schemas.microsoft.com/office/drawing/2014/main" id="{39958334-0670-4B8B-9A4B-94F4BA1CFFCA}"/>
+              </a:ext>
+            </a:extLst>
+          </p:cNvPr>
+          <p:cNvSpPr txBox="1">
+            <a:spLocks noChangeArrowheads="1"/>
+          </p:cNvSpPr>
+          <p:nvPr/>
+        </p:nvSpPr>
+        <p:spPr bwMode="auto">
+          <a:xfrm>
+            <a:off x="141719" y="0"/>
+            <a:ext cx="5257800" cy="503238"/>
+          </a:xfrm>
+          <a:prstGeom prst="rect">
+            <a:avLst/>
+          </a:prstGeom>
+          <a:noFill/>
+          <a:ln>
+            <a:noFill/>
+          </a:ln>
+          <a:extLst>
+            <a:ext uri="{909E8E84-426E-40DD-AFC4-6F175D3DCCD1}">
+              <a14:hiddenFill xmlns:a14="http://schemas.microsoft.com/office/drawing/2010/main">
+                <a:solidFill>
+                  <a:srgbClr val="FFFFFF"/>
+                </a:solidFill>
+              </a14:hiddenFill>
+            </a:ext>
+            <a:ext uri="{91240B29-F687-4F45-9708-019B960494DF}">
+              <a14:hiddenLine xmlns:a14="http://schemas.microsoft.com/office/drawing/2010/main" w="9525">
+                <a:solidFill>
+                  <a:srgbClr val="000000"/>
+                </a:solidFill>
+                <a:miter lim="800000"/>
+                <a:headEnd/>
+                <a:tailEnd/>
+              </a14:hiddenLine>
+            </a:ext>
+          </a:extLst>
+        </p:spPr>
+        <p:txBody>
+          <a:bodyPr>
+            <a:spAutoFit/>
+          </a:bodyPr>
+          <a:lstStyle>
+            <a:lvl1pPr marL="342900" indent="-342900" eaLnBrk="0" hangingPunct="0">
+              <a:defRPr b="1">
+                <a:solidFill>
+                  <a:schemeClr val="tx1"/>
+                </a:solidFill>
+                <a:latin typeface="Arial" panose="020B0604020202020204" pitchFamily="34" charset="0"/>
+                <a:ea typeface="SimSun" panose="02010600030101010101" pitchFamily="2" charset="-122"/>
+              </a:defRPr>
+            </a:lvl1pPr>
+            <a:lvl2pPr marL="742950" indent="-285750" eaLnBrk="0" hangingPunct="0">
+              <a:defRPr b="1">
+                <a:solidFill>
+                  <a:schemeClr val="tx1"/>
+                </a:solidFill>
+                <a:latin typeface="Arial" panose="020B0604020202020204" pitchFamily="34" charset="0"/>
+                <a:ea typeface="SimSun" panose="02010600030101010101" pitchFamily="2" charset="-122"/>
+              </a:defRPr>
+            </a:lvl2pPr>
+            <a:lvl3pPr marL="1143000" indent="-228600" eaLnBrk="0" hangingPunct="0">
+              <a:defRPr b="1">
+                <a:solidFill>
+                  <a:schemeClr val="tx1"/>
+                </a:solidFill>
+                <a:latin typeface="Arial" panose="020B0604020202020204" pitchFamily="34" charset="0"/>
+                <a:ea typeface="SimSun" panose="02010600030101010101" pitchFamily="2" charset="-122"/>
+              </a:defRPr>
+            </a:lvl3pPr>
+            <a:lvl4pPr marL="1600200" indent="-228600" eaLnBrk="0" hangingPunct="0">
+              <a:defRPr b="1">
+                <a:solidFill>
+                  <a:schemeClr val="tx1"/>
+                </a:solidFill>
+                <a:latin typeface="Arial" panose="020B0604020202020204" pitchFamily="34" charset="0"/>
+                <a:ea typeface="SimSun" panose="02010600030101010101" pitchFamily="2" charset="-122"/>
+              </a:defRPr>
+            </a:lvl4pPr>
+            <a:lvl5pPr marL="2057400" indent="-228600" eaLnBrk="0" hangingPunct="0">
+              <a:defRPr b="1">
+                <a:solidFill>
+                  <a:schemeClr val="tx1"/>
+                </a:solidFill>
+                <a:latin typeface="Arial" panose="020B0604020202020204" pitchFamily="34" charset="0"/>
+                <a:ea typeface="SimSun" panose="02010600030101010101" pitchFamily="2" charset="-122"/>
+              </a:defRPr>
+            </a:lvl5pPr>
+            <a:lvl6pPr marL="2514600" indent="-228600" algn="ctr" eaLnBrk="0" fontAlgn="base" hangingPunct="0">
+              <a:spcBef>
+                <a:spcPct val="0"/>
+              </a:spcBef>
+              <a:spcAft>
+                <a:spcPct val="0"/>
+              </a:spcAft>
+              <a:defRPr b="1">
+                <a:solidFill>
+                  <a:schemeClr val="tx1"/>
+                </a:solidFill>
+                <a:latin typeface="Arial" panose="020B0604020202020204" pitchFamily="34" charset="0"/>
+                <a:ea typeface="SimSun" panose="02010600030101010101" pitchFamily="2" charset="-122"/>
+              </a:defRPr>
+            </a:lvl6pPr>
+            <a:lvl7pPr marL="2971800" indent="-228600" algn="ctr" eaLnBrk="0" fontAlgn="base" hangingPunct="0">
+              <a:spcBef>
+                <a:spcPct val="0"/>
+              </a:spcBef>
+              <a:spcAft>
+                <a:spcPct val="0"/>
+              </a:spcAft>
+              <a:defRPr b="1">
+                <a:solidFill>
+                  <a:schemeClr val="tx1"/>
+                </a:solidFill>
+                <a:latin typeface="Arial" panose="020B0604020202020204" pitchFamily="34" charset="0"/>
+                <a:ea typeface="SimSun" panose="02010600030101010101" pitchFamily="2" charset="-122"/>
+              </a:defRPr>
+            </a:lvl7pPr>
+            <a:lvl8pPr marL="3429000" indent="-228600" algn="ctr" eaLnBrk="0" fontAlgn="base" hangingPunct="0">
+              <a:spcBef>
+                <a:spcPct val="0"/>
+              </a:spcBef>
+              <a:spcAft>
+                <a:spcPct val="0"/>
+              </a:spcAft>
+              <a:defRPr b="1">
+                <a:solidFill>
+                  <a:schemeClr val="tx1"/>
+                </a:solidFill>
+                <a:latin typeface="Arial" panose="020B0604020202020204" pitchFamily="34" charset="0"/>
+                <a:ea typeface="SimSun" panose="02010600030101010101" pitchFamily="2" charset="-122"/>
+              </a:defRPr>
+            </a:lvl8pPr>
+            <a:lvl9pPr marL="3886200" indent="-228600" algn="ctr" eaLnBrk="0" fontAlgn="base" hangingPunct="0">
+              <a:spcBef>
+                <a:spcPct val="0"/>
+              </a:spcBef>
+              <a:spcAft>
+                <a:spcPct val="0"/>
+              </a:spcAft>
+              <a:defRPr b="1">
+                <a:solidFill>
+                  <a:schemeClr val="tx1"/>
+                </a:solidFill>
+                <a:latin typeface="Arial" panose="020B0604020202020204" pitchFamily="34" charset="0"/>
+                <a:ea typeface="SimSun" panose="02010600030101010101" pitchFamily="2" charset="-122"/>
+              </a:defRPr>
+            </a:lvl9pPr>
+          </a:lstStyle>
+          <a:p>
+            <a:pPr eaLnBrk="1" hangingPunct="1">
+              <a:spcBef>
+                <a:spcPct val="50000"/>
+              </a:spcBef>
+            </a:pPr>
+            <a:r>
+              <a:rPr lang="en-US" sz="4000" baseline="-25000" dirty="0">
+                <a:solidFill>
+                  <a:schemeClr val="accent1">
+                    <a:lumMod val="50000"/>
+                  </a:schemeClr>
+                </a:solidFill>
+                <a:latin typeface="+mj-ea"/>
+                <a:ea typeface="+mj-ea"/>
+              </a:rPr>
+              <a:t>1. </a:t>
+            </a:r>
+            <a:r>
+              <a:rPr lang="ko-KR" altLang="en-US" sz="4000" baseline="-25000" dirty="0">
+                <a:solidFill>
+                  <a:schemeClr val="accent1">
+                    <a:lumMod val="50000"/>
+                  </a:schemeClr>
+                </a:solidFill>
+                <a:latin typeface="+mj-ea"/>
+                <a:ea typeface="+mj-ea"/>
+              </a:rPr>
+              <a:t>졸업 연구 및 개요</a:t>
+            </a:r>
+            <a:endParaRPr lang="en-US" sz="4000" baseline="-25000" dirty="0">
+              <a:solidFill>
+                <a:schemeClr val="accent1">
+                  <a:lumMod val="50000"/>
+                </a:schemeClr>
+              </a:solidFill>
+              <a:latin typeface="+mj-ea"/>
+              <a:ea typeface="+mj-ea"/>
+            </a:endParaRPr>
+          </a:p>
+        </p:txBody>
+      </p:sp>
+      <p:sp>
+        <p:nvSpPr>
+          <p:cNvPr id="7" name="TextBox 6">
+            <a:extLst>
+              <a:ext uri="{FF2B5EF4-FFF2-40B4-BE49-F238E27FC236}">
+                <a16:creationId xmlns:a16="http://schemas.microsoft.com/office/drawing/2014/main" id="{ED451419-CB2D-4CCB-BFDD-B24D6A3E95D2}"/>
+              </a:ext>
+            </a:extLst>
+          </p:cNvPr>
+          <p:cNvSpPr txBox="1"/>
+          <p:nvPr/>
+        </p:nvSpPr>
+        <p:spPr>
+          <a:xfrm>
+            <a:off x="426125" y="975848"/>
+            <a:ext cx="3737499" cy="400110"/>
+          </a:xfrm>
+          <a:prstGeom prst="rect">
+            <a:avLst/>
+          </a:prstGeom>
+          <a:noFill/>
+        </p:spPr>
+        <p:txBody>
+          <a:bodyPr wrap="square" rtlCol="0">
+            <a:spAutoFit/>
+          </a:bodyPr>
+          <a:lstStyle/>
+          <a:p>
+            <a:r>
+              <a:rPr lang="ko-KR" altLang="en-US" sz="2000" dirty="0"/>
+              <a:t>지난 발표에서의 지적 사항</a:t>
+            </a:r>
+          </a:p>
+        </p:txBody>
+      </p:sp>
+      <p:sp>
+        <p:nvSpPr>
+          <p:cNvPr id="8" name="TextBox 7">
+            <a:extLst>
+              <a:ext uri="{FF2B5EF4-FFF2-40B4-BE49-F238E27FC236}">
+                <a16:creationId xmlns:a16="http://schemas.microsoft.com/office/drawing/2014/main" id="{21B77E87-BDDE-4DFA-B650-2AEDDA5B43DC}"/>
+              </a:ext>
+            </a:extLst>
+          </p:cNvPr>
+          <p:cNvSpPr txBox="1"/>
+          <p:nvPr/>
+        </p:nvSpPr>
+        <p:spPr>
+          <a:xfrm>
+            <a:off x="426125" y="2541652"/>
+            <a:ext cx="3737499" cy="369332"/>
+          </a:xfrm>
+          <a:prstGeom prst="rect">
+            <a:avLst/>
+          </a:prstGeom>
+          <a:noFill/>
+        </p:spPr>
+        <p:txBody>
+          <a:bodyPr wrap="square" rtlCol="0">
+            <a:spAutoFit/>
+          </a:bodyPr>
+          <a:lstStyle/>
+          <a:p>
+            <a:r>
+              <a:rPr lang="ko-KR" altLang="en-US" dirty="0"/>
+              <a:t>지적 사항 답변</a:t>
+            </a:r>
+          </a:p>
+        </p:txBody>
+      </p:sp>
+      <p:sp>
+        <p:nvSpPr>
+          <p:cNvPr id="9" name="슬라이드 번호 개체 틀 8">
+            <a:extLst>
+              <a:ext uri="{FF2B5EF4-FFF2-40B4-BE49-F238E27FC236}">
+                <a16:creationId xmlns:a16="http://schemas.microsoft.com/office/drawing/2014/main" id="{9283DD15-EC06-4B7E-8E4F-3C67A6F6420D}"/>
+              </a:ext>
+            </a:extLst>
+          </p:cNvPr>
+          <p:cNvSpPr>
+            <a:spLocks noGrp="1"/>
+          </p:cNvSpPr>
+          <p:nvPr>
+            <p:ph type="sldNum" sz="quarter" idx="12"/>
+          </p:nvPr>
+        </p:nvSpPr>
+        <p:spPr/>
+        <p:txBody>
+          <a:bodyPr/>
+          <a:lstStyle/>
+          <a:p>
+            <a:fld id="{EB942B9F-D695-4224-97C8-E7A171F5AE33}" type="slidenum">
+              <a:rPr lang="ko-KR" altLang="en-US" smtClean="0"/>
+              <a:t>8</a:t>
+            </a:fld>
+            <a:endParaRPr lang="ko-KR" altLang="en-US"/>
+          </a:p>
+        </p:txBody>
+      </p:sp>
+      <p:sp>
+        <p:nvSpPr>
+          <p:cNvPr id="10" name="TextBox 9">
+            <a:extLst>
+              <a:ext uri="{FF2B5EF4-FFF2-40B4-BE49-F238E27FC236}">
+                <a16:creationId xmlns:a16="http://schemas.microsoft.com/office/drawing/2014/main" id="{35D63B36-29EB-4953-831E-84AEDC8757BA}"/>
+              </a:ext>
+            </a:extLst>
+          </p:cNvPr>
+          <p:cNvSpPr txBox="1"/>
+          <p:nvPr/>
+        </p:nvSpPr>
+        <p:spPr>
+          <a:xfrm>
+            <a:off x="426125" y="1665472"/>
+            <a:ext cx="8625870" cy="584775"/>
+          </a:xfrm>
+          <a:prstGeom prst="rect">
+            <a:avLst/>
+          </a:prstGeom>
+          <a:noFill/>
+        </p:spPr>
+        <p:txBody>
+          <a:bodyPr wrap="square" rtlCol="0">
+            <a:spAutoFit/>
+          </a:bodyPr>
+          <a:lstStyle/>
+          <a:p>
+            <a:r>
+              <a:rPr lang="en-US" altLang="ko-KR" sz="3200" b="1" dirty="0"/>
+              <a:t>Q5. </a:t>
+            </a:r>
+            <a:r>
+              <a:rPr lang="ko-KR" altLang="en-US" sz="3200" b="1" dirty="0"/>
+              <a:t>시나리오를 구체화 할 것</a:t>
+            </a:r>
+          </a:p>
+        </p:txBody>
+      </p:sp>
+      <p:sp>
+        <p:nvSpPr>
+          <p:cNvPr id="11" name="TextBox 10">
+            <a:extLst>
+              <a:ext uri="{FF2B5EF4-FFF2-40B4-BE49-F238E27FC236}">
+                <a16:creationId xmlns:a16="http://schemas.microsoft.com/office/drawing/2014/main" id="{8BD8B48A-29AB-4E6A-ADC7-B7EFF833EB22}"/>
+              </a:ext>
+            </a:extLst>
+          </p:cNvPr>
+          <p:cNvSpPr txBox="1"/>
+          <p:nvPr/>
+        </p:nvSpPr>
+        <p:spPr>
+          <a:xfrm>
+            <a:off x="426124" y="3048500"/>
+            <a:ext cx="8832176" cy="1384995"/>
+          </a:xfrm>
+          <a:prstGeom prst="rect">
+            <a:avLst/>
+          </a:prstGeom>
+          <a:noFill/>
+        </p:spPr>
+        <p:txBody>
+          <a:bodyPr wrap="square" rtlCol="0">
+            <a:spAutoFit/>
+          </a:bodyPr>
+          <a:lstStyle/>
+          <a:p>
+            <a:pPr marL="457200" indent="-457200">
+              <a:buFont typeface="Arial" panose="020B0604020202020204" pitchFamily="34" charset="0"/>
+              <a:buChar char="•"/>
+            </a:pPr>
+            <a:r>
+              <a:rPr lang="ko-KR" altLang="en-US" sz="2800" b="1" dirty="0">
+                <a:solidFill>
+                  <a:srgbClr val="FF0000"/>
+                </a:solidFill>
+              </a:rPr>
+              <a:t>관리자 시나리오 구체화 하여 작성</a:t>
+            </a:r>
+            <a:endParaRPr lang="en-US" altLang="ko-KR" sz="2800" b="1" dirty="0">
+              <a:solidFill>
+                <a:srgbClr val="FF0000"/>
+              </a:solidFill>
+            </a:endParaRPr>
+          </a:p>
+          <a:p>
+            <a:pPr marL="457200" indent="-457200">
+              <a:buFont typeface="Arial" panose="020B0604020202020204" pitchFamily="34" charset="0"/>
+              <a:buChar char="•"/>
+            </a:pPr>
+            <a:endParaRPr lang="en-US" altLang="ko-KR" sz="2800" b="1" dirty="0">
+              <a:solidFill>
+                <a:srgbClr val="FF0000"/>
+              </a:solidFill>
+            </a:endParaRPr>
+          </a:p>
+          <a:p>
+            <a:pPr marL="457200" indent="-457200">
+              <a:buFont typeface="Arial" panose="020B0604020202020204" pitchFamily="34" charset="0"/>
+              <a:buChar char="•"/>
+            </a:pPr>
+            <a:r>
+              <a:rPr lang="en-US" altLang="ko-KR" sz="2800" b="1" dirty="0" err="1">
+                <a:solidFill>
+                  <a:srgbClr val="FF0000"/>
+                </a:solidFill>
+              </a:rPr>
+              <a:t>Xxpage</a:t>
+            </a:r>
+            <a:r>
+              <a:rPr lang="en-US" altLang="ko-KR" sz="2800" b="1" dirty="0">
+                <a:solidFill>
+                  <a:srgbClr val="FF0000"/>
+                </a:solidFill>
+              </a:rPr>
+              <a:t> </a:t>
+            </a:r>
+            <a:r>
+              <a:rPr lang="ko-KR" altLang="en-US" sz="2800" b="1" dirty="0">
+                <a:solidFill>
+                  <a:srgbClr val="FF0000"/>
+                </a:solidFill>
+              </a:rPr>
+              <a:t>참고</a:t>
+            </a:r>
+            <a:endParaRPr lang="en-US" altLang="ko-KR" sz="2800" b="1" dirty="0">
+              <a:solidFill>
+                <a:srgbClr val="FF0000"/>
+              </a:solidFill>
+            </a:endParaRPr>
+          </a:p>
+        </p:txBody>
+      </p:sp>
+    </p:spTree>
+    <p:extLst>
+      <p:ext uri="{BB962C8B-B14F-4D97-AF65-F5344CB8AC3E}">
+        <p14:creationId xmlns:p14="http://schemas.microsoft.com/office/powerpoint/2010/main" val="2937891710"/>
+      </p:ext>
+    </p:extLst>
+  </p:cSld>
+  <p:clrMapOvr>
+    <a:masterClrMapping/>
+  </p:clrMapOvr>
+</p:sld>
+</file>
+
+<file path=ppt/slides/slide9.xml><?xml version="1.0" encoding="utf-8"?>
 <p:sld xmlns:a="http://schemas.openxmlformats.org/drawingml/2006/main" xmlns:r="http://schemas.openxmlformats.org/officeDocument/2006/relationships" xmlns:p="http://schemas.openxmlformats.org/presentationml/2006/main">
   <p:cSld>
     <p:spTree>
@@ -35721,7 +38360,7 @@
           <a:p>
             <a:fld id="{EB942B9F-D695-4224-97C8-E7A171F5AE33}" type="slidenum">
               <a:rPr lang="ko-KR" altLang="en-US" smtClean="0"/>
-              <a:t>8</a:t>
+              <a:t>9</a:t>
             </a:fld>
             <a:endParaRPr lang="ko-KR" altLang="en-US"/>
           </a:p>
@@ -35731,1065 +38370,6 @@
     <p:extLst>
       <p:ext uri="{BB962C8B-B14F-4D97-AF65-F5344CB8AC3E}">
         <p14:creationId xmlns:p14="http://schemas.microsoft.com/office/powerpoint/2010/main" val="4277314407"/>
-      </p:ext>
-    </p:extLst>
-  </p:cSld>
-  <p:clrMapOvr>
-    <a:masterClrMapping/>
-  </p:clrMapOvr>
-</p:sld>
-</file>
-
-<file path=ppt/slides/slide9.xml><?xml version="1.0" encoding="utf-8"?>
-<p:sld xmlns:a="http://schemas.openxmlformats.org/drawingml/2006/main" xmlns:r="http://schemas.openxmlformats.org/officeDocument/2006/relationships" xmlns:p="http://schemas.openxmlformats.org/presentationml/2006/main">
-  <p:cSld>
-    <p:spTree>
-      <p:nvGrpSpPr>
-        <p:cNvPr id="1" name=""/>
-        <p:cNvGrpSpPr/>
-        <p:nvPr/>
-      </p:nvGrpSpPr>
-      <p:grpSpPr>
-        <a:xfrm>
-          <a:off x="0" y="0"/>
-          <a:ext cx="0" cy="0"/>
-          <a:chOff x="0" y="0"/>
-          <a:chExt cx="0" cy="0"/>
-        </a:xfrm>
-      </p:grpSpPr>
-      <p:sp>
-        <p:nvSpPr>
-          <p:cNvPr id="26" name="Text Box 22"/>
-          <p:cNvSpPr txBox="1">
-            <a:spLocks noChangeArrowheads="1"/>
-          </p:cNvSpPr>
-          <p:nvPr/>
-        </p:nvSpPr>
-        <p:spPr bwMode="auto">
-          <a:xfrm>
-            <a:off x="141719" y="0"/>
-            <a:ext cx="5257800" cy="503238"/>
-          </a:xfrm>
-          <a:prstGeom prst="rect">
-            <a:avLst/>
-          </a:prstGeom>
-          <a:noFill/>
-          <a:ln>
-            <a:noFill/>
-          </a:ln>
-          <a:extLst>
-            <a:ext uri="{909E8E84-426E-40DD-AFC4-6F175D3DCCD1}">
-              <a14:hiddenFill xmlns:a14="http://schemas.microsoft.com/office/drawing/2010/main">
-                <a:solidFill>
-                  <a:srgbClr val="FFFFFF"/>
-                </a:solidFill>
-              </a14:hiddenFill>
-            </a:ext>
-            <a:ext uri="{91240B29-F687-4F45-9708-019B960494DF}">
-              <a14:hiddenLine xmlns:a14="http://schemas.microsoft.com/office/drawing/2010/main" w="9525">
-                <a:solidFill>
-                  <a:srgbClr val="000000"/>
-                </a:solidFill>
-                <a:miter lim="800000"/>
-                <a:headEnd/>
-                <a:tailEnd/>
-              </a14:hiddenLine>
-            </a:ext>
-          </a:extLst>
-        </p:spPr>
-        <p:txBody>
-          <a:bodyPr>
-            <a:spAutoFit/>
-          </a:bodyPr>
-          <a:lstStyle>
-            <a:defPPr>
-              <a:defRPr lang="ko-KR"/>
-            </a:defPPr>
-            <a:lvl1pPr marL="342900" indent="-342900">
-              <a:spcBef>
-                <a:spcPct val="50000"/>
-              </a:spcBef>
-              <a:defRPr sz="4000" b="1" baseline="-25000">
-                <a:solidFill>
-                  <a:schemeClr val="accent1">
-                    <a:lumMod val="50000"/>
-                  </a:schemeClr>
-                </a:solidFill>
-                <a:latin typeface="+mj-ea"/>
-                <a:ea typeface="+mj-ea"/>
-              </a:defRPr>
-            </a:lvl1pPr>
-            <a:lvl2pPr marL="742950" indent="-285750" eaLnBrk="0" hangingPunct="0">
-              <a:defRPr b="1">
-                <a:latin typeface="Arial" panose="020B0604020202020204" pitchFamily="34" charset="0"/>
-                <a:ea typeface="SimSun" panose="02010600030101010101" pitchFamily="2" charset="-122"/>
-              </a:defRPr>
-            </a:lvl2pPr>
-            <a:lvl3pPr marL="1143000" indent="-228600" eaLnBrk="0" hangingPunct="0">
-              <a:defRPr b="1">
-                <a:latin typeface="Arial" panose="020B0604020202020204" pitchFamily="34" charset="0"/>
-                <a:ea typeface="SimSun" panose="02010600030101010101" pitchFamily="2" charset="-122"/>
-              </a:defRPr>
-            </a:lvl3pPr>
-            <a:lvl4pPr marL="1600200" indent="-228600" eaLnBrk="0" hangingPunct="0">
-              <a:defRPr b="1">
-                <a:latin typeface="Arial" panose="020B0604020202020204" pitchFamily="34" charset="0"/>
-                <a:ea typeface="SimSun" panose="02010600030101010101" pitchFamily="2" charset="-122"/>
-              </a:defRPr>
-            </a:lvl4pPr>
-            <a:lvl5pPr marL="2057400" indent="-228600" eaLnBrk="0" hangingPunct="0">
-              <a:defRPr b="1">
-                <a:latin typeface="Arial" panose="020B0604020202020204" pitchFamily="34" charset="0"/>
-                <a:ea typeface="SimSun" panose="02010600030101010101" pitchFamily="2" charset="-122"/>
-              </a:defRPr>
-            </a:lvl5pPr>
-            <a:lvl6pPr marL="2514600" indent="-228600" algn="ctr" eaLnBrk="0" fontAlgn="base" hangingPunct="0">
-              <a:spcBef>
-                <a:spcPct val="0"/>
-              </a:spcBef>
-              <a:spcAft>
-                <a:spcPct val="0"/>
-              </a:spcAft>
-              <a:defRPr b="1">
-                <a:latin typeface="Arial" panose="020B0604020202020204" pitchFamily="34" charset="0"/>
-                <a:ea typeface="SimSun" panose="02010600030101010101" pitchFamily="2" charset="-122"/>
-              </a:defRPr>
-            </a:lvl6pPr>
-            <a:lvl7pPr marL="2971800" indent="-228600" algn="ctr" eaLnBrk="0" fontAlgn="base" hangingPunct="0">
-              <a:spcBef>
-                <a:spcPct val="0"/>
-              </a:spcBef>
-              <a:spcAft>
-                <a:spcPct val="0"/>
-              </a:spcAft>
-              <a:defRPr b="1">
-                <a:latin typeface="Arial" panose="020B0604020202020204" pitchFamily="34" charset="0"/>
-                <a:ea typeface="SimSun" panose="02010600030101010101" pitchFamily="2" charset="-122"/>
-              </a:defRPr>
-            </a:lvl7pPr>
-            <a:lvl8pPr marL="3429000" indent="-228600" algn="ctr" eaLnBrk="0" fontAlgn="base" hangingPunct="0">
-              <a:spcBef>
-                <a:spcPct val="0"/>
-              </a:spcBef>
-              <a:spcAft>
-                <a:spcPct val="0"/>
-              </a:spcAft>
-              <a:defRPr b="1">
-                <a:latin typeface="Arial" panose="020B0604020202020204" pitchFamily="34" charset="0"/>
-                <a:ea typeface="SimSun" panose="02010600030101010101" pitchFamily="2" charset="-122"/>
-              </a:defRPr>
-            </a:lvl8pPr>
-            <a:lvl9pPr marL="3886200" indent="-228600" algn="ctr" eaLnBrk="0" fontAlgn="base" hangingPunct="0">
-              <a:spcBef>
-                <a:spcPct val="0"/>
-              </a:spcBef>
-              <a:spcAft>
-                <a:spcPct val="0"/>
-              </a:spcAft>
-              <a:defRPr b="1">
-                <a:latin typeface="Arial" panose="020B0604020202020204" pitchFamily="34" charset="0"/>
-                <a:ea typeface="SimSun" panose="02010600030101010101" pitchFamily="2" charset="-122"/>
-              </a:defRPr>
-            </a:lvl9pPr>
-          </a:lstStyle>
-          <a:p>
-            <a:r>
-              <a:rPr lang="en-US" dirty="0"/>
-              <a:t>1. </a:t>
-            </a:r>
-            <a:r>
-              <a:rPr lang="ko-KR" altLang="en-US" dirty="0"/>
-              <a:t>졸업 연구 </a:t>
-            </a:r>
-            <a:r>
-              <a:rPr lang="ko-KR" altLang="en-US"/>
-              <a:t>및 개요</a:t>
-            </a:r>
-            <a:endParaRPr lang="en-US" dirty="0"/>
-          </a:p>
-        </p:txBody>
-      </p:sp>
-      <p:sp>
-        <p:nvSpPr>
-          <p:cNvPr id="2" name="TextBox 1">
-            <a:extLst>
-              <a:ext uri="{FF2B5EF4-FFF2-40B4-BE49-F238E27FC236}">
-                <a16:creationId xmlns:a16="http://schemas.microsoft.com/office/drawing/2014/main" id="{8D8B05C7-87F9-43B6-A885-B4EA1EFF4CD7}"/>
-              </a:ext>
-            </a:extLst>
-          </p:cNvPr>
-          <p:cNvSpPr txBox="1"/>
-          <p:nvPr/>
-        </p:nvSpPr>
-        <p:spPr>
-          <a:xfrm>
-            <a:off x="2642485" y="2384191"/>
-            <a:ext cx="6503703" cy="369332"/>
-          </a:xfrm>
-          <a:prstGeom prst="rect">
-            <a:avLst/>
-          </a:prstGeom>
-          <a:noFill/>
-        </p:spPr>
-        <p:txBody>
-          <a:bodyPr wrap="none" rtlCol="0">
-            <a:spAutoFit/>
-          </a:bodyPr>
-          <a:lstStyle/>
-          <a:p>
-            <a:pPr marL="285750" indent="-285750">
-              <a:buFont typeface="Arial" panose="020B0604020202020204" pitchFamily="34" charset="0"/>
-              <a:buChar char="•"/>
-            </a:pPr>
-            <a:r>
-              <a:rPr lang="ko-KR" altLang="en-US" b="1" dirty="0">
-                <a:solidFill>
-                  <a:srgbClr val="6F6761"/>
-                </a:solidFill>
-                <a:sym typeface="Wingdings" panose="05000000000000000000" pitchFamily="2" charset="2"/>
-              </a:rPr>
-              <a:t>지역별 커스터마이징             </a:t>
-            </a:r>
-            <a:r>
-              <a:rPr lang="ko-KR" altLang="en-US" b="1" dirty="0">
-                <a:solidFill>
-                  <a:srgbClr val="FF0000"/>
-                </a:solidFill>
-                <a:sym typeface="Wingdings" panose="05000000000000000000" pitchFamily="2" charset="2"/>
-              </a:rPr>
-              <a:t>고객 니즈에 맞는 서비스를 제공</a:t>
-            </a:r>
-            <a:endParaRPr lang="en-US" altLang="ko-KR" b="1" dirty="0">
-              <a:solidFill>
-                <a:srgbClr val="FF0000"/>
-              </a:solidFill>
-              <a:sym typeface="Wingdings" panose="05000000000000000000" pitchFamily="2" charset="2"/>
-            </a:endParaRPr>
-          </a:p>
-        </p:txBody>
-      </p:sp>
-      <p:sp>
-        <p:nvSpPr>
-          <p:cNvPr id="23" name="TextBox 22">
-            <a:extLst>
-              <a:ext uri="{FF2B5EF4-FFF2-40B4-BE49-F238E27FC236}">
-                <a16:creationId xmlns:a16="http://schemas.microsoft.com/office/drawing/2014/main" id="{6CB960C1-5211-45F6-B8D6-371160F302A2}"/>
-              </a:ext>
-            </a:extLst>
-          </p:cNvPr>
-          <p:cNvSpPr txBox="1"/>
-          <p:nvPr/>
-        </p:nvSpPr>
-        <p:spPr>
-          <a:xfrm>
-            <a:off x="2642485" y="4362883"/>
-            <a:ext cx="6450805" cy="369332"/>
-          </a:xfrm>
-          <a:prstGeom prst="rect">
-            <a:avLst/>
-          </a:prstGeom>
-          <a:noFill/>
-        </p:spPr>
-        <p:txBody>
-          <a:bodyPr wrap="none" rtlCol="0">
-            <a:spAutoFit/>
-          </a:bodyPr>
-          <a:lstStyle/>
-          <a:p>
-            <a:pPr marL="285750" indent="-285750">
-              <a:buFont typeface="Arial" panose="020B0604020202020204" pitchFamily="34" charset="0"/>
-              <a:buChar char="•"/>
-            </a:pPr>
-            <a:r>
-              <a:rPr lang="ko-KR" altLang="en-US" b="1" dirty="0">
-                <a:solidFill>
-                  <a:srgbClr val="6F6761"/>
-                </a:solidFill>
-                <a:sym typeface="Wingdings" panose="05000000000000000000" pitchFamily="2" charset="2"/>
-              </a:rPr>
-              <a:t>또 클라이언트 고객층에 맞춘 광고            추가적인 수익상승</a:t>
-            </a:r>
-            <a:endParaRPr lang="en-US" altLang="ko-KR" b="1" dirty="0">
-              <a:solidFill>
-                <a:srgbClr val="FF0000"/>
-              </a:solidFill>
-              <a:sym typeface="Wingdings" panose="05000000000000000000" pitchFamily="2" charset="2"/>
-            </a:endParaRPr>
-          </a:p>
-        </p:txBody>
-      </p:sp>
-      <p:sp>
-        <p:nvSpPr>
-          <p:cNvPr id="19" name="TextBox 18">
-            <a:extLst>
-              <a:ext uri="{FF2B5EF4-FFF2-40B4-BE49-F238E27FC236}">
-                <a16:creationId xmlns:a16="http://schemas.microsoft.com/office/drawing/2014/main" id="{512E8FBB-C7AD-4445-8250-5095972E560E}"/>
-              </a:ext>
-            </a:extLst>
-          </p:cNvPr>
-          <p:cNvSpPr txBox="1"/>
-          <p:nvPr/>
-        </p:nvSpPr>
-        <p:spPr>
-          <a:xfrm>
-            <a:off x="2642485" y="2872917"/>
-            <a:ext cx="6803466" cy="369332"/>
-          </a:xfrm>
-          <a:prstGeom prst="rect">
-            <a:avLst/>
-          </a:prstGeom>
-          <a:noFill/>
-        </p:spPr>
-        <p:txBody>
-          <a:bodyPr wrap="none" rtlCol="0">
-            <a:spAutoFit/>
-          </a:bodyPr>
-          <a:lstStyle/>
-          <a:p>
-            <a:pPr marL="285750" indent="-285750">
-              <a:buFont typeface="Arial" panose="020B0604020202020204" pitchFamily="34" charset="0"/>
-              <a:buChar char="•"/>
-            </a:pPr>
-            <a:r>
-              <a:rPr lang="en-US" altLang="ko-KR" b="1" dirty="0">
-                <a:solidFill>
-                  <a:srgbClr val="6F6761"/>
-                </a:solidFill>
-                <a:sym typeface="Wingdings" panose="05000000000000000000" pitchFamily="2" charset="2"/>
-              </a:rPr>
-              <a:t>KBO</a:t>
-            </a:r>
-            <a:r>
-              <a:rPr lang="ko-KR" altLang="en-US" b="1" dirty="0">
-                <a:solidFill>
-                  <a:srgbClr val="6F6761"/>
-                </a:solidFill>
-                <a:sym typeface="Wingdings" panose="05000000000000000000" pitchFamily="2" charset="2"/>
-              </a:rPr>
-              <a:t>사이트 기록 기준 </a:t>
-            </a:r>
-            <a:r>
-              <a:rPr lang="en-US" altLang="ko-KR" b="1" dirty="0">
-                <a:solidFill>
-                  <a:srgbClr val="6F6761"/>
-                </a:solidFill>
-                <a:sym typeface="Wingdings" panose="05000000000000000000" pitchFamily="2" charset="2"/>
-              </a:rPr>
-              <a:t>99%</a:t>
-            </a:r>
-            <a:r>
-              <a:rPr lang="ko-KR" altLang="en-US" b="1" dirty="0">
-                <a:solidFill>
-                  <a:srgbClr val="6F6761"/>
-                </a:solidFill>
-                <a:sym typeface="Wingdings" panose="05000000000000000000" pitchFamily="2" charset="2"/>
-              </a:rPr>
-              <a:t>에 달하는 상세 기록          </a:t>
-            </a:r>
-            <a:r>
-              <a:rPr lang="ko-KR" altLang="en-US" b="1" dirty="0">
-                <a:solidFill>
-                  <a:srgbClr val="FF0000"/>
-                </a:solidFill>
-                <a:sym typeface="Wingdings" panose="05000000000000000000" pitchFamily="2" charset="2"/>
-              </a:rPr>
-              <a:t>만족도 상승</a:t>
-            </a:r>
-            <a:endParaRPr lang="en-US" altLang="ko-KR" b="1" dirty="0">
-              <a:solidFill>
-                <a:srgbClr val="FF0000"/>
-              </a:solidFill>
-              <a:sym typeface="Wingdings" panose="05000000000000000000" pitchFamily="2" charset="2"/>
-            </a:endParaRPr>
-          </a:p>
-        </p:txBody>
-      </p:sp>
-      <p:sp>
-        <p:nvSpPr>
-          <p:cNvPr id="21" name="TextBox 20">
-            <a:extLst>
-              <a:ext uri="{FF2B5EF4-FFF2-40B4-BE49-F238E27FC236}">
-                <a16:creationId xmlns:a16="http://schemas.microsoft.com/office/drawing/2014/main" id="{44222454-24C5-4396-8513-51B6512D95CF}"/>
-              </a:ext>
-            </a:extLst>
-          </p:cNvPr>
-          <p:cNvSpPr txBox="1"/>
-          <p:nvPr/>
-        </p:nvSpPr>
-        <p:spPr>
-          <a:xfrm>
-            <a:off x="2642485" y="3360644"/>
-            <a:ext cx="6147837" cy="369332"/>
-          </a:xfrm>
-          <a:prstGeom prst="rect">
-            <a:avLst/>
-          </a:prstGeom>
-          <a:noFill/>
-        </p:spPr>
-        <p:txBody>
-          <a:bodyPr wrap="none" rtlCol="0">
-            <a:spAutoFit/>
-          </a:bodyPr>
-          <a:lstStyle/>
-          <a:p>
-            <a:pPr marL="285750" indent="-285750">
-              <a:buFont typeface="Arial" panose="020B0604020202020204" pitchFamily="34" charset="0"/>
-              <a:buChar char="•"/>
-            </a:pPr>
-            <a:r>
-              <a:rPr lang="ko-KR" altLang="en-US" b="1" dirty="0">
-                <a:solidFill>
-                  <a:srgbClr val="6F6761"/>
-                </a:solidFill>
-                <a:sym typeface="Wingdings" panose="05000000000000000000" pitchFamily="2" charset="2"/>
-              </a:rPr>
-              <a:t>장시간 선수들의 데이터 누적              </a:t>
-            </a:r>
-            <a:r>
-              <a:rPr lang="ko-KR" altLang="en-US" b="1" dirty="0">
-                <a:solidFill>
-                  <a:srgbClr val="FF0000"/>
-                </a:solidFill>
-                <a:sym typeface="Wingdings" panose="05000000000000000000" pitchFamily="2" charset="2"/>
-              </a:rPr>
-              <a:t>평생 고객 유도 가능</a:t>
-            </a:r>
-            <a:endParaRPr lang="en-US" altLang="ko-KR" b="1" dirty="0">
-              <a:solidFill>
-                <a:srgbClr val="FF0000"/>
-              </a:solidFill>
-              <a:sym typeface="Wingdings" panose="05000000000000000000" pitchFamily="2" charset="2"/>
-            </a:endParaRPr>
-          </a:p>
-        </p:txBody>
-      </p:sp>
-      <p:sp>
-        <p:nvSpPr>
-          <p:cNvPr id="25" name="TextBox 24">
-            <a:extLst>
-              <a:ext uri="{FF2B5EF4-FFF2-40B4-BE49-F238E27FC236}">
-                <a16:creationId xmlns:a16="http://schemas.microsoft.com/office/drawing/2014/main" id="{04F12578-9B97-4FFE-9AED-1BC64FF59A68}"/>
-              </a:ext>
-            </a:extLst>
-          </p:cNvPr>
-          <p:cNvSpPr txBox="1"/>
-          <p:nvPr/>
-        </p:nvSpPr>
-        <p:spPr>
-          <a:xfrm>
-            <a:off x="2628274" y="4861569"/>
-            <a:ext cx="6436377" cy="369332"/>
-          </a:xfrm>
-          <a:prstGeom prst="rect">
-            <a:avLst/>
-          </a:prstGeom>
-          <a:noFill/>
-        </p:spPr>
-        <p:txBody>
-          <a:bodyPr wrap="none" rtlCol="0">
-            <a:spAutoFit/>
-          </a:bodyPr>
-          <a:lstStyle/>
-          <a:p>
-            <a:pPr marL="285750" indent="-285750">
-              <a:buFont typeface="Arial" panose="020B0604020202020204" pitchFamily="34" charset="0"/>
-              <a:buChar char="•"/>
-            </a:pPr>
-            <a:r>
-              <a:rPr lang="ko-KR" altLang="en-US" b="1" dirty="0">
-                <a:solidFill>
-                  <a:srgbClr val="6F6761"/>
-                </a:solidFill>
-                <a:sym typeface="Wingdings" panose="05000000000000000000" pitchFamily="2" charset="2"/>
-              </a:rPr>
-              <a:t>그 외적으로 야구 용품 판매와 같은 </a:t>
-            </a:r>
-            <a:r>
-              <a:rPr lang="ko-KR" altLang="en-US" b="1" dirty="0">
-                <a:solidFill>
-                  <a:srgbClr val="FF0000"/>
-                </a:solidFill>
-                <a:sym typeface="Wingdings" panose="05000000000000000000" pitchFamily="2" charset="2"/>
-              </a:rPr>
-              <a:t>사행성은 제로</a:t>
-            </a:r>
-            <a:r>
-              <a:rPr lang="ko-KR" altLang="en-US" b="1" dirty="0">
-                <a:solidFill>
-                  <a:srgbClr val="6F6761"/>
-                </a:solidFill>
-                <a:sym typeface="Wingdings" panose="05000000000000000000" pitchFamily="2" charset="2"/>
-              </a:rPr>
-              <a:t>에 가까움</a:t>
-            </a:r>
-            <a:endParaRPr lang="en-US" altLang="ko-KR" b="1" dirty="0">
-              <a:solidFill>
-                <a:srgbClr val="FF0000"/>
-              </a:solidFill>
-              <a:sym typeface="Wingdings" panose="05000000000000000000" pitchFamily="2" charset="2"/>
-            </a:endParaRPr>
-          </a:p>
-        </p:txBody>
-      </p:sp>
-      <p:sp>
-        <p:nvSpPr>
-          <p:cNvPr id="28" name="TextBox 27">
-            <a:extLst>
-              <a:ext uri="{FF2B5EF4-FFF2-40B4-BE49-F238E27FC236}">
-                <a16:creationId xmlns:a16="http://schemas.microsoft.com/office/drawing/2014/main" id="{9DE46C4F-CCA2-43FE-BDF4-D960E7341251}"/>
-              </a:ext>
-            </a:extLst>
-          </p:cNvPr>
-          <p:cNvSpPr txBox="1"/>
-          <p:nvPr/>
-        </p:nvSpPr>
-        <p:spPr>
-          <a:xfrm>
-            <a:off x="3441807" y="2384191"/>
-            <a:ext cx="45719" cy="369332"/>
-          </a:xfrm>
-          <a:prstGeom prst="rect">
-            <a:avLst/>
-          </a:prstGeom>
-          <a:noFill/>
-        </p:spPr>
-        <p:txBody>
-          <a:bodyPr wrap="square" rtlCol="0">
-            <a:spAutoFit/>
-          </a:bodyPr>
-          <a:lstStyle/>
-          <a:p>
-            <a:pPr marL="285750" indent="-285750">
-              <a:buFont typeface="Arial" panose="020B0604020202020204" pitchFamily="34" charset="0"/>
-              <a:buChar char="•"/>
-            </a:pPr>
-            <a:endParaRPr lang="ko-KR" altLang="en-US" dirty="0"/>
-          </a:p>
-        </p:txBody>
-      </p:sp>
-      <p:grpSp>
-        <p:nvGrpSpPr>
-          <p:cNvPr id="39" name="그룹 38">
-            <a:extLst>
-              <a:ext uri="{FF2B5EF4-FFF2-40B4-BE49-F238E27FC236}">
-                <a16:creationId xmlns:a16="http://schemas.microsoft.com/office/drawing/2014/main" id="{6682E081-99BB-4282-9CFC-0FA6E5709D31}"/>
-              </a:ext>
-            </a:extLst>
-          </p:cNvPr>
-          <p:cNvGrpSpPr/>
-          <p:nvPr/>
-        </p:nvGrpSpPr>
-        <p:grpSpPr>
-          <a:xfrm>
-            <a:off x="281414" y="2014859"/>
-            <a:ext cx="1794255" cy="2497706"/>
-            <a:chOff x="281414" y="2014859"/>
-            <a:chExt cx="1794255" cy="2497706"/>
-          </a:xfrm>
-        </p:grpSpPr>
-        <p:pic>
-          <p:nvPicPr>
-            <p:cNvPr id="5" name="그래픽 4" descr="교사">
-              <a:extLst>
-                <a:ext uri="{FF2B5EF4-FFF2-40B4-BE49-F238E27FC236}">
-                  <a16:creationId xmlns:a16="http://schemas.microsoft.com/office/drawing/2014/main" id="{7E3FE4B9-CD09-468A-8AD4-2E685D2F4D90}"/>
-                </a:ext>
-              </a:extLst>
-            </p:cNvPr>
-            <p:cNvPicPr>
-              <a:picLocks noChangeAspect="1"/>
-            </p:cNvPicPr>
-            <p:nvPr/>
-          </p:nvPicPr>
-          <p:blipFill>
-            <a:blip r:embed="rId2" cstate="print">
-              <a:extLst>
-                <a:ext uri="{28A0092B-C50C-407E-A947-70E740481C1C}">
-                  <a14:useLocalDpi xmlns:a14="http://schemas.microsoft.com/office/drawing/2010/main" val="0"/>
-                </a:ext>
-                <a:ext uri="{96DAC541-7B7A-43D3-8B79-37D633B846F1}">
-                  <asvg:svgBlip xmlns:asvg="http://schemas.microsoft.com/office/drawing/2016/SVG/main" r:embed="rId3"/>
-                </a:ext>
-              </a:extLst>
-            </a:blip>
-            <a:stretch>
-              <a:fillRect/>
-            </a:stretch>
-          </p:blipFill>
-          <p:spPr>
-            <a:xfrm>
-              <a:off x="281414" y="3078920"/>
-              <a:ext cx="1433645" cy="1433645"/>
-            </a:xfrm>
-            <a:prstGeom prst="rect">
-              <a:avLst/>
-            </a:prstGeom>
-          </p:spPr>
-        </p:pic>
-        <p:sp>
-          <p:nvSpPr>
-            <p:cNvPr id="29" name="TextBox 28">
-              <a:extLst>
-                <a:ext uri="{FF2B5EF4-FFF2-40B4-BE49-F238E27FC236}">
-                  <a16:creationId xmlns:a16="http://schemas.microsoft.com/office/drawing/2014/main" id="{28771099-37AB-45E0-972F-99049A789078}"/>
-                </a:ext>
-              </a:extLst>
-            </p:cNvPr>
-            <p:cNvSpPr txBox="1"/>
-            <p:nvPr/>
-          </p:nvSpPr>
-          <p:spPr>
-            <a:xfrm>
-              <a:off x="281414" y="2014859"/>
-              <a:ext cx="1794255" cy="369332"/>
-            </a:xfrm>
-            <a:prstGeom prst="rect">
-              <a:avLst/>
-            </a:prstGeom>
-            <a:noFill/>
-          </p:spPr>
-          <p:txBody>
-            <a:bodyPr wrap="square" rtlCol="0">
-              <a:spAutoFit/>
-            </a:bodyPr>
-            <a:lstStyle/>
-            <a:p>
-              <a:r>
-                <a:rPr lang="ko-KR" altLang="en-US" b="1" dirty="0">
-                  <a:effectLst>
-                    <a:outerShdw blurRad="38100" dist="38100" dir="2700000" algn="tl">
-                      <a:srgbClr val="000000">
-                        <a:alpha val="43137"/>
-                      </a:srgbClr>
-                    </a:outerShdw>
-                  </a:effectLst>
-                </a:rPr>
-                <a:t>졸업 연구 효과</a:t>
-              </a:r>
-            </a:p>
-          </p:txBody>
-        </p:sp>
-      </p:grpSp>
-      <p:sp>
-        <p:nvSpPr>
-          <p:cNvPr id="22" name="TextBox 21">
-            <a:extLst>
-              <a:ext uri="{FF2B5EF4-FFF2-40B4-BE49-F238E27FC236}">
-                <a16:creationId xmlns:a16="http://schemas.microsoft.com/office/drawing/2014/main" id="{1C55D484-41FF-4266-9078-C08A888C7E24}"/>
-              </a:ext>
-            </a:extLst>
-          </p:cNvPr>
-          <p:cNvSpPr txBox="1"/>
-          <p:nvPr/>
-        </p:nvSpPr>
-        <p:spPr>
-          <a:xfrm>
-            <a:off x="2642485" y="3843030"/>
-            <a:ext cx="6426759" cy="369332"/>
-          </a:xfrm>
-          <a:prstGeom prst="rect">
-            <a:avLst/>
-          </a:prstGeom>
-          <a:noFill/>
-        </p:spPr>
-        <p:txBody>
-          <a:bodyPr wrap="none" rtlCol="0">
-            <a:spAutoFit/>
-          </a:bodyPr>
-          <a:lstStyle/>
-          <a:p>
-            <a:pPr marL="285750" indent="-285750">
-              <a:buFont typeface="Arial" panose="020B0604020202020204" pitchFamily="34" charset="0"/>
-              <a:buChar char="•"/>
-            </a:pPr>
-            <a:r>
-              <a:rPr lang="ko-KR" altLang="en-US" b="1" dirty="0">
-                <a:solidFill>
-                  <a:srgbClr val="6F6761"/>
-                </a:solidFill>
-                <a:sym typeface="Wingdings" panose="05000000000000000000" pitchFamily="2" charset="2"/>
-              </a:rPr>
-              <a:t>회원수가 증가</a:t>
-            </a:r>
-            <a:r>
-              <a:rPr lang="en-US" altLang="ko-KR" b="1" dirty="0">
-                <a:solidFill>
-                  <a:srgbClr val="6F6761"/>
-                </a:solidFill>
-                <a:sym typeface="Wingdings" panose="05000000000000000000" pitchFamily="2" charset="2"/>
-              </a:rPr>
-              <a:t>          </a:t>
-            </a:r>
-            <a:r>
-              <a:rPr lang="ko-KR" altLang="en-US" b="1" dirty="0">
-                <a:solidFill>
-                  <a:srgbClr val="6F6761"/>
-                </a:solidFill>
-                <a:sym typeface="Wingdings" panose="05000000000000000000" pitchFamily="2" charset="2"/>
-              </a:rPr>
-              <a:t>팀 증가          리그 수 증가          수익상승</a:t>
-            </a:r>
-            <a:endParaRPr lang="en-US" altLang="ko-KR" b="1" dirty="0">
-              <a:solidFill>
-                <a:srgbClr val="FF0000"/>
-              </a:solidFill>
-              <a:sym typeface="Wingdings" panose="05000000000000000000" pitchFamily="2" charset="2"/>
-            </a:endParaRPr>
-          </a:p>
-        </p:txBody>
-      </p:sp>
-      <p:sp>
-        <p:nvSpPr>
-          <p:cNvPr id="7" name="오른쪽 화살표 6"/>
-          <p:cNvSpPr/>
-          <p:nvPr/>
-        </p:nvSpPr>
-        <p:spPr>
-          <a:xfrm>
-            <a:off x="5267995" y="2428425"/>
-            <a:ext cx="448408" cy="280863"/>
-          </a:xfrm>
-          <a:prstGeom prst="rightArrow">
-            <a:avLst/>
-          </a:prstGeom>
-        </p:spPr>
-        <p:style>
-          <a:lnRef idx="2">
-            <a:schemeClr val="accent1">
-              <a:shade val="50000"/>
-            </a:schemeClr>
-          </a:lnRef>
-          <a:fillRef idx="1">
-            <a:schemeClr val="accent1"/>
-          </a:fillRef>
-          <a:effectRef idx="0">
-            <a:schemeClr val="accent1"/>
-          </a:effectRef>
-          <a:fontRef idx="minor">
-            <a:schemeClr val="lt1"/>
-          </a:fontRef>
-        </p:style>
-        <p:txBody>
-          <a:bodyPr rtlCol="0" anchor="ctr"/>
-          <a:lstStyle/>
-          <a:p>
-            <a:pPr marL="285750" indent="-285750" algn="ctr">
-              <a:buFont typeface="Arial" panose="020B0604020202020204" pitchFamily="34" charset="0"/>
-              <a:buChar char="•"/>
-            </a:pPr>
-            <a:endParaRPr lang="ko-KR" altLang="en-US"/>
-          </a:p>
-        </p:txBody>
-      </p:sp>
-      <p:sp>
-        <p:nvSpPr>
-          <p:cNvPr id="12" name="오른쪽 화살표 11"/>
-          <p:cNvSpPr/>
-          <p:nvPr/>
-        </p:nvSpPr>
-        <p:spPr>
-          <a:xfrm>
-            <a:off x="6524075" y="4372133"/>
-            <a:ext cx="448408" cy="280863"/>
-          </a:xfrm>
-          <a:prstGeom prst="rightArrow">
-            <a:avLst/>
-          </a:prstGeom>
-        </p:spPr>
-        <p:style>
-          <a:lnRef idx="2">
-            <a:schemeClr val="accent1">
-              <a:shade val="50000"/>
-            </a:schemeClr>
-          </a:lnRef>
-          <a:fillRef idx="1">
-            <a:schemeClr val="accent1"/>
-          </a:fillRef>
-          <a:effectRef idx="0">
-            <a:schemeClr val="accent1"/>
-          </a:effectRef>
-          <a:fontRef idx="minor">
-            <a:schemeClr val="lt1"/>
-          </a:fontRef>
-        </p:style>
-        <p:txBody>
-          <a:bodyPr rtlCol="0" anchor="ctr"/>
-          <a:lstStyle/>
-          <a:p>
-            <a:pPr marL="285750" indent="-285750" algn="ctr">
-              <a:buFont typeface="Arial" panose="020B0604020202020204" pitchFamily="34" charset="0"/>
-              <a:buChar char="•"/>
-            </a:pPr>
-            <a:endParaRPr lang="ko-KR" altLang="en-US"/>
-          </a:p>
-        </p:txBody>
-      </p:sp>
-      <p:sp>
-        <p:nvSpPr>
-          <p:cNvPr id="9" name="오른쪽 화살표 8"/>
-          <p:cNvSpPr/>
-          <p:nvPr/>
-        </p:nvSpPr>
-        <p:spPr>
-          <a:xfrm>
-            <a:off x="7614809" y="2901186"/>
-            <a:ext cx="448408" cy="280863"/>
-          </a:xfrm>
-          <a:prstGeom prst="rightArrow">
-            <a:avLst/>
-          </a:prstGeom>
-        </p:spPr>
-        <p:style>
-          <a:lnRef idx="2">
-            <a:schemeClr val="accent1">
-              <a:shade val="50000"/>
-            </a:schemeClr>
-          </a:lnRef>
-          <a:fillRef idx="1">
-            <a:schemeClr val="accent1"/>
-          </a:fillRef>
-          <a:effectRef idx="0">
-            <a:schemeClr val="accent1"/>
-          </a:effectRef>
-          <a:fontRef idx="minor">
-            <a:schemeClr val="lt1"/>
-          </a:fontRef>
-        </p:style>
-        <p:txBody>
-          <a:bodyPr rtlCol="0" anchor="ctr"/>
-          <a:lstStyle/>
-          <a:p>
-            <a:pPr marL="285750" indent="-285750" algn="ctr">
-              <a:buFont typeface="Arial" panose="020B0604020202020204" pitchFamily="34" charset="0"/>
-              <a:buChar char="•"/>
-            </a:pPr>
-            <a:endParaRPr lang="ko-KR" altLang="en-US"/>
-          </a:p>
-        </p:txBody>
-      </p:sp>
-      <p:sp>
-        <p:nvSpPr>
-          <p:cNvPr id="10" name="오른쪽 화살표 9"/>
-          <p:cNvSpPr/>
-          <p:nvPr/>
-        </p:nvSpPr>
-        <p:spPr>
-          <a:xfrm>
-            <a:off x="6075667" y="3402208"/>
-            <a:ext cx="448408" cy="280863"/>
-          </a:xfrm>
-          <a:prstGeom prst="rightArrow">
-            <a:avLst/>
-          </a:prstGeom>
-        </p:spPr>
-        <p:style>
-          <a:lnRef idx="2">
-            <a:schemeClr val="accent1">
-              <a:shade val="50000"/>
-            </a:schemeClr>
-          </a:lnRef>
-          <a:fillRef idx="1">
-            <a:schemeClr val="accent1"/>
-          </a:fillRef>
-          <a:effectRef idx="0">
-            <a:schemeClr val="accent1"/>
-          </a:effectRef>
-          <a:fontRef idx="minor">
-            <a:schemeClr val="lt1"/>
-          </a:fontRef>
-        </p:style>
-        <p:txBody>
-          <a:bodyPr rtlCol="0" anchor="ctr"/>
-          <a:lstStyle/>
-          <a:p>
-            <a:pPr marL="285750" indent="-285750" algn="ctr">
-              <a:buFont typeface="Arial" panose="020B0604020202020204" pitchFamily="34" charset="0"/>
-              <a:buChar char="•"/>
-            </a:pPr>
-            <a:endParaRPr lang="ko-KR" altLang="en-US"/>
-          </a:p>
-        </p:txBody>
-      </p:sp>
-      <p:sp>
-        <p:nvSpPr>
-          <p:cNvPr id="30" name="오른쪽 화살표 10">
-            <a:extLst>
-              <a:ext uri="{FF2B5EF4-FFF2-40B4-BE49-F238E27FC236}">
-                <a16:creationId xmlns:a16="http://schemas.microsoft.com/office/drawing/2014/main" id="{77353AFD-ABD0-4DAA-A50C-EC1EF53566E6}"/>
-              </a:ext>
-            </a:extLst>
-          </p:cNvPr>
-          <p:cNvSpPr/>
-          <p:nvPr/>
-        </p:nvSpPr>
-        <p:spPr>
-          <a:xfrm>
-            <a:off x="4484580" y="3874478"/>
-            <a:ext cx="448408" cy="280863"/>
-          </a:xfrm>
-          <a:prstGeom prst="rightArrow">
-            <a:avLst/>
-          </a:prstGeom>
-        </p:spPr>
-        <p:style>
-          <a:lnRef idx="2">
-            <a:schemeClr val="accent1">
-              <a:shade val="50000"/>
-            </a:schemeClr>
-          </a:lnRef>
-          <a:fillRef idx="1">
-            <a:schemeClr val="accent1"/>
-          </a:fillRef>
-          <a:effectRef idx="0">
-            <a:schemeClr val="accent1"/>
-          </a:effectRef>
-          <a:fontRef idx="minor">
-            <a:schemeClr val="lt1"/>
-          </a:fontRef>
-        </p:style>
-        <p:txBody>
-          <a:bodyPr rtlCol="0" anchor="ctr"/>
-          <a:lstStyle/>
-          <a:p>
-            <a:pPr marL="285750" indent="-285750" algn="ctr">
-              <a:buFont typeface="Arial" panose="020B0604020202020204" pitchFamily="34" charset="0"/>
-              <a:buChar char="•"/>
-            </a:pPr>
-            <a:endParaRPr lang="ko-KR" altLang="en-US"/>
-          </a:p>
-        </p:txBody>
-      </p:sp>
-      <p:sp>
-        <p:nvSpPr>
-          <p:cNvPr id="31" name="오른쪽 화살표 10">
-            <a:extLst>
-              <a:ext uri="{FF2B5EF4-FFF2-40B4-BE49-F238E27FC236}">
-                <a16:creationId xmlns:a16="http://schemas.microsoft.com/office/drawing/2014/main" id="{03FC4268-DC3E-401B-AC95-E7E57F0FED44}"/>
-              </a:ext>
-            </a:extLst>
-          </p:cNvPr>
-          <p:cNvSpPr/>
-          <p:nvPr/>
-        </p:nvSpPr>
-        <p:spPr>
-          <a:xfrm>
-            <a:off x="5740788" y="3874478"/>
-            <a:ext cx="448408" cy="280863"/>
-          </a:xfrm>
-          <a:prstGeom prst="rightArrow">
-            <a:avLst/>
-          </a:prstGeom>
-        </p:spPr>
-        <p:style>
-          <a:lnRef idx="2">
-            <a:schemeClr val="accent1">
-              <a:shade val="50000"/>
-            </a:schemeClr>
-          </a:lnRef>
-          <a:fillRef idx="1">
-            <a:schemeClr val="accent1"/>
-          </a:fillRef>
-          <a:effectRef idx="0">
-            <a:schemeClr val="accent1"/>
-          </a:effectRef>
-          <a:fontRef idx="minor">
-            <a:schemeClr val="lt1"/>
-          </a:fontRef>
-        </p:style>
-        <p:txBody>
-          <a:bodyPr rtlCol="0" anchor="ctr"/>
-          <a:lstStyle/>
-          <a:p>
-            <a:pPr marL="285750" indent="-285750" algn="ctr">
-              <a:buFont typeface="Arial" panose="020B0604020202020204" pitchFamily="34" charset="0"/>
-              <a:buChar char="•"/>
-            </a:pPr>
-            <a:endParaRPr lang="ko-KR" altLang="en-US"/>
-          </a:p>
-        </p:txBody>
-      </p:sp>
-      <p:sp>
-        <p:nvSpPr>
-          <p:cNvPr id="32" name="오른쪽 화살표 10">
-            <a:extLst>
-              <a:ext uri="{FF2B5EF4-FFF2-40B4-BE49-F238E27FC236}">
-                <a16:creationId xmlns:a16="http://schemas.microsoft.com/office/drawing/2014/main" id="{F8BC7AC7-0797-4546-9F00-252A630579B1}"/>
-              </a:ext>
-            </a:extLst>
-          </p:cNvPr>
-          <p:cNvSpPr/>
-          <p:nvPr/>
-        </p:nvSpPr>
-        <p:spPr>
-          <a:xfrm>
-            <a:off x="7532265" y="3874478"/>
-            <a:ext cx="448408" cy="280863"/>
-          </a:xfrm>
-          <a:prstGeom prst="rightArrow">
-            <a:avLst/>
-          </a:prstGeom>
-        </p:spPr>
-        <p:style>
-          <a:lnRef idx="2">
-            <a:schemeClr val="accent1">
-              <a:shade val="50000"/>
-            </a:schemeClr>
-          </a:lnRef>
-          <a:fillRef idx="1">
-            <a:schemeClr val="accent1"/>
-          </a:fillRef>
-          <a:effectRef idx="0">
-            <a:schemeClr val="accent1"/>
-          </a:effectRef>
-          <a:fontRef idx="minor">
-            <a:schemeClr val="lt1"/>
-          </a:fontRef>
-        </p:style>
-        <p:txBody>
-          <a:bodyPr rtlCol="0" anchor="ctr"/>
-          <a:lstStyle/>
-          <a:p>
-            <a:pPr marL="285750" indent="-285750" algn="ctr">
-              <a:buFont typeface="Arial" panose="020B0604020202020204" pitchFamily="34" charset="0"/>
-              <a:buChar char="•"/>
-            </a:pPr>
-            <a:endParaRPr lang="ko-KR" altLang="en-US"/>
-          </a:p>
-        </p:txBody>
-      </p:sp>
-      <p:sp>
-        <p:nvSpPr>
-          <p:cNvPr id="3" name="슬라이드 번호 개체 틀 2">
-            <a:extLst>
-              <a:ext uri="{FF2B5EF4-FFF2-40B4-BE49-F238E27FC236}">
-                <a16:creationId xmlns:a16="http://schemas.microsoft.com/office/drawing/2014/main" id="{81BA6205-09C0-4D2F-B3F9-49AF34D6F94A}"/>
-              </a:ext>
-            </a:extLst>
-          </p:cNvPr>
-          <p:cNvSpPr>
-            <a:spLocks noGrp="1"/>
-          </p:cNvSpPr>
-          <p:nvPr>
-            <p:ph type="sldNum" sz="quarter" idx="12"/>
-          </p:nvPr>
-        </p:nvSpPr>
-        <p:spPr/>
-        <p:txBody>
-          <a:bodyPr/>
-          <a:lstStyle/>
-          <a:p>
-            <a:fld id="{EB942B9F-D695-4224-97C8-E7A171F5AE33}" type="slidenum">
-              <a:rPr lang="ko-KR" altLang="en-US" smtClean="0"/>
-              <a:t>9</a:t>
-            </a:fld>
-            <a:endParaRPr lang="ko-KR" altLang="en-US"/>
-          </a:p>
-        </p:txBody>
-      </p:sp>
-    </p:spTree>
-    <p:extLst>
-      <p:ext uri="{BB962C8B-B14F-4D97-AF65-F5344CB8AC3E}">
-        <p14:creationId xmlns:p14="http://schemas.microsoft.com/office/powerpoint/2010/main" val="3666679560"/>
       </p:ext>
     </p:extLst>
   </p:cSld>

</xml_diff>

<commit_message>
--2019.02.15 Jeong-Chan Lee 설계서 수정
</commit_message>
<xml_diff>
--- a/resources/졸작설계서.pptx
+++ b/resources/졸작설계서.pptx
@@ -5,10 +5,10 @@
     <p:sldMasterId id="2147483660" r:id="rId3"/>
   </p:sldMasterIdLst>
   <p:notesMasterIdLst>
-    <p:notesMasterId r:id="rId32"/>
+    <p:notesMasterId r:id="rId34"/>
   </p:notesMasterIdLst>
   <p:handoutMasterIdLst>
-    <p:handoutMasterId r:id="rId33"/>
+    <p:handoutMasterId r:id="rId35"/>
   </p:handoutMasterIdLst>
   <p:sldIdLst>
     <p:sldId id="256" r:id="rId4"/>
@@ -29,16 +29,18 @@
     <p:sldId id="308" r:id="rId19"/>
     <p:sldId id="316" r:id="rId20"/>
     <p:sldId id="323" r:id="rId21"/>
-    <p:sldId id="324" r:id="rId22"/>
-    <p:sldId id="309" r:id="rId23"/>
-    <p:sldId id="310" r:id="rId24"/>
-    <p:sldId id="312" r:id="rId25"/>
-    <p:sldId id="317" r:id="rId26"/>
-    <p:sldId id="270" r:id="rId27"/>
-    <p:sldId id="290" r:id="rId28"/>
-    <p:sldId id="303" r:id="rId29"/>
-    <p:sldId id="283" r:id="rId30"/>
-    <p:sldId id="261" r:id="rId31"/>
+    <p:sldId id="330" r:id="rId22"/>
+    <p:sldId id="331" r:id="rId23"/>
+    <p:sldId id="332" r:id="rId24"/>
+    <p:sldId id="309" r:id="rId25"/>
+    <p:sldId id="310" r:id="rId26"/>
+    <p:sldId id="312" r:id="rId27"/>
+    <p:sldId id="317" r:id="rId28"/>
+    <p:sldId id="270" r:id="rId29"/>
+    <p:sldId id="290" r:id="rId30"/>
+    <p:sldId id="303" r:id="rId31"/>
+    <p:sldId id="283" r:id="rId32"/>
+    <p:sldId id="261" r:id="rId33"/>
   </p:sldIdLst>
   <p:sldSz cx="9720263" cy="6858000"/>
   <p:notesSz cx="6858000" cy="9144000"/>
@@ -1307,7 +1309,7 @@
           <a:p>
             <a:fld id="{55C1C2EC-08DE-4AE3-9D58-8409DB890493}" type="datetimeFigureOut">
               <a:rPr lang="ko-KR" altLang="en-US" smtClean="0"/>
-              <a:t>2019-02-10</a:t>
+              <a:t>2019-02-15</a:t>
             </a:fld>
             <a:endParaRPr lang="ko-KR" altLang="en-US"/>
           </a:p>
@@ -1473,7 +1475,7 @@
           <a:p>
             <a:fld id="{7B0C47E4-26E9-4C74-A846-469F09AE2EBB}" type="datetimeFigureOut">
               <a:rPr lang="ko-KR" altLang="en-US" smtClean="0"/>
-              <a:t>2019-02-10</a:t>
+              <a:t>2019-02-15</a:t>
             </a:fld>
             <a:endParaRPr lang="ko-KR" altLang="en-US"/>
           </a:p>
@@ -15856,10 +15858,10 @@
               <a:buChar char="Ø"/>
             </a:pPr>
             <a:r>
-              <a:rPr lang="ko-KR" altLang="en-US" b="1" dirty="0"/>
+              <a:rPr lang="ko-KR" altLang="en-US" dirty="0"/>
               <a:t>리그 관리를 위해 필요한 데이터 저장소  </a:t>
             </a:r>
-            <a:endParaRPr lang="en-US" altLang="ko-KR" b="1" dirty="0"/>
+            <a:endParaRPr lang="en-US" altLang="ko-KR" dirty="0"/>
           </a:p>
           <a:p>
             <a:pPr marL="285750" indent="-285750">
@@ -15885,10 +15887,10 @@
               <a:buChar char="Ø"/>
             </a:pPr>
             <a:r>
-              <a:rPr lang="ko-KR" altLang="en-US" b="1" dirty="0"/>
+              <a:rPr lang="ko-KR" altLang="en-US" dirty="0"/>
               <a:t>다루는 정보 작성</a:t>
             </a:r>
-            <a:endParaRPr lang="en-US" altLang="ko-KR" b="1" dirty="0"/>
+            <a:endParaRPr lang="en-US" altLang="ko-KR" dirty="0"/>
           </a:p>
           <a:p>
             <a:pPr marL="285750" indent="-285750">
@@ -15978,11 +15980,11 @@
               <a:buChar char="Ø"/>
             </a:pPr>
             <a:r>
-              <a:rPr lang="ko-KR" altLang="en-US" b="1" dirty="0"/>
+              <a:rPr lang="ko-KR" altLang="en-US" dirty="0"/>
               <a:t>팀</a:t>
             </a:r>
             <a:r>
-              <a:rPr lang="en-US" altLang="ko-KR" b="1" dirty="0"/>
+              <a:rPr lang="en-US" altLang="ko-KR" dirty="0"/>
               <a:t> </a:t>
             </a:r>
           </a:p>
@@ -15992,10 +15994,10 @@
               <a:buChar char="Ø"/>
             </a:pPr>
             <a:r>
-              <a:rPr lang="ko-KR" altLang="en-US" b="1" dirty="0"/>
+              <a:rPr lang="ko-KR" altLang="en-US" dirty="0"/>
               <a:t>팀 선수 매핑</a:t>
             </a:r>
-            <a:endParaRPr lang="en-US" altLang="ko-KR" b="1" dirty="0"/>
+            <a:endParaRPr lang="en-US" altLang="ko-KR" dirty="0"/>
           </a:p>
           <a:p>
             <a:pPr marL="742950" lvl="1" indent="-285750">
@@ -16003,10 +16005,10 @@
               <a:buChar char="Ø"/>
             </a:pPr>
             <a:r>
-              <a:rPr lang="ko-KR" altLang="en-US" b="1" dirty="0"/>
+              <a:rPr lang="ko-KR" altLang="en-US" dirty="0"/>
               <a:t>선수</a:t>
             </a:r>
-            <a:endParaRPr lang="en-US" altLang="ko-KR" b="1" dirty="0"/>
+            <a:endParaRPr lang="en-US" altLang="ko-KR" dirty="0"/>
           </a:p>
           <a:p>
             <a:pPr marL="742950" lvl="1" indent="-285750">
@@ -16014,10 +16016,10 @@
               <a:buChar char="Ø"/>
             </a:pPr>
             <a:r>
-              <a:rPr lang="ko-KR" altLang="en-US" b="1" dirty="0"/>
+              <a:rPr lang="ko-KR" altLang="en-US" dirty="0"/>
               <a:t>팀 리그 매핑</a:t>
             </a:r>
-            <a:endParaRPr lang="en-US" altLang="ko-KR" b="1" dirty="0"/>
+            <a:endParaRPr lang="en-US" altLang="ko-KR" dirty="0"/>
           </a:p>
           <a:p>
             <a:pPr marL="742950" lvl="1" indent="-285750">
@@ -16025,10 +16027,10 @@
               <a:buChar char="Ø"/>
             </a:pPr>
             <a:r>
-              <a:rPr lang="ko-KR" altLang="en-US" b="1" dirty="0"/>
+              <a:rPr lang="ko-KR" altLang="en-US" dirty="0"/>
               <a:t>리그</a:t>
             </a:r>
-            <a:endParaRPr lang="en-US" altLang="ko-KR" b="1" dirty="0"/>
+            <a:endParaRPr lang="en-US" altLang="ko-KR" dirty="0"/>
           </a:p>
           <a:p>
             <a:pPr marL="742950" lvl="1" indent="-285750">
@@ -16036,10 +16038,10 @@
               <a:buChar char="Ø"/>
             </a:pPr>
             <a:r>
-              <a:rPr lang="ko-KR" altLang="en-US" b="1" dirty="0"/>
+              <a:rPr lang="ko-KR" altLang="en-US" dirty="0"/>
               <a:t>팀별 경기결과</a:t>
             </a:r>
-            <a:endParaRPr lang="en-US" altLang="ko-KR" b="1" dirty="0"/>
+            <a:endParaRPr lang="en-US" altLang="ko-KR" dirty="0"/>
           </a:p>
           <a:p>
             <a:pPr marL="742950" lvl="1" indent="-285750">
@@ -16047,10 +16049,10 @@
               <a:buChar char="Ø"/>
             </a:pPr>
             <a:r>
-              <a:rPr lang="ko-KR" altLang="en-US" b="1" dirty="0"/>
+              <a:rPr lang="ko-KR" altLang="en-US" dirty="0"/>
               <a:t>경기일정</a:t>
             </a:r>
-            <a:endParaRPr lang="en-US" altLang="ko-KR" b="1" dirty="0"/>
+            <a:endParaRPr lang="en-US" altLang="ko-KR" dirty="0"/>
           </a:p>
           <a:p>
             <a:pPr marL="742950" lvl="1" indent="-285750">
@@ -16058,10 +16060,10 @@
               <a:buChar char="Ø"/>
             </a:pPr>
             <a:r>
-              <a:rPr lang="ko-KR" altLang="en-US" b="1" dirty="0"/>
+              <a:rPr lang="ko-KR" altLang="en-US" dirty="0"/>
               <a:t>구장</a:t>
             </a:r>
-            <a:endParaRPr lang="en-US" altLang="ko-KR" b="1" dirty="0"/>
+            <a:endParaRPr lang="en-US" altLang="ko-KR" dirty="0"/>
           </a:p>
           <a:p>
             <a:pPr marL="742950" lvl="1" indent="-285750">
@@ -16069,10 +16071,10 @@
               <a:buChar char="Ø"/>
             </a:pPr>
             <a:r>
-              <a:rPr lang="ko-KR" altLang="en-US" b="1" dirty="0"/>
+              <a:rPr lang="ko-KR" altLang="en-US" dirty="0"/>
               <a:t>구장사진</a:t>
             </a:r>
-            <a:endParaRPr lang="en-US" altLang="ko-KR" b="1" dirty="0"/>
+            <a:endParaRPr lang="en-US" altLang="ko-KR" dirty="0"/>
           </a:p>
           <a:p>
             <a:pPr marL="742950" lvl="1" indent="-285750">
@@ -16080,10 +16082,10 @@
               <a:buChar char="Ø"/>
             </a:pPr>
             <a:r>
-              <a:rPr lang="ko-KR" altLang="en-US" b="1" dirty="0"/>
+              <a:rPr lang="ko-KR" altLang="en-US" dirty="0"/>
               <a:t>개별 경기일정</a:t>
             </a:r>
-            <a:endParaRPr lang="en-US" altLang="ko-KR" b="1" dirty="0"/>
+            <a:endParaRPr lang="en-US" altLang="ko-KR" dirty="0"/>
           </a:p>
           <a:p>
             <a:pPr marL="742950" lvl="1" indent="-285750">
@@ -16091,10 +16093,10 @@
               <a:buChar char="Ø"/>
             </a:pPr>
             <a:r>
-              <a:rPr lang="ko-KR" altLang="en-US" b="1" dirty="0"/>
+              <a:rPr lang="ko-KR" altLang="en-US" dirty="0"/>
               <a:t>개별 경기일정 동영상</a:t>
             </a:r>
-            <a:endParaRPr lang="en-US" altLang="ko-KR" b="1" dirty="0"/>
+            <a:endParaRPr lang="en-US" altLang="ko-KR" dirty="0"/>
           </a:p>
           <a:p>
             <a:pPr marL="742950" lvl="1" indent="-285750">
@@ -16102,10 +16104,10 @@
               <a:buChar char="Ø"/>
             </a:pPr>
             <a:r>
-              <a:rPr lang="ko-KR" altLang="en-US" b="1" dirty="0"/>
+              <a:rPr lang="ko-KR" altLang="en-US" dirty="0"/>
               <a:t>개별 경기일정 동영상 히스토리</a:t>
             </a:r>
-            <a:endParaRPr lang="en-US" altLang="ko-KR" b="1" dirty="0"/>
+            <a:endParaRPr lang="en-US" altLang="ko-KR" dirty="0"/>
           </a:p>
           <a:p>
             <a:endParaRPr lang="ko-KR" altLang="en-US" dirty="0"/>
@@ -16145,10 +16147,10 @@
               <a:buChar char="Ø"/>
             </a:pPr>
             <a:r>
-              <a:rPr lang="ko-KR" altLang="en-US" b="1" dirty="0"/>
+              <a:rPr lang="ko-KR" altLang="en-US" dirty="0"/>
               <a:t>타자명단</a:t>
             </a:r>
-            <a:endParaRPr lang="en-US" altLang="ko-KR" b="1" dirty="0"/>
+            <a:endParaRPr lang="en-US" altLang="ko-KR" dirty="0"/>
           </a:p>
           <a:p>
             <a:pPr marL="742950" lvl="1" indent="-285750">
@@ -16156,10 +16158,10 @@
               <a:buChar char="Ø"/>
             </a:pPr>
             <a:r>
-              <a:rPr lang="ko-KR" altLang="en-US" b="1" dirty="0"/>
+              <a:rPr lang="ko-KR" altLang="en-US" dirty="0"/>
               <a:t>투수명단</a:t>
             </a:r>
-            <a:endParaRPr lang="en-US" altLang="ko-KR" b="1" dirty="0"/>
+            <a:endParaRPr lang="en-US" altLang="ko-KR" dirty="0"/>
           </a:p>
           <a:p>
             <a:pPr marL="742950" lvl="1" indent="-285750">
@@ -16167,10 +16169,10 @@
               <a:buChar char="Ø"/>
             </a:pPr>
             <a:r>
-              <a:rPr lang="ko-KR" altLang="en-US" b="1" dirty="0"/>
+              <a:rPr lang="ko-KR" altLang="en-US" dirty="0"/>
               <a:t>명단 매칭</a:t>
             </a:r>
-            <a:endParaRPr lang="en-US" altLang="ko-KR" b="1" dirty="0"/>
+            <a:endParaRPr lang="en-US" altLang="ko-KR" dirty="0"/>
           </a:p>
           <a:p>
             <a:pPr marL="742950" lvl="1" indent="-285750">
@@ -16178,10 +16180,10 @@
               <a:buChar char="Ø"/>
             </a:pPr>
             <a:r>
-              <a:rPr lang="ko-KR" altLang="en-US" b="1" dirty="0"/>
+              <a:rPr lang="ko-KR" altLang="en-US" dirty="0"/>
               <a:t>매칭 세부 기록</a:t>
             </a:r>
-            <a:endParaRPr lang="en-US" altLang="ko-KR" b="1" dirty="0"/>
+            <a:endParaRPr lang="en-US" altLang="ko-KR" dirty="0"/>
           </a:p>
           <a:p>
             <a:pPr marL="742950" lvl="1" indent="-285750">
@@ -16189,10 +16191,10 @@
               <a:buChar char="Ø"/>
             </a:pPr>
             <a:r>
-              <a:rPr lang="ko-KR" altLang="en-US" b="1" dirty="0"/>
+              <a:rPr lang="ko-KR" altLang="en-US" dirty="0"/>
               <a:t>타자 기록</a:t>
             </a:r>
-            <a:endParaRPr lang="en-US" altLang="ko-KR" b="1" dirty="0"/>
+            <a:endParaRPr lang="en-US" altLang="ko-KR" dirty="0"/>
           </a:p>
           <a:p>
             <a:pPr marL="742950" lvl="1" indent="-285750">
@@ -16200,10 +16202,10 @@
               <a:buChar char="Ø"/>
             </a:pPr>
             <a:r>
-              <a:rPr lang="ko-KR" altLang="en-US" b="1" dirty="0"/>
+              <a:rPr lang="ko-KR" altLang="en-US" dirty="0"/>
               <a:t>투수 기록</a:t>
             </a:r>
-            <a:endParaRPr lang="en-US" altLang="ko-KR" b="1" dirty="0"/>
+            <a:endParaRPr lang="en-US" altLang="ko-KR" dirty="0"/>
           </a:p>
           <a:p>
             <a:pPr marL="742950" lvl="1" indent="-285750">
@@ -16211,10 +16213,10 @@
               <a:buChar char="Ø"/>
             </a:pPr>
             <a:r>
-              <a:rPr lang="ko-KR" altLang="en-US" b="1" dirty="0"/>
+              <a:rPr lang="ko-KR" altLang="en-US" dirty="0"/>
               <a:t>팀 순위</a:t>
             </a:r>
-            <a:endParaRPr lang="en-US" altLang="ko-KR" b="1" dirty="0"/>
+            <a:endParaRPr lang="en-US" altLang="ko-KR" dirty="0"/>
           </a:p>
           <a:p>
             <a:pPr marL="742950" lvl="1" indent="-285750">
@@ -16222,10 +16224,10 @@
               <a:buChar char="Ø"/>
             </a:pPr>
             <a:r>
-              <a:rPr lang="ko-KR" altLang="en-US" b="1" dirty="0"/>
+              <a:rPr lang="ko-KR" altLang="en-US" dirty="0"/>
               <a:t>경기 기록</a:t>
             </a:r>
-            <a:endParaRPr lang="en-US" altLang="ko-KR" b="1" dirty="0"/>
+            <a:endParaRPr lang="en-US" altLang="ko-KR" dirty="0"/>
           </a:p>
           <a:p>
             <a:pPr marL="742950" lvl="1" indent="-285750">
@@ -16233,10 +16235,10 @@
               <a:buChar char="Ø"/>
             </a:pPr>
             <a:r>
-              <a:rPr lang="ko-KR" altLang="en-US" b="1" dirty="0"/>
+              <a:rPr lang="ko-KR" altLang="en-US" dirty="0"/>
               <a:t>동영상</a:t>
             </a:r>
-            <a:endParaRPr lang="en-US" altLang="ko-KR" b="1" dirty="0"/>
+            <a:endParaRPr lang="en-US" altLang="ko-KR" dirty="0"/>
           </a:p>
           <a:p>
             <a:pPr marL="742950" lvl="1" indent="-285750">
@@ -16244,10 +16246,10 @@
               <a:buChar char="Ø"/>
             </a:pPr>
             <a:r>
-              <a:rPr lang="ko-KR" altLang="en-US" b="1" dirty="0"/>
+              <a:rPr lang="ko-KR" altLang="en-US" dirty="0"/>
               <a:t>동영상 히스토리</a:t>
             </a:r>
-            <a:endParaRPr lang="en-US" altLang="ko-KR" b="1" dirty="0"/>
+            <a:endParaRPr lang="en-US" altLang="ko-KR" dirty="0"/>
           </a:p>
         </p:txBody>
       </p:sp>
@@ -16519,7 +16521,7 @@
         <p:spPr>
           <a:xfrm>
             <a:off x="284084" y="1410808"/>
-            <a:ext cx="3639845" cy="1200329"/>
+            <a:ext cx="4802821" cy="1200329"/>
           </a:xfrm>
           <a:prstGeom prst="rect">
             <a:avLst/>
@@ -16538,9 +16540,21 @@
             </a:pPr>
             <a:r>
               <a:rPr lang="ko-KR" altLang="en-US" b="1" dirty="0"/>
-              <a:t>데이터 구조</a:t>
+              <a:t>리그 관리 데이터베이스 </a:t>
             </a:r>
-            <a:endParaRPr lang="en-US" altLang="ko-KR" b="1" dirty="0"/>
+            <a:r>
+              <a:rPr lang="ko-KR" altLang="en-US" b="1" dirty="0">
+                <a:solidFill>
+                  <a:srgbClr val="FF0000"/>
+                </a:solidFill>
+              </a:rPr>
+              <a:t>전체 모듈 구조</a:t>
+            </a:r>
+            <a:endParaRPr lang="en-US" altLang="ko-KR" b="1" dirty="0">
+              <a:solidFill>
+                <a:srgbClr val="FF0000"/>
+              </a:solidFill>
+            </a:endParaRPr>
           </a:p>
           <a:p>
             <a:pPr marL="285750" indent="-285750">
@@ -16567,10 +16581,10 @@
       </p:sp>
       <p:pic>
         <p:nvPicPr>
-          <p:cNvPr id="5" name="그림 4">
+          <p:cNvPr id="16" name="그림 15">
             <a:extLst>
               <a:ext uri="{FF2B5EF4-FFF2-40B4-BE49-F238E27FC236}">
-                <a16:creationId xmlns:a16="http://schemas.microsoft.com/office/drawing/2014/main" id="{36DDC0FE-4B9B-44A0-8899-9792FDF67965}"/>
+                <a16:creationId xmlns:a16="http://schemas.microsoft.com/office/drawing/2014/main" id="{3980FAA0-4A6E-4C2A-B2E0-4D1C2F3875BD}"/>
               </a:ext>
             </a:extLst>
           </p:cNvPr>
@@ -16593,8 +16607,8 @@
         </p:blipFill>
         <p:spPr>
           <a:xfrm>
-            <a:off x="522958" y="1977681"/>
-            <a:ext cx="2000791" cy="1653286"/>
+            <a:off x="-1" y="1751983"/>
+            <a:ext cx="8673483" cy="5106018"/>
           </a:xfrm>
           <a:prstGeom prst="rect">
             <a:avLst/>
@@ -16604,7 +16618,7 @@
     </p:spTree>
     <p:extLst>
       <p:ext uri="{BB962C8B-B14F-4D97-AF65-F5344CB8AC3E}">
-        <p14:creationId xmlns:p14="http://schemas.microsoft.com/office/powerpoint/2010/main" val="4262247549"/>
+        <p14:creationId xmlns:p14="http://schemas.microsoft.com/office/powerpoint/2010/main" val="1953474453"/>
       </p:ext>
     </p:extLst>
   </p:cSld>
@@ -16926,6 +16940,1066 @@
 </file>
 
 <file path=ppt/slides/slide20.xml><?xml version="1.0" encoding="utf-8"?>
+<p:sld xmlns:a="http://schemas.openxmlformats.org/drawingml/2006/main" xmlns:r="http://schemas.openxmlformats.org/officeDocument/2006/relationships" xmlns:p="http://schemas.openxmlformats.org/presentationml/2006/main">
+  <p:cSld>
+    <p:spTree>
+      <p:nvGrpSpPr>
+        <p:cNvPr id="1" name=""/>
+        <p:cNvGrpSpPr/>
+        <p:nvPr/>
+      </p:nvGrpSpPr>
+      <p:grpSpPr>
+        <a:xfrm>
+          <a:off x="0" y="0"/>
+          <a:ext cx="0" cy="0"/>
+          <a:chOff x="0" y="0"/>
+          <a:chExt cx="0" cy="0"/>
+        </a:xfrm>
+      </p:grpSpPr>
+      <p:sp>
+        <p:nvSpPr>
+          <p:cNvPr id="71" name="Text Box 22"/>
+          <p:cNvSpPr txBox="1">
+            <a:spLocks noChangeArrowheads="1"/>
+          </p:cNvSpPr>
+          <p:nvPr/>
+        </p:nvSpPr>
+        <p:spPr bwMode="auto">
+          <a:xfrm>
+            <a:off x="141719" y="0"/>
+            <a:ext cx="5257800" cy="503238"/>
+          </a:xfrm>
+          <a:prstGeom prst="rect">
+            <a:avLst/>
+          </a:prstGeom>
+          <a:noFill/>
+          <a:ln>
+            <a:noFill/>
+          </a:ln>
+          <a:extLst>
+            <a:ext uri="{909E8E84-426E-40DD-AFC4-6F175D3DCCD1}">
+              <a14:hiddenFill xmlns:a14="http://schemas.microsoft.com/office/drawing/2010/main">
+                <a:solidFill>
+                  <a:srgbClr val="FFFFFF"/>
+                </a:solidFill>
+              </a14:hiddenFill>
+            </a:ext>
+            <a:ext uri="{91240B29-F687-4F45-9708-019B960494DF}">
+              <a14:hiddenLine xmlns:a14="http://schemas.microsoft.com/office/drawing/2010/main" w="9525">
+                <a:solidFill>
+                  <a:srgbClr val="000000"/>
+                </a:solidFill>
+                <a:miter lim="800000"/>
+                <a:headEnd/>
+                <a:tailEnd/>
+              </a14:hiddenLine>
+            </a:ext>
+          </a:extLst>
+        </p:spPr>
+        <p:txBody>
+          <a:bodyPr>
+            <a:spAutoFit/>
+          </a:bodyPr>
+          <a:lstStyle>
+            <a:defPPr>
+              <a:defRPr lang="ko-KR"/>
+            </a:defPPr>
+            <a:lvl1pPr marL="342900" marR="0" lvl="0" indent="-342900" fontAlgn="auto">
+              <a:lnSpc>
+                <a:spcPct val="100000"/>
+              </a:lnSpc>
+              <a:spcBef>
+                <a:spcPct val="50000"/>
+              </a:spcBef>
+              <a:spcAft>
+                <a:spcPts val="0"/>
+              </a:spcAft>
+              <a:buClrTx/>
+              <a:buSzTx/>
+              <a:buFontTx/>
+              <a:buNone/>
+              <a:tabLst/>
+              <a:defRPr sz="4000" b="1" baseline="-25000">
+                <a:solidFill>
+                  <a:schemeClr val="accent1">
+                    <a:lumMod val="50000"/>
+                  </a:schemeClr>
+                </a:solidFill>
+                <a:latin typeface="+mj-ea"/>
+                <a:ea typeface="+mj-ea"/>
+              </a:defRPr>
+            </a:lvl1pPr>
+            <a:lvl2pPr marL="742950" indent="-285750" eaLnBrk="0" hangingPunct="0">
+              <a:defRPr b="1">
+                <a:latin typeface="Arial" panose="020B0604020202020204" pitchFamily="34" charset="0"/>
+                <a:ea typeface="SimSun" panose="02010600030101010101" pitchFamily="2" charset="-122"/>
+              </a:defRPr>
+            </a:lvl2pPr>
+            <a:lvl3pPr marL="1143000" indent="-228600" eaLnBrk="0" hangingPunct="0">
+              <a:defRPr b="1">
+                <a:latin typeface="Arial" panose="020B0604020202020204" pitchFamily="34" charset="0"/>
+                <a:ea typeface="SimSun" panose="02010600030101010101" pitchFamily="2" charset="-122"/>
+              </a:defRPr>
+            </a:lvl3pPr>
+            <a:lvl4pPr marL="1600200" indent="-228600" eaLnBrk="0" hangingPunct="0">
+              <a:defRPr b="1">
+                <a:latin typeface="Arial" panose="020B0604020202020204" pitchFamily="34" charset="0"/>
+                <a:ea typeface="SimSun" panose="02010600030101010101" pitchFamily="2" charset="-122"/>
+              </a:defRPr>
+            </a:lvl4pPr>
+            <a:lvl5pPr marL="2057400" indent="-228600" eaLnBrk="0" hangingPunct="0">
+              <a:defRPr b="1">
+                <a:latin typeface="Arial" panose="020B0604020202020204" pitchFamily="34" charset="0"/>
+                <a:ea typeface="SimSun" panose="02010600030101010101" pitchFamily="2" charset="-122"/>
+              </a:defRPr>
+            </a:lvl5pPr>
+            <a:lvl6pPr marL="2514600" indent="-228600" algn="ctr" eaLnBrk="0" fontAlgn="base" hangingPunct="0">
+              <a:spcBef>
+                <a:spcPct val="0"/>
+              </a:spcBef>
+              <a:spcAft>
+                <a:spcPct val="0"/>
+              </a:spcAft>
+              <a:defRPr b="1">
+                <a:latin typeface="Arial" panose="020B0604020202020204" pitchFamily="34" charset="0"/>
+                <a:ea typeface="SimSun" panose="02010600030101010101" pitchFamily="2" charset="-122"/>
+              </a:defRPr>
+            </a:lvl6pPr>
+            <a:lvl7pPr marL="2971800" indent="-228600" algn="ctr" eaLnBrk="0" fontAlgn="base" hangingPunct="0">
+              <a:spcBef>
+                <a:spcPct val="0"/>
+              </a:spcBef>
+              <a:spcAft>
+                <a:spcPct val="0"/>
+              </a:spcAft>
+              <a:defRPr b="1">
+                <a:latin typeface="Arial" panose="020B0604020202020204" pitchFamily="34" charset="0"/>
+                <a:ea typeface="SimSun" panose="02010600030101010101" pitchFamily="2" charset="-122"/>
+              </a:defRPr>
+            </a:lvl7pPr>
+            <a:lvl8pPr marL="3429000" indent="-228600" algn="ctr" eaLnBrk="0" fontAlgn="base" hangingPunct="0">
+              <a:spcBef>
+                <a:spcPct val="0"/>
+              </a:spcBef>
+              <a:spcAft>
+                <a:spcPct val="0"/>
+              </a:spcAft>
+              <a:defRPr b="1">
+                <a:latin typeface="Arial" panose="020B0604020202020204" pitchFamily="34" charset="0"/>
+                <a:ea typeface="SimSun" panose="02010600030101010101" pitchFamily="2" charset="-122"/>
+              </a:defRPr>
+            </a:lvl8pPr>
+            <a:lvl9pPr marL="3886200" indent="-228600" algn="ctr" eaLnBrk="0" fontAlgn="base" hangingPunct="0">
+              <a:spcBef>
+                <a:spcPct val="0"/>
+              </a:spcBef>
+              <a:spcAft>
+                <a:spcPct val="0"/>
+              </a:spcAft>
+              <a:defRPr b="1">
+                <a:latin typeface="Arial" panose="020B0604020202020204" pitchFamily="34" charset="0"/>
+                <a:ea typeface="SimSun" panose="02010600030101010101" pitchFamily="2" charset="-122"/>
+              </a:defRPr>
+            </a:lvl9pPr>
+          </a:lstStyle>
+          <a:p>
+            <a:r>
+              <a:rPr lang="en-US" dirty="0"/>
+              <a:t>5. </a:t>
+            </a:r>
+            <a:r>
+              <a:rPr lang="ko-KR" altLang="en-US" dirty="0"/>
+              <a:t>시스템 모듈 상세 설계</a:t>
+            </a:r>
+            <a:endParaRPr lang="en-US" dirty="0"/>
+          </a:p>
+        </p:txBody>
+      </p:sp>
+      <p:sp>
+        <p:nvSpPr>
+          <p:cNvPr id="2" name="슬라이드 번호 개체 틀 1">
+            <a:extLst>
+              <a:ext uri="{FF2B5EF4-FFF2-40B4-BE49-F238E27FC236}">
+                <a16:creationId xmlns:a16="http://schemas.microsoft.com/office/drawing/2014/main" id="{7A881AB0-6BA1-4F62-B570-84FF1DDEB869}"/>
+              </a:ext>
+            </a:extLst>
+          </p:cNvPr>
+          <p:cNvSpPr>
+            <a:spLocks noGrp="1"/>
+          </p:cNvSpPr>
+          <p:nvPr>
+            <p:ph type="sldNum" sz="quarter" idx="12"/>
+          </p:nvPr>
+        </p:nvSpPr>
+        <p:spPr/>
+        <p:txBody>
+          <a:bodyPr/>
+          <a:lstStyle/>
+          <a:p>
+            <a:fld id="{EB942B9F-D695-4224-97C8-E7A171F5AE33}" type="slidenum">
+              <a:rPr lang="ko-KR" altLang="en-US" smtClean="0"/>
+              <a:t>20</a:t>
+            </a:fld>
+            <a:endParaRPr lang="ko-KR" altLang="en-US"/>
+          </a:p>
+        </p:txBody>
+      </p:sp>
+      <p:sp>
+        <p:nvSpPr>
+          <p:cNvPr id="3" name="TextBox 2">
+            <a:extLst>
+              <a:ext uri="{FF2B5EF4-FFF2-40B4-BE49-F238E27FC236}">
+                <a16:creationId xmlns:a16="http://schemas.microsoft.com/office/drawing/2014/main" id="{3B13009C-4E35-4871-8905-71DCD827884B}"/>
+              </a:ext>
+            </a:extLst>
+          </p:cNvPr>
+          <p:cNvSpPr txBox="1"/>
+          <p:nvPr/>
+        </p:nvSpPr>
+        <p:spPr>
+          <a:xfrm>
+            <a:off x="284085" y="772357"/>
+            <a:ext cx="3639845" cy="400110"/>
+          </a:xfrm>
+          <a:prstGeom prst="rect">
+            <a:avLst/>
+          </a:prstGeom>
+          <a:noFill/>
+        </p:spPr>
+        <p:txBody>
+          <a:bodyPr wrap="square" rtlCol="0">
+            <a:spAutoFit/>
+          </a:bodyPr>
+          <a:lstStyle/>
+          <a:p>
+            <a:r>
+              <a:rPr lang="ko-KR" altLang="en-US" sz="2000" b="1" dirty="0"/>
+              <a:t>리그 정보 데이터베이스 모듈</a:t>
+            </a:r>
+          </a:p>
+        </p:txBody>
+      </p:sp>
+      <p:sp>
+        <p:nvSpPr>
+          <p:cNvPr id="7" name="TextBox 6">
+            <a:extLst>
+              <a:ext uri="{FF2B5EF4-FFF2-40B4-BE49-F238E27FC236}">
+                <a16:creationId xmlns:a16="http://schemas.microsoft.com/office/drawing/2014/main" id="{90D9130C-5F1A-490B-A8CC-2BBC6C73307C}"/>
+              </a:ext>
+            </a:extLst>
+          </p:cNvPr>
+          <p:cNvSpPr txBox="1"/>
+          <p:nvPr/>
+        </p:nvSpPr>
+        <p:spPr>
+          <a:xfrm>
+            <a:off x="284084" y="1410808"/>
+            <a:ext cx="3639845" cy="1200329"/>
+          </a:xfrm>
+          <a:prstGeom prst="rect">
+            <a:avLst/>
+          </a:prstGeom>
+          <a:noFill/>
+        </p:spPr>
+        <p:txBody>
+          <a:bodyPr wrap="square" rtlCol="0">
+            <a:spAutoFit/>
+          </a:bodyPr>
+          <a:lstStyle/>
+          <a:p>
+            <a:pPr marL="285750" indent="-285750">
+              <a:buFont typeface="Wingdings" panose="05000000000000000000" pitchFamily="2" charset="2"/>
+              <a:buChar char="v"/>
+            </a:pPr>
+            <a:r>
+              <a:rPr lang="ko-KR" altLang="en-US" b="1" dirty="0"/>
+              <a:t>리그 관리 데이터베이스 구조</a:t>
+            </a:r>
+            <a:endParaRPr lang="en-US" altLang="ko-KR" b="1" dirty="0"/>
+          </a:p>
+          <a:p>
+            <a:pPr marL="285750" indent="-285750">
+              <a:buFont typeface="Arial" panose="020B0604020202020204" pitchFamily="34" charset="0"/>
+              <a:buChar char="•"/>
+            </a:pPr>
+            <a:endParaRPr lang="en-US" altLang="ko-KR" b="1" dirty="0"/>
+          </a:p>
+          <a:p>
+            <a:pPr marL="285750" indent="-285750">
+              <a:buFont typeface="Arial" panose="020B0604020202020204" pitchFamily="34" charset="0"/>
+              <a:buChar char="•"/>
+            </a:pPr>
+            <a:endParaRPr lang="en-US" altLang="ko-KR" b="1" dirty="0"/>
+          </a:p>
+          <a:p>
+            <a:pPr marL="285750" indent="-285750">
+              <a:buFont typeface="Arial" panose="020B0604020202020204" pitchFamily="34" charset="0"/>
+              <a:buChar char="•"/>
+            </a:pPr>
+            <a:endParaRPr lang="ko-KR" altLang="en-US" b="1" dirty="0"/>
+          </a:p>
+        </p:txBody>
+      </p:sp>
+      <p:pic>
+        <p:nvPicPr>
+          <p:cNvPr id="5" name="그림 4">
+            <a:extLst>
+              <a:ext uri="{FF2B5EF4-FFF2-40B4-BE49-F238E27FC236}">
+                <a16:creationId xmlns:a16="http://schemas.microsoft.com/office/drawing/2014/main" id="{36DDC0FE-4B9B-44A0-8899-9792FDF67965}"/>
+              </a:ext>
+            </a:extLst>
+          </p:cNvPr>
+          <p:cNvPicPr>
+            <a:picLocks noChangeAspect="1"/>
+          </p:cNvPicPr>
+          <p:nvPr/>
+        </p:nvPicPr>
+        <p:blipFill>
+          <a:blip r:embed="rId2">
+            <a:extLst>
+              <a:ext uri="{28A0092B-C50C-407E-A947-70E740481C1C}">
+                <a14:useLocalDpi xmlns:a14="http://schemas.microsoft.com/office/drawing/2010/main" val="0"/>
+              </a:ext>
+            </a:extLst>
+          </a:blip>
+          <a:stretch>
+            <a:fillRect/>
+          </a:stretch>
+        </p:blipFill>
+        <p:spPr>
+          <a:xfrm>
+            <a:off x="141719" y="1784494"/>
+            <a:ext cx="2000791" cy="1653286"/>
+          </a:xfrm>
+          <a:prstGeom prst="rect">
+            <a:avLst/>
+          </a:prstGeom>
+        </p:spPr>
+      </p:pic>
+      <p:pic>
+        <p:nvPicPr>
+          <p:cNvPr id="6" name="그림 5">
+            <a:extLst>
+              <a:ext uri="{FF2B5EF4-FFF2-40B4-BE49-F238E27FC236}">
+                <a16:creationId xmlns:a16="http://schemas.microsoft.com/office/drawing/2014/main" id="{90A49A59-FD0B-4871-9E36-6B2B05B073FE}"/>
+              </a:ext>
+            </a:extLst>
+          </p:cNvPr>
+          <p:cNvPicPr>
+            <a:picLocks noChangeAspect="1"/>
+          </p:cNvPicPr>
+          <p:nvPr/>
+        </p:nvPicPr>
+        <p:blipFill>
+          <a:blip r:embed="rId3">
+            <a:extLst>
+              <a:ext uri="{28A0092B-C50C-407E-A947-70E740481C1C}">
+                <a14:useLocalDpi xmlns:a14="http://schemas.microsoft.com/office/drawing/2010/main" val="0"/>
+              </a:ext>
+            </a:extLst>
+          </a:blip>
+          <a:stretch>
+            <a:fillRect/>
+          </a:stretch>
+        </p:blipFill>
+        <p:spPr>
+          <a:xfrm>
+            <a:off x="2313067" y="1784494"/>
+            <a:ext cx="2421310" cy="1127382"/>
+          </a:xfrm>
+          <a:prstGeom prst="rect">
+            <a:avLst/>
+          </a:prstGeom>
+        </p:spPr>
+      </p:pic>
+      <p:pic>
+        <p:nvPicPr>
+          <p:cNvPr id="9" name="그림 8">
+            <a:extLst>
+              <a:ext uri="{FF2B5EF4-FFF2-40B4-BE49-F238E27FC236}">
+                <a16:creationId xmlns:a16="http://schemas.microsoft.com/office/drawing/2014/main" id="{678D25CE-0C1E-47CE-8625-04648AAFD8F8}"/>
+              </a:ext>
+            </a:extLst>
+          </p:cNvPr>
+          <p:cNvPicPr>
+            <a:picLocks noChangeAspect="1"/>
+          </p:cNvPicPr>
+          <p:nvPr/>
+        </p:nvPicPr>
+        <p:blipFill>
+          <a:blip r:embed="rId4">
+            <a:extLst>
+              <a:ext uri="{28A0092B-C50C-407E-A947-70E740481C1C}">
+                <a14:useLocalDpi xmlns:a14="http://schemas.microsoft.com/office/drawing/2010/main" val="0"/>
+              </a:ext>
+            </a:extLst>
+          </a:blip>
+          <a:stretch>
+            <a:fillRect/>
+          </a:stretch>
+        </p:blipFill>
+        <p:spPr>
+          <a:xfrm>
+            <a:off x="159049" y="3551949"/>
+            <a:ext cx="1966130" cy="2804403"/>
+          </a:xfrm>
+          <a:prstGeom prst="rect">
+            <a:avLst/>
+          </a:prstGeom>
+        </p:spPr>
+      </p:pic>
+      <p:pic>
+        <p:nvPicPr>
+          <p:cNvPr id="11" name="그림 10">
+            <a:extLst>
+              <a:ext uri="{FF2B5EF4-FFF2-40B4-BE49-F238E27FC236}">
+                <a16:creationId xmlns:a16="http://schemas.microsoft.com/office/drawing/2014/main" id="{DECC9577-36A6-4DFF-B7F9-333F31837B6C}"/>
+              </a:ext>
+            </a:extLst>
+          </p:cNvPr>
+          <p:cNvPicPr>
+            <a:picLocks noChangeAspect="1"/>
+          </p:cNvPicPr>
+          <p:nvPr/>
+        </p:nvPicPr>
+        <p:blipFill>
+          <a:blip r:embed="rId5">
+            <a:extLst>
+              <a:ext uri="{28A0092B-C50C-407E-A947-70E740481C1C}">
+                <a14:useLocalDpi xmlns:a14="http://schemas.microsoft.com/office/drawing/2010/main" val="0"/>
+              </a:ext>
+            </a:extLst>
+          </a:blip>
+          <a:stretch>
+            <a:fillRect/>
+          </a:stretch>
+        </p:blipFill>
+        <p:spPr>
+          <a:xfrm>
+            <a:off x="2239703" y="3551949"/>
+            <a:ext cx="1738335" cy="2050659"/>
+          </a:xfrm>
+          <a:prstGeom prst="rect">
+            <a:avLst/>
+          </a:prstGeom>
+        </p:spPr>
+      </p:pic>
+      <p:pic>
+        <p:nvPicPr>
+          <p:cNvPr id="13" name="그림 12">
+            <a:extLst>
+              <a:ext uri="{FF2B5EF4-FFF2-40B4-BE49-F238E27FC236}">
+                <a16:creationId xmlns:a16="http://schemas.microsoft.com/office/drawing/2014/main" id="{71CE7D66-48F7-458B-87F4-CF9C2EA33F61}"/>
+              </a:ext>
+            </a:extLst>
+          </p:cNvPr>
+          <p:cNvPicPr>
+            <a:picLocks noChangeAspect="1"/>
+          </p:cNvPicPr>
+          <p:nvPr/>
+        </p:nvPicPr>
+        <p:blipFill>
+          <a:blip r:embed="rId6">
+            <a:extLst>
+              <a:ext uri="{28A0092B-C50C-407E-A947-70E740481C1C}">
+                <a14:useLocalDpi xmlns:a14="http://schemas.microsoft.com/office/drawing/2010/main" val="0"/>
+              </a:ext>
+            </a:extLst>
+          </a:blip>
+          <a:stretch>
+            <a:fillRect/>
+          </a:stretch>
+        </p:blipFill>
+        <p:spPr>
+          <a:xfrm>
+            <a:off x="2239703" y="5672421"/>
+            <a:ext cx="2462486" cy="1140520"/>
+          </a:xfrm>
+          <a:prstGeom prst="rect">
+            <a:avLst/>
+          </a:prstGeom>
+        </p:spPr>
+      </p:pic>
+      <p:pic>
+        <p:nvPicPr>
+          <p:cNvPr id="23" name="그림 22">
+            <a:extLst>
+              <a:ext uri="{FF2B5EF4-FFF2-40B4-BE49-F238E27FC236}">
+                <a16:creationId xmlns:a16="http://schemas.microsoft.com/office/drawing/2014/main" id="{9C9813FA-E26E-46F8-81F3-C3A2F80D855B}"/>
+              </a:ext>
+            </a:extLst>
+          </p:cNvPr>
+          <p:cNvPicPr>
+            <a:picLocks noChangeAspect="1"/>
+          </p:cNvPicPr>
+          <p:nvPr/>
+        </p:nvPicPr>
+        <p:blipFill>
+          <a:blip r:embed="rId7">
+            <a:extLst>
+              <a:ext uri="{28A0092B-C50C-407E-A947-70E740481C1C}">
+                <a14:useLocalDpi xmlns:a14="http://schemas.microsoft.com/office/drawing/2010/main" val="0"/>
+              </a:ext>
+            </a:extLst>
+          </a:blip>
+          <a:stretch>
+            <a:fillRect/>
+          </a:stretch>
+        </p:blipFill>
+        <p:spPr>
+          <a:xfrm>
+            <a:off x="5130115" y="1784494"/>
+            <a:ext cx="2187059" cy="1097818"/>
+          </a:xfrm>
+          <a:prstGeom prst="rect">
+            <a:avLst/>
+          </a:prstGeom>
+        </p:spPr>
+      </p:pic>
+      <p:pic>
+        <p:nvPicPr>
+          <p:cNvPr id="25" name="그림 24">
+            <a:extLst>
+              <a:ext uri="{FF2B5EF4-FFF2-40B4-BE49-F238E27FC236}">
+                <a16:creationId xmlns:a16="http://schemas.microsoft.com/office/drawing/2014/main" id="{63B899A9-3E1E-41FE-AEF4-BB2358B7F98F}"/>
+              </a:ext>
+            </a:extLst>
+          </p:cNvPr>
+          <p:cNvPicPr>
+            <a:picLocks noChangeAspect="1"/>
+          </p:cNvPicPr>
+          <p:nvPr/>
+        </p:nvPicPr>
+        <p:blipFill>
+          <a:blip r:embed="rId8">
+            <a:extLst>
+              <a:ext uri="{28A0092B-C50C-407E-A947-70E740481C1C}">
+                <a14:useLocalDpi xmlns:a14="http://schemas.microsoft.com/office/drawing/2010/main" val="0"/>
+              </a:ext>
+            </a:extLst>
+          </a:blip>
+          <a:stretch>
+            <a:fillRect/>
+          </a:stretch>
+        </p:blipFill>
+        <p:spPr>
+          <a:xfrm>
+            <a:off x="7407196" y="1784495"/>
+            <a:ext cx="2171348" cy="1127381"/>
+          </a:xfrm>
+          <a:prstGeom prst="rect">
+            <a:avLst/>
+          </a:prstGeom>
+        </p:spPr>
+      </p:pic>
+      <p:pic>
+        <p:nvPicPr>
+          <p:cNvPr id="27" name="그림 26">
+            <a:extLst>
+              <a:ext uri="{FF2B5EF4-FFF2-40B4-BE49-F238E27FC236}">
+                <a16:creationId xmlns:a16="http://schemas.microsoft.com/office/drawing/2014/main" id="{766FC2A9-B16E-4A52-827C-C160000F1C8E}"/>
+              </a:ext>
+            </a:extLst>
+          </p:cNvPr>
+          <p:cNvPicPr>
+            <a:picLocks noChangeAspect="1"/>
+          </p:cNvPicPr>
+          <p:nvPr/>
+        </p:nvPicPr>
+        <p:blipFill>
+          <a:blip r:embed="rId9">
+            <a:extLst>
+              <a:ext uri="{28A0092B-C50C-407E-A947-70E740481C1C}">
+                <a14:useLocalDpi xmlns:a14="http://schemas.microsoft.com/office/drawing/2010/main" val="0"/>
+              </a:ext>
+            </a:extLst>
+          </a:blip>
+          <a:stretch>
+            <a:fillRect/>
+          </a:stretch>
+        </p:blipFill>
+        <p:spPr>
+          <a:xfrm>
+            <a:off x="6067179" y="3017852"/>
+            <a:ext cx="2149026" cy="3795089"/>
+          </a:xfrm>
+          <a:prstGeom prst="rect">
+            <a:avLst/>
+          </a:prstGeom>
+        </p:spPr>
+      </p:pic>
+    </p:spTree>
+    <p:extLst>
+      <p:ext uri="{BB962C8B-B14F-4D97-AF65-F5344CB8AC3E}">
+        <p14:creationId xmlns:p14="http://schemas.microsoft.com/office/powerpoint/2010/main" val="4262247549"/>
+      </p:ext>
+    </p:extLst>
+  </p:cSld>
+  <p:clrMapOvr>
+    <a:masterClrMapping/>
+  </p:clrMapOvr>
+</p:sld>
+</file>
+
+<file path=ppt/slides/slide21.xml><?xml version="1.0" encoding="utf-8"?>
+<p:sld xmlns:a="http://schemas.openxmlformats.org/drawingml/2006/main" xmlns:r="http://schemas.openxmlformats.org/officeDocument/2006/relationships" xmlns:p="http://schemas.openxmlformats.org/presentationml/2006/main">
+  <p:cSld>
+    <p:spTree>
+      <p:nvGrpSpPr>
+        <p:cNvPr id="1" name=""/>
+        <p:cNvGrpSpPr/>
+        <p:nvPr/>
+      </p:nvGrpSpPr>
+      <p:grpSpPr>
+        <a:xfrm>
+          <a:off x="0" y="0"/>
+          <a:ext cx="0" cy="0"/>
+          <a:chOff x="0" y="0"/>
+          <a:chExt cx="0" cy="0"/>
+        </a:xfrm>
+      </p:grpSpPr>
+      <p:sp>
+        <p:nvSpPr>
+          <p:cNvPr id="71" name="Text Box 22"/>
+          <p:cNvSpPr txBox="1">
+            <a:spLocks noChangeArrowheads="1"/>
+          </p:cNvSpPr>
+          <p:nvPr/>
+        </p:nvSpPr>
+        <p:spPr bwMode="auto">
+          <a:xfrm>
+            <a:off x="141719" y="0"/>
+            <a:ext cx="5257800" cy="503238"/>
+          </a:xfrm>
+          <a:prstGeom prst="rect">
+            <a:avLst/>
+          </a:prstGeom>
+          <a:noFill/>
+          <a:ln>
+            <a:noFill/>
+          </a:ln>
+          <a:extLst>
+            <a:ext uri="{909E8E84-426E-40DD-AFC4-6F175D3DCCD1}">
+              <a14:hiddenFill xmlns:a14="http://schemas.microsoft.com/office/drawing/2010/main">
+                <a:solidFill>
+                  <a:srgbClr val="FFFFFF"/>
+                </a:solidFill>
+              </a14:hiddenFill>
+            </a:ext>
+            <a:ext uri="{91240B29-F687-4F45-9708-019B960494DF}">
+              <a14:hiddenLine xmlns:a14="http://schemas.microsoft.com/office/drawing/2010/main" w="9525">
+                <a:solidFill>
+                  <a:srgbClr val="000000"/>
+                </a:solidFill>
+                <a:miter lim="800000"/>
+                <a:headEnd/>
+                <a:tailEnd/>
+              </a14:hiddenLine>
+            </a:ext>
+          </a:extLst>
+        </p:spPr>
+        <p:txBody>
+          <a:bodyPr>
+            <a:spAutoFit/>
+          </a:bodyPr>
+          <a:lstStyle>
+            <a:defPPr>
+              <a:defRPr lang="ko-KR"/>
+            </a:defPPr>
+            <a:lvl1pPr marL="342900" marR="0" lvl="0" indent="-342900" fontAlgn="auto">
+              <a:lnSpc>
+                <a:spcPct val="100000"/>
+              </a:lnSpc>
+              <a:spcBef>
+                <a:spcPct val="50000"/>
+              </a:spcBef>
+              <a:spcAft>
+                <a:spcPts val="0"/>
+              </a:spcAft>
+              <a:buClrTx/>
+              <a:buSzTx/>
+              <a:buFontTx/>
+              <a:buNone/>
+              <a:tabLst/>
+              <a:defRPr sz="4000" b="1" baseline="-25000">
+                <a:solidFill>
+                  <a:schemeClr val="accent1">
+                    <a:lumMod val="50000"/>
+                  </a:schemeClr>
+                </a:solidFill>
+                <a:latin typeface="+mj-ea"/>
+                <a:ea typeface="+mj-ea"/>
+              </a:defRPr>
+            </a:lvl1pPr>
+            <a:lvl2pPr marL="742950" indent="-285750" eaLnBrk="0" hangingPunct="0">
+              <a:defRPr b="1">
+                <a:latin typeface="Arial" panose="020B0604020202020204" pitchFamily="34" charset="0"/>
+                <a:ea typeface="SimSun" panose="02010600030101010101" pitchFamily="2" charset="-122"/>
+              </a:defRPr>
+            </a:lvl2pPr>
+            <a:lvl3pPr marL="1143000" indent="-228600" eaLnBrk="0" hangingPunct="0">
+              <a:defRPr b="1">
+                <a:latin typeface="Arial" panose="020B0604020202020204" pitchFamily="34" charset="0"/>
+                <a:ea typeface="SimSun" panose="02010600030101010101" pitchFamily="2" charset="-122"/>
+              </a:defRPr>
+            </a:lvl3pPr>
+            <a:lvl4pPr marL="1600200" indent="-228600" eaLnBrk="0" hangingPunct="0">
+              <a:defRPr b="1">
+                <a:latin typeface="Arial" panose="020B0604020202020204" pitchFamily="34" charset="0"/>
+                <a:ea typeface="SimSun" panose="02010600030101010101" pitchFamily="2" charset="-122"/>
+              </a:defRPr>
+            </a:lvl4pPr>
+            <a:lvl5pPr marL="2057400" indent="-228600" eaLnBrk="0" hangingPunct="0">
+              <a:defRPr b="1">
+                <a:latin typeface="Arial" panose="020B0604020202020204" pitchFamily="34" charset="0"/>
+                <a:ea typeface="SimSun" panose="02010600030101010101" pitchFamily="2" charset="-122"/>
+              </a:defRPr>
+            </a:lvl5pPr>
+            <a:lvl6pPr marL="2514600" indent="-228600" algn="ctr" eaLnBrk="0" fontAlgn="base" hangingPunct="0">
+              <a:spcBef>
+                <a:spcPct val="0"/>
+              </a:spcBef>
+              <a:spcAft>
+                <a:spcPct val="0"/>
+              </a:spcAft>
+              <a:defRPr b="1">
+                <a:latin typeface="Arial" panose="020B0604020202020204" pitchFamily="34" charset="0"/>
+                <a:ea typeface="SimSun" panose="02010600030101010101" pitchFamily="2" charset="-122"/>
+              </a:defRPr>
+            </a:lvl6pPr>
+            <a:lvl7pPr marL="2971800" indent="-228600" algn="ctr" eaLnBrk="0" fontAlgn="base" hangingPunct="0">
+              <a:spcBef>
+                <a:spcPct val="0"/>
+              </a:spcBef>
+              <a:spcAft>
+                <a:spcPct val="0"/>
+              </a:spcAft>
+              <a:defRPr b="1">
+                <a:latin typeface="Arial" panose="020B0604020202020204" pitchFamily="34" charset="0"/>
+                <a:ea typeface="SimSun" panose="02010600030101010101" pitchFamily="2" charset="-122"/>
+              </a:defRPr>
+            </a:lvl7pPr>
+            <a:lvl8pPr marL="3429000" indent="-228600" algn="ctr" eaLnBrk="0" fontAlgn="base" hangingPunct="0">
+              <a:spcBef>
+                <a:spcPct val="0"/>
+              </a:spcBef>
+              <a:spcAft>
+                <a:spcPct val="0"/>
+              </a:spcAft>
+              <a:defRPr b="1">
+                <a:latin typeface="Arial" panose="020B0604020202020204" pitchFamily="34" charset="0"/>
+                <a:ea typeface="SimSun" panose="02010600030101010101" pitchFamily="2" charset="-122"/>
+              </a:defRPr>
+            </a:lvl8pPr>
+            <a:lvl9pPr marL="3886200" indent="-228600" algn="ctr" eaLnBrk="0" fontAlgn="base" hangingPunct="0">
+              <a:spcBef>
+                <a:spcPct val="0"/>
+              </a:spcBef>
+              <a:spcAft>
+                <a:spcPct val="0"/>
+              </a:spcAft>
+              <a:defRPr b="1">
+                <a:latin typeface="Arial" panose="020B0604020202020204" pitchFamily="34" charset="0"/>
+                <a:ea typeface="SimSun" panose="02010600030101010101" pitchFamily="2" charset="-122"/>
+              </a:defRPr>
+            </a:lvl9pPr>
+          </a:lstStyle>
+          <a:p>
+            <a:r>
+              <a:rPr lang="en-US" dirty="0"/>
+              <a:t>5. </a:t>
+            </a:r>
+            <a:r>
+              <a:rPr lang="ko-KR" altLang="en-US" dirty="0"/>
+              <a:t>시스템 모듈 상세 설계</a:t>
+            </a:r>
+            <a:endParaRPr lang="en-US" dirty="0"/>
+          </a:p>
+        </p:txBody>
+      </p:sp>
+      <p:sp>
+        <p:nvSpPr>
+          <p:cNvPr id="2" name="슬라이드 번호 개체 틀 1">
+            <a:extLst>
+              <a:ext uri="{FF2B5EF4-FFF2-40B4-BE49-F238E27FC236}">
+                <a16:creationId xmlns:a16="http://schemas.microsoft.com/office/drawing/2014/main" id="{7A881AB0-6BA1-4F62-B570-84FF1DDEB869}"/>
+              </a:ext>
+            </a:extLst>
+          </p:cNvPr>
+          <p:cNvSpPr>
+            <a:spLocks noGrp="1"/>
+          </p:cNvSpPr>
+          <p:nvPr>
+            <p:ph type="sldNum" sz="quarter" idx="12"/>
+          </p:nvPr>
+        </p:nvSpPr>
+        <p:spPr/>
+        <p:txBody>
+          <a:bodyPr/>
+          <a:lstStyle/>
+          <a:p>
+            <a:fld id="{EB942B9F-D695-4224-97C8-E7A171F5AE33}" type="slidenum">
+              <a:rPr lang="ko-KR" altLang="en-US" smtClean="0"/>
+              <a:t>21</a:t>
+            </a:fld>
+            <a:endParaRPr lang="ko-KR" altLang="en-US"/>
+          </a:p>
+        </p:txBody>
+      </p:sp>
+      <p:sp>
+        <p:nvSpPr>
+          <p:cNvPr id="3" name="TextBox 2">
+            <a:extLst>
+              <a:ext uri="{FF2B5EF4-FFF2-40B4-BE49-F238E27FC236}">
+                <a16:creationId xmlns:a16="http://schemas.microsoft.com/office/drawing/2014/main" id="{3B13009C-4E35-4871-8905-71DCD827884B}"/>
+              </a:ext>
+            </a:extLst>
+          </p:cNvPr>
+          <p:cNvSpPr txBox="1"/>
+          <p:nvPr/>
+        </p:nvSpPr>
+        <p:spPr>
+          <a:xfrm>
+            <a:off x="284085" y="772357"/>
+            <a:ext cx="3639845" cy="400110"/>
+          </a:xfrm>
+          <a:prstGeom prst="rect">
+            <a:avLst/>
+          </a:prstGeom>
+          <a:noFill/>
+        </p:spPr>
+        <p:txBody>
+          <a:bodyPr wrap="square" rtlCol="0">
+            <a:spAutoFit/>
+          </a:bodyPr>
+          <a:lstStyle/>
+          <a:p>
+            <a:r>
+              <a:rPr lang="ko-KR" altLang="en-US" sz="2000" b="1" dirty="0"/>
+              <a:t>리그 정보 데이터베이스 모듈</a:t>
+            </a:r>
+          </a:p>
+        </p:txBody>
+      </p:sp>
+      <p:sp>
+        <p:nvSpPr>
+          <p:cNvPr id="7" name="TextBox 6">
+            <a:extLst>
+              <a:ext uri="{FF2B5EF4-FFF2-40B4-BE49-F238E27FC236}">
+                <a16:creationId xmlns:a16="http://schemas.microsoft.com/office/drawing/2014/main" id="{90D9130C-5F1A-490B-A8CC-2BBC6C73307C}"/>
+              </a:ext>
+            </a:extLst>
+          </p:cNvPr>
+          <p:cNvSpPr txBox="1"/>
+          <p:nvPr/>
+        </p:nvSpPr>
+        <p:spPr>
+          <a:xfrm>
+            <a:off x="284084" y="1410808"/>
+            <a:ext cx="3639845" cy="1200329"/>
+          </a:xfrm>
+          <a:prstGeom prst="rect">
+            <a:avLst/>
+          </a:prstGeom>
+          <a:noFill/>
+        </p:spPr>
+        <p:txBody>
+          <a:bodyPr wrap="square" rtlCol="0">
+            <a:spAutoFit/>
+          </a:bodyPr>
+          <a:lstStyle/>
+          <a:p>
+            <a:pPr marL="285750" indent="-285750">
+              <a:buFont typeface="Wingdings" panose="05000000000000000000" pitchFamily="2" charset="2"/>
+              <a:buChar char="v"/>
+            </a:pPr>
+            <a:r>
+              <a:rPr lang="ko-KR" altLang="en-US" b="1" dirty="0"/>
+              <a:t>리그 관리 데이터베이스 구조</a:t>
+            </a:r>
+            <a:endParaRPr lang="en-US" altLang="ko-KR" b="1" dirty="0"/>
+          </a:p>
+          <a:p>
+            <a:pPr marL="285750" indent="-285750">
+              <a:buFont typeface="Arial" panose="020B0604020202020204" pitchFamily="34" charset="0"/>
+              <a:buChar char="•"/>
+            </a:pPr>
+            <a:endParaRPr lang="en-US" altLang="ko-KR" b="1" dirty="0"/>
+          </a:p>
+          <a:p>
+            <a:pPr marL="285750" indent="-285750">
+              <a:buFont typeface="Arial" panose="020B0604020202020204" pitchFamily="34" charset="0"/>
+              <a:buChar char="•"/>
+            </a:pPr>
+            <a:endParaRPr lang="en-US" altLang="ko-KR" b="1" dirty="0"/>
+          </a:p>
+          <a:p>
+            <a:pPr marL="285750" indent="-285750">
+              <a:buFont typeface="Arial" panose="020B0604020202020204" pitchFamily="34" charset="0"/>
+              <a:buChar char="•"/>
+            </a:pPr>
+            <a:endParaRPr lang="ko-KR" altLang="en-US" b="1" dirty="0"/>
+          </a:p>
+        </p:txBody>
+      </p:sp>
+      <p:pic>
+        <p:nvPicPr>
+          <p:cNvPr id="12" name="그림 11">
+            <a:extLst>
+              <a:ext uri="{FF2B5EF4-FFF2-40B4-BE49-F238E27FC236}">
+                <a16:creationId xmlns:a16="http://schemas.microsoft.com/office/drawing/2014/main" id="{8128BCDD-8B57-479E-8871-AD766A1F4334}"/>
+              </a:ext>
+            </a:extLst>
+          </p:cNvPr>
+          <p:cNvPicPr>
+            <a:picLocks noChangeAspect="1"/>
+          </p:cNvPicPr>
+          <p:nvPr/>
+        </p:nvPicPr>
+        <p:blipFill>
+          <a:blip r:embed="rId2">
+            <a:extLst>
+              <a:ext uri="{28A0092B-C50C-407E-A947-70E740481C1C}">
+                <a14:useLocalDpi xmlns:a14="http://schemas.microsoft.com/office/drawing/2010/main" val="0"/>
+              </a:ext>
+            </a:extLst>
+          </a:blip>
+          <a:stretch>
+            <a:fillRect/>
+          </a:stretch>
+        </p:blipFill>
+        <p:spPr>
+          <a:xfrm>
+            <a:off x="5140486" y="3275525"/>
+            <a:ext cx="2126164" cy="3383573"/>
+          </a:xfrm>
+          <a:prstGeom prst="rect">
+            <a:avLst/>
+          </a:prstGeom>
+        </p:spPr>
+      </p:pic>
+      <p:pic>
+        <p:nvPicPr>
+          <p:cNvPr id="15" name="그림 14">
+            <a:extLst>
+              <a:ext uri="{FF2B5EF4-FFF2-40B4-BE49-F238E27FC236}">
+                <a16:creationId xmlns:a16="http://schemas.microsoft.com/office/drawing/2014/main" id="{2712C29B-24B0-4080-853A-0D47642FEAC3}"/>
+              </a:ext>
+            </a:extLst>
+          </p:cNvPr>
+          <p:cNvPicPr>
+            <a:picLocks noChangeAspect="1"/>
+          </p:cNvPicPr>
+          <p:nvPr/>
+        </p:nvPicPr>
+        <p:blipFill>
+          <a:blip r:embed="rId3">
+            <a:extLst>
+              <a:ext uri="{28A0092B-C50C-407E-A947-70E740481C1C}">
+                <a14:useLocalDpi xmlns:a14="http://schemas.microsoft.com/office/drawing/2010/main" val="0"/>
+              </a:ext>
+            </a:extLst>
+          </a:blip>
+          <a:stretch>
+            <a:fillRect/>
+          </a:stretch>
+        </p:blipFill>
+        <p:spPr>
+          <a:xfrm>
+            <a:off x="1385063" y="3138354"/>
+            <a:ext cx="2095682" cy="3657917"/>
+          </a:xfrm>
+          <a:prstGeom prst="rect">
+            <a:avLst/>
+          </a:prstGeom>
+        </p:spPr>
+      </p:pic>
+      <p:pic>
+        <p:nvPicPr>
+          <p:cNvPr id="22" name="그림 21">
+            <a:extLst>
+              <a:ext uri="{FF2B5EF4-FFF2-40B4-BE49-F238E27FC236}">
+                <a16:creationId xmlns:a16="http://schemas.microsoft.com/office/drawing/2014/main" id="{57D85EBA-5E7C-4669-A9E0-CF3B7F48E069}"/>
+              </a:ext>
+            </a:extLst>
+          </p:cNvPr>
+          <p:cNvPicPr>
+            <a:picLocks noChangeAspect="1"/>
+          </p:cNvPicPr>
+          <p:nvPr/>
+        </p:nvPicPr>
+        <p:blipFill>
+          <a:blip r:embed="rId4">
+            <a:extLst>
+              <a:ext uri="{28A0092B-C50C-407E-A947-70E740481C1C}">
+                <a14:useLocalDpi xmlns:a14="http://schemas.microsoft.com/office/drawing/2010/main" val="0"/>
+              </a:ext>
+            </a:extLst>
+          </a:blip>
+          <a:stretch>
+            <a:fillRect/>
+          </a:stretch>
+        </p:blipFill>
+        <p:spPr>
+          <a:xfrm>
+            <a:off x="1329636" y="1987635"/>
+            <a:ext cx="2187059" cy="1082134"/>
+          </a:xfrm>
+          <a:prstGeom prst="rect">
+            <a:avLst/>
+          </a:prstGeom>
+        </p:spPr>
+      </p:pic>
+      <p:pic>
+        <p:nvPicPr>
+          <p:cNvPr id="24" name="그림 23">
+            <a:extLst>
+              <a:ext uri="{FF2B5EF4-FFF2-40B4-BE49-F238E27FC236}">
+                <a16:creationId xmlns:a16="http://schemas.microsoft.com/office/drawing/2014/main" id="{2BBD1FB3-B883-4FA2-8D10-BE1B95AD9652}"/>
+              </a:ext>
+            </a:extLst>
+          </p:cNvPr>
+          <p:cNvPicPr>
+            <a:picLocks noChangeAspect="1"/>
+          </p:cNvPicPr>
+          <p:nvPr/>
+        </p:nvPicPr>
+        <p:blipFill>
+          <a:blip r:embed="rId5">
+            <a:extLst>
+              <a:ext uri="{28A0092B-C50C-407E-A947-70E740481C1C}">
+                <a14:useLocalDpi xmlns:a14="http://schemas.microsoft.com/office/drawing/2010/main" val="0"/>
+              </a:ext>
+            </a:extLst>
+          </a:blip>
+          <a:stretch>
+            <a:fillRect/>
+          </a:stretch>
+        </p:blipFill>
+        <p:spPr>
+          <a:xfrm>
+            <a:off x="5110039" y="2010972"/>
+            <a:ext cx="2187059" cy="1127382"/>
+          </a:xfrm>
+          <a:prstGeom prst="rect">
+            <a:avLst/>
+          </a:prstGeom>
+        </p:spPr>
+      </p:pic>
+    </p:spTree>
+    <p:extLst>
+      <p:ext uri="{BB962C8B-B14F-4D97-AF65-F5344CB8AC3E}">
+        <p14:creationId xmlns:p14="http://schemas.microsoft.com/office/powerpoint/2010/main" val="2425566757"/>
+      </p:ext>
+    </p:extLst>
+  </p:cSld>
+  <p:clrMapOvr>
+    <a:masterClrMapping/>
+  </p:clrMapOvr>
+</p:sld>
+</file>
+
+<file path=ppt/slides/slide22.xml><?xml version="1.0" encoding="utf-8"?>
 <p:sld xmlns:a="http://schemas.openxmlformats.org/drawingml/2006/main" xmlns:r="http://schemas.openxmlformats.org/officeDocument/2006/relationships" xmlns:p="http://schemas.openxmlformats.org/presentationml/2006/main">
   <p:cSld>
     <p:spTree>
@@ -20405,7 +21479,7 @@
           <a:p>
             <a:fld id="{EB942B9F-D695-4224-97C8-E7A171F5AE33}" type="slidenum">
               <a:rPr lang="ko-KR" altLang="en-US" smtClean="0"/>
-              <a:t>20</a:t>
+              <a:t>22</a:t>
             </a:fld>
             <a:endParaRPr lang="ko-KR" altLang="en-US"/>
           </a:p>
@@ -20424,7 +21498,7 @@
 </p:sld>
 </file>
 
-<file path=ppt/slides/slide21.xml><?xml version="1.0" encoding="utf-8"?>
+<file path=ppt/slides/slide23.xml><?xml version="1.0" encoding="utf-8"?>
 <p:sld xmlns:a="http://schemas.openxmlformats.org/drawingml/2006/main" xmlns:r="http://schemas.openxmlformats.org/officeDocument/2006/relationships" xmlns:p="http://schemas.openxmlformats.org/presentationml/2006/main">
   <p:cSld>
     <p:spTree>
@@ -22061,7 +23135,7 @@
           <a:p>
             <a:fld id="{EB942B9F-D695-4224-97C8-E7A171F5AE33}" type="slidenum">
               <a:rPr lang="ko-KR" altLang="en-US" smtClean="0"/>
-              <a:t>21</a:t>
+              <a:t>23</a:t>
             </a:fld>
             <a:endParaRPr lang="ko-KR" altLang="en-US"/>
           </a:p>
@@ -22080,7 +23154,7 @@
 </p:sld>
 </file>
 
-<file path=ppt/slides/slide22.xml><?xml version="1.0" encoding="utf-8"?>
+<file path=ppt/slides/slide24.xml><?xml version="1.0" encoding="utf-8"?>
 <p:sld xmlns:a="http://schemas.openxmlformats.org/drawingml/2006/main" xmlns:r="http://schemas.openxmlformats.org/officeDocument/2006/relationships" xmlns:p="http://schemas.openxmlformats.org/presentationml/2006/main">
   <p:cSld>
     <p:spTree>
@@ -22744,7 +23818,7 @@
           <a:p>
             <a:fld id="{EB942B9F-D695-4224-97C8-E7A171F5AE33}" type="slidenum">
               <a:rPr lang="ko-KR" altLang="en-US" smtClean="0"/>
-              <a:t>22</a:t>
+              <a:t>24</a:t>
             </a:fld>
             <a:endParaRPr lang="ko-KR" altLang="en-US"/>
           </a:p>
@@ -22763,7 +23837,7 @@
 </p:sld>
 </file>
 
-<file path=ppt/slides/slide23.xml><?xml version="1.0" encoding="utf-8"?>
+<file path=ppt/slides/slide25.xml><?xml version="1.0" encoding="utf-8"?>
 <p:sld xmlns:a="http://schemas.openxmlformats.org/drawingml/2006/main" xmlns:r="http://schemas.openxmlformats.org/officeDocument/2006/relationships" xmlns:p="http://schemas.openxmlformats.org/presentationml/2006/main">
   <p:cSld>
     <p:spTree>
@@ -23002,7 +24076,7 @@
           <a:p>
             <a:fld id="{EB942B9F-D695-4224-97C8-E7A171F5AE33}" type="slidenum">
               <a:rPr lang="ko-KR" altLang="en-US" smtClean="0"/>
-              <a:t>23</a:t>
+              <a:t>25</a:t>
             </a:fld>
             <a:endParaRPr lang="ko-KR" altLang="en-US"/>
           </a:p>
@@ -23021,7 +24095,7 @@
 </p:sld>
 </file>
 
-<file path=ppt/slides/slide24.xml><?xml version="1.0" encoding="utf-8"?>
+<file path=ppt/slides/slide26.xml><?xml version="1.0" encoding="utf-8"?>
 <p:sld xmlns:a="http://schemas.openxmlformats.org/drawingml/2006/main" xmlns:r="http://schemas.openxmlformats.org/officeDocument/2006/relationships" xmlns:p="http://schemas.openxmlformats.org/presentationml/2006/main">
   <p:cSld>
     <p:spTree>
@@ -26029,7 +27103,7 @@
           <a:p>
             <a:fld id="{EB942B9F-D695-4224-97C8-E7A171F5AE33}" type="slidenum">
               <a:rPr lang="ko-KR" altLang="en-US" smtClean="0"/>
-              <a:t>24</a:t>
+              <a:t>26</a:t>
             </a:fld>
             <a:endParaRPr lang="ko-KR" altLang="en-US"/>
           </a:p>
@@ -26048,7 +27122,7 @@
 </p:sld>
 </file>
 
-<file path=ppt/slides/slide25.xml><?xml version="1.0" encoding="utf-8"?>
+<file path=ppt/slides/slide27.xml><?xml version="1.0" encoding="utf-8"?>
 <p:sld xmlns:a="http://schemas.openxmlformats.org/drawingml/2006/main" xmlns:r="http://schemas.openxmlformats.org/officeDocument/2006/relationships" xmlns:p="http://schemas.openxmlformats.org/presentationml/2006/main">
   <p:cSld>
     <p:spTree>
@@ -32431,7 +33505,7 @@
           <a:p>
             <a:fld id="{EB942B9F-D695-4224-97C8-E7A171F5AE33}" type="slidenum">
               <a:rPr lang="ko-KR" altLang="en-US" smtClean="0"/>
-              <a:t>25</a:t>
+              <a:t>27</a:t>
             </a:fld>
             <a:endParaRPr lang="ko-KR" altLang="en-US"/>
           </a:p>
@@ -32450,7 +33524,7 @@
 </p:sld>
 </file>
 
-<file path=ppt/slides/slide26.xml><?xml version="1.0" encoding="utf-8"?>
+<file path=ppt/slides/slide28.xml><?xml version="1.0" encoding="utf-8"?>
 <p:sld xmlns:a="http://schemas.openxmlformats.org/drawingml/2006/main" xmlns:r="http://schemas.openxmlformats.org/officeDocument/2006/relationships" xmlns:p="http://schemas.openxmlformats.org/presentationml/2006/main">
   <p:cSld>
     <p:spTree>
@@ -33035,7 +34109,7 @@
           <a:p>
             <a:fld id="{EB942B9F-D695-4224-97C8-E7A171F5AE33}" type="slidenum">
               <a:rPr lang="ko-KR" altLang="en-US" smtClean="0"/>
-              <a:t>26</a:t>
+              <a:t>28</a:t>
             </a:fld>
             <a:endParaRPr lang="ko-KR" altLang="en-US"/>
           </a:p>
@@ -33054,7 +34128,7 @@
 </p:sld>
 </file>
 
-<file path=ppt/slides/slide27.xml><?xml version="1.0" encoding="utf-8"?>
+<file path=ppt/slides/slide29.xml><?xml version="1.0" encoding="utf-8"?>
 <p:sld xmlns:a="http://schemas.openxmlformats.org/drawingml/2006/main" xmlns:r="http://schemas.openxmlformats.org/officeDocument/2006/relationships" xmlns:p="http://schemas.openxmlformats.org/presentationml/2006/main">
   <p:cSld>
     <p:spTree>
@@ -33645,7 +34719,7 @@
           <a:p>
             <a:fld id="{EB942B9F-D695-4224-97C8-E7A171F5AE33}" type="slidenum">
               <a:rPr lang="ko-KR" altLang="en-US" smtClean="0"/>
-              <a:t>27</a:t>
+              <a:t>29</a:t>
             </a:fld>
             <a:endParaRPr lang="ko-KR" altLang="en-US"/>
           </a:p>
@@ -33655,127 +34729,6 @@
     <p:extLst>
       <p:ext uri="{BB962C8B-B14F-4D97-AF65-F5344CB8AC3E}">
         <p14:creationId xmlns:p14="http://schemas.microsoft.com/office/powerpoint/2010/main" val="347655109"/>
-      </p:ext>
-    </p:extLst>
-  </p:cSld>
-  <p:clrMapOvr>
-    <a:masterClrMapping/>
-  </p:clrMapOvr>
-</p:sld>
-</file>
-
-<file path=ppt/slides/slide28.xml><?xml version="1.0" encoding="utf-8"?>
-<p:sld xmlns:a="http://schemas.openxmlformats.org/drawingml/2006/main" xmlns:r="http://schemas.openxmlformats.org/officeDocument/2006/relationships" xmlns:p="http://schemas.openxmlformats.org/presentationml/2006/main">
-  <p:cSld>
-    <p:spTree>
-      <p:nvGrpSpPr>
-        <p:cNvPr id="1" name=""/>
-        <p:cNvGrpSpPr/>
-        <p:nvPr/>
-      </p:nvGrpSpPr>
-      <p:grpSpPr>
-        <a:xfrm>
-          <a:off x="0" y="0"/>
-          <a:ext cx="0" cy="0"/>
-          <a:chOff x="0" y="0"/>
-          <a:chExt cx="0" cy="0"/>
-        </a:xfrm>
-      </p:grpSpPr>
-      <p:sp>
-        <p:nvSpPr>
-          <p:cNvPr id="2" name="직사각형 1"/>
-          <p:cNvSpPr/>
-          <p:nvPr/>
-        </p:nvSpPr>
-        <p:spPr>
-          <a:xfrm>
-            <a:off x="1700130" y="5171282"/>
-            <a:ext cx="6320003" cy="1036637"/>
-          </a:xfrm>
-          <a:prstGeom prst="rect">
-            <a:avLst/>
-          </a:prstGeom>
-          <a:noFill/>
-          <a:ln>
-            <a:noFill/>
-          </a:ln>
-        </p:spPr>
-        <p:style>
-          <a:lnRef idx="2">
-            <a:schemeClr val="accent1">
-              <a:shade val="50000"/>
-            </a:schemeClr>
-          </a:lnRef>
-          <a:fillRef idx="1">
-            <a:schemeClr val="accent1"/>
-          </a:fillRef>
-          <a:effectRef idx="0">
-            <a:schemeClr val="accent1"/>
-          </a:effectRef>
-          <a:fontRef idx="minor">
-            <a:schemeClr val="lt1"/>
-          </a:fontRef>
-        </p:style>
-        <p:txBody>
-          <a:bodyPr anchor="ctr"/>
-          <a:lstStyle/>
-          <a:p>
-            <a:pPr algn="ctr">
-              <a:defRPr/>
-            </a:pPr>
-            <a:r>
-              <a:rPr lang="en-US" altLang="ko-KR" sz="7200" b="1" dirty="0">
-                <a:solidFill>
-                  <a:srgbClr val="6F6761"/>
-                </a:solidFill>
-                <a:latin typeface="Tahoma" pitchFamily="34" charset="0"/>
-                <a:cs typeface="Tahoma" pitchFamily="34" charset="0"/>
-              </a:rPr>
-              <a:t>Thank you</a:t>
-            </a:r>
-            <a:endParaRPr lang="ko-KR" altLang="en-US" sz="7200" b="1" dirty="0">
-              <a:solidFill>
-                <a:srgbClr val="6F6761"/>
-              </a:solidFill>
-              <a:latin typeface="Tahoma" pitchFamily="34" charset="0"/>
-              <a:cs typeface="Tahoma" pitchFamily="34" charset="0"/>
-            </a:endParaRPr>
-          </a:p>
-        </p:txBody>
-      </p:sp>
-      <p:sp>
-        <p:nvSpPr>
-          <p:cNvPr id="3" name="슬라이드 번호 개체 틀 2">
-            <a:extLst>
-              <a:ext uri="{FF2B5EF4-FFF2-40B4-BE49-F238E27FC236}">
-                <a16:creationId xmlns:a16="http://schemas.microsoft.com/office/drawing/2014/main" id="{99AB7930-9A7C-48F3-AFA5-037E04E1AA4C}"/>
-              </a:ext>
-            </a:extLst>
-          </p:cNvPr>
-          <p:cNvSpPr>
-            <a:spLocks noGrp="1"/>
-          </p:cNvSpPr>
-          <p:nvPr>
-            <p:ph type="sldNum" sz="quarter" idx="12"/>
-          </p:nvPr>
-        </p:nvSpPr>
-        <p:spPr/>
-        <p:txBody>
-          <a:bodyPr/>
-          <a:lstStyle/>
-          <a:p>
-            <a:fld id="{EB942B9F-D695-4224-97C8-E7A171F5AE33}" type="slidenum">
-              <a:rPr lang="ko-KR" altLang="en-US" smtClean="0"/>
-              <a:t>28</a:t>
-            </a:fld>
-            <a:endParaRPr lang="ko-KR" altLang="en-US" dirty="0"/>
-          </a:p>
-        </p:txBody>
-      </p:sp>
-    </p:spTree>
-    <p:extLst>
-      <p:ext uri="{BB962C8B-B14F-4D97-AF65-F5344CB8AC3E}">
-        <p14:creationId xmlns:p14="http://schemas.microsoft.com/office/powerpoint/2010/main" val="114247042"/>
       </p:ext>
     </p:extLst>
   </p:cSld>
@@ -34329,6 +35282,127 @@
     <p:extLst>
       <p:ext uri="{BB962C8B-B14F-4D97-AF65-F5344CB8AC3E}">
         <p14:creationId xmlns:p14="http://schemas.microsoft.com/office/powerpoint/2010/main" val="1154531880"/>
+      </p:ext>
+    </p:extLst>
+  </p:cSld>
+  <p:clrMapOvr>
+    <a:masterClrMapping/>
+  </p:clrMapOvr>
+</p:sld>
+</file>
+
+<file path=ppt/slides/slide30.xml><?xml version="1.0" encoding="utf-8"?>
+<p:sld xmlns:a="http://schemas.openxmlformats.org/drawingml/2006/main" xmlns:r="http://schemas.openxmlformats.org/officeDocument/2006/relationships" xmlns:p="http://schemas.openxmlformats.org/presentationml/2006/main">
+  <p:cSld>
+    <p:spTree>
+      <p:nvGrpSpPr>
+        <p:cNvPr id="1" name=""/>
+        <p:cNvGrpSpPr/>
+        <p:nvPr/>
+      </p:nvGrpSpPr>
+      <p:grpSpPr>
+        <a:xfrm>
+          <a:off x="0" y="0"/>
+          <a:ext cx="0" cy="0"/>
+          <a:chOff x="0" y="0"/>
+          <a:chExt cx="0" cy="0"/>
+        </a:xfrm>
+      </p:grpSpPr>
+      <p:sp>
+        <p:nvSpPr>
+          <p:cNvPr id="2" name="직사각형 1"/>
+          <p:cNvSpPr/>
+          <p:nvPr/>
+        </p:nvSpPr>
+        <p:spPr>
+          <a:xfrm>
+            <a:off x="1700130" y="5171282"/>
+            <a:ext cx="6320003" cy="1036637"/>
+          </a:xfrm>
+          <a:prstGeom prst="rect">
+            <a:avLst/>
+          </a:prstGeom>
+          <a:noFill/>
+          <a:ln>
+            <a:noFill/>
+          </a:ln>
+        </p:spPr>
+        <p:style>
+          <a:lnRef idx="2">
+            <a:schemeClr val="accent1">
+              <a:shade val="50000"/>
+            </a:schemeClr>
+          </a:lnRef>
+          <a:fillRef idx="1">
+            <a:schemeClr val="accent1"/>
+          </a:fillRef>
+          <a:effectRef idx="0">
+            <a:schemeClr val="accent1"/>
+          </a:effectRef>
+          <a:fontRef idx="minor">
+            <a:schemeClr val="lt1"/>
+          </a:fontRef>
+        </p:style>
+        <p:txBody>
+          <a:bodyPr anchor="ctr"/>
+          <a:lstStyle/>
+          <a:p>
+            <a:pPr algn="ctr">
+              <a:defRPr/>
+            </a:pPr>
+            <a:r>
+              <a:rPr lang="en-US" altLang="ko-KR" sz="7200" b="1" dirty="0">
+                <a:solidFill>
+                  <a:srgbClr val="6F6761"/>
+                </a:solidFill>
+                <a:latin typeface="Tahoma" pitchFamily="34" charset="0"/>
+                <a:cs typeface="Tahoma" pitchFamily="34" charset="0"/>
+              </a:rPr>
+              <a:t>Thank you</a:t>
+            </a:r>
+            <a:endParaRPr lang="ko-KR" altLang="en-US" sz="7200" b="1" dirty="0">
+              <a:solidFill>
+                <a:srgbClr val="6F6761"/>
+              </a:solidFill>
+              <a:latin typeface="Tahoma" pitchFamily="34" charset="0"/>
+              <a:cs typeface="Tahoma" pitchFamily="34" charset="0"/>
+            </a:endParaRPr>
+          </a:p>
+        </p:txBody>
+      </p:sp>
+      <p:sp>
+        <p:nvSpPr>
+          <p:cNvPr id="3" name="슬라이드 번호 개체 틀 2">
+            <a:extLst>
+              <a:ext uri="{FF2B5EF4-FFF2-40B4-BE49-F238E27FC236}">
+                <a16:creationId xmlns:a16="http://schemas.microsoft.com/office/drawing/2014/main" id="{99AB7930-9A7C-48F3-AFA5-037E04E1AA4C}"/>
+              </a:ext>
+            </a:extLst>
+          </p:cNvPr>
+          <p:cNvSpPr>
+            <a:spLocks noGrp="1"/>
+          </p:cNvSpPr>
+          <p:nvPr>
+            <p:ph type="sldNum" sz="quarter" idx="12"/>
+          </p:nvPr>
+        </p:nvSpPr>
+        <p:spPr/>
+        <p:txBody>
+          <a:bodyPr/>
+          <a:lstStyle/>
+          <a:p>
+            <a:fld id="{EB942B9F-D695-4224-97C8-E7A171F5AE33}" type="slidenum">
+              <a:rPr lang="ko-KR" altLang="en-US" smtClean="0"/>
+              <a:t>30</a:t>
+            </a:fld>
+            <a:endParaRPr lang="ko-KR" altLang="en-US" dirty="0"/>
+          </a:p>
+        </p:txBody>
+      </p:sp>
+    </p:spTree>
+    <p:extLst>
+      <p:ext uri="{BB962C8B-B14F-4D97-AF65-F5344CB8AC3E}">
+        <p14:creationId xmlns:p14="http://schemas.microsoft.com/office/powerpoint/2010/main" val="114247042"/>
       </p:ext>
     </p:extLst>
   </p:cSld>
@@ -39610,18 +40684,18 @@
 
 <file path=customXml/item1.xml><?xml version="1.0" encoding="utf-8"?>
 <Control xmlns="http://schemas.microsoft.com/VisualStudio/2011/storyboarding/control">
-  <Id Name="System.Storyboarding.Icons.CheckCircle" Revision="1" Stencil="System.Storyboarding.Icons" StencilVersion="0.1"/>
+  <Id Name="System.Storyboarding.WindowsAppIcons.Paste" Revision="1" Stencil="System.Storyboarding.WindowsAppIcons" StencilVersion="0.1"/>
 </Control>
 </file>
 
 <file path=customXml/item2.xml><?xml version="1.0" encoding="utf-8"?>
 <Control xmlns="http://schemas.microsoft.com/VisualStudio/2011/storyboarding/control">
-  <Id Name="System.Storyboarding.WindowsAppIcons.Paste" Revision="1" Stencil="System.Storyboarding.WindowsAppIcons" StencilVersion="0.1"/>
+  <Id Name="System.Storyboarding.Icons.CheckCircle" Revision="1" Stencil="System.Storyboarding.Icons" StencilVersion="0.1"/>
 </Control>
 </file>
 
 <file path=customXml/itemProps1.xml><?xml version="1.0" encoding="utf-8"?>
-<ds:datastoreItem xmlns:ds="http://schemas.openxmlformats.org/officeDocument/2006/customXml" ds:itemID="{D3DA86E8-34BE-44E8-91C9-A4F4C9D9BF5C}">
+<ds:datastoreItem xmlns:ds="http://schemas.openxmlformats.org/officeDocument/2006/customXml" ds:itemID="{52266879-4E94-44A1-A54A-A7163A1198C4}">
   <ds:schemaRefs>
     <ds:schemaRef ds:uri="http://schemas.microsoft.com/VisualStudio/2011/storyboarding/control"/>
   </ds:schemaRefs>
@@ -39629,7 +40703,7 @@
 </file>
 
 <file path=customXml/itemProps2.xml><?xml version="1.0" encoding="utf-8"?>
-<ds:datastoreItem xmlns:ds="http://schemas.openxmlformats.org/officeDocument/2006/customXml" ds:itemID="{52266879-4E94-44A1-A54A-A7163A1198C4}">
+<ds:datastoreItem xmlns:ds="http://schemas.openxmlformats.org/officeDocument/2006/customXml" ds:itemID="{D3DA86E8-34BE-44E8-91C9-A4F4C9D9BF5C}">
   <ds:schemaRefs>
     <ds:schemaRef ds:uri="http://schemas.microsoft.com/VisualStudio/2011/storyboarding/control"/>
   </ds:schemaRefs>

</xml_diff>

<commit_message>
--2019.02.24 Jeong-Chan Lee 2월 25일 졸업작품 중간 보고서
</commit_message>
<xml_diff>
--- a/resources/졸작설계서.pptx
+++ b/resources/졸작설계서.pptx
@@ -3368,7 +3368,7 @@
           <p:cNvPr id="2" name="날짜 개체 틀 1">
             <a:extLst>
               <a:ext uri="{FF2B5EF4-FFF2-40B4-BE49-F238E27FC236}">
-                <a16:creationId xmlns:a16="http://schemas.microsoft.com/office/drawing/2014/main" xmlns="" id="{019639C8-E49E-4914-8A30-0CD330248078}"/>
+                <a16:creationId xmlns:a16="http://schemas.microsoft.com/office/drawing/2014/main" id="{019639C8-E49E-4914-8A30-0CD330248078}"/>
               </a:ext>
             </a:extLst>
           </p:cNvPr>
@@ -3393,7 +3393,7 @@
           <p:cNvPr id="3" name="바닥글 개체 틀 2">
             <a:extLst>
               <a:ext uri="{FF2B5EF4-FFF2-40B4-BE49-F238E27FC236}">
-                <a16:creationId xmlns:a16="http://schemas.microsoft.com/office/drawing/2014/main" xmlns="" id="{4C73C8C1-0083-46BF-A47D-0630F3D125C4}"/>
+                <a16:creationId xmlns:a16="http://schemas.microsoft.com/office/drawing/2014/main" id="{4C73C8C1-0083-46BF-A47D-0630F3D125C4}"/>
               </a:ext>
             </a:extLst>
           </p:cNvPr>
@@ -3418,7 +3418,7 @@
           <p:cNvPr id="4" name="슬라이드 번호 개체 틀 3">
             <a:extLst>
               <a:ext uri="{FF2B5EF4-FFF2-40B4-BE49-F238E27FC236}">
-                <a16:creationId xmlns:a16="http://schemas.microsoft.com/office/drawing/2014/main" xmlns="" id="{CC841BC3-4CD8-496A-955D-C7169753A779}"/>
+                <a16:creationId xmlns:a16="http://schemas.microsoft.com/office/drawing/2014/main" id="{CC841BC3-4CD8-496A-955D-C7169753A779}"/>
               </a:ext>
             </a:extLst>
           </p:cNvPr>
@@ -3819,7 +3819,7 @@
           <p:cNvPr id="2" name="날짜 개체 틀 1">
             <a:extLst>
               <a:ext uri="{FF2B5EF4-FFF2-40B4-BE49-F238E27FC236}">
-                <a16:creationId xmlns:a16="http://schemas.microsoft.com/office/drawing/2014/main" xmlns="" id="{7FA35E20-B83D-4043-9DC3-570F564AE418}"/>
+                <a16:creationId xmlns:a16="http://schemas.microsoft.com/office/drawing/2014/main" id="{7FA35E20-B83D-4043-9DC3-570F564AE418}"/>
               </a:ext>
             </a:extLst>
           </p:cNvPr>
@@ -3844,7 +3844,7 @@
           <p:cNvPr id="3" name="바닥글 개체 틀 2">
             <a:extLst>
               <a:ext uri="{FF2B5EF4-FFF2-40B4-BE49-F238E27FC236}">
-                <a16:creationId xmlns:a16="http://schemas.microsoft.com/office/drawing/2014/main" xmlns="" id="{D20DDF66-F74E-4E67-B348-8C9AA95865A2}"/>
+                <a16:creationId xmlns:a16="http://schemas.microsoft.com/office/drawing/2014/main" id="{D20DDF66-F74E-4E67-B348-8C9AA95865A2}"/>
               </a:ext>
             </a:extLst>
           </p:cNvPr>
@@ -3869,7 +3869,7 @@
           <p:cNvPr id="4" name="슬라이드 번호 개체 틀 3">
             <a:extLst>
               <a:ext uri="{FF2B5EF4-FFF2-40B4-BE49-F238E27FC236}">
-                <a16:creationId xmlns:a16="http://schemas.microsoft.com/office/drawing/2014/main" xmlns="" id="{53116A96-C32C-4F15-B781-3338C36BC8A4}"/>
+                <a16:creationId xmlns:a16="http://schemas.microsoft.com/office/drawing/2014/main" id="{53116A96-C32C-4F15-B781-3338C36BC8A4}"/>
               </a:ext>
             </a:extLst>
           </p:cNvPr>
@@ -3928,7 +3928,7 @@
           <p:cNvPr id="2" name="날짜 개체 틀 1">
             <a:extLst>
               <a:ext uri="{FF2B5EF4-FFF2-40B4-BE49-F238E27FC236}">
-                <a16:creationId xmlns:a16="http://schemas.microsoft.com/office/drawing/2014/main" xmlns="" id="{474FB958-62ED-4ACC-AD0D-B26BB4C6D9E9}"/>
+                <a16:creationId xmlns:a16="http://schemas.microsoft.com/office/drawing/2014/main" id="{474FB958-62ED-4ACC-AD0D-B26BB4C6D9E9}"/>
               </a:ext>
             </a:extLst>
           </p:cNvPr>
@@ -3953,7 +3953,7 @@
           <p:cNvPr id="3" name="바닥글 개체 틀 2">
             <a:extLst>
               <a:ext uri="{FF2B5EF4-FFF2-40B4-BE49-F238E27FC236}">
-                <a16:creationId xmlns:a16="http://schemas.microsoft.com/office/drawing/2014/main" xmlns="" id="{3284C931-094D-4A97-BA40-DEC4E96A0CC9}"/>
+                <a16:creationId xmlns:a16="http://schemas.microsoft.com/office/drawing/2014/main" id="{3284C931-094D-4A97-BA40-DEC4E96A0CC9}"/>
               </a:ext>
             </a:extLst>
           </p:cNvPr>
@@ -3978,7 +3978,7 @@
           <p:cNvPr id="4" name="슬라이드 번호 개체 틀 3">
             <a:extLst>
               <a:ext uri="{FF2B5EF4-FFF2-40B4-BE49-F238E27FC236}">
-                <a16:creationId xmlns:a16="http://schemas.microsoft.com/office/drawing/2014/main" xmlns="" id="{DDAFD0F6-1281-4A8E-8272-FC76AF998912}"/>
+                <a16:creationId xmlns:a16="http://schemas.microsoft.com/office/drawing/2014/main" id="{DDAFD0F6-1281-4A8E-8272-FC76AF998912}"/>
               </a:ext>
             </a:extLst>
           </p:cNvPr>
@@ -4790,7 +4790,7 @@
           <p:cNvPr id="2" name="날짜 개체 틀 1">
             <a:extLst>
               <a:ext uri="{FF2B5EF4-FFF2-40B4-BE49-F238E27FC236}">
-                <a16:creationId xmlns:a16="http://schemas.microsoft.com/office/drawing/2014/main" xmlns="" id="{A5F592DF-1292-4210-B5A2-EF5390576C26}"/>
+                <a16:creationId xmlns:a16="http://schemas.microsoft.com/office/drawing/2014/main" id="{A5F592DF-1292-4210-B5A2-EF5390576C26}"/>
               </a:ext>
             </a:extLst>
           </p:cNvPr>
@@ -4815,7 +4815,7 @@
           <p:cNvPr id="3" name="바닥글 개체 틀 2">
             <a:extLst>
               <a:ext uri="{FF2B5EF4-FFF2-40B4-BE49-F238E27FC236}">
-                <a16:creationId xmlns:a16="http://schemas.microsoft.com/office/drawing/2014/main" xmlns="" id="{7024015C-54DE-4613-8AB0-6C3F995B2DE7}"/>
+                <a16:creationId xmlns:a16="http://schemas.microsoft.com/office/drawing/2014/main" id="{7024015C-54DE-4613-8AB0-6C3F995B2DE7}"/>
               </a:ext>
             </a:extLst>
           </p:cNvPr>
@@ -4840,7 +4840,7 @@
           <p:cNvPr id="4" name="슬라이드 번호 개체 틀 3">
             <a:extLst>
               <a:ext uri="{FF2B5EF4-FFF2-40B4-BE49-F238E27FC236}">
-                <a16:creationId xmlns:a16="http://schemas.microsoft.com/office/drawing/2014/main" xmlns="" id="{F0E2530B-787E-4821-8C53-E0214112C336}"/>
+                <a16:creationId xmlns:a16="http://schemas.microsoft.com/office/drawing/2014/main" id="{F0E2530B-787E-4821-8C53-E0214112C336}"/>
               </a:ext>
             </a:extLst>
           </p:cNvPr>
@@ -6051,7 +6051,7 @@
               </a:spcAft>
             </a:pPr>
             <a:r>
-              <a:rPr lang="ko-KR" altLang="en-US" sz="2000" b="1" smtClean="0">
+              <a:rPr lang="ko-KR" altLang="en-US" sz="2000" b="1">
                 <a:solidFill>
                   <a:srgbClr val="6F6761"/>
                 </a:solidFill>
@@ -6454,7 +6454,7 @@
           <p:cNvPr id="3" name="슬라이드 번호 개체 틀 2">
             <a:extLst>
               <a:ext uri="{FF2B5EF4-FFF2-40B4-BE49-F238E27FC236}">
-                <a16:creationId xmlns:a16="http://schemas.microsoft.com/office/drawing/2014/main" xmlns="" id="{145702BB-4F89-4A0B-AFFE-3A1E4AA61170}"/>
+                <a16:creationId xmlns:a16="http://schemas.microsoft.com/office/drawing/2014/main" id="{145702BB-4F89-4A0B-AFFE-3A1E4AA61170}"/>
               </a:ext>
             </a:extLst>
           </p:cNvPr>
@@ -6665,7 +6665,7 @@
           <p:cNvPr id="2" name="TextBox 1">
             <a:extLst>
               <a:ext uri="{FF2B5EF4-FFF2-40B4-BE49-F238E27FC236}">
-                <a16:creationId xmlns:a16="http://schemas.microsoft.com/office/drawing/2014/main" xmlns="" id="{8D8B05C7-87F9-43B6-A885-B4EA1EFF4CD7}"/>
+                <a16:creationId xmlns:a16="http://schemas.microsoft.com/office/drawing/2014/main" id="{8D8B05C7-87F9-43B6-A885-B4EA1EFF4CD7}"/>
               </a:ext>
             </a:extLst>
           </p:cNvPr>
@@ -6724,7 +6724,7 @@
           <p:cNvPr id="23" name="TextBox 22">
             <a:extLst>
               <a:ext uri="{FF2B5EF4-FFF2-40B4-BE49-F238E27FC236}">
-                <a16:creationId xmlns:a16="http://schemas.microsoft.com/office/drawing/2014/main" xmlns="" id="{6CB960C1-5211-45F6-B8D6-371160F302A2}"/>
+                <a16:creationId xmlns:a16="http://schemas.microsoft.com/office/drawing/2014/main" id="{6CB960C1-5211-45F6-B8D6-371160F302A2}"/>
               </a:ext>
             </a:extLst>
           </p:cNvPr>
@@ -6774,7 +6774,7 @@
           <p:cNvPr id="19" name="TextBox 18">
             <a:extLst>
               <a:ext uri="{FF2B5EF4-FFF2-40B4-BE49-F238E27FC236}">
-                <a16:creationId xmlns:a16="http://schemas.microsoft.com/office/drawing/2014/main" xmlns="" id="{512E8FBB-C7AD-4445-8250-5095972E560E}"/>
+                <a16:creationId xmlns:a16="http://schemas.microsoft.com/office/drawing/2014/main" id="{512E8FBB-C7AD-4445-8250-5095972E560E}"/>
               </a:ext>
             </a:extLst>
           </p:cNvPr>
@@ -6860,7 +6860,7 @@
           <p:cNvPr id="21" name="TextBox 20">
             <a:extLst>
               <a:ext uri="{FF2B5EF4-FFF2-40B4-BE49-F238E27FC236}">
-                <a16:creationId xmlns:a16="http://schemas.microsoft.com/office/drawing/2014/main" xmlns="" id="{44222454-24C5-4396-8513-51B6512D95CF}"/>
+                <a16:creationId xmlns:a16="http://schemas.microsoft.com/office/drawing/2014/main" id="{44222454-24C5-4396-8513-51B6512D95CF}"/>
               </a:ext>
             </a:extLst>
           </p:cNvPr>
@@ -6919,7 +6919,7 @@
           <p:cNvPr id="25" name="TextBox 24">
             <a:extLst>
               <a:ext uri="{FF2B5EF4-FFF2-40B4-BE49-F238E27FC236}">
-                <a16:creationId xmlns:a16="http://schemas.microsoft.com/office/drawing/2014/main" xmlns="" id="{04F12578-9B97-4FFE-9AED-1BC64FF59A68}"/>
+                <a16:creationId xmlns:a16="http://schemas.microsoft.com/office/drawing/2014/main" id="{04F12578-9B97-4FFE-9AED-1BC64FF59A68}"/>
               </a:ext>
             </a:extLst>
           </p:cNvPr>
@@ -6987,7 +6987,7 @@
           <p:cNvPr id="28" name="TextBox 27">
             <a:extLst>
               <a:ext uri="{FF2B5EF4-FFF2-40B4-BE49-F238E27FC236}">
-                <a16:creationId xmlns:a16="http://schemas.microsoft.com/office/drawing/2014/main" xmlns="" id="{9DE46C4F-CCA2-43FE-BDF4-D960E7341251}"/>
+                <a16:creationId xmlns:a16="http://schemas.microsoft.com/office/drawing/2014/main" id="{9DE46C4F-CCA2-43FE-BDF4-D960E7341251}"/>
               </a:ext>
             </a:extLst>
           </p:cNvPr>
@@ -7023,7 +7023,7 @@
           <p:cNvPr id="39" name="그룹 38">
             <a:extLst>
               <a:ext uri="{FF2B5EF4-FFF2-40B4-BE49-F238E27FC236}">
-                <a16:creationId xmlns:a16="http://schemas.microsoft.com/office/drawing/2014/main" xmlns="" id="{6682E081-99BB-4282-9CFC-0FA6E5709D31}"/>
+                <a16:creationId xmlns:a16="http://schemas.microsoft.com/office/drawing/2014/main" id="{6682E081-99BB-4282-9CFC-0FA6E5709D31}"/>
               </a:ext>
             </a:extLst>
           </p:cNvPr>
@@ -7043,7 +7043,7 @@
             <p:cNvPr id="5" name="그래픽 4" descr="교사">
               <a:extLst>
                 <a:ext uri="{FF2B5EF4-FFF2-40B4-BE49-F238E27FC236}">
-                  <a16:creationId xmlns:a16="http://schemas.microsoft.com/office/drawing/2014/main" xmlns="" id="{7E3FE4B9-CD09-468A-8AD4-2E685D2F4D90}"/>
+                  <a16:creationId xmlns:a16="http://schemas.microsoft.com/office/drawing/2014/main" id="{7E3FE4B9-CD09-468A-8AD4-2E685D2F4D90}"/>
                 </a:ext>
               </a:extLst>
             </p:cNvPr>
@@ -7059,7 +7059,7 @@
                   <a14:useLocalDpi xmlns:a14="http://schemas.microsoft.com/office/drawing/2010/main" val="0"/>
                 </a:ext>
                 <a:ext uri="{96DAC541-7B7A-43D3-8B79-37D633B846F1}">
-                  <asvg:svgBlip xmlns:asvg="http://schemas.microsoft.com/office/drawing/2016/SVG/main" xmlns="" r:embed="rId3"/>
+                  <asvg:svgBlip xmlns:asvg="http://schemas.microsoft.com/office/drawing/2016/SVG/main" r:embed="rId3"/>
                 </a:ext>
               </a:extLst>
             </a:blip>
@@ -7082,7 +7082,7 @@
             <p:cNvPr id="29" name="TextBox 28">
               <a:extLst>
                 <a:ext uri="{FF2B5EF4-FFF2-40B4-BE49-F238E27FC236}">
-                  <a16:creationId xmlns:a16="http://schemas.microsoft.com/office/drawing/2014/main" xmlns="" id="{28771099-37AB-45E0-972F-99049A789078}"/>
+                  <a16:creationId xmlns:a16="http://schemas.microsoft.com/office/drawing/2014/main" id="{28771099-37AB-45E0-972F-99049A789078}"/>
                 </a:ext>
               </a:extLst>
             </p:cNvPr>
@@ -7126,7 +7126,7 @@
           <p:cNvPr id="22" name="TextBox 21">
             <a:extLst>
               <a:ext uri="{FF2B5EF4-FFF2-40B4-BE49-F238E27FC236}">
-                <a16:creationId xmlns:a16="http://schemas.microsoft.com/office/drawing/2014/main" xmlns="" id="{1C55D484-41FF-4266-9078-C08A888C7E24}"/>
+                <a16:creationId xmlns:a16="http://schemas.microsoft.com/office/drawing/2014/main" id="{1C55D484-41FF-4266-9078-C08A888C7E24}"/>
               </a:ext>
             </a:extLst>
           </p:cNvPr>
@@ -7366,7 +7366,7 @@
           <p:cNvPr id="30" name="오른쪽 화살표 10">
             <a:extLst>
               <a:ext uri="{FF2B5EF4-FFF2-40B4-BE49-F238E27FC236}">
-                <a16:creationId xmlns:a16="http://schemas.microsoft.com/office/drawing/2014/main" xmlns="" id="{77353AFD-ABD0-4DAA-A50C-EC1EF53566E6}"/>
+                <a16:creationId xmlns:a16="http://schemas.microsoft.com/office/drawing/2014/main" id="{77353AFD-ABD0-4DAA-A50C-EC1EF53566E6}"/>
               </a:ext>
             </a:extLst>
           </p:cNvPr>
@@ -7415,7 +7415,7 @@
           <p:cNvPr id="31" name="오른쪽 화살표 10">
             <a:extLst>
               <a:ext uri="{FF2B5EF4-FFF2-40B4-BE49-F238E27FC236}">
-                <a16:creationId xmlns:a16="http://schemas.microsoft.com/office/drawing/2014/main" xmlns="" id="{03FC4268-DC3E-401B-AC95-E7E57F0FED44}"/>
+                <a16:creationId xmlns:a16="http://schemas.microsoft.com/office/drawing/2014/main" id="{03FC4268-DC3E-401B-AC95-E7E57F0FED44}"/>
               </a:ext>
             </a:extLst>
           </p:cNvPr>
@@ -7464,7 +7464,7 @@
           <p:cNvPr id="32" name="오른쪽 화살표 10">
             <a:extLst>
               <a:ext uri="{FF2B5EF4-FFF2-40B4-BE49-F238E27FC236}">
-                <a16:creationId xmlns:a16="http://schemas.microsoft.com/office/drawing/2014/main" xmlns="" id="{F8BC7AC7-0797-4546-9F00-252A630579B1}"/>
+                <a16:creationId xmlns:a16="http://schemas.microsoft.com/office/drawing/2014/main" id="{F8BC7AC7-0797-4546-9F00-252A630579B1}"/>
               </a:ext>
             </a:extLst>
           </p:cNvPr>
@@ -7513,7 +7513,7 @@
           <p:cNvPr id="3" name="슬라이드 번호 개체 틀 2">
             <a:extLst>
               <a:ext uri="{FF2B5EF4-FFF2-40B4-BE49-F238E27FC236}">
-                <a16:creationId xmlns:a16="http://schemas.microsoft.com/office/drawing/2014/main" xmlns="" id="{81BA6205-09C0-4D2F-B3F9-49AF34D6F94A}"/>
+                <a16:creationId xmlns:a16="http://schemas.microsoft.com/office/drawing/2014/main" id="{81BA6205-09C0-4D2F-B3F9-49AF34D6F94A}"/>
               </a:ext>
             </a:extLst>
           </p:cNvPr>
@@ -7724,7 +7724,7 @@
           <p:cNvPr id="2" name="TextBox 1">
             <a:extLst>
               <a:ext uri="{FF2B5EF4-FFF2-40B4-BE49-F238E27FC236}">
-                <a16:creationId xmlns:a16="http://schemas.microsoft.com/office/drawing/2014/main" xmlns="" id="{ED361D71-8FDC-4037-BFB9-78A383E47702}"/>
+                <a16:creationId xmlns:a16="http://schemas.microsoft.com/office/drawing/2014/main" id="{ED361D71-8FDC-4037-BFB9-78A383E47702}"/>
               </a:ext>
             </a:extLst>
           </p:cNvPr>
@@ -7804,7 +7804,7 @@
           <p:cNvPr id="6" name="TextBox 5">
             <a:extLst>
               <a:ext uri="{FF2B5EF4-FFF2-40B4-BE49-F238E27FC236}">
-                <a16:creationId xmlns:a16="http://schemas.microsoft.com/office/drawing/2014/main" xmlns="" id="{F1C6DAD8-161A-4B61-8AC8-FB3B4EE4DCC3}"/>
+                <a16:creationId xmlns:a16="http://schemas.microsoft.com/office/drawing/2014/main" id="{F1C6DAD8-161A-4B61-8AC8-FB3B4EE4DCC3}"/>
               </a:ext>
             </a:extLst>
           </p:cNvPr>
@@ -7836,7 +7836,7 @@
           <p:cNvPr id="27" name="TextBox 26">
             <a:extLst>
               <a:ext uri="{FF2B5EF4-FFF2-40B4-BE49-F238E27FC236}">
-                <a16:creationId xmlns:a16="http://schemas.microsoft.com/office/drawing/2014/main" xmlns="" id="{EC9224F7-C730-4987-B94C-D185D0856848}"/>
+                <a16:creationId xmlns:a16="http://schemas.microsoft.com/office/drawing/2014/main" id="{EC9224F7-C730-4987-B94C-D185D0856848}"/>
               </a:ext>
             </a:extLst>
           </p:cNvPr>
@@ -7868,7 +7868,7 @@
           <p:cNvPr id="8" name="그림 7">
             <a:extLst>
               <a:ext uri="{FF2B5EF4-FFF2-40B4-BE49-F238E27FC236}">
-                <a16:creationId xmlns:a16="http://schemas.microsoft.com/office/drawing/2014/main" xmlns="" id="{D550FD66-9BA3-4DEF-A7B2-AF3E468B7111}"/>
+                <a16:creationId xmlns:a16="http://schemas.microsoft.com/office/drawing/2014/main" id="{D550FD66-9BA3-4DEF-A7B2-AF3E468B7111}"/>
               </a:ext>
             </a:extLst>
           </p:cNvPr>
@@ -7934,7 +7934,7 @@
           <p:cNvPr id="10" name="그림 9">
             <a:extLst>
               <a:ext uri="{FF2B5EF4-FFF2-40B4-BE49-F238E27FC236}">
-                <a16:creationId xmlns:a16="http://schemas.microsoft.com/office/drawing/2014/main" xmlns="" id="{9F5EBCC0-C65E-43AD-BE06-FD4D971567CF}"/>
+                <a16:creationId xmlns:a16="http://schemas.microsoft.com/office/drawing/2014/main" id="{9F5EBCC0-C65E-43AD-BE06-FD4D971567CF}"/>
               </a:ext>
             </a:extLst>
           </p:cNvPr>
@@ -8000,7 +8000,7 @@
           <p:cNvPr id="3" name="슬라이드 번호 개체 틀 2">
             <a:extLst>
               <a:ext uri="{FF2B5EF4-FFF2-40B4-BE49-F238E27FC236}">
-                <a16:creationId xmlns:a16="http://schemas.microsoft.com/office/drawing/2014/main" xmlns="" id="{74CA49AF-C174-43D5-9FF0-0AFE322636E8}"/>
+                <a16:creationId xmlns:a16="http://schemas.microsoft.com/office/drawing/2014/main" id="{74CA49AF-C174-43D5-9FF0-0AFE322636E8}"/>
               </a:ext>
             </a:extLst>
           </p:cNvPr>
@@ -8207,7 +8207,7 @@
           <p:cNvPr id="6" name="TextBox 5">
             <a:extLst>
               <a:ext uri="{FF2B5EF4-FFF2-40B4-BE49-F238E27FC236}">
-                <a16:creationId xmlns:a16="http://schemas.microsoft.com/office/drawing/2014/main" xmlns="" id="{F1C6DAD8-161A-4B61-8AC8-FB3B4EE4DCC3}"/>
+                <a16:creationId xmlns:a16="http://schemas.microsoft.com/office/drawing/2014/main" id="{F1C6DAD8-161A-4B61-8AC8-FB3B4EE4DCC3}"/>
               </a:ext>
             </a:extLst>
           </p:cNvPr>
@@ -8239,7 +8239,7 @@
           <p:cNvPr id="10" name="화살표: 오른쪽 9">
             <a:extLst>
               <a:ext uri="{FF2B5EF4-FFF2-40B4-BE49-F238E27FC236}">
-                <a16:creationId xmlns:a16="http://schemas.microsoft.com/office/drawing/2014/main" xmlns="" id="{46046C68-3A75-4D3C-9A83-C57AC575789E}"/>
+                <a16:creationId xmlns:a16="http://schemas.microsoft.com/office/drawing/2014/main" id="{46046C68-3A75-4D3C-9A83-C57AC575789E}"/>
               </a:ext>
             </a:extLst>
           </p:cNvPr>
@@ -8288,7 +8288,7 @@
           <p:cNvPr id="11" name="TextBox 10">
             <a:extLst>
               <a:ext uri="{FF2B5EF4-FFF2-40B4-BE49-F238E27FC236}">
-                <a16:creationId xmlns:a16="http://schemas.microsoft.com/office/drawing/2014/main" xmlns="" id="{6DD5F4B0-B32D-471C-A1A8-2D5C3E1C678D}"/>
+                <a16:creationId xmlns:a16="http://schemas.microsoft.com/office/drawing/2014/main" id="{6DD5F4B0-B32D-471C-A1A8-2D5C3E1C678D}"/>
               </a:ext>
             </a:extLst>
           </p:cNvPr>
@@ -8334,7 +8334,7 @@
           <p:cNvPr id="8" name="표 7">
             <a:extLst>
               <a:ext uri="{FF2B5EF4-FFF2-40B4-BE49-F238E27FC236}">
-                <a16:creationId xmlns:a16="http://schemas.microsoft.com/office/drawing/2014/main" xmlns="" id="{35368BA8-6475-4720-B005-F2CD1A00B897}"/>
+                <a16:creationId xmlns:a16="http://schemas.microsoft.com/office/drawing/2014/main" id="{35368BA8-6475-4720-B005-F2CD1A00B897}"/>
               </a:ext>
             </a:extLst>
           </p:cNvPr>
@@ -8363,42 +8363,42 @@
                 <a:gridCol w="1473961">
                   <a:extLst>
                     <a:ext uri="{9D8B030D-6E8A-4147-A177-3AD203B41FA5}">
-                      <a16:colId xmlns:a16="http://schemas.microsoft.com/office/drawing/2014/main" xmlns="" val="1398965542"/>
+                      <a16:colId xmlns:a16="http://schemas.microsoft.com/office/drawing/2014/main" val="1398965542"/>
                     </a:ext>
                   </a:extLst>
                 </a:gridCol>
                 <a:gridCol w="1473961">
                   <a:extLst>
                     <a:ext uri="{9D8B030D-6E8A-4147-A177-3AD203B41FA5}">
-                      <a16:colId xmlns:a16="http://schemas.microsoft.com/office/drawing/2014/main" xmlns="" val="1107982913"/>
+                      <a16:colId xmlns:a16="http://schemas.microsoft.com/office/drawing/2014/main" val="1107982913"/>
                     </a:ext>
                   </a:extLst>
                 </a:gridCol>
                 <a:gridCol w="1473961">
                   <a:extLst>
                     <a:ext uri="{9D8B030D-6E8A-4147-A177-3AD203B41FA5}">
-                      <a16:colId xmlns:a16="http://schemas.microsoft.com/office/drawing/2014/main" xmlns="" val="1543047607"/>
+                      <a16:colId xmlns:a16="http://schemas.microsoft.com/office/drawing/2014/main" val="1543047607"/>
                     </a:ext>
                   </a:extLst>
                 </a:gridCol>
                 <a:gridCol w="1473961">
                   <a:extLst>
                     <a:ext uri="{9D8B030D-6E8A-4147-A177-3AD203B41FA5}">
-                      <a16:colId xmlns:a16="http://schemas.microsoft.com/office/drawing/2014/main" xmlns="" val="409512791"/>
+                      <a16:colId xmlns:a16="http://schemas.microsoft.com/office/drawing/2014/main" val="409512791"/>
                     </a:ext>
                   </a:extLst>
                 </a:gridCol>
                 <a:gridCol w="1473961">
                   <a:extLst>
                     <a:ext uri="{9D8B030D-6E8A-4147-A177-3AD203B41FA5}">
-                      <a16:colId xmlns:a16="http://schemas.microsoft.com/office/drawing/2014/main" xmlns="" val="1718162129"/>
+                      <a16:colId xmlns:a16="http://schemas.microsoft.com/office/drawing/2014/main" val="1718162129"/>
                     </a:ext>
                   </a:extLst>
                 </a:gridCol>
                 <a:gridCol w="1473961">
                   <a:extLst>
                     <a:ext uri="{9D8B030D-6E8A-4147-A177-3AD203B41FA5}">
-                      <a16:colId xmlns:a16="http://schemas.microsoft.com/office/drawing/2014/main" xmlns="" val="2289427594"/>
+                      <a16:colId xmlns:a16="http://schemas.microsoft.com/office/drawing/2014/main" val="2289427594"/>
                     </a:ext>
                   </a:extLst>
                 </a:gridCol>
@@ -8498,7 +8498,7 @@
                 </a:tc>
                 <a:extLst>
                   <a:ext uri="{0D108BD9-81ED-4DB2-BD59-A6C34878D82A}">
-                    <a16:rowId xmlns:a16="http://schemas.microsoft.com/office/drawing/2014/main" xmlns="" val="4177027433"/>
+                    <a16:rowId xmlns:a16="http://schemas.microsoft.com/office/drawing/2014/main" val="4177027433"/>
                   </a:ext>
                 </a:extLst>
               </a:tr>
@@ -8636,7 +8636,7 @@
                 </a:tc>
                 <a:extLst>
                   <a:ext uri="{0D108BD9-81ED-4DB2-BD59-A6C34878D82A}">
-                    <a16:rowId xmlns:a16="http://schemas.microsoft.com/office/drawing/2014/main" xmlns="" val="456854664"/>
+                    <a16:rowId xmlns:a16="http://schemas.microsoft.com/office/drawing/2014/main" val="456854664"/>
                   </a:ext>
                 </a:extLst>
               </a:tr>
@@ -8775,7 +8775,7 @@
                 </a:tc>
                 <a:extLst>
                   <a:ext uri="{0D108BD9-81ED-4DB2-BD59-A6C34878D82A}">
-                    <a16:rowId xmlns:a16="http://schemas.microsoft.com/office/drawing/2014/main" xmlns="" val="2264763768"/>
+                    <a16:rowId xmlns:a16="http://schemas.microsoft.com/office/drawing/2014/main" val="2264763768"/>
                   </a:ext>
                 </a:extLst>
               </a:tr>
@@ -8788,7 +8788,7 @@
           <p:cNvPr id="12" name="TextBox 11">
             <a:extLst>
               <a:ext uri="{FF2B5EF4-FFF2-40B4-BE49-F238E27FC236}">
-                <a16:creationId xmlns:a16="http://schemas.microsoft.com/office/drawing/2014/main" xmlns="" id="{DC5AF152-5D8E-45AB-BC28-C9D7C0F55526}"/>
+                <a16:creationId xmlns:a16="http://schemas.microsoft.com/office/drawing/2014/main" id="{DC5AF152-5D8E-45AB-BC28-C9D7C0F55526}"/>
               </a:ext>
             </a:extLst>
           </p:cNvPr>
@@ -8834,7 +8834,7 @@
           <p:cNvPr id="13" name="TextBox 12">
             <a:extLst>
               <a:ext uri="{FF2B5EF4-FFF2-40B4-BE49-F238E27FC236}">
-                <a16:creationId xmlns:a16="http://schemas.microsoft.com/office/drawing/2014/main" xmlns="" id="{45A0CC32-7853-424C-BF17-79DECF1DD7B9}"/>
+                <a16:creationId xmlns:a16="http://schemas.microsoft.com/office/drawing/2014/main" id="{45A0CC32-7853-424C-BF17-79DECF1DD7B9}"/>
               </a:ext>
             </a:extLst>
           </p:cNvPr>
@@ -8880,7 +8880,7 @@
           <p:cNvPr id="2" name="슬라이드 번호 개체 틀 1">
             <a:extLst>
               <a:ext uri="{FF2B5EF4-FFF2-40B4-BE49-F238E27FC236}">
-                <a16:creationId xmlns:a16="http://schemas.microsoft.com/office/drawing/2014/main" xmlns="" id="{E744C402-463F-425F-B0F0-6F40A99CC785}"/>
+                <a16:creationId xmlns:a16="http://schemas.microsoft.com/office/drawing/2014/main" id="{E744C402-463F-425F-B0F0-6F40A99CC785}"/>
               </a:ext>
             </a:extLst>
           </p:cNvPr>
@@ -9180,7 +9180,7 @@
           <p:cNvPr id="64" name="그래픽 80" descr="남자">
             <a:extLst>
               <a:ext uri="{FF2B5EF4-FFF2-40B4-BE49-F238E27FC236}">
-                <a16:creationId xmlns:a16="http://schemas.microsoft.com/office/drawing/2014/main" xmlns="" id="{5FB202F3-34EF-4D58-956C-04AC564FA09A}"/>
+                <a16:creationId xmlns:a16="http://schemas.microsoft.com/office/drawing/2014/main" id="{5FB202F3-34EF-4D58-956C-04AC564FA09A}"/>
               </a:ext>
             </a:extLst>
           </p:cNvPr>
@@ -9196,7 +9196,7 @@
                 <a14:useLocalDpi xmlns:a14="http://schemas.microsoft.com/office/drawing/2010/main" val="0"/>
               </a:ext>
               <a:ext uri="{96DAC541-7B7A-43D3-8B79-37D633B846F1}">
-                <asvg:svgBlip xmlns:asvg="http://schemas.microsoft.com/office/drawing/2016/SVG/main" xmlns="" r:embed="rId5"/>
+                <asvg:svgBlip xmlns:asvg="http://schemas.microsoft.com/office/drawing/2016/SVG/main" r:embed="rId5"/>
               </a:ext>
             </a:extLst>
           </a:blip>
@@ -9219,7 +9219,7 @@
           <p:cNvPr id="65" name="그림 64">
             <a:extLst>
               <a:ext uri="{FF2B5EF4-FFF2-40B4-BE49-F238E27FC236}">
-                <a16:creationId xmlns:a16="http://schemas.microsoft.com/office/drawing/2014/main" xmlns="" id="{F31240CD-C4FB-4C93-A25E-841126A0F06E}"/>
+                <a16:creationId xmlns:a16="http://schemas.microsoft.com/office/drawing/2014/main" id="{F31240CD-C4FB-4C93-A25E-841126A0F06E}"/>
               </a:ext>
             </a:extLst>
           </p:cNvPr>
@@ -9255,7 +9255,7 @@
           <p:cNvPr id="66" name="그림 65">
             <a:extLst>
               <a:ext uri="{FF2B5EF4-FFF2-40B4-BE49-F238E27FC236}">
-                <a16:creationId xmlns:a16="http://schemas.microsoft.com/office/drawing/2014/main" xmlns="" id="{D5111546-29D2-4169-8AB4-78B2C1CB9E8E}"/>
+                <a16:creationId xmlns:a16="http://schemas.microsoft.com/office/drawing/2014/main" id="{D5111546-29D2-4169-8AB4-78B2C1CB9E8E}"/>
               </a:ext>
             </a:extLst>
           </p:cNvPr>
@@ -9291,7 +9291,7 @@
           <p:cNvPr id="67" name="그림 66">
             <a:extLst>
               <a:ext uri="{FF2B5EF4-FFF2-40B4-BE49-F238E27FC236}">
-                <a16:creationId xmlns:a16="http://schemas.microsoft.com/office/drawing/2014/main" xmlns="" id="{A322A947-0AC9-4638-81A2-CCA68D3B1C27}"/>
+                <a16:creationId xmlns:a16="http://schemas.microsoft.com/office/drawing/2014/main" id="{A322A947-0AC9-4638-81A2-CCA68D3B1C27}"/>
               </a:ext>
             </a:extLst>
           </p:cNvPr>
@@ -9327,7 +9327,7 @@
           <p:cNvPr id="74" name="TextBox 73">
             <a:extLst>
               <a:ext uri="{FF2B5EF4-FFF2-40B4-BE49-F238E27FC236}">
-                <a16:creationId xmlns:a16="http://schemas.microsoft.com/office/drawing/2014/main" xmlns="" id="{3A0315C1-30AC-48A4-937B-5C244FCA7138}"/>
+                <a16:creationId xmlns:a16="http://schemas.microsoft.com/office/drawing/2014/main" id="{3A0315C1-30AC-48A4-937B-5C244FCA7138}"/>
               </a:ext>
             </a:extLst>
           </p:cNvPr>
@@ -9392,7 +9392,7 @@
           <p:cNvPr id="75" name="TextBox 74">
             <a:extLst>
               <a:ext uri="{FF2B5EF4-FFF2-40B4-BE49-F238E27FC236}">
-                <a16:creationId xmlns:a16="http://schemas.microsoft.com/office/drawing/2014/main" xmlns="" id="{3A0315C1-30AC-48A4-937B-5C244FCA7138}"/>
+                <a16:creationId xmlns:a16="http://schemas.microsoft.com/office/drawing/2014/main" id="{3A0315C1-30AC-48A4-937B-5C244FCA7138}"/>
               </a:ext>
             </a:extLst>
           </p:cNvPr>
@@ -9471,7 +9471,7 @@
           <p:cNvPr id="76" name="TextBox 75">
             <a:extLst>
               <a:ext uri="{FF2B5EF4-FFF2-40B4-BE49-F238E27FC236}">
-                <a16:creationId xmlns:a16="http://schemas.microsoft.com/office/drawing/2014/main" xmlns="" id="{3A0315C1-30AC-48A4-937B-5C244FCA7138}"/>
+                <a16:creationId xmlns:a16="http://schemas.microsoft.com/office/drawing/2014/main" id="{3A0315C1-30AC-48A4-937B-5C244FCA7138}"/>
               </a:ext>
             </a:extLst>
           </p:cNvPr>
@@ -9550,7 +9550,7 @@
           <p:cNvPr id="77" name="TextBox 76">
             <a:extLst>
               <a:ext uri="{FF2B5EF4-FFF2-40B4-BE49-F238E27FC236}">
-                <a16:creationId xmlns:a16="http://schemas.microsoft.com/office/drawing/2014/main" xmlns="" id="{3A0315C1-30AC-48A4-937B-5C244FCA7138}"/>
+                <a16:creationId xmlns:a16="http://schemas.microsoft.com/office/drawing/2014/main" id="{3A0315C1-30AC-48A4-937B-5C244FCA7138}"/>
               </a:ext>
             </a:extLst>
           </p:cNvPr>
@@ -9629,7 +9629,7 @@
           <p:cNvPr id="80" name="그림 79">
             <a:extLst>
               <a:ext uri="{FF2B5EF4-FFF2-40B4-BE49-F238E27FC236}">
-                <a16:creationId xmlns:a16="http://schemas.microsoft.com/office/drawing/2014/main" xmlns="" id="{90164F1A-86AD-4D67-888A-2DC3A89BD57D}"/>
+                <a16:creationId xmlns:a16="http://schemas.microsoft.com/office/drawing/2014/main" id="{90164F1A-86AD-4D67-888A-2DC3A89BD57D}"/>
               </a:ext>
             </a:extLst>
           </p:cNvPr>
@@ -9665,7 +9665,7 @@
           <p:cNvPr id="81" name="TextBox 80">
             <a:extLst>
               <a:ext uri="{FF2B5EF4-FFF2-40B4-BE49-F238E27FC236}">
-                <a16:creationId xmlns:a16="http://schemas.microsoft.com/office/drawing/2014/main" xmlns="" id="{3A0315C1-30AC-48A4-937B-5C244FCA7138}"/>
+                <a16:creationId xmlns:a16="http://schemas.microsoft.com/office/drawing/2014/main" id="{3A0315C1-30AC-48A4-937B-5C244FCA7138}"/>
               </a:ext>
             </a:extLst>
           </p:cNvPr>
@@ -9744,7 +9744,7 @@
           <p:cNvPr id="88" name="그림 87">
             <a:extLst>
               <a:ext uri="{FF2B5EF4-FFF2-40B4-BE49-F238E27FC236}">
-                <a16:creationId xmlns:a16="http://schemas.microsoft.com/office/drawing/2014/main" xmlns="" id="{130B19F0-CA03-4BDA-A561-EFF3292EE9C7}"/>
+                <a16:creationId xmlns:a16="http://schemas.microsoft.com/office/drawing/2014/main" id="{130B19F0-CA03-4BDA-A561-EFF3292EE9C7}"/>
               </a:ext>
             </a:extLst>
           </p:cNvPr>
@@ -9780,7 +9780,7 @@
           <p:cNvPr id="90" name="TextBox 89">
             <a:extLst>
               <a:ext uri="{FF2B5EF4-FFF2-40B4-BE49-F238E27FC236}">
-                <a16:creationId xmlns:a16="http://schemas.microsoft.com/office/drawing/2014/main" xmlns="" id="{3A0315C1-30AC-48A4-937B-5C244FCA7138}"/>
+                <a16:creationId xmlns:a16="http://schemas.microsoft.com/office/drawing/2014/main" id="{3A0315C1-30AC-48A4-937B-5C244FCA7138}"/>
               </a:ext>
             </a:extLst>
           </p:cNvPr>
@@ -9876,7 +9876,7 @@
           <p:cNvPr id="106" name="그림 105">
             <a:extLst>
               <a:ext uri="{FF2B5EF4-FFF2-40B4-BE49-F238E27FC236}">
-                <a16:creationId xmlns:a16="http://schemas.microsoft.com/office/drawing/2014/main" xmlns="" id="{C7B87DDD-5997-42A3-9959-39669F021407}"/>
+                <a16:creationId xmlns:a16="http://schemas.microsoft.com/office/drawing/2014/main" id="{C7B87DDD-5997-42A3-9959-39669F021407}"/>
               </a:ext>
             </a:extLst>
           </p:cNvPr>
@@ -9912,7 +9912,7 @@
           <p:cNvPr id="110" name="TextBox 109">
             <a:extLst>
               <a:ext uri="{FF2B5EF4-FFF2-40B4-BE49-F238E27FC236}">
-                <a16:creationId xmlns:a16="http://schemas.microsoft.com/office/drawing/2014/main" xmlns="" id="{3A0315C1-30AC-48A4-937B-5C244FCA7138}"/>
+                <a16:creationId xmlns:a16="http://schemas.microsoft.com/office/drawing/2014/main" id="{3A0315C1-30AC-48A4-937B-5C244FCA7138}"/>
               </a:ext>
             </a:extLst>
           </p:cNvPr>
@@ -10036,7 +10036,7 @@
           <p:cNvPr id="112" name="TextBox 111">
             <a:extLst>
               <a:ext uri="{FF2B5EF4-FFF2-40B4-BE49-F238E27FC236}">
-                <a16:creationId xmlns:a16="http://schemas.microsoft.com/office/drawing/2014/main" xmlns="" id="{3A0315C1-30AC-48A4-937B-5C244FCA7138}"/>
+                <a16:creationId xmlns:a16="http://schemas.microsoft.com/office/drawing/2014/main" id="{3A0315C1-30AC-48A4-937B-5C244FCA7138}"/>
               </a:ext>
             </a:extLst>
           </p:cNvPr>
@@ -10115,7 +10115,7 @@
           <p:cNvPr id="3" name="그룹 2">
             <a:extLst>
               <a:ext uri="{FF2B5EF4-FFF2-40B4-BE49-F238E27FC236}">
-                <a16:creationId xmlns:a16="http://schemas.microsoft.com/office/drawing/2014/main" xmlns="" id="{64FC3447-40B9-4255-A1C7-7C0E7FAE9253}"/>
+                <a16:creationId xmlns:a16="http://schemas.microsoft.com/office/drawing/2014/main" id="{64FC3447-40B9-4255-A1C7-7C0E7FAE9253}"/>
               </a:ext>
             </a:extLst>
           </p:cNvPr>
@@ -10135,7 +10135,7 @@
             <p:cNvPr id="68" name="화살표: 오른쪽 68">
               <a:extLst>
                 <a:ext uri="{FF2B5EF4-FFF2-40B4-BE49-F238E27FC236}">
-                  <a16:creationId xmlns:a16="http://schemas.microsoft.com/office/drawing/2014/main" xmlns="" id="{6726F422-B710-4026-94E8-E32FBC30D751}"/>
+                  <a16:creationId xmlns:a16="http://schemas.microsoft.com/office/drawing/2014/main" id="{6726F422-B710-4026-94E8-E32FBC30D751}"/>
                 </a:ext>
               </a:extLst>
             </p:cNvPr>
@@ -10213,7 +10213,7 @@
             <p:cNvPr id="72" name="화살표: 오른쪽 68">
               <a:extLst>
                 <a:ext uri="{FF2B5EF4-FFF2-40B4-BE49-F238E27FC236}">
-                  <a16:creationId xmlns:a16="http://schemas.microsoft.com/office/drawing/2014/main" xmlns="" id="{6726F422-B710-4026-94E8-E32FBC30D751}"/>
+                  <a16:creationId xmlns:a16="http://schemas.microsoft.com/office/drawing/2014/main" id="{6726F422-B710-4026-94E8-E32FBC30D751}"/>
                 </a:ext>
               </a:extLst>
             </p:cNvPr>
@@ -10291,7 +10291,7 @@
             <p:cNvPr id="78" name="화살표: 오른쪽 68">
               <a:extLst>
                 <a:ext uri="{FF2B5EF4-FFF2-40B4-BE49-F238E27FC236}">
-                  <a16:creationId xmlns:a16="http://schemas.microsoft.com/office/drawing/2014/main" xmlns="" id="{6726F422-B710-4026-94E8-E32FBC30D751}"/>
+                  <a16:creationId xmlns:a16="http://schemas.microsoft.com/office/drawing/2014/main" id="{6726F422-B710-4026-94E8-E32FBC30D751}"/>
                 </a:ext>
               </a:extLst>
             </p:cNvPr>
@@ -10369,7 +10369,7 @@
             <p:cNvPr id="113" name="화살표: 오른쪽 68">
               <a:extLst>
                 <a:ext uri="{FF2B5EF4-FFF2-40B4-BE49-F238E27FC236}">
-                  <a16:creationId xmlns:a16="http://schemas.microsoft.com/office/drawing/2014/main" xmlns="" id="{6726F422-B710-4026-94E8-E32FBC30D751}"/>
+                  <a16:creationId xmlns:a16="http://schemas.microsoft.com/office/drawing/2014/main" id="{6726F422-B710-4026-94E8-E32FBC30D751}"/>
                 </a:ext>
               </a:extLst>
             </p:cNvPr>
@@ -10447,7 +10447,7 @@
             <p:cNvPr id="114" name="화살표: 오른쪽 68">
               <a:extLst>
                 <a:ext uri="{FF2B5EF4-FFF2-40B4-BE49-F238E27FC236}">
-                  <a16:creationId xmlns:a16="http://schemas.microsoft.com/office/drawing/2014/main" xmlns="" id="{6726F422-B710-4026-94E8-E32FBC30D751}"/>
+                  <a16:creationId xmlns:a16="http://schemas.microsoft.com/office/drawing/2014/main" id="{6726F422-B710-4026-94E8-E32FBC30D751}"/>
                 </a:ext>
               </a:extLst>
             </p:cNvPr>
@@ -10560,7 +10560,7 @@
           <p:cNvPr id="116" name="TextBox 115">
             <a:extLst>
               <a:ext uri="{FF2B5EF4-FFF2-40B4-BE49-F238E27FC236}">
-                <a16:creationId xmlns:a16="http://schemas.microsoft.com/office/drawing/2014/main" xmlns="" id="{3A0315C1-30AC-48A4-937B-5C244FCA7138}"/>
+                <a16:creationId xmlns:a16="http://schemas.microsoft.com/office/drawing/2014/main" id="{3A0315C1-30AC-48A4-937B-5C244FCA7138}"/>
               </a:ext>
             </a:extLst>
           </p:cNvPr>
@@ -10673,7 +10673,7 @@
           <p:cNvPr id="79" name="화살표: 오른쪽 68">
             <a:extLst>
               <a:ext uri="{FF2B5EF4-FFF2-40B4-BE49-F238E27FC236}">
-                <a16:creationId xmlns:a16="http://schemas.microsoft.com/office/drawing/2014/main" xmlns="" id="{6726F422-B710-4026-94E8-E32FBC30D751}"/>
+                <a16:creationId xmlns:a16="http://schemas.microsoft.com/office/drawing/2014/main" id="{6726F422-B710-4026-94E8-E32FBC30D751}"/>
               </a:ext>
             </a:extLst>
           </p:cNvPr>
@@ -10751,7 +10751,7 @@
           <p:cNvPr id="84" name="화살표: 오른쪽 68">
             <a:extLst>
               <a:ext uri="{FF2B5EF4-FFF2-40B4-BE49-F238E27FC236}">
-                <a16:creationId xmlns:a16="http://schemas.microsoft.com/office/drawing/2014/main" xmlns="" id="{6726F422-B710-4026-94E8-E32FBC30D751}"/>
+                <a16:creationId xmlns:a16="http://schemas.microsoft.com/office/drawing/2014/main" id="{6726F422-B710-4026-94E8-E32FBC30D751}"/>
               </a:ext>
             </a:extLst>
           </p:cNvPr>
@@ -10829,7 +10829,7 @@
           <p:cNvPr id="107" name="화살표: 오른쪽 68">
             <a:extLst>
               <a:ext uri="{FF2B5EF4-FFF2-40B4-BE49-F238E27FC236}">
-                <a16:creationId xmlns:a16="http://schemas.microsoft.com/office/drawing/2014/main" xmlns="" id="{6726F422-B710-4026-94E8-E32FBC30D751}"/>
+                <a16:creationId xmlns:a16="http://schemas.microsoft.com/office/drawing/2014/main" id="{6726F422-B710-4026-94E8-E32FBC30D751}"/>
               </a:ext>
             </a:extLst>
           </p:cNvPr>
@@ -10937,7 +10937,7 @@
           <p:cNvPr id="2" name="슬라이드 번호 개체 틀 1">
             <a:extLst>
               <a:ext uri="{FF2B5EF4-FFF2-40B4-BE49-F238E27FC236}">
-                <a16:creationId xmlns:a16="http://schemas.microsoft.com/office/drawing/2014/main" xmlns="" id="{AC8F9171-72ED-4349-B320-1DB200D46692}"/>
+                <a16:creationId xmlns:a16="http://schemas.microsoft.com/office/drawing/2014/main" id="{AC8F9171-72ED-4349-B320-1DB200D46692}"/>
               </a:ext>
             </a:extLst>
           </p:cNvPr>
@@ -10966,7 +10966,7 @@
           <p:cNvPr id="3" name="Text Box 22">
             <a:extLst>
               <a:ext uri="{FF2B5EF4-FFF2-40B4-BE49-F238E27FC236}">
-                <a16:creationId xmlns:a16="http://schemas.microsoft.com/office/drawing/2014/main" xmlns="" id="{7D94873B-24C5-4438-AB9F-D817691F2242}"/>
+                <a16:creationId xmlns:a16="http://schemas.microsoft.com/office/drawing/2014/main" id="{7D94873B-24C5-4438-AB9F-D817691F2242}"/>
               </a:ext>
             </a:extLst>
           </p:cNvPr>
@@ -11213,7 +11213,7 @@
           <p:cNvPr id="4" name="TextBox 3">
             <a:extLst>
               <a:ext uri="{FF2B5EF4-FFF2-40B4-BE49-F238E27FC236}">
-                <a16:creationId xmlns:a16="http://schemas.microsoft.com/office/drawing/2014/main" xmlns="" id="{A1090493-8069-405D-ACE1-671356218977}"/>
+                <a16:creationId xmlns:a16="http://schemas.microsoft.com/office/drawing/2014/main" id="{A1090493-8069-405D-ACE1-671356218977}"/>
               </a:ext>
             </a:extLst>
           </p:cNvPr>
@@ -11278,7 +11278,7 @@
           <p:cNvPr id="5" name="TextBox 4">
             <a:extLst>
               <a:ext uri="{FF2B5EF4-FFF2-40B4-BE49-F238E27FC236}">
-                <a16:creationId xmlns:a16="http://schemas.microsoft.com/office/drawing/2014/main" xmlns="" id="{774A0DB3-0595-4940-A1FE-C37DD3916AF5}"/>
+                <a16:creationId xmlns:a16="http://schemas.microsoft.com/office/drawing/2014/main" id="{774A0DB3-0595-4940-A1FE-C37DD3916AF5}"/>
               </a:ext>
             </a:extLst>
           </p:cNvPr>
@@ -11343,7 +11343,7 @@
           <p:cNvPr id="6" name="그래픽 5" descr="모임">
             <a:extLst>
               <a:ext uri="{FF2B5EF4-FFF2-40B4-BE49-F238E27FC236}">
-                <a16:creationId xmlns:a16="http://schemas.microsoft.com/office/drawing/2014/main" xmlns="" id="{24ECDF70-712C-434A-B635-02F491480BB7}"/>
+                <a16:creationId xmlns:a16="http://schemas.microsoft.com/office/drawing/2014/main" id="{24ECDF70-712C-434A-B635-02F491480BB7}"/>
               </a:ext>
             </a:extLst>
           </p:cNvPr>
@@ -11359,7 +11359,7 @@
                 <a14:useLocalDpi xmlns:a14="http://schemas.microsoft.com/office/drawing/2010/main" val="0"/>
               </a:ext>
               <a:ext uri="{96DAC541-7B7A-43D3-8B79-37D633B846F1}">
-                <asvg:svgBlip xmlns:asvg="http://schemas.microsoft.com/office/drawing/2016/SVG/main" xmlns="" r:embed="rId3"/>
+                <asvg:svgBlip xmlns:asvg="http://schemas.microsoft.com/office/drawing/2016/SVG/main" r:embed="rId3"/>
               </a:ext>
             </a:extLst>
           </a:blip>
@@ -11382,7 +11382,7 @@
           <p:cNvPr id="7" name="그룹 6">
             <a:extLst>
               <a:ext uri="{FF2B5EF4-FFF2-40B4-BE49-F238E27FC236}">
-                <a16:creationId xmlns:a16="http://schemas.microsoft.com/office/drawing/2014/main" xmlns="" id="{F792FE34-9DC4-4B76-8E29-6CC8861A4253}"/>
+                <a16:creationId xmlns:a16="http://schemas.microsoft.com/office/drawing/2014/main" id="{F792FE34-9DC4-4B76-8E29-6CC8861A4253}"/>
               </a:ext>
             </a:extLst>
           </p:cNvPr>
@@ -11402,7 +11402,7 @@
             <p:cNvPr id="8" name="그래픽 7" descr="남자">
               <a:extLst>
                 <a:ext uri="{FF2B5EF4-FFF2-40B4-BE49-F238E27FC236}">
-                  <a16:creationId xmlns:a16="http://schemas.microsoft.com/office/drawing/2014/main" xmlns="" id="{4D6213DB-471A-456D-A548-2DC2FC0B65AB}"/>
+                  <a16:creationId xmlns:a16="http://schemas.microsoft.com/office/drawing/2014/main" id="{4D6213DB-471A-456D-A548-2DC2FC0B65AB}"/>
                 </a:ext>
               </a:extLst>
             </p:cNvPr>
@@ -11418,7 +11418,7 @@
                   <a14:useLocalDpi xmlns:a14="http://schemas.microsoft.com/office/drawing/2010/main" val="0"/>
                 </a:ext>
                 <a:ext uri="{96DAC541-7B7A-43D3-8B79-37D633B846F1}">
-                  <asvg:svgBlip xmlns:asvg="http://schemas.microsoft.com/office/drawing/2016/SVG/main" xmlns="" r:embed="rId5"/>
+                  <asvg:svgBlip xmlns:asvg="http://schemas.microsoft.com/office/drawing/2016/SVG/main" r:embed="rId5"/>
                 </a:ext>
               </a:extLst>
             </a:blip>
@@ -11441,7 +11441,7 @@
             <p:cNvPr id="9" name="그래픽 8" descr="단일 톱니바퀴">
               <a:extLst>
                 <a:ext uri="{FF2B5EF4-FFF2-40B4-BE49-F238E27FC236}">
-                  <a16:creationId xmlns:a16="http://schemas.microsoft.com/office/drawing/2014/main" xmlns="" id="{33EA0681-C96D-45B1-B5FC-52CAE4E62E12}"/>
+                  <a16:creationId xmlns:a16="http://schemas.microsoft.com/office/drawing/2014/main" id="{33EA0681-C96D-45B1-B5FC-52CAE4E62E12}"/>
                 </a:ext>
               </a:extLst>
             </p:cNvPr>
@@ -11457,7 +11457,7 @@
                   <a14:useLocalDpi xmlns:a14="http://schemas.microsoft.com/office/drawing/2010/main" val="0"/>
                 </a:ext>
                 <a:ext uri="{96DAC541-7B7A-43D3-8B79-37D633B846F1}">
-                  <asvg:svgBlip xmlns:asvg="http://schemas.microsoft.com/office/drawing/2016/SVG/main" xmlns="" r:embed="rId7"/>
+                  <asvg:svgBlip xmlns:asvg="http://schemas.microsoft.com/office/drawing/2016/SVG/main" r:embed="rId7"/>
                 </a:ext>
               </a:extLst>
             </a:blip>
@@ -11481,7 +11481,7 @@
           <p:cNvPr id="10" name="화살표: 오른쪽 9">
             <a:extLst>
               <a:ext uri="{FF2B5EF4-FFF2-40B4-BE49-F238E27FC236}">
-                <a16:creationId xmlns:a16="http://schemas.microsoft.com/office/drawing/2014/main" xmlns="" id="{7AD31498-F3FC-4596-B8A1-C42ED18F65F7}"/>
+                <a16:creationId xmlns:a16="http://schemas.microsoft.com/office/drawing/2014/main" id="{7AD31498-F3FC-4596-B8A1-C42ED18F65F7}"/>
               </a:ext>
             </a:extLst>
           </p:cNvPr>
@@ -11559,7 +11559,7 @@
           <p:cNvPr id="12" name="그래픽 11" descr="자물쇠">
             <a:extLst>
               <a:ext uri="{FF2B5EF4-FFF2-40B4-BE49-F238E27FC236}">
-                <a16:creationId xmlns:a16="http://schemas.microsoft.com/office/drawing/2014/main" xmlns="" id="{2BC601A0-4B26-40F8-A856-83C8C0F16800}"/>
+                <a16:creationId xmlns:a16="http://schemas.microsoft.com/office/drawing/2014/main" id="{2BC601A0-4B26-40F8-A856-83C8C0F16800}"/>
               </a:ext>
             </a:extLst>
           </p:cNvPr>
@@ -11575,7 +11575,7 @@
                 <a14:useLocalDpi xmlns:a14="http://schemas.microsoft.com/office/drawing/2010/main" val="0"/>
               </a:ext>
               <a:ext uri="{96DAC541-7B7A-43D3-8B79-37D633B846F1}">
-                <asvg:svgBlip xmlns:asvg="http://schemas.microsoft.com/office/drawing/2016/SVG/main" xmlns="" r:embed="rId9"/>
+                <asvg:svgBlip xmlns:asvg="http://schemas.microsoft.com/office/drawing/2016/SVG/main" r:embed="rId9"/>
               </a:ext>
             </a:extLst>
           </a:blip>
@@ -11598,7 +11598,7 @@
           <p:cNvPr id="13" name="TextBox 12">
             <a:extLst>
               <a:ext uri="{FF2B5EF4-FFF2-40B4-BE49-F238E27FC236}">
-                <a16:creationId xmlns:a16="http://schemas.microsoft.com/office/drawing/2014/main" xmlns="" id="{5CDDDA56-5FA4-4286-A0E6-33BCF593C1E4}"/>
+                <a16:creationId xmlns:a16="http://schemas.microsoft.com/office/drawing/2014/main" id="{5CDDDA56-5FA4-4286-A0E6-33BCF593C1E4}"/>
               </a:ext>
             </a:extLst>
           </p:cNvPr>
@@ -11663,7 +11663,7 @@
           <p:cNvPr id="14" name="그래픽 13" descr="점검 목록">
             <a:extLst>
               <a:ext uri="{FF2B5EF4-FFF2-40B4-BE49-F238E27FC236}">
-                <a16:creationId xmlns:a16="http://schemas.microsoft.com/office/drawing/2014/main" xmlns="" id="{4F0A9F5F-0C3E-48C4-8A50-68CFA1E927CF}"/>
+                <a16:creationId xmlns:a16="http://schemas.microsoft.com/office/drawing/2014/main" id="{4F0A9F5F-0C3E-48C4-8A50-68CFA1E927CF}"/>
               </a:ext>
             </a:extLst>
           </p:cNvPr>
@@ -11679,7 +11679,7 @@
                 <a14:useLocalDpi xmlns:a14="http://schemas.microsoft.com/office/drawing/2010/main" val="0"/>
               </a:ext>
               <a:ext uri="{96DAC541-7B7A-43D3-8B79-37D633B846F1}">
-                <asvg:svgBlip xmlns:asvg="http://schemas.microsoft.com/office/drawing/2016/SVG/main" xmlns="" r:embed="rId11"/>
+                <asvg:svgBlip xmlns:asvg="http://schemas.microsoft.com/office/drawing/2016/SVG/main" r:embed="rId11"/>
               </a:ext>
             </a:extLst>
           </a:blip>
@@ -11702,7 +11702,7 @@
           <p:cNvPr id="15" name="TextBox 14">
             <a:extLst>
               <a:ext uri="{FF2B5EF4-FFF2-40B4-BE49-F238E27FC236}">
-                <a16:creationId xmlns:a16="http://schemas.microsoft.com/office/drawing/2014/main" xmlns="" id="{5261587E-611C-4744-9AEF-0AB22502446C}"/>
+                <a16:creationId xmlns:a16="http://schemas.microsoft.com/office/drawing/2014/main" id="{5261587E-611C-4744-9AEF-0AB22502446C}"/>
               </a:ext>
             </a:extLst>
           </p:cNvPr>
@@ -11767,7 +11767,7 @@
           <p:cNvPr id="16" name="그래픽 15" descr="태그">
             <a:extLst>
               <a:ext uri="{FF2B5EF4-FFF2-40B4-BE49-F238E27FC236}">
-                <a16:creationId xmlns:a16="http://schemas.microsoft.com/office/drawing/2014/main" xmlns="" id="{FD44A81C-7540-4B91-ADDD-6E11BCBEC19F}"/>
+                <a16:creationId xmlns:a16="http://schemas.microsoft.com/office/drawing/2014/main" id="{FD44A81C-7540-4B91-ADDD-6E11BCBEC19F}"/>
               </a:ext>
             </a:extLst>
           </p:cNvPr>
@@ -11783,7 +11783,7 @@
                 <a14:useLocalDpi xmlns:a14="http://schemas.microsoft.com/office/drawing/2010/main" val="0"/>
               </a:ext>
               <a:ext uri="{96DAC541-7B7A-43D3-8B79-37D633B846F1}">
-                <asvg:svgBlip xmlns:asvg="http://schemas.microsoft.com/office/drawing/2016/SVG/main" xmlns="" r:embed="rId13"/>
+                <asvg:svgBlip xmlns:asvg="http://schemas.microsoft.com/office/drawing/2016/SVG/main" r:embed="rId13"/>
               </a:ext>
             </a:extLst>
           </a:blip>
@@ -11806,7 +11806,7 @@
           <p:cNvPr id="17" name="TextBox 16">
             <a:extLst>
               <a:ext uri="{FF2B5EF4-FFF2-40B4-BE49-F238E27FC236}">
-                <a16:creationId xmlns:a16="http://schemas.microsoft.com/office/drawing/2014/main" xmlns="" id="{758439FE-593D-469A-B205-683DC7BB4337}"/>
+                <a16:creationId xmlns:a16="http://schemas.microsoft.com/office/drawing/2014/main" id="{758439FE-593D-469A-B205-683DC7BB4337}"/>
               </a:ext>
             </a:extLst>
           </p:cNvPr>
@@ -11871,7 +11871,7 @@
           <p:cNvPr id="18" name="그래픽 17" descr="목록">
             <a:extLst>
               <a:ext uri="{FF2B5EF4-FFF2-40B4-BE49-F238E27FC236}">
-                <a16:creationId xmlns:a16="http://schemas.microsoft.com/office/drawing/2014/main" xmlns="" id="{869C2CF7-7A11-4024-BD0C-B3EA4C40DDB7}"/>
+                <a16:creationId xmlns:a16="http://schemas.microsoft.com/office/drawing/2014/main" id="{869C2CF7-7A11-4024-BD0C-B3EA4C40DDB7}"/>
               </a:ext>
             </a:extLst>
           </p:cNvPr>
@@ -11887,7 +11887,7 @@
                 <a14:useLocalDpi xmlns:a14="http://schemas.microsoft.com/office/drawing/2010/main" val="0"/>
               </a:ext>
               <a:ext uri="{96DAC541-7B7A-43D3-8B79-37D633B846F1}">
-                <asvg:svgBlip xmlns:asvg="http://schemas.microsoft.com/office/drawing/2016/SVG/main" xmlns="" r:embed="rId15"/>
+                <asvg:svgBlip xmlns:asvg="http://schemas.microsoft.com/office/drawing/2016/SVG/main" r:embed="rId15"/>
               </a:ext>
             </a:extLst>
           </a:blip>
@@ -11910,7 +11910,7 @@
           <p:cNvPr id="19" name="TextBox 18">
             <a:extLst>
               <a:ext uri="{FF2B5EF4-FFF2-40B4-BE49-F238E27FC236}">
-                <a16:creationId xmlns:a16="http://schemas.microsoft.com/office/drawing/2014/main" xmlns="" id="{97CF7450-0719-449E-8908-A5A10BBDE73B}"/>
+                <a16:creationId xmlns:a16="http://schemas.microsoft.com/office/drawing/2014/main" id="{97CF7450-0719-449E-8908-A5A10BBDE73B}"/>
               </a:ext>
             </a:extLst>
           </p:cNvPr>
@@ -11975,7 +11975,7 @@
           <p:cNvPr id="20" name="그래픽 19" descr="프로세서">
             <a:extLst>
               <a:ext uri="{FF2B5EF4-FFF2-40B4-BE49-F238E27FC236}">
-                <a16:creationId xmlns:a16="http://schemas.microsoft.com/office/drawing/2014/main" xmlns="" id="{DE714BD5-96FF-4398-A365-F0A9D518AB57}"/>
+                <a16:creationId xmlns:a16="http://schemas.microsoft.com/office/drawing/2014/main" id="{DE714BD5-96FF-4398-A365-F0A9D518AB57}"/>
               </a:ext>
             </a:extLst>
           </p:cNvPr>
@@ -11991,7 +11991,7 @@
                 <a14:useLocalDpi xmlns:a14="http://schemas.microsoft.com/office/drawing/2010/main" val="0"/>
               </a:ext>
               <a:ext uri="{96DAC541-7B7A-43D3-8B79-37D633B846F1}">
-                <asvg:svgBlip xmlns:asvg="http://schemas.microsoft.com/office/drawing/2016/SVG/main" xmlns="" r:embed="rId17"/>
+                <asvg:svgBlip xmlns:asvg="http://schemas.microsoft.com/office/drawing/2016/SVG/main" r:embed="rId17"/>
               </a:ext>
             </a:extLst>
           </a:blip>
@@ -12014,7 +12014,7 @@
           <p:cNvPr id="21" name="TextBox 20">
             <a:extLst>
               <a:ext uri="{FF2B5EF4-FFF2-40B4-BE49-F238E27FC236}">
-                <a16:creationId xmlns:a16="http://schemas.microsoft.com/office/drawing/2014/main" xmlns="" id="{364B033F-00CD-4940-B58F-B8BF085E9158}"/>
+                <a16:creationId xmlns:a16="http://schemas.microsoft.com/office/drawing/2014/main" id="{364B033F-00CD-4940-B58F-B8BF085E9158}"/>
               </a:ext>
             </a:extLst>
           </p:cNvPr>
@@ -12079,7 +12079,7 @@
           <p:cNvPr id="22" name="그래픽 21" descr="돋보기">
             <a:extLst>
               <a:ext uri="{FF2B5EF4-FFF2-40B4-BE49-F238E27FC236}">
-                <a16:creationId xmlns:a16="http://schemas.microsoft.com/office/drawing/2014/main" xmlns="" id="{C735FD78-6EE5-4A26-A89F-63CF623497ED}"/>
+                <a16:creationId xmlns:a16="http://schemas.microsoft.com/office/drawing/2014/main" id="{C735FD78-6EE5-4A26-A89F-63CF623497ED}"/>
               </a:ext>
             </a:extLst>
           </p:cNvPr>
@@ -12095,7 +12095,7 @@
                 <a14:useLocalDpi xmlns:a14="http://schemas.microsoft.com/office/drawing/2010/main" val="0"/>
               </a:ext>
               <a:ext uri="{96DAC541-7B7A-43D3-8B79-37D633B846F1}">
-                <asvg:svgBlip xmlns:asvg="http://schemas.microsoft.com/office/drawing/2016/SVG/main" xmlns="" r:embed="rId19"/>
+                <asvg:svgBlip xmlns:asvg="http://schemas.microsoft.com/office/drawing/2016/SVG/main" r:embed="rId19"/>
               </a:ext>
             </a:extLst>
           </a:blip>
@@ -12118,7 +12118,7 @@
           <p:cNvPr id="23" name="TextBox 22">
             <a:extLst>
               <a:ext uri="{FF2B5EF4-FFF2-40B4-BE49-F238E27FC236}">
-                <a16:creationId xmlns:a16="http://schemas.microsoft.com/office/drawing/2014/main" xmlns="" id="{ABB29192-B88F-4AF8-A35F-7C22C58DE1B3}"/>
+                <a16:creationId xmlns:a16="http://schemas.microsoft.com/office/drawing/2014/main" id="{ABB29192-B88F-4AF8-A35F-7C22C58DE1B3}"/>
               </a:ext>
             </a:extLst>
           </p:cNvPr>
@@ -12200,7 +12200,7 @@
           <p:cNvPr id="24" name="화살표: 오른쪽 23">
             <a:extLst>
               <a:ext uri="{FF2B5EF4-FFF2-40B4-BE49-F238E27FC236}">
-                <a16:creationId xmlns:a16="http://schemas.microsoft.com/office/drawing/2014/main" xmlns="" id="{9109FC85-B3D4-4DE3-A56F-49457821BF32}"/>
+                <a16:creationId xmlns:a16="http://schemas.microsoft.com/office/drawing/2014/main" id="{9109FC85-B3D4-4DE3-A56F-49457821BF32}"/>
               </a:ext>
             </a:extLst>
           </p:cNvPr>
@@ -12278,7 +12278,7 @@
           <p:cNvPr id="25" name="화살표: 오른쪽 24">
             <a:extLst>
               <a:ext uri="{FF2B5EF4-FFF2-40B4-BE49-F238E27FC236}">
-                <a16:creationId xmlns:a16="http://schemas.microsoft.com/office/drawing/2014/main" xmlns="" id="{AB591FB3-789F-4F96-AFF8-FB3CC5BB1B2B}"/>
+                <a16:creationId xmlns:a16="http://schemas.microsoft.com/office/drawing/2014/main" id="{AB591FB3-789F-4F96-AFF8-FB3CC5BB1B2B}"/>
               </a:ext>
             </a:extLst>
           </p:cNvPr>
@@ -12356,7 +12356,7 @@
           <p:cNvPr id="26" name="화살표: 오른쪽 25">
             <a:extLst>
               <a:ext uri="{FF2B5EF4-FFF2-40B4-BE49-F238E27FC236}">
-                <a16:creationId xmlns:a16="http://schemas.microsoft.com/office/drawing/2014/main" xmlns="" id="{9E26014D-41B7-4146-A6D3-7C7D706A4554}"/>
+                <a16:creationId xmlns:a16="http://schemas.microsoft.com/office/drawing/2014/main" id="{9E26014D-41B7-4146-A6D3-7C7D706A4554}"/>
               </a:ext>
             </a:extLst>
           </p:cNvPr>
@@ -12434,7 +12434,7 @@
           <p:cNvPr id="27" name="그림 26">
             <a:extLst>
               <a:ext uri="{FF2B5EF4-FFF2-40B4-BE49-F238E27FC236}">
-                <a16:creationId xmlns:a16="http://schemas.microsoft.com/office/drawing/2014/main" xmlns="" id="{0A8BDDA9-1322-49BF-893D-58CD9FD4DAE6}"/>
+                <a16:creationId xmlns:a16="http://schemas.microsoft.com/office/drawing/2014/main" id="{0A8BDDA9-1322-49BF-893D-58CD9FD4DAE6}"/>
               </a:ext>
             </a:extLst>
           </p:cNvPr>
@@ -12470,7 +12470,7 @@
           <p:cNvPr id="28" name="TextBox 27">
             <a:extLst>
               <a:ext uri="{FF2B5EF4-FFF2-40B4-BE49-F238E27FC236}">
-                <a16:creationId xmlns:a16="http://schemas.microsoft.com/office/drawing/2014/main" xmlns="" id="{82F534B3-2453-4FBB-86BA-0CE2D59A8FFB}"/>
+                <a16:creationId xmlns:a16="http://schemas.microsoft.com/office/drawing/2014/main" id="{82F534B3-2453-4FBB-86BA-0CE2D59A8FFB}"/>
               </a:ext>
             </a:extLst>
           </p:cNvPr>
@@ -12535,7 +12535,7 @@
           <p:cNvPr id="29" name="그래픽 28" descr="사용자">
             <a:extLst>
               <a:ext uri="{FF2B5EF4-FFF2-40B4-BE49-F238E27FC236}">
-                <a16:creationId xmlns:a16="http://schemas.microsoft.com/office/drawing/2014/main" xmlns="" id="{97544B2A-3FB1-4422-8FFA-67496A327C15}"/>
+                <a16:creationId xmlns:a16="http://schemas.microsoft.com/office/drawing/2014/main" id="{97544B2A-3FB1-4422-8FFA-67496A327C15}"/>
               </a:ext>
             </a:extLst>
           </p:cNvPr>
@@ -12551,7 +12551,7 @@
                 <a14:useLocalDpi xmlns:a14="http://schemas.microsoft.com/office/drawing/2010/main" val="0"/>
               </a:ext>
               <a:ext uri="{96DAC541-7B7A-43D3-8B79-37D633B846F1}">
-                <asvg:svgBlip xmlns:asvg="http://schemas.microsoft.com/office/drawing/2016/SVG/main" xmlns="" r:embed="rId22"/>
+                <asvg:svgBlip xmlns:asvg="http://schemas.microsoft.com/office/drawing/2016/SVG/main" r:embed="rId22"/>
               </a:ext>
             </a:extLst>
           </a:blip>
@@ -12574,7 +12574,7 @@
           <p:cNvPr id="30" name="TextBox 29">
             <a:extLst>
               <a:ext uri="{FF2B5EF4-FFF2-40B4-BE49-F238E27FC236}">
-                <a16:creationId xmlns:a16="http://schemas.microsoft.com/office/drawing/2014/main" xmlns="" id="{83DBB28F-A4B4-4466-A944-5FA3E5D0604C}"/>
+                <a16:creationId xmlns:a16="http://schemas.microsoft.com/office/drawing/2014/main" id="{83DBB28F-A4B4-4466-A944-5FA3E5D0604C}"/>
               </a:ext>
             </a:extLst>
           </p:cNvPr>
@@ -12669,7 +12669,7 @@
           <p:cNvPr id="26" name="TextBox 25">
             <a:extLst>
               <a:ext uri="{FF2B5EF4-FFF2-40B4-BE49-F238E27FC236}">
-                <a16:creationId xmlns:a16="http://schemas.microsoft.com/office/drawing/2014/main" xmlns="" id="{7F7BB87B-DC19-4B85-9DAD-BF626FEC05CF}"/>
+                <a16:creationId xmlns:a16="http://schemas.microsoft.com/office/drawing/2014/main" id="{7F7BB87B-DC19-4B85-9DAD-BF626FEC05CF}"/>
               </a:ext>
             </a:extLst>
           </p:cNvPr>
@@ -12999,7 +12999,7 @@
           <p:cNvPr id="27" name="그래픽 26" descr="돋보기">
             <a:extLst>
               <a:ext uri="{FF2B5EF4-FFF2-40B4-BE49-F238E27FC236}">
-                <a16:creationId xmlns:a16="http://schemas.microsoft.com/office/drawing/2014/main" xmlns="" id="{DB9B6BE5-5460-49EA-8E0C-6D3ED5AD4B66}"/>
+                <a16:creationId xmlns:a16="http://schemas.microsoft.com/office/drawing/2014/main" id="{DB9B6BE5-5460-49EA-8E0C-6D3ED5AD4B66}"/>
               </a:ext>
             </a:extLst>
           </p:cNvPr>
@@ -13015,7 +13015,7 @@
                 <a14:useLocalDpi xmlns:a14="http://schemas.microsoft.com/office/drawing/2010/main" val="0"/>
               </a:ext>
               <a:ext uri="{96DAC541-7B7A-43D3-8B79-37D633B846F1}">
-                <asvg:svgBlip xmlns:asvg="http://schemas.microsoft.com/office/drawing/2016/SVG/main" xmlns="" r:embed="rId3"/>
+                <asvg:svgBlip xmlns:asvg="http://schemas.microsoft.com/office/drawing/2016/SVG/main" r:embed="rId3"/>
               </a:ext>
             </a:extLst>
           </a:blip>
@@ -13038,7 +13038,7 @@
           <p:cNvPr id="77" name="TextBox 76">
             <a:extLst>
               <a:ext uri="{FF2B5EF4-FFF2-40B4-BE49-F238E27FC236}">
-                <a16:creationId xmlns:a16="http://schemas.microsoft.com/office/drawing/2014/main" xmlns="" id="{C4EE9C28-217C-4411-B8AA-22AD507D7F04}"/>
+                <a16:creationId xmlns:a16="http://schemas.microsoft.com/office/drawing/2014/main" id="{C4EE9C28-217C-4411-B8AA-22AD507D7F04}"/>
               </a:ext>
             </a:extLst>
           </p:cNvPr>
@@ -13103,7 +13103,7 @@
           <p:cNvPr id="79" name="화살표: 오른쪽 78">
             <a:extLst>
               <a:ext uri="{FF2B5EF4-FFF2-40B4-BE49-F238E27FC236}">
-                <a16:creationId xmlns:a16="http://schemas.microsoft.com/office/drawing/2014/main" xmlns="" id="{7D49E5F8-FF52-40A4-9485-E67E0DEF6CDD}"/>
+                <a16:creationId xmlns:a16="http://schemas.microsoft.com/office/drawing/2014/main" id="{7D49E5F8-FF52-40A4-9485-E67E0DEF6CDD}"/>
               </a:ext>
             </a:extLst>
           </p:cNvPr>
@@ -13181,7 +13181,7 @@
           <p:cNvPr id="80" name="화살표: 오른쪽 79">
             <a:extLst>
               <a:ext uri="{FF2B5EF4-FFF2-40B4-BE49-F238E27FC236}">
-                <a16:creationId xmlns:a16="http://schemas.microsoft.com/office/drawing/2014/main" xmlns="" id="{8E2898F6-8B69-4F45-9BBA-C6A3BB75B0DF}"/>
+                <a16:creationId xmlns:a16="http://schemas.microsoft.com/office/drawing/2014/main" id="{8E2898F6-8B69-4F45-9BBA-C6A3BB75B0DF}"/>
               </a:ext>
             </a:extLst>
           </p:cNvPr>
@@ -13259,7 +13259,7 @@
           <p:cNvPr id="28" name="그룹 27">
             <a:extLst>
               <a:ext uri="{FF2B5EF4-FFF2-40B4-BE49-F238E27FC236}">
-                <a16:creationId xmlns:a16="http://schemas.microsoft.com/office/drawing/2014/main" xmlns="" id="{4598D000-E647-47D5-8842-DD2AF99EACA1}"/>
+                <a16:creationId xmlns:a16="http://schemas.microsoft.com/office/drawing/2014/main" id="{4598D000-E647-47D5-8842-DD2AF99EACA1}"/>
               </a:ext>
             </a:extLst>
           </p:cNvPr>
@@ -13279,7 +13279,7 @@
             <p:cNvPr id="29" name="그래픽 28" descr="남자">
               <a:extLst>
                 <a:ext uri="{FF2B5EF4-FFF2-40B4-BE49-F238E27FC236}">
-                  <a16:creationId xmlns:a16="http://schemas.microsoft.com/office/drawing/2014/main" xmlns="" id="{CA0B206B-7072-4370-9A8B-D2230ECB7213}"/>
+                  <a16:creationId xmlns:a16="http://schemas.microsoft.com/office/drawing/2014/main" id="{CA0B206B-7072-4370-9A8B-D2230ECB7213}"/>
                 </a:ext>
               </a:extLst>
             </p:cNvPr>
@@ -13295,7 +13295,7 @@
                   <a14:useLocalDpi xmlns:a14="http://schemas.microsoft.com/office/drawing/2010/main" val="0"/>
                 </a:ext>
                 <a:ext uri="{96DAC541-7B7A-43D3-8B79-37D633B846F1}">
-                  <asvg:svgBlip xmlns:asvg="http://schemas.microsoft.com/office/drawing/2016/SVG/main" xmlns="" r:embed="rId5"/>
+                  <asvg:svgBlip xmlns:asvg="http://schemas.microsoft.com/office/drawing/2016/SVG/main" r:embed="rId5"/>
                 </a:ext>
               </a:extLst>
             </a:blip>
@@ -13318,7 +13318,7 @@
             <p:cNvPr id="30" name="그래픽 29" descr="종이">
               <a:extLst>
                 <a:ext uri="{FF2B5EF4-FFF2-40B4-BE49-F238E27FC236}">
-                  <a16:creationId xmlns:a16="http://schemas.microsoft.com/office/drawing/2014/main" xmlns="" id="{D5CA10D3-1D54-473B-9822-20575CCC4498}"/>
+                  <a16:creationId xmlns:a16="http://schemas.microsoft.com/office/drawing/2014/main" id="{D5CA10D3-1D54-473B-9822-20575CCC4498}"/>
                 </a:ext>
               </a:extLst>
             </p:cNvPr>
@@ -13334,7 +13334,7 @@
                   <a14:useLocalDpi xmlns:a14="http://schemas.microsoft.com/office/drawing/2010/main" val="0"/>
                 </a:ext>
                 <a:ext uri="{96DAC541-7B7A-43D3-8B79-37D633B846F1}">
-                  <asvg:svgBlip xmlns:asvg="http://schemas.microsoft.com/office/drawing/2016/SVG/main" xmlns="" r:embed="rId7"/>
+                  <asvg:svgBlip xmlns:asvg="http://schemas.microsoft.com/office/drawing/2016/SVG/main" r:embed="rId7"/>
                 </a:ext>
               </a:extLst>
             </a:blip>
@@ -13358,7 +13358,7 @@
           <p:cNvPr id="4" name="그래픽 3" descr="연필">
             <a:extLst>
               <a:ext uri="{FF2B5EF4-FFF2-40B4-BE49-F238E27FC236}">
-                <a16:creationId xmlns:a16="http://schemas.microsoft.com/office/drawing/2014/main" xmlns="" id="{EC862E3A-0891-47BA-901D-9BD387F92D97}"/>
+                <a16:creationId xmlns:a16="http://schemas.microsoft.com/office/drawing/2014/main" id="{EC862E3A-0891-47BA-901D-9BD387F92D97}"/>
               </a:ext>
             </a:extLst>
           </p:cNvPr>
@@ -13374,7 +13374,7 @@
                 <a14:useLocalDpi xmlns:a14="http://schemas.microsoft.com/office/drawing/2010/main" val="0"/>
               </a:ext>
               <a:ext uri="{96DAC541-7B7A-43D3-8B79-37D633B846F1}">
-                <asvg:svgBlip xmlns:asvg="http://schemas.microsoft.com/office/drawing/2016/SVG/main" xmlns="" r:embed="rId9"/>
+                <asvg:svgBlip xmlns:asvg="http://schemas.microsoft.com/office/drawing/2016/SVG/main" r:embed="rId9"/>
               </a:ext>
             </a:extLst>
           </a:blip>
@@ -13397,7 +13397,7 @@
           <p:cNvPr id="35" name="TextBox 34">
             <a:extLst>
               <a:ext uri="{FF2B5EF4-FFF2-40B4-BE49-F238E27FC236}">
-                <a16:creationId xmlns:a16="http://schemas.microsoft.com/office/drawing/2014/main" xmlns="" id="{D63AC6EC-D140-4366-85D0-09549E15D0DF}"/>
+                <a16:creationId xmlns:a16="http://schemas.microsoft.com/office/drawing/2014/main" id="{D63AC6EC-D140-4366-85D0-09549E15D0DF}"/>
               </a:ext>
             </a:extLst>
           </p:cNvPr>
@@ -13462,7 +13462,7 @@
           <p:cNvPr id="36" name="그림 35">
             <a:extLst>
               <a:ext uri="{FF2B5EF4-FFF2-40B4-BE49-F238E27FC236}">
-                <a16:creationId xmlns:a16="http://schemas.microsoft.com/office/drawing/2014/main" xmlns="" id="{11C90869-61E3-466B-BA28-64FDECC65515}"/>
+                <a16:creationId xmlns:a16="http://schemas.microsoft.com/office/drawing/2014/main" id="{11C90869-61E3-466B-BA28-64FDECC65515}"/>
               </a:ext>
             </a:extLst>
           </p:cNvPr>
@@ -13498,7 +13498,7 @@
           <p:cNvPr id="37" name="TextBox 36">
             <a:extLst>
               <a:ext uri="{FF2B5EF4-FFF2-40B4-BE49-F238E27FC236}">
-                <a16:creationId xmlns:a16="http://schemas.microsoft.com/office/drawing/2014/main" xmlns="" id="{33D88EE5-12AB-40C4-B6E6-27A79393FFEA}"/>
+                <a16:creationId xmlns:a16="http://schemas.microsoft.com/office/drawing/2014/main" id="{33D88EE5-12AB-40C4-B6E6-27A79393FFEA}"/>
               </a:ext>
             </a:extLst>
           </p:cNvPr>
@@ -13563,7 +13563,7 @@
           <p:cNvPr id="38" name="화살표: 오른쪽 37">
             <a:extLst>
               <a:ext uri="{FF2B5EF4-FFF2-40B4-BE49-F238E27FC236}">
-                <a16:creationId xmlns:a16="http://schemas.microsoft.com/office/drawing/2014/main" xmlns="" id="{8271DF90-9263-4629-89A2-3432C520A0AE}"/>
+                <a16:creationId xmlns:a16="http://schemas.microsoft.com/office/drawing/2014/main" id="{8271DF90-9263-4629-89A2-3432C520A0AE}"/>
               </a:ext>
             </a:extLst>
           </p:cNvPr>
@@ -13641,7 +13641,7 @@
           <p:cNvPr id="16" name="그래픽 80" descr="남자">
             <a:extLst>
               <a:ext uri="{FF2B5EF4-FFF2-40B4-BE49-F238E27FC236}">
-                <a16:creationId xmlns:a16="http://schemas.microsoft.com/office/drawing/2014/main" xmlns="" id="{FF41491D-A026-4E08-9151-623E51D53386}"/>
+                <a16:creationId xmlns:a16="http://schemas.microsoft.com/office/drawing/2014/main" id="{FF41491D-A026-4E08-9151-623E51D53386}"/>
               </a:ext>
             </a:extLst>
           </p:cNvPr>
@@ -13657,7 +13657,7 @@
                 <a14:useLocalDpi xmlns:a14="http://schemas.microsoft.com/office/drawing/2010/main" val="0"/>
               </a:ext>
               <a:ext uri="{96DAC541-7B7A-43D3-8B79-37D633B846F1}">
-                <asvg:svgBlip xmlns:asvg="http://schemas.microsoft.com/office/drawing/2016/SVG/main" xmlns="" r:embed="rId5"/>
+                <asvg:svgBlip xmlns:asvg="http://schemas.microsoft.com/office/drawing/2016/SVG/main" r:embed="rId5"/>
               </a:ext>
             </a:extLst>
           </a:blip>
@@ -13680,7 +13680,7 @@
           <p:cNvPr id="17" name="TextBox 16">
             <a:extLst>
               <a:ext uri="{FF2B5EF4-FFF2-40B4-BE49-F238E27FC236}">
-                <a16:creationId xmlns:a16="http://schemas.microsoft.com/office/drawing/2014/main" xmlns="" id="{A4D5AA8A-7FB2-47DF-A047-7173C07FBC05}"/>
+                <a16:creationId xmlns:a16="http://schemas.microsoft.com/office/drawing/2014/main" id="{A4D5AA8A-7FB2-47DF-A047-7173C07FBC05}"/>
               </a:ext>
             </a:extLst>
           </p:cNvPr>
@@ -13775,7 +13775,7 @@
           <p:cNvPr id="12" name="순서도: 대체 처리 11">
             <a:extLst>
               <a:ext uri="{FF2B5EF4-FFF2-40B4-BE49-F238E27FC236}">
-                <a16:creationId xmlns:a16="http://schemas.microsoft.com/office/drawing/2014/main" xmlns="" id="{0A71885C-A525-4A19-A4C8-9456A8E9C754}"/>
+                <a16:creationId xmlns:a16="http://schemas.microsoft.com/office/drawing/2014/main" id="{0A71885C-A525-4A19-A4C8-9456A8E9C754}"/>
               </a:ext>
             </a:extLst>
           </p:cNvPr>
@@ -14015,7 +14015,7 @@
           <p:cNvPr id="67" name="그룹 66">
             <a:extLst>
               <a:ext uri="{FF2B5EF4-FFF2-40B4-BE49-F238E27FC236}">
-                <a16:creationId xmlns:a16="http://schemas.microsoft.com/office/drawing/2014/main" xmlns="" id="{8AF4DEC3-439E-4C5C-B5BD-BFFF85D60DCF}"/>
+                <a16:creationId xmlns:a16="http://schemas.microsoft.com/office/drawing/2014/main" id="{8AF4DEC3-439E-4C5C-B5BD-BFFF85D60DCF}"/>
               </a:ext>
             </a:extLst>
           </p:cNvPr>
@@ -14038,7 +14038,7 @@
             <p:cNvPr id="7" name="직사각형 6">
               <a:extLst>
                 <a:ext uri="{FF2B5EF4-FFF2-40B4-BE49-F238E27FC236}">
-                  <a16:creationId xmlns:a16="http://schemas.microsoft.com/office/drawing/2014/main" xmlns="" id="{C229BF0A-518C-4DA1-8831-61682FF90814}"/>
+                  <a16:creationId xmlns:a16="http://schemas.microsoft.com/office/drawing/2014/main" id="{C229BF0A-518C-4DA1-8831-61682FF90814}"/>
                 </a:ext>
               </a:extLst>
             </p:cNvPr>
@@ -14134,7 +14134,7 @@
             <p:cNvPr id="68" name="직사각형 67">
               <a:extLst>
                 <a:ext uri="{FF2B5EF4-FFF2-40B4-BE49-F238E27FC236}">
-                  <a16:creationId xmlns:a16="http://schemas.microsoft.com/office/drawing/2014/main" xmlns="" id="{64CD2D6A-F359-42A5-9287-69DA30AF54A9}"/>
+                  <a16:creationId xmlns:a16="http://schemas.microsoft.com/office/drawing/2014/main" id="{64CD2D6A-F359-42A5-9287-69DA30AF54A9}"/>
                 </a:ext>
               </a:extLst>
             </p:cNvPr>
@@ -14213,7 +14213,7 @@
             <p:cNvPr id="69" name="직사각형 68">
               <a:extLst>
                 <a:ext uri="{FF2B5EF4-FFF2-40B4-BE49-F238E27FC236}">
-                  <a16:creationId xmlns:a16="http://schemas.microsoft.com/office/drawing/2014/main" xmlns="" id="{8FD1A02B-2759-4EFE-B353-8BCEF514AE75}"/>
+                  <a16:creationId xmlns:a16="http://schemas.microsoft.com/office/drawing/2014/main" id="{8FD1A02B-2759-4EFE-B353-8BCEF514AE75}"/>
                 </a:ext>
               </a:extLst>
             </p:cNvPr>
@@ -14293,7 +14293,7 @@
           <p:cNvPr id="81" name="그래픽 80" descr="남자">
             <a:extLst>
               <a:ext uri="{FF2B5EF4-FFF2-40B4-BE49-F238E27FC236}">
-                <a16:creationId xmlns:a16="http://schemas.microsoft.com/office/drawing/2014/main" xmlns="" id="{5FB202F3-34EF-4D58-956C-04AC564FA09A}"/>
+                <a16:creationId xmlns:a16="http://schemas.microsoft.com/office/drawing/2014/main" id="{5FB202F3-34EF-4D58-956C-04AC564FA09A}"/>
               </a:ext>
             </a:extLst>
           </p:cNvPr>
@@ -14309,7 +14309,7 @@
                 <a14:useLocalDpi xmlns:a14="http://schemas.microsoft.com/office/drawing/2010/main" val="0"/>
               </a:ext>
               <a:ext uri="{96DAC541-7B7A-43D3-8B79-37D633B846F1}">
-                <asvg:svgBlip xmlns:asvg="http://schemas.microsoft.com/office/drawing/2016/SVG/main" xmlns="" r:embed="rId3"/>
+                <asvg:svgBlip xmlns:asvg="http://schemas.microsoft.com/office/drawing/2016/SVG/main" r:embed="rId3"/>
               </a:ext>
             </a:extLst>
           </a:blip>
@@ -14332,7 +14332,7 @@
           <p:cNvPr id="82" name="TextBox 81">
             <a:extLst>
               <a:ext uri="{FF2B5EF4-FFF2-40B4-BE49-F238E27FC236}">
-                <a16:creationId xmlns:a16="http://schemas.microsoft.com/office/drawing/2014/main" xmlns="" id="{205C3221-4081-4E04-BCC9-B1B78846F88C}"/>
+                <a16:creationId xmlns:a16="http://schemas.microsoft.com/office/drawing/2014/main" id="{205C3221-4081-4E04-BCC9-B1B78846F88C}"/>
               </a:ext>
             </a:extLst>
           </p:cNvPr>
@@ -14397,7 +14397,7 @@
           <p:cNvPr id="39" name="TextBox 38">
             <a:extLst>
               <a:ext uri="{FF2B5EF4-FFF2-40B4-BE49-F238E27FC236}">
-                <a16:creationId xmlns:a16="http://schemas.microsoft.com/office/drawing/2014/main" xmlns="" id="{8D98872A-4B8D-4697-B68B-83632AB39464}"/>
+                <a16:creationId xmlns:a16="http://schemas.microsoft.com/office/drawing/2014/main" id="{8D98872A-4B8D-4697-B68B-83632AB39464}"/>
               </a:ext>
             </a:extLst>
           </p:cNvPr>
@@ -14476,7 +14476,7 @@
           <p:cNvPr id="5" name="정육면체 4">
             <a:extLst>
               <a:ext uri="{FF2B5EF4-FFF2-40B4-BE49-F238E27FC236}">
-                <a16:creationId xmlns:a16="http://schemas.microsoft.com/office/drawing/2014/main" xmlns="" id="{8D07146B-52C7-4DC7-9987-46FC9B448DE3}"/>
+                <a16:creationId xmlns:a16="http://schemas.microsoft.com/office/drawing/2014/main" id="{8D07146B-52C7-4DC7-9987-46FC9B448DE3}"/>
               </a:ext>
             </a:extLst>
           </p:cNvPr>
@@ -14576,7 +14576,7 @@
           <p:cNvPr id="50" name="TextBox 49">
             <a:extLst>
               <a:ext uri="{FF2B5EF4-FFF2-40B4-BE49-F238E27FC236}">
-                <a16:creationId xmlns:a16="http://schemas.microsoft.com/office/drawing/2014/main" xmlns="" id="{E22DF7F3-2720-4025-9A86-2370B6E90FEB}"/>
+                <a16:creationId xmlns:a16="http://schemas.microsoft.com/office/drawing/2014/main" id="{E22DF7F3-2720-4025-9A86-2370B6E90FEB}"/>
               </a:ext>
             </a:extLst>
           </p:cNvPr>
@@ -14641,7 +14641,7 @@
           <p:cNvPr id="8" name="원통형 7">
             <a:extLst>
               <a:ext uri="{FF2B5EF4-FFF2-40B4-BE49-F238E27FC236}">
-                <a16:creationId xmlns:a16="http://schemas.microsoft.com/office/drawing/2014/main" xmlns="" id="{0EA18589-A3DC-483F-B228-702F97E15326}"/>
+                <a16:creationId xmlns:a16="http://schemas.microsoft.com/office/drawing/2014/main" id="{0EA18589-A3DC-483F-B228-702F97E15326}"/>
               </a:ext>
             </a:extLst>
           </p:cNvPr>
@@ -14739,7 +14739,7 @@
           <p:cNvPr id="73" name="TextBox 72">
             <a:extLst>
               <a:ext uri="{FF2B5EF4-FFF2-40B4-BE49-F238E27FC236}">
-                <a16:creationId xmlns:a16="http://schemas.microsoft.com/office/drawing/2014/main" xmlns="" id="{AC6F10B8-9962-451B-AF38-3C1D17FD9E2D}"/>
+                <a16:creationId xmlns:a16="http://schemas.microsoft.com/office/drawing/2014/main" id="{AC6F10B8-9962-451B-AF38-3C1D17FD9E2D}"/>
               </a:ext>
             </a:extLst>
           </p:cNvPr>
@@ -14804,7 +14804,7 @@
           <p:cNvPr id="3" name="그룹 2">
             <a:extLst>
               <a:ext uri="{FF2B5EF4-FFF2-40B4-BE49-F238E27FC236}">
-                <a16:creationId xmlns:a16="http://schemas.microsoft.com/office/drawing/2014/main" xmlns="" id="{084EA206-D9B2-42F8-9822-1EAEC595319B}"/>
+                <a16:creationId xmlns:a16="http://schemas.microsoft.com/office/drawing/2014/main" id="{084EA206-D9B2-42F8-9822-1EAEC595319B}"/>
               </a:ext>
             </a:extLst>
           </p:cNvPr>
@@ -14824,7 +14824,7 @@
             <p:cNvPr id="4" name="순서도: 대체 처리 3">
               <a:extLst>
                 <a:ext uri="{FF2B5EF4-FFF2-40B4-BE49-F238E27FC236}">
-                  <a16:creationId xmlns:a16="http://schemas.microsoft.com/office/drawing/2014/main" xmlns="" id="{B335DDB8-38D1-4A0B-8564-922229962005}"/>
+                  <a16:creationId xmlns:a16="http://schemas.microsoft.com/office/drawing/2014/main" id="{B335DDB8-38D1-4A0B-8564-922229962005}"/>
                 </a:ext>
               </a:extLst>
             </p:cNvPr>
@@ -14902,7 +14902,7 @@
             <p:cNvPr id="6" name="말풍선: 모서리가 둥근 사각형 5">
               <a:extLst>
                 <a:ext uri="{FF2B5EF4-FFF2-40B4-BE49-F238E27FC236}">
-                  <a16:creationId xmlns:a16="http://schemas.microsoft.com/office/drawing/2014/main" xmlns="" id="{D10161FC-B17F-4249-973E-9531AD72B4BA}"/>
+                  <a16:creationId xmlns:a16="http://schemas.microsoft.com/office/drawing/2014/main" id="{D10161FC-B17F-4249-973E-9531AD72B4BA}"/>
                 </a:ext>
               </a:extLst>
             </p:cNvPr>
@@ -14984,7 +14984,7 @@
             <p:cNvPr id="41" name="순서도: 대체 처리 40">
               <a:extLst>
                 <a:ext uri="{FF2B5EF4-FFF2-40B4-BE49-F238E27FC236}">
-                  <a16:creationId xmlns:a16="http://schemas.microsoft.com/office/drawing/2014/main" xmlns="" id="{5B07F4EB-E946-40A6-A844-BA31D10ABDDA}"/>
+                  <a16:creationId xmlns:a16="http://schemas.microsoft.com/office/drawing/2014/main" id="{5B07F4EB-E946-40A6-A844-BA31D10ABDDA}"/>
                 </a:ext>
               </a:extLst>
             </p:cNvPr>
@@ -15062,7 +15062,7 @@
             <p:cNvPr id="42" name="순서도: 대체 처리 41">
               <a:extLst>
                 <a:ext uri="{FF2B5EF4-FFF2-40B4-BE49-F238E27FC236}">
-                  <a16:creationId xmlns:a16="http://schemas.microsoft.com/office/drawing/2014/main" xmlns="" id="{77952AF5-BDB6-4E88-ACC7-E0F393EE9D57}"/>
+                  <a16:creationId xmlns:a16="http://schemas.microsoft.com/office/drawing/2014/main" id="{77952AF5-BDB6-4E88-ACC7-E0F393EE9D57}"/>
                 </a:ext>
               </a:extLst>
             </p:cNvPr>
@@ -15175,7 +15175,7 @@
           <p:cNvPr id="47" name="순서도: 대체 처리 46">
             <a:extLst>
               <a:ext uri="{FF2B5EF4-FFF2-40B4-BE49-F238E27FC236}">
-                <a16:creationId xmlns:a16="http://schemas.microsoft.com/office/drawing/2014/main" xmlns="" id="{9CA93868-1295-4F83-B552-4834F3201037}"/>
+                <a16:creationId xmlns:a16="http://schemas.microsoft.com/office/drawing/2014/main" id="{9CA93868-1295-4F83-B552-4834F3201037}"/>
               </a:ext>
             </a:extLst>
           </p:cNvPr>
@@ -15290,7 +15290,7 @@
           <p:cNvPr id="48" name="말풍선: 모서리가 둥근 사각형 47">
             <a:extLst>
               <a:ext uri="{FF2B5EF4-FFF2-40B4-BE49-F238E27FC236}">
-                <a16:creationId xmlns:a16="http://schemas.microsoft.com/office/drawing/2014/main" xmlns="" id="{DA63D59E-8B62-471E-B8FD-6A2645E39876}"/>
+                <a16:creationId xmlns:a16="http://schemas.microsoft.com/office/drawing/2014/main" id="{DA63D59E-8B62-471E-B8FD-6A2645E39876}"/>
               </a:ext>
             </a:extLst>
           </p:cNvPr>
@@ -15375,7 +15375,7 @@
           <p:cNvPr id="49" name="순서도: 대체 처리 48">
             <a:extLst>
               <a:ext uri="{FF2B5EF4-FFF2-40B4-BE49-F238E27FC236}">
-                <a16:creationId xmlns:a16="http://schemas.microsoft.com/office/drawing/2014/main" xmlns="" id="{4E330394-5F97-4C77-AA18-BF284644DC48}"/>
+                <a16:creationId xmlns:a16="http://schemas.microsoft.com/office/drawing/2014/main" id="{4E330394-5F97-4C77-AA18-BF284644DC48}"/>
               </a:ext>
             </a:extLst>
           </p:cNvPr>
@@ -15453,7 +15453,7 @@
           <p:cNvPr id="51" name="순서도: 대체 처리 50">
             <a:extLst>
               <a:ext uri="{FF2B5EF4-FFF2-40B4-BE49-F238E27FC236}">
-                <a16:creationId xmlns:a16="http://schemas.microsoft.com/office/drawing/2014/main" xmlns="" id="{D9D9739E-98DB-4A6C-9EED-C2D9B7C253ED}"/>
+                <a16:creationId xmlns:a16="http://schemas.microsoft.com/office/drawing/2014/main" id="{D9D9739E-98DB-4A6C-9EED-C2D9B7C253ED}"/>
               </a:ext>
             </a:extLst>
           </p:cNvPr>
@@ -15534,7 +15534,7 @@
           <p:cNvPr id="9" name="빼기 기호 8">
             <a:extLst>
               <a:ext uri="{FF2B5EF4-FFF2-40B4-BE49-F238E27FC236}">
-                <a16:creationId xmlns:a16="http://schemas.microsoft.com/office/drawing/2014/main" xmlns="" id="{C2DE321D-E8E1-49BF-9D0D-0F947A9CDB7C}"/>
+                <a16:creationId xmlns:a16="http://schemas.microsoft.com/office/drawing/2014/main" id="{C2DE321D-E8E1-49BF-9D0D-0F947A9CDB7C}"/>
               </a:ext>
             </a:extLst>
           </p:cNvPr>
@@ -15609,7 +15609,7 @@
           <p:cNvPr id="53" name="빼기 기호 52">
             <a:extLst>
               <a:ext uri="{FF2B5EF4-FFF2-40B4-BE49-F238E27FC236}">
-                <a16:creationId xmlns:a16="http://schemas.microsoft.com/office/drawing/2014/main" xmlns="" id="{E92F8830-5282-4F9C-BAA2-44A596A81599}"/>
+                <a16:creationId xmlns:a16="http://schemas.microsoft.com/office/drawing/2014/main" id="{E92F8830-5282-4F9C-BAA2-44A596A81599}"/>
               </a:ext>
             </a:extLst>
           </p:cNvPr>
@@ -15684,7 +15684,7 @@
           <p:cNvPr id="54" name="빼기 기호 53">
             <a:extLst>
               <a:ext uri="{FF2B5EF4-FFF2-40B4-BE49-F238E27FC236}">
-                <a16:creationId xmlns:a16="http://schemas.microsoft.com/office/drawing/2014/main" xmlns="" id="{F95A7E62-5D76-4DEB-9B7E-D98DACF8DCBD}"/>
+                <a16:creationId xmlns:a16="http://schemas.microsoft.com/office/drawing/2014/main" id="{F95A7E62-5D76-4DEB-9B7E-D98DACF8DCBD}"/>
               </a:ext>
             </a:extLst>
           </p:cNvPr>
@@ -15759,7 +15759,7 @@
           <p:cNvPr id="11" name="TextBox 10">
             <a:extLst>
               <a:ext uri="{FF2B5EF4-FFF2-40B4-BE49-F238E27FC236}">
-                <a16:creationId xmlns:a16="http://schemas.microsoft.com/office/drawing/2014/main" xmlns="" id="{4912C0F0-E9FB-44CD-A749-D8E664613433}"/>
+                <a16:creationId xmlns:a16="http://schemas.microsoft.com/office/drawing/2014/main" id="{4912C0F0-E9FB-44CD-A749-D8E664613433}"/>
               </a:ext>
             </a:extLst>
           </p:cNvPr>
@@ -15824,7 +15824,7 @@
           <p:cNvPr id="56" name="TextBox 55">
             <a:extLst>
               <a:ext uri="{FF2B5EF4-FFF2-40B4-BE49-F238E27FC236}">
-                <a16:creationId xmlns:a16="http://schemas.microsoft.com/office/drawing/2014/main" xmlns="" id="{DE7C84C2-4211-492D-8508-DE55688FC340}"/>
+                <a16:creationId xmlns:a16="http://schemas.microsoft.com/office/drawing/2014/main" id="{DE7C84C2-4211-492D-8508-DE55688FC340}"/>
               </a:ext>
             </a:extLst>
           </p:cNvPr>
@@ -15889,7 +15889,7 @@
           <p:cNvPr id="58" name="TextBox 57">
             <a:extLst>
               <a:ext uri="{FF2B5EF4-FFF2-40B4-BE49-F238E27FC236}">
-                <a16:creationId xmlns:a16="http://schemas.microsoft.com/office/drawing/2014/main" xmlns="" id="{CFA51693-77B2-4008-8CAB-49BA9E510AD2}"/>
+                <a16:creationId xmlns:a16="http://schemas.microsoft.com/office/drawing/2014/main" id="{CFA51693-77B2-4008-8CAB-49BA9E510AD2}"/>
               </a:ext>
             </a:extLst>
           </p:cNvPr>
@@ -15985,7 +15985,7 @@
           <p:cNvPr id="62" name="말풍선: 모서리가 둥근 사각형 61">
             <a:extLst>
               <a:ext uri="{FF2B5EF4-FFF2-40B4-BE49-F238E27FC236}">
-                <a16:creationId xmlns:a16="http://schemas.microsoft.com/office/drawing/2014/main" xmlns="" id="{4196B130-789B-4DA8-B16F-58BAE5B8C7ED}"/>
+                <a16:creationId xmlns:a16="http://schemas.microsoft.com/office/drawing/2014/main" id="{4196B130-789B-4DA8-B16F-58BAE5B8C7ED}"/>
               </a:ext>
             </a:extLst>
           </p:cNvPr>
@@ -16067,7 +16067,7 @@
           <p:cNvPr id="63" name="TextBox 62">
             <a:extLst>
               <a:ext uri="{FF2B5EF4-FFF2-40B4-BE49-F238E27FC236}">
-                <a16:creationId xmlns:a16="http://schemas.microsoft.com/office/drawing/2014/main" xmlns="" id="{A9863FAF-7C4D-472E-B520-52465C931279}"/>
+                <a16:creationId xmlns:a16="http://schemas.microsoft.com/office/drawing/2014/main" id="{A9863FAF-7C4D-472E-B520-52465C931279}"/>
               </a:ext>
             </a:extLst>
           </p:cNvPr>
@@ -16180,7 +16180,7 @@
           <p:cNvPr id="2" name="그룹 1">
             <a:extLst>
               <a:ext uri="{FF2B5EF4-FFF2-40B4-BE49-F238E27FC236}">
-                <a16:creationId xmlns:a16="http://schemas.microsoft.com/office/drawing/2014/main" xmlns="" id="{5A0A9D34-2821-4066-A011-DEC8AC69AF65}"/>
+                <a16:creationId xmlns:a16="http://schemas.microsoft.com/office/drawing/2014/main" id="{5A0A9D34-2821-4066-A011-DEC8AC69AF65}"/>
               </a:ext>
             </a:extLst>
           </p:cNvPr>
@@ -16200,7 +16200,7 @@
             <p:cNvPr id="59" name="말풍선: 모서리가 둥근 사각형 58">
               <a:extLst>
                 <a:ext uri="{FF2B5EF4-FFF2-40B4-BE49-F238E27FC236}">
-                  <a16:creationId xmlns:a16="http://schemas.microsoft.com/office/drawing/2014/main" xmlns="" id="{AFBE8749-CE76-4E36-92A3-631C0DE1EE89}"/>
+                  <a16:creationId xmlns:a16="http://schemas.microsoft.com/office/drawing/2014/main" id="{AFBE8749-CE76-4E36-92A3-631C0DE1EE89}"/>
                 </a:ext>
               </a:extLst>
             </p:cNvPr>
@@ -16282,7 +16282,7 @@
             <p:cNvPr id="60" name="순서도: 대체 처리 59">
               <a:extLst>
                 <a:ext uri="{FF2B5EF4-FFF2-40B4-BE49-F238E27FC236}">
-                  <a16:creationId xmlns:a16="http://schemas.microsoft.com/office/drawing/2014/main" xmlns="" id="{67463392-4575-470F-8E5D-2DD6A9105EAA}"/>
+                  <a16:creationId xmlns:a16="http://schemas.microsoft.com/office/drawing/2014/main" id="{67463392-4575-470F-8E5D-2DD6A9105EAA}"/>
                 </a:ext>
               </a:extLst>
             </p:cNvPr>
@@ -16374,7 +16374,7 @@
             <p:cNvPr id="61" name="순서도: 대체 처리 60">
               <a:extLst>
                 <a:ext uri="{FF2B5EF4-FFF2-40B4-BE49-F238E27FC236}">
-                  <a16:creationId xmlns:a16="http://schemas.microsoft.com/office/drawing/2014/main" xmlns="" id="{659E68D9-D0CD-4823-BB62-EFC4489DDC99}"/>
+                  <a16:creationId xmlns:a16="http://schemas.microsoft.com/office/drawing/2014/main" id="{659E68D9-D0CD-4823-BB62-EFC4489DDC99}"/>
                 </a:ext>
               </a:extLst>
             </p:cNvPr>
@@ -16452,7 +16452,7 @@
             <p:cNvPr id="35" name="순서도: 대체 처리 34">
               <a:extLst>
                 <a:ext uri="{FF2B5EF4-FFF2-40B4-BE49-F238E27FC236}">
-                  <a16:creationId xmlns:a16="http://schemas.microsoft.com/office/drawing/2014/main" xmlns="" id="{F9063484-0C6F-445D-86AF-90330BD406B7}"/>
+                  <a16:creationId xmlns:a16="http://schemas.microsoft.com/office/drawing/2014/main" id="{F9063484-0C6F-445D-86AF-90330BD406B7}"/>
                 </a:ext>
               </a:extLst>
             </p:cNvPr>
@@ -16531,7 +16531,7 @@
           <p:cNvPr id="13" name="슬라이드 번호 개체 틀 12">
             <a:extLst>
               <a:ext uri="{FF2B5EF4-FFF2-40B4-BE49-F238E27FC236}">
-                <a16:creationId xmlns:a16="http://schemas.microsoft.com/office/drawing/2014/main" xmlns="" id="{C35A132F-B78B-4AED-AA3D-5FE0B3BF796D}"/>
+                <a16:creationId xmlns:a16="http://schemas.microsoft.com/office/drawing/2014/main" id="{C35A132F-B78B-4AED-AA3D-5FE0B3BF796D}"/>
               </a:ext>
             </a:extLst>
           </p:cNvPr>
@@ -16749,7 +16749,7 @@
           <p:cNvPr id="13" name="TextBox 12">
             <a:extLst>
               <a:ext uri="{FF2B5EF4-FFF2-40B4-BE49-F238E27FC236}">
-                <a16:creationId xmlns:a16="http://schemas.microsoft.com/office/drawing/2014/main" xmlns="" id="{822BF130-D6AA-4715-9FBF-8F051B1C32A6}"/>
+                <a16:creationId xmlns:a16="http://schemas.microsoft.com/office/drawing/2014/main" id="{822BF130-D6AA-4715-9FBF-8F051B1C32A6}"/>
               </a:ext>
             </a:extLst>
           </p:cNvPr>
@@ -16792,7 +16792,7 @@
           <p:cNvPr id="14" name="그림 13">
             <a:extLst>
               <a:ext uri="{FF2B5EF4-FFF2-40B4-BE49-F238E27FC236}">
-                <a16:creationId xmlns:a16="http://schemas.microsoft.com/office/drawing/2014/main" xmlns="" id="{3E1C5617-D57A-461A-A342-5CF3E0D51C43}"/>
+                <a16:creationId xmlns:a16="http://schemas.microsoft.com/office/drawing/2014/main" id="{3E1C5617-D57A-461A-A342-5CF3E0D51C43}"/>
               </a:ext>
             </a:extLst>
           </p:cNvPr>
@@ -16822,7 +16822,7 @@
           <p:cNvPr id="2" name="슬라이드 번호 개체 틀 1">
             <a:extLst>
               <a:ext uri="{FF2B5EF4-FFF2-40B4-BE49-F238E27FC236}">
-                <a16:creationId xmlns:a16="http://schemas.microsoft.com/office/drawing/2014/main" xmlns="" id="{7A881AB0-6BA1-4F62-B570-84FF1DDEB869}"/>
+                <a16:creationId xmlns:a16="http://schemas.microsoft.com/office/drawing/2014/main" id="{7A881AB0-6BA1-4F62-B570-84FF1DDEB869}"/>
               </a:ext>
             </a:extLst>
           </p:cNvPr>
@@ -17040,7 +17040,7 @@
           <p:cNvPr id="2" name="슬라이드 번호 개체 틀 1">
             <a:extLst>
               <a:ext uri="{FF2B5EF4-FFF2-40B4-BE49-F238E27FC236}">
-                <a16:creationId xmlns:a16="http://schemas.microsoft.com/office/drawing/2014/main" xmlns="" id="{7A881AB0-6BA1-4F62-B570-84FF1DDEB869}"/>
+                <a16:creationId xmlns:a16="http://schemas.microsoft.com/office/drawing/2014/main" id="{7A881AB0-6BA1-4F62-B570-84FF1DDEB869}"/>
               </a:ext>
             </a:extLst>
           </p:cNvPr>
@@ -17069,7 +17069,7 @@
           <p:cNvPr id="3" name="TextBox 2">
             <a:extLst>
               <a:ext uri="{FF2B5EF4-FFF2-40B4-BE49-F238E27FC236}">
-                <a16:creationId xmlns:a16="http://schemas.microsoft.com/office/drawing/2014/main" xmlns="" id="{3B13009C-4E35-4871-8905-71DCD827884B}"/>
+                <a16:creationId xmlns:a16="http://schemas.microsoft.com/office/drawing/2014/main" id="{3B13009C-4E35-4871-8905-71DCD827884B}"/>
               </a:ext>
             </a:extLst>
           </p:cNvPr>
@@ -17108,7 +17108,7 @@
           <p:cNvPr id="7" name="TextBox 6">
             <a:extLst>
               <a:ext uri="{FF2B5EF4-FFF2-40B4-BE49-F238E27FC236}">
-                <a16:creationId xmlns:a16="http://schemas.microsoft.com/office/drawing/2014/main" xmlns="" id="{90D9130C-5F1A-490B-A8CC-2BBC6C73307C}"/>
+                <a16:creationId xmlns:a16="http://schemas.microsoft.com/office/drawing/2014/main" id="{90D9130C-5F1A-490B-A8CC-2BBC6C73307C}"/>
               </a:ext>
             </a:extLst>
           </p:cNvPr>
@@ -17169,10 +17169,6 @@
               <a:rPr lang="ko-KR" altLang="en-US" dirty="0"/>
               <a:t>관리하는 데이터의 집합</a:t>
             </a:r>
-            <a:r>
-              <a:rPr lang="en-US" altLang="ko-KR" dirty="0"/>
-              <a:t/>
-            </a:r>
             <a:br>
               <a:rPr lang="en-US" altLang="ko-KR" dirty="0"/>
             </a:br>
@@ -17231,7 +17227,7 @@
           <p:cNvPr id="5" name="TextBox 4">
             <a:extLst>
               <a:ext uri="{FF2B5EF4-FFF2-40B4-BE49-F238E27FC236}">
-                <a16:creationId xmlns:a16="http://schemas.microsoft.com/office/drawing/2014/main" xmlns="" id="{B739B812-9151-4E03-94AD-C699EBDF66A8}"/>
+                <a16:creationId xmlns:a16="http://schemas.microsoft.com/office/drawing/2014/main" id="{B739B812-9151-4E03-94AD-C699EBDF66A8}"/>
               </a:ext>
             </a:extLst>
           </p:cNvPr>
@@ -17394,7 +17390,7 @@
           <p:cNvPr id="10" name="TextBox 9">
             <a:extLst>
               <a:ext uri="{FF2B5EF4-FFF2-40B4-BE49-F238E27FC236}">
-                <a16:creationId xmlns:a16="http://schemas.microsoft.com/office/drawing/2014/main" xmlns="" id="{B9A6D9C6-94CE-4145-A1A7-D3F6A46ABCB6}"/>
+                <a16:creationId xmlns:a16="http://schemas.microsoft.com/office/drawing/2014/main" id="{B9A6D9C6-94CE-4145-A1A7-D3F6A46ABCB6}"/>
               </a:ext>
             </a:extLst>
           </p:cNvPr>
@@ -17722,7 +17718,7 @@
           <p:cNvPr id="2" name="슬라이드 번호 개체 틀 1">
             <a:extLst>
               <a:ext uri="{FF2B5EF4-FFF2-40B4-BE49-F238E27FC236}">
-                <a16:creationId xmlns:a16="http://schemas.microsoft.com/office/drawing/2014/main" xmlns="" id="{7A881AB0-6BA1-4F62-B570-84FF1DDEB869}"/>
+                <a16:creationId xmlns:a16="http://schemas.microsoft.com/office/drawing/2014/main" id="{7A881AB0-6BA1-4F62-B570-84FF1DDEB869}"/>
               </a:ext>
             </a:extLst>
           </p:cNvPr>
@@ -17751,7 +17747,7 @@
           <p:cNvPr id="3" name="TextBox 2">
             <a:extLst>
               <a:ext uri="{FF2B5EF4-FFF2-40B4-BE49-F238E27FC236}">
-                <a16:creationId xmlns:a16="http://schemas.microsoft.com/office/drawing/2014/main" xmlns="" id="{3B13009C-4E35-4871-8905-71DCD827884B}"/>
+                <a16:creationId xmlns:a16="http://schemas.microsoft.com/office/drawing/2014/main" id="{3B13009C-4E35-4871-8905-71DCD827884B}"/>
               </a:ext>
             </a:extLst>
           </p:cNvPr>
@@ -17790,7 +17786,7 @@
           <p:cNvPr id="9" name="그림 8">
             <a:extLst>
               <a:ext uri="{FF2B5EF4-FFF2-40B4-BE49-F238E27FC236}">
-                <a16:creationId xmlns:a16="http://schemas.microsoft.com/office/drawing/2014/main" xmlns="" id="{678D25CE-0C1E-47CE-8625-04648AAFD8F8}"/>
+                <a16:creationId xmlns:a16="http://schemas.microsoft.com/office/drawing/2014/main" id="{678D25CE-0C1E-47CE-8625-04648AAFD8F8}"/>
               </a:ext>
             </a:extLst>
           </p:cNvPr>
@@ -17826,7 +17822,7 @@
           <p:cNvPr id="11" name="그림 10">
             <a:extLst>
               <a:ext uri="{FF2B5EF4-FFF2-40B4-BE49-F238E27FC236}">
-                <a16:creationId xmlns:a16="http://schemas.microsoft.com/office/drawing/2014/main" xmlns="" id="{DECC9577-36A6-4DFF-B7F9-333F31837B6C}"/>
+                <a16:creationId xmlns:a16="http://schemas.microsoft.com/office/drawing/2014/main" id="{DECC9577-36A6-4DFF-B7F9-333F31837B6C}"/>
               </a:ext>
             </a:extLst>
           </p:cNvPr>
@@ -17862,7 +17858,7 @@
           <p:cNvPr id="13" name="그림 12">
             <a:extLst>
               <a:ext uri="{FF2B5EF4-FFF2-40B4-BE49-F238E27FC236}">
-                <a16:creationId xmlns:a16="http://schemas.microsoft.com/office/drawing/2014/main" xmlns="" id="{71CE7D66-48F7-458B-87F4-CF9C2EA33F61}"/>
+                <a16:creationId xmlns:a16="http://schemas.microsoft.com/office/drawing/2014/main" id="{71CE7D66-48F7-458B-87F4-CF9C2EA33F61}"/>
               </a:ext>
             </a:extLst>
           </p:cNvPr>
@@ -17898,7 +17894,7 @@
           <p:cNvPr id="4" name="그림 3">
             <a:extLst>
               <a:ext uri="{FF2B5EF4-FFF2-40B4-BE49-F238E27FC236}">
-                <a16:creationId xmlns:a16="http://schemas.microsoft.com/office/drawing/2014/main" xmlns="" id="{008D985F-3B45-4BAE-8AC1-9B4329CFE443}"/>
+                <a16:creationId xmlns:a16="http://schemas.microsoft.com/office/drawing/2014/main" id="{008D985F-3B45-4BAE-8AC1-9B4329CFE443}"/>
               </a:ext>
             </a:extLst>
           </p:cNvPr>
@@ -17928,7 +17924,7 @@
           <p:cNvPr id="8" name="그림 7">
             <a:extLst>
               <a:ext uri="{FF2B5EF4-FFF2-40B4-BE49-F238E27FC236}">
-                <a16:creationId xmlns:a16="http://schemas.microsoft.com/office/drawing/2014/main" xmlns="" id="{9F078949-6E2C-4738-95C7-067BDDC0202E}"/>
+                <a16:creationId xmlns:a16="http://schemas.microsoft.com/office/drawing/2014/main" id="{9F078949-6E2C-4738-95C7-067BDDC0202E}"/>
               </a:ext>
             </a:extLst>
           </p:cNvPr>
@@ -17958,7 +17954,7 @@
           <p:cNvPr id="17" name="직선 연결선 16">
             <a:extLst>
               <a:ext uri="{FF2B5EF4-FFF2-40B4-BE49-F238E27FC236}">
-                <a16:creationId xmlns:a16="http://schemas.microsoft.com/office/drawing/2014/main" xmlns="" id="{794ABC3F-E006-42A8-AADB-4DFEEA572E6D}"/>
+                <a16:creationId xmlns:a16="http://schemas.microsoft.com/office/drawing/2014/main" id="{794ABC3F-E006-42A8-AADB-4DFEEA572E6D}"/>
               </a:ext>
             </a:extLst>
           </p:cNvPr>
@@ -18003,7 +17999,7 @@
           <p:cNvPr id="18" name="TextBox 17">
             <a:extLst>
               <a:ext uri="{FF2B5EF4-FFF2-40B4-BE49-F238E27FC236}">
-                <a16:creationId xmlns:a16="http://schemas.microsoft.com/office/drawing/2014/main" xmlns="" id="{22D2B7BF-104B-4EC5-9BA8-CCB75D5F3C69}"/>
+                <a16:creationId xmlns:a16="http://schemas.microsoft.com/office/drawing/2014/main" id="{22D2B7BF-104B-4EC5-9BA8-CCB75D5F3C69}"/>
               </a:ext>
             </a:extLst>
           </p:cNvPr>
@@ -18039,7 +18035,7 @@
           <p:cNvPr id="19" name="TextBox 18">
             <a:extLst>
               <a:ext uri="{FF2B5EF4-FFF2-40B4-BE49-F238E27FC236}">
-                <a16:creationId xmlns:a16="http://schemas.microsoft.com/office/drawing/2014/main" xmlns="" id="{9FD3CE90-3D24-4087-B7C4-DE277100862D}"/>
+                <a16:creationId xmlns:a16="http://schemas.microsoft.com/office/drawing/2014/main" id="{9FD3CE90-3D24-4087-B7C4-DE277100862D}"/>
               </a:ext>
             </a:extLst>
           </p:cNvPr>
@@ -18075,7 +18071,7 @@
           <p:cNvPr id="22" name="직선 연결선 21">
             <a:extLst>
               <a:ext uri="{FF2B5EF4-FFF2-40B4-BE49-F238E27FC236}">
-                <a16:creationId xmlns:a16="http://schemas.microsoft.com/office/drawing/2014/main" xmlns="" id="{E9D0A3C2-EB46-4B7F-89E3-139911679F58}"/>
+                <a16:creationId xmlns:a16="http://schemas.microsoft.com/office/drawing/2014/main" id="{E9D0A3C2-EB46-4B7F-89E3-139911679F58}"/>
               </a:ext>
             </a:extLst>
           </p:cNvPr>
@@ -18120,7 +18116,7 @@
           <p:cNvPr id="24" name="TextBox 23">
             <a:extLst>
               <a:ext uri="{FF2B5EF4-FFF2-40B4-BE49-F238E27FC236}">
-                <a16:creationId xmlns:a16="http://schemas.microsoft.com/office/drawing/2014/main" xmlns="" id="{A1FF7C1A-BC58-4F69-8202-FB3A84590824}"/>
+                <a16:creationId xmlns:a16="http://schemas.microsoft.com/office/drawing/2014/main" id="{A1FF7C1A-BC58-4F69-8202-FB3A84590824}"/>
               </a:ext>
             </a:extLst>
           </p:cNvPr>
@@ -18156,7 +18152,7 @@
           <p:cNvPr id="26" name="TextBox 25">
             <a:extLst>
               <a:ext uri="{FF2B5EF4-FFF2-40B4-BE49-F238E27FC236}">
-                <a16:creationId xmlns:a16="http://schemas.microsoft.com/office/drawing/2014/main" xmlns="" id="{8CFC58F2-37D4-4109-A233-5BE7E0F283FB}"/>
+                <a16:creationId xmlns:a16="http://schemas.microsoft.com/office/drawing/2014/main" id="{8CFC58F2-37D4-4109-A233-5BE7E0F283FB}"/>
               </a:ext>
             </a:extLst>
           </p:cNvPr>
@@ -18192,7 +18188,7 @@
           <p:cNvPr id="28" name="직선 연결선 27">
             <a:extLst>
               <a:ext uri="{FF2B5EF4-FFF2-40B4-BE49-F238E27FC236}">
-                <a16:creationId xmlns:a16="http://schemas.microsoft.com/office/drawing/2014/main" xmlns="" id="{8137D47D-8C8F-4A02-8927-F90FAEE8FE71}"/>
+                <a16:creationId xmlns:a16="http://schemas.microsoft.com/office/drawing/2014/main" id="{8137D47D-8C8F-4A02-8927-F90FAEE8FE71}"/>
               </a:ext>
             </a:extLst>
           </p:cNvPr>
@@ -18237,7 +18233,7 @@
           <p:cNvPr id="29" name="TextBox 28">
             <a:extLst>
               <a:ext uri="{FF2B5EF4-FFF2-40B4-BE49-F238E27FC236}">
-                <a16:creationId xmlns:a16="http://schemas.microsoft.com/office/drawing/2014/main" xmlns="" id="{70678C88-54B2-41B1-AA39-E199D1C780AA}"/>
+                <a16:creationId xmlns:a16="http://schemas.microsoft.com/office/drawing/2014/main" id="{70678C88-54B2-41B1-AA39-E199D1C780AA}"/>
               </a:ext>
             </a:extLst>
           </p:cNvPr>
@@ -18273,7 +18269,7 @@
           <p:cNvPr id="30" name="TextBox 29">
             <a:extLst>
               <a:ext uri="{FF2B5EF4-FFF2-40B4-BE49-F238E27FC236}">
-                <a16:creationId xmlns:a16="http://schemas.microsoft.com/office/drawing/2014/main" xmlns="" id="{9D1E9D31-C78B-46C4-9B2E-85BD8EDF4251}"/>
+                <a16:creationId xmlns:a16="http://schemas.microsoft.com/office/drawing/2014/main" id="{9D1E9D31-C78B-46C4-9B2E-85BD8EDF4251}"/>
               </a:ext>
             </a:extLst>
           </p:cNvPr>
@@ -18309,7 +18305,7 @@
           <p:cNvPr id="32" name="직선 연결선 31">
             <a:extLst>
               <a:ext uri="{FF2B5EF4-FFF2-40B4-BE49-F238E27FC236}">
-                <a16:creationId xmlns:a16="http://schemas.microsoft.com/office/drawing/2014/main" xmlns="" id="{B0D37BFE-EF99-47B1-A4CA-14FF336E318B}"/>
+                <a16:creationId xmlns:a16="http://schemas.microsoft.com/office/drawing/2014/main" id="{B0D37BFE-EF99-47B1-A4CA-14FF336E318B}"/>
               </a:ext>
             </a:extLst>
           </p:cNvPr>
@@ -18354,7 +18350,7 @@
           <p:cNvPr id="33" name="TextBox 32">
             <a:extLst>
               <a:ext uri="{FF2B5EF4-FFF2-40B4-BE49-F238E27FC236}">
-                <a16:creationId xmlns:a16="http://schemas.microsoft.com/office/drawing/2014/main" xmlns="" id="{DFE2871E-367C-456E-8632-07E54F51659D}"/>
+                <a16:creationId xmlns:a16="http://schemas.microsoft.com/office/drawing/2014/main" id="{DFE2871E-367C-456E-8632-07E54F51659D}"/>
               </a:ext>
             </a:extLst>
           </p:cNvPr>
@@ -18390,7 +18386,7 @@
           <p:cNvPr id="34" name="TextBox 33">
             <a:extLst>
               <a:ext uri="{FF2B5EF4-FFF2-40B4-BE49-F238E27FC236}">
-                <a16:creationId xmlns:a16="http://schemas.microsoft.com/office/drawing/2014/main" xmlns="" id="{82911719-FEF1-4DBB-8166-C203F868A7D9}"/>
+                <a16:creationId xmlns:a16="http://schemas.microsoft.com/office/drawing/2014/main" id="{82911719-FEF1-4DBB-8166-C203F868A7D9}"/>
               </a:ext>
             </a:extLst>
           </p:cNvPr>
@@ -18426,7 +18422,7 @@
           <p:cNvPr id="37" name="TextBox 36">
             <a:extLst>
               <a:ext uri="{FF2B5EF4-FFF2-40B4-BE49-F238E27FC236}">
-                <a16:creationId xmlns:a16="http://schemas.microsoft.com/office/drawing/2014/main" xmlns="" id="{B6443133-8063-4104-90AA-6C1A96AEFF25}"/>
+                <a16:creationId xmlns:a16="http://schemas.microsoft.com/office/drawing/2014/main" id="{B6443133-8063-4104-90AA-6C1A96AEFF25}"/>
               </a:ext>
             </a:extLst>
           </p:cNvPr>
@@ -18725,7 +18721,7 @@
           <p:cNvPr id="7" name="그림 6">
             <a:extLst>
               <a:ext uri="{FF2B5EF4-FFF2-40B4-BE49-F238E27FC236}">
-                <a16:creationId xmlns:a16="http://schemas.microsoft.com/office/drawing/2014/main" xmlns="" id="{40A4C828-B04A-4C88-A242-161B76BC29E9}"/>
+                <a16:creationId xmlns:a16="http://schemas.microsoft.com/office/drawing/2014/main" id="{40A4C828-B04A-4C88-A242-161B76BC29E9}"/>
               </a:ext>
             </a:extLst>
           </p:cNvPr>
@@ -18755,7 +18751,7 @@
           <p:cNvPr id="2" name="슬라이드 번호 개체 틀 1">
             <a:extLst>
               <a:ext uri="{FF2B5EF4-FFF2-40B4-BE49-F238E27FC236}">
-                <a16:creationId xmlns:a16="http://schemas.microsoft.com/office/drawing/2014/main" xmlns="" id="{766F4043-ACB7-49CC-BE53-543784E32DB3}"/>
+                <a16:creationId xmlns:a16="http://schemas.microsoft.com/office/drawing/2014/main" id="{766F4043-ACB7-49CC-BE53-543784E32DB3}"/>
               </a:ext>
             </a:extLst>
           </p:cNvPr>
@@ -18973,7 +18969,7 @@
           <p:cNvPr id="2" name="슬라이드 번호 개체 틀 1">
             <a:extLst>
               <a:ext uri="{FF2B5EF4-FFF2-40B4-BE49-F238E27FC236}">
-                <a16:creationId xmlns:a16="http://schemas.microsoft.com/office/drawing/2014/main" xmlns="" id="{7A881AB0-6BA1-4F62-B570-84FF1DDEB869}"/>
+                <a16:creationId xmlns:a16="http://schemas.microsoft.com/office/drawing/2014/main" id="{7A881AB0-6BA1-4F62-B570-84FF1DDEB869}"/>
               </a:ext>
             </a:extLst>
           </p:cNvPr>
@@ -19002,7 +18998,7 @@
           <p:cNvPr id="3" name="TextBox 2">
             <a:extLst>
               <a:ext uri="{FF2B5EF4-FFF2-40B4-BE49-F238E27FC236}">
-                <a16:creationId xmlns:a16="http://schemas.microsoft.com/office/drawing/2014/main" xmlns="" id="{3B13009C-4E35-4871-8905-71DCD827884B}"/>
+                <a16:creationId xmlns:a16="http://schemas.microsoft.com/office/drawing/2014/main" id="{3B13009C-4E35-4871-8905-71DCD827884B}"/>
               </a:ext>
             </a:extLst>
           </p:cNvPr>
@@ -19041,7 +19037,7 @@
           <p:cNvPr id="5" name="그림 4">
             <a:extLst>
               <a:ext uri="{FF2B5EF4-FFF2-40B4-BE49-F238E27FC236}">
-                <a16:creationId xmlns:a16="http://schemas.microsoft.com/office/drawing/2014/main" xmlns="" id="{36DDC0FE-4B9B-44A0-8899-9792FDF67965}"/>
+                <a16:creationId xmlns:a16="http://schemas.microsoft.com/office/drawing/2014/main" id="{36DDC0FE-4B9B-44A0-8899-9792FDF67965}"/>
               </a:ext>
             </a:extLst>
           </p:cNvPr>
@@ -19077,7 +19073,7 @@
           <p:cNvPr id="6" name="그림 5">
             <a:extLst>
               <a:ext uri="{FF2B5EF4-FFF2-40B4-BE49-F238E27FC236}">
-                <a16:creationId xmlns:a16="http://schemas.microsoft.com/office/drawing/2014/main" xmlns="" id="{90A49A59-FD0B-4871-9E36-6B2B05B073FE}"/>
+                <a16:creationId xmlns:a16="http://schemas.microsoft.com/office/drawing/2014/main" id="{90A49A59-FD0B-4871-9E36-6B2B05B073FE}"/>
               </a:ext>
             </a:extLst>
           </p:cNvPr>
@@ -19113,7 +19109,7 @@
           <p:cNvPr id="11" name="그림 10">
             <a:extLst>
               <a:ext uri="{FF2B5EF4-FFF2-40B4-BE49-F238E27FC236}">
-                <a16:creationId xmlns:a16="http://schemas.microsoft.com/office/drawing/2014/main" xmlns="" id="{DECC9577-36A6-4DFF-B7F9-333F31837B6C}"/>
+                <a16:creationId xmlns:a16="http://schemas.microsoft.com/office/drawing/2014/main" id="{DECC9577-36A6-4DFF-B7F9-333F31837B6C}"/>
               </a:ext>
             </a:extLst>
           </p:cNvPr>
@@ -19149,7 +19145,7 @@
           <p:cNvPr id="15" name="그림 14">
             <a:extLst>
               <a:ext uri="{FF2B5EF4-FFF2-40B4-BE49-F238E27FC236}">
-                <a16:creationId xmlns:a16="http://schemas.microsoft.com/office/drawing/2014/main" xmlns="" id="{B16866B5-8618-4CFA-969F-363366359907}"/>
+                <a16:creationId xmlns:a16="http://schemas.microsoft.com/office/drawing/2014/main" id="{B16866B5-8618-4CFA-969F-363366359907}"/>
               </a:ext>
             </a:extLst>
           </p:cNvPr>
@@ -19185,7 +19181,7 @@
           <p:cNvPr id="16" name="그림 15">
             <a:extLst>
               <a:ext uri="{FF2B5EF4-FFF2-40B4-BE49-F238E27FC236}">
-                <a16:creationId xmlns:a16="http://schemas.microsoft.com/office/drawing/2014/main" xmlns="" id="{0E8A5099-7F1A-4DED-A2E2-7259004671A1}"/>
+                <a16:creationId xmlns:a16="http://schemas.microsoft.com/office/drawing/2014/main" id="{0E8A5099-7F1A-4DED-A2E2-7259004671A1}"/>
               </a:ext>
             </a:extLst>
           </p:cNvPr>
@@ -19221,7 +19217,7 @@
           <p:cNvPr id="17" name="TextBox 16">
             <a:extLst>
               <a:ext uri="{FF2B5EF4-FFF2-40B4-BE49-F238E27FC236}">
-                <a16:creationId xmlns:a16="http://schemas.microsoft.com/office/drawing/2014/main" xmlns="" id="{D1E8705C-D8D6-49C5-B522-507ABE433A30}"/>
+                <a16:creationId xmlns:a16="http://schemas.microsoft.com/office/drawing/2014/main" id="{D1E8705C-D8D6-49C5-B522-507ABE433A30}"/>
               </a:ext>
             </a:extLst>
           </p:cNvPr>
@@ -19260,7 +19256,7 @@
           <p:cNvPr id="18" name="직선 연결선 17">
             <a:extLst>
               <a:ext uri="{FF2B5EF4-FFF2-40B4-BE49-F238E27FC236}">
-                <a16:creationId xmlns:a16="http://schemas.microsoft.com/office/drawing/2014/main" xmlns="" id="{97BE7529-EF10-4DFA-8FD7-FAF15631BC92}"/>
+                <a16:creationId xmlns:a16="http://schemas.microsoft.com/office/drawing/2014/main" id="{97BE7529-EF10-4DFA-8FD7-FAF15631BC92}"/>
               </a:ext>
             </a:extLst>
           </p:cNvPr>
@@ -19304,7 +19300,7 @@
           <p:cNvPr id="19" name="TextBox 18">
             <a:extLst>
               <a:ext uri="{FF2B5EF4-FFF2-40B4-BE49-F238E27FC236}">
-                <a16:creationId xmlns:a16="http://schemas.microsoft.com/office/drawing/2014/main" xmlns="" id="{055B2E87-1AD7-4817-B124-912F60976A7B}"/>
+                <a16:creationId xmlns:a16="http://schemas.microsoft.com/office/drawing/2014/main" id="{055B2E87-1AD7-4817-B124-912F60976A7B}"/>
               </a:ext>
             </a:extLst>
           </p:cNvPr>
@@ -19340,7 +19336,7 @@
           <p:cNvPr id="20" name="TextBox 19">
             <a:extLst>
               <a:ext uri="{FF2B5EF4-FFF2-40B4-BE49-F238E27FC236}">
-                <a16:creationId xmlns:a16="http://schemas.microsoft.com/office/drawing/2014/main" xmlns="" id="{C47F718A-6206-4615-8AD1-A9F0466EEEFA}"/>
+                <a16:creationId xmlns:a16="http://schemas.microsoft.com/office/drawing/2014/main" id="{C47F718A-6206-4615-8AD1-A9F0466EEEFA}"/>
               </a:ext>
             </a:extLst>
           </p:cNvPr>
@@ -19376,7 +19372,7 @@
           <p:cNvPr id="22" name="직선 연결선 21">
             <a:extLst>
               <a:ext uri="{FF2B5EF4-FFF2-40B4-BE49-F238E27FC236}">
-                <a16:creationId xmlns:a16="http://schemas.microsoft.com/office/drawing/2014/main" xmlns="" id="{8F7A2562-28DC-482C-B897-890B81FD7519}"/>
+                <a16:creationId xmlns:a16="http://schemas.microsoft.com/office/drawing/2014/main" id="{8F7A2562-28DC-482C-B897-890B81FD7519}"/>
               </a:ext>
             </a:extLst>
           </p:cNvPr>
@@ -19421,7 +19417,7 @@
           <p:cNvPr id="24" name="TextBox 23">
             <a:extLst>
               <a:ext uri="{FF2B5EF4-FFF2-40B4-BE49-F238E27FC236}">
-                <a16:creationId xmlns:a16="http://schemas.microsoft.com/office/drawing/2014/main" xmlns="" id="{DD3456F5-F394-461D-93B7-0A7465212164}"/>
+                <a16:creationId xmlns:a16="http://schemas.microsoft.com/office/drawing/2014/main" id="{DD3456F5-F394-461D-93B7-0A7465212164}"/>
               </a:ext>
             </a:extLst>
           </p:cNvPr>
@@ -19457,7 +19453,7 @@
           <p:cNvPr id="26" name="TextBox 25">
             <a:extLst>
               <a:ext uri="{FF2B5EF4-FFF2-40B4-BE49-F238E27FC236}">
-                <a16:creationId xmlns:a16="http://schemas.microsoft.com/office/drawing/2014/main" xmlns="" id="{DD71C9C2-BFDA-47FD-B7E7-F24243323C77}"/>
+                <a16:creationId xmlns:a16="http://schemas.microsoft.com/office/drawing/2014/main" id="{DD71C9C2-BFDA-47FD-B7E7-F24243323C77}"/>
               </a:ext>
             </a:extLst>
           </p:cNvPr>
@@ -19493,7 +19489,7 @@
           <p:cNvPr id="28" name="직선 연결선 27">
             <a:extLst>
               <a:ext uri="{FF2B5EF4-FFF2-40B4-BE49-F238E27FC236}">
-                <a16:creationId xmlns:a16="http://schemas.microsoft.com/office/drawing/2014/main" xmlns="" id="{8B6D87A0-395E-4CA9-9F61-0A3A679746E4}"/>
+                <a16:creationId xmlns:a16="http://schemas.microsoft.com/office/drawing/2014/main" id="{8B6D87A0-395E-4CA9-9F61-0A3A679746E4}"/>
               </a:ext>
             </a:extLst>
           </p:cNvPr>
@@ -19538,7 +19534,7 @@
           <p:cNvPr id="29" name="TextBox 28">
             <a:extLst>
               <a:ext uri="{FF2B5EF4-FFF2-40B4-BE49-F238E27FC236}">
-                <a16:creationId xmlns:a16="http://schemas.microsoft.com/office/drawing/2014/main" xmlns="" id="{A67C4734-F5BC-4AC2-A818-6C05AEA419E0}"/>
+                <a16:creationId xmlns:a16="http://schemas.microsoft.com/office/drawing/2014/main" id="{A67C4734-F5BC-4AC2-A818-6C05AEA419E0}"/>
               </a:ext>
             </a:extLst>
           </p:cNvPr>
@@ -19574,7 +19570,7 @@
           <p:cNvPr id="30" name="TextBox 29">
             <a:extLst>
               <a:ext uri="{FF2B5EF4-FFF2-40B4-BE49-F238E27FC236}">
-                <a16:creationId xmlns:a16="http://schemas.microsoft.com/office/drawing/2014/main" xmlns="" id="{24E01771-5076-4B9F-912C-63FD0B33A194}"/>
+                <a16:creationId xmlns:a16="http://schemas.microsoft.com/office/drawing/2014/main" id="{24E01771-5076-4B9F-912C-63FD0B33A194}"/>
               </a:ext>
             </a:extLst>
           </p:cNvPr>
@@ -19610,7 +19606,7 @@
           <p:cNvPr id="32" name="직선 연결선 31">
             <a:extLst>
               <a:ext uri="{FF2B5EF4-FFF2-40B4-BE49-F238E27FC236}">
-                <a16:creationId xmlns:a16="http://schemas.microsoft.com/office/drawing/2014/main" xmlns="" id="{23CEF5FF-98F6-426F-A9E8-D85A1D6417B7}"/>
+                <a16:creationId xmlns:a16="http://schemas.microsoft.com/office/drawing/2014/main" id="{23CEF5FF-98F6-426F-A9E8-D85A1D6417B7}"/>
               </a:ext>
             </a:extLst>
           </p:cNvPr>
@@ -19655,7 +19651,7 @@
           <p:cNvPr id="33" name="TextBox 32">
             <a:extLst>
               <a:ext uri="{FF2B5EF4-FFF2-40B4-BE49-F238E27FC236}">
-                <a16:creationId xmlns:a16="http://schemas.microsoft.com/office/drawing/2014/main" xmlns="" id="{B4B0D291-C262-4374-9975-5075D0E26F77}"/>
+                <a16:creationId xmlns:a16="http://schemas.microsoft.com/office/drawing/2014/main" id="{B4B0D291-C262-4374-9975-5075D0E26F77}"/>
               </a:ext>
             </a:extLst>
           </p:cNvPr>
@@ -19691,7 +19687,7 @@
           <p:cNvPr id="34" name="TextBox 33">
             <a:extLst>
               <a:ext uri="{FF2B5EF4-FFF2-40B4-BE49-F238E27FC236}">
-                <a16:creationId xmlns:a16="http://schemas.microsoft.com/office/drawing/2014/main" xmlns="" id="{04F77861-E414-4C5C-9102-4715E728A710}"/>
+                <a16:creationId xmlns:a16="http://schemas.microsoft.com/office/drawing/2014/main" id="{04F77861-E414-4C5C-9102-4715E728A710}"/>
               </a:ext>
             </a:extLst>
           </p:cNvPr>
@@ -19916,7 +19912,7 @@
           <p:cNvPr id="2" name="슬라이드 번호 개체 틀 1">
             <a:extLst>
               <a:ext uri="{FF2B5EF4-FFF2-40B4-BE49-F238E27FC236}">
-                <a16:creationId xmlns:a16="http://schemas.microsoft.com/office/drawing/2014/main" xmlns="" id="{7A881AB0-6BA1-4F62-B570-84FF1DDEB869}"/>
+                <a16:creationId xmlns:a16="http://schemas.microsoft.com/office/drawing/2014/main" id="{7A881AB0-6BA1-4F62-B570-84FF1DDEB869}"/>
               </a:ext>
             </a:extLst>
           </p:cNvPr>
@@ -19945,7 +19941,7 @@
           <p:cNvPr id="3" name="TextBox 2">
             <a:extLst>
               <a:ext uri="{FF2B5EF4-FFF2-40B4-BE49-F238E27FC236}">
-                <a16:creationId xmlns:a16="http://schemas.microsoft.com/office/drawing/2014/main" xmlns="" id="{3B13009C-4E35-4871-8905-71DCD827884B}"/>
+                <a16:creationId xmlns:a16="http://schemas.microsoft.com/office/drawing/2014/main" id="{3B13009C-4E35-4871-8905-71DCD827884B}"/>
               </a:ext>
             </a:extLst>
           </p:cNvPr>
@@ -19984,7 +19980,7 @@
           <p:cNvPr id="12" name="그림 11">
             <a:extLst>
               <a:ext uri="{FF2B5EF4-FFF2-40B4-BE49-F238E27FC236}">
-                <a16:creationId xmlns:a16="http://schemas.microsoft.com/office/drawing/2014/main" xmlns="" id="{8128BCDD-8B57-479E-8871-AD766A1F4334}"/>
+                <a16:creationId xmlns:a16="http://schemas.microsoft.com/office/drawing/2014/main" id="{8128BCDD-8B57-479E-8871-AD766A1F4334}"/>
               </a:ext>
             </a:extLst>
           </p:cNvPr>
@@ -20020,7 +20016,7 @@
           <p:cNvPr id="22" name="그림 21">
             <a:extLst>
               <a:ext uri="{FF2B5EF4-FFF2-40B4-BE49-F238E27FC236}">
-                <a16:creationId xmlns:a16="http://schemas.microsoft.com/office/drawing/2014/main" xmlns="" id="{57D85EBA-5E7C-4669-A9E0-CF3B7F48E069}"/>
+                <a16:creationId xmlns:a16="http://schemas.microsoft.com/office/drawing/2014/main" id="{57D85EBA-5E7C-4669-A9E0-CF3B7F48E069}"/>
               </a:ext>
             </a:extLst>
           </p:cNvPr>
@@ -20056,7 +20052,7 @@
           <p:cNvPr id="24" name="그림 23">
             <a:extLst>
               <a:ext uri="{FF2B5EF4-FFF2-40B4-BE49-F238E27FC236}">
-                <a16:creationId xmlns:a16="http://schemas.microsoft.com/office/drawing/2014/main" xmlns="" id="{2BBD1FB3-B883-4FA2-8D10-BE1B95AD9652}"/>
+                <a16:creationId xmlns:a16="http://schemas.microsoft.com/office/drawing/2014/main" id="{2BBD1FB3-B883-4FA2-8D10-BE1B95AD9652}"/>
               </a:ext>
             </a:extLst>
           </p:cNvPr>
@@ -20092,7 +20088,7 @@
           <p:cNvPr id="9" name="TextBox 8">
             <a:extLst>
               <a:ext uri="{FF2B5EF4-FFF2-40B4-BE49-F238E27FC236}">
-                <a16:creationId xmlns:a16="http://schemas.microsoft.com/office/drawing/2014/main" xmlns="" id="{F3504D33-ACB0-4B81-A49B-CE9CBABFFB37}"/>
+                <a16:creationId xmlns:a16="http://schemas.microsoft.com/office/drawing/2014/main" id="{F3504D33-ACB0-4B81-A49B-CE9CBABFFB37}"/>
               </a:ext>
             </a:extLst>
           </p:cNvPr>
@@ -20131,7 +20127,7 @@
           <p:cNvPr id="10" name="직선 연결선 9">
             <a:extLst>
               <a:ext uri="{FF2B5EF4-FFF2-40B4-BE49-F238E27FC236}">
-                <a16:creationId xmlns:a16="http://schemas.microsoft.com/office/drawing/2014/main" xmlns="" id="{1AAAFE4C-C7EE-48A7-ABCA-5943FE84A8AE}"/>
+                <a16:creationId xmlns:a16="http://schemas.microsoft.com/office/drawing/2014/main" id="{1AAAFE4C-C7EE-48A7-ABCA-5943FE84A8AE}"/>
               </a:ext>
             </a:extLst>
           </p:cNvPr>
@@ -20176,7 +20172,7 @@
           <p:cNvPr id="11" name="TextBox 10">
             <a:extLst>
               <a:ext uri="{FF2B5EF4-FFF2-40B4-BE49-F238E27FC236}">
-                <a16:creationId xmlns:a16="http://schemas.microsoft.com/office/drawing/2014/main" xmlns="" id="{DED2A084-FB12-4219-AE29-73DA5A80A554}"/>
+                <a16:creationId xmlns:a16="http://schemas.microsoft.com/office/drawing/2014/main" id="{DED2A084-FB12-4219-AE29-73DA5A80A554}"/>
               </a:ext>
             </a:extLst>
           </p:cNvPr>
@@ -20212,7 +20208,7 @@
           <p:cNvPr id="13" name="TextBox 12">
             <a:extLst>
               <a:ext uri="{FF2B5EF4-FFF2-40B4-BE49-F238E27FC236}">
-                <a16:creationId xmlns:a16="http://schemas.microsoft.com/office/drawing/2014/main" xmlns="" id="{C7C92FC4-39B6-4D6A-8303-06EE799D0E74}"/>
+                <a16:creationId xmlns:a16="http://schemas.microsoft.com/office/drawing/2014/main" id="{C7C92FC4-39B6-4D6A-8303-06EE799D0E74}"/>
               </a:ext>
             </a:extLst>
           </p:cNvPr>
@@ -20248,7 +20244,7 @@
           <p:cNvPr id="16" name="직선 연결선 15">
             <a:extLst>
               <a:ext uri="{FF2B5EF4-FFF2-40B4-BE49-F238E27FC236}">
-                <a16:creationId xmlns:a16="http://schemas.microsoft.com/office/drawing/2014/main" xmlns="" id="{B3D130EB-4A22-4D80-88F9-CD1996BC6589}"/>
+                <a16:creationId xmlns:a16="http://schemas.microsoft.com/office/drawing/2014/main" id="{B3D130EB-4A22-4D80-88F9-CD1996BC6589}"/>
               </a:ext>
             </a:extLst>
           </p:cNvPr>
@@ -20293,7 +20289,7 @@
           <p:cNvPr id="17" name="TextBox 16">
             <a:extLst>
               <a:ext uri="{FF2B5EF4-FFF2-40B4-BE49-F238E27FC236}">
-                <a16:creationId xmlns:a16="http://schemas.microsoft.com/office/drawing/2014/main" xmlns="" id="{84787933-8E05-4C2E-BBE2-9B96EEC138FB}"/>
+                <a16:creationId xmlns:a16="http://schemas.microsoft.com/office/drawing/2014/main" id="{84787933-8E05-4C2E-BBE2-9B96EEC138FB}"/>
               </a:ext>
             </a:extLst>
           </p:cNvPr>
@@ -20329,7 +20325,7 @@
           <p:cNvPr id="18" name="TextBox 17">
             <a:extLst>
               <a:ext uri="{FF2B5EF4-FFF2-40B4-BE49-F238E27FC236}">
-                <a16:creationId xmlns:a16="http://schemas.microsoft.com/office/drawing/2014/main" xmlns="" id="{92A185C3-8BE5-4C75-9C2F-EEECA3A0A0A3}"/>
+                <a16:creationId xmlns:a16="http://schemas.microsoft.com/office/drawing/2014/main" id="{92A185C3-8BE5-4C75-9C2F-EEECA3A0A0A3}"/>
               </a:ext>
             </a:extLst>
           </p:cNvPr>
@@ -20554,7 +20550,7 @@
           <p:cNvPr id="2" name="슬라이드 번호 개체 틀 1">
             <a:extLst>
               <a:ext uri="{FF2B5EF4-FFF2-40B4-BE49-F238E27FC236}">
-                <a16:creationId xmlns:a16="http://schemas.microsoft.com/office/drawing/2014/main" xmlns="" id="{7A881AB0-6BA1-4F62-B570-84FF1DDEB869}"/>
+                <a16:creationId xmlns:a16="http://schemas.microsoft.com/office/drawing/2014/main" id="{7A881AB0-6BA1-4F62-B570-84FF1DDEB869}"/>
               </a:ext>
             </a:extLst>
           </p:cNvPr>
@@ -20583,7 +20579,7 @@
           <p:cNvPr id="3" name="TextBox 2">
             <a:extLst>
               <a:ext uri="{FF2B5EF4-FFF2-40B4-BE49-F238E27FC236}">
-                <a16:creationId xmlns:a16="http://schemas.microsoft.com/office/drawing/2014/main" xmlns="" id="{3B13009C-4E35-4871-8905-71DCD827884B}"/>
+                <a16:creationId xmlns:a16="http://schemas.microsoft.com/office/drawing/2014/main" id="{3B13009C-4E35-4871-8905-71DCD827884B}"/>
               </a:ext>
             </a:extLst>
           </p:cNvPr>
@@ -20622,7 +20618,7 @@
           <p:cNvPr id="11" name="그림 10">
             <a:extLst>
               <a:ext uri="{FF2B5EF4-FFF2-40B4-BE49-F238E27FC236}">
-                <a16:creationId xmlns:a16="http://schemas.microsoft.com/office/drawing/2014/main" xmlns="" id="{DECC9577-36A6-4DFF-B7F9-333F31837B6C}"/>
+                <a16:creationId xmlns:a16="http://schemas.microsoft.com/office/drawing/2014/main" id="{DECC9577-36A6-4DFF-B7F9-333F31837B6C}"/>
               </a:ext>
             </a:extLst>
           </p:cNvPr>
@@ -20658,7 +20654,7 @@
           <p:cNvPr id="15" name="그림 14">
             <a:extLst>
               <a:ext uri="{FF2B5EF4-FFF2-40B4-BE49-F238E27FC236}">
-                <a16:creationId xmlns:a16="http://schemas.microsoft.com/office/drawing/2014/main" xmlns="" id="{65E2216D-5347-41BD-A132-056E8A610FCA}"/>
+                <a16:creationId xmlns:a16="http://schemas.microsoft.com/office/drawing/2014/main" id="{65E2216D-5347-41BD-A132-056E8A610FCA}"/>
               </a:ext>
             </a:extLst>
           </p:cNvPr>
@@ -20694,7 +20690,7 @@
           <p:cNvPr id="16" name="그림 15">
             <a:extLst>
               <a:ext uri="{FF2B5EF4-FFF2-40B4-BE49-F238E27FC236}">
-                <a16:creationId xmlns:a16="http://schemas.microsoft.com/office/drawing/2014/main" xmlns="" id="{E2B20D85-2136-48BB-816D-6CCCE3740925}"/>
+                <a16:creationId xmlns:a16="http://schemas.microsoft.com/office/drawing/2014/main" id="{E2B20D85-2136-48BB-816D-6CCCE3740925}"/>
               </a:ext>
             </a:extLst>
           </p:cNvPr>
@@ -20730,7 +20726,7 @@
           <p:cNvPr id="17" name="그림 16">
             <a:extLst>
               <a:ext uri="{FF2B5EF4-FFF2-40B4-BE49-F238E27FC236}">
-                <a16:creationId xmlns:a16="http://schemas.microsoft.com/office/drawing/2014/main" xmlns="" id="{EBD28824-60D0-4D9E-A9BF-32ACDF24E2F0}"/>
+                <a16:creationId xmlns:a16="http://schemas.microsoft.com/office/drawing/2014/main" id="{EBD28824-60D0-4D9E-A9BF-32ACDF24E2F0}"/>
               </a:ext>
             </a:extLst>
           </p:cNvPr>
@@ -20760,7 +20756,7 @@
           <p:cNvPr id="18" name="그림 17">
             <a:extLst>
               <a:ext uri="{FF2B5EF4-FFF2-40B4-BE49-F238E27FC236}">
-                <a16:creationId xmlns:a16="http://schemas.microsoft.com/office/drawing/2014/main" xmlns="" id="{0449F2EE-3910-484F-B521-6A7544C4A050}"/>
+                <a16:creationId xmlns:a16="http://schemas.microsoft.com/office/drawing/2014/main" id="{0449F2EE-3910-484F-B521-6A7544C4A050}"/>
               </a:ext>
             </a:extLst>
           </p:cNvPr>
@@ -20790,7 +20786,7 @@
           <p:cNvPr id="19" name="TextBox 18">
             <a:extLst>
               <a:ext uri="{FF2B5EF4-FFF2-40B4-BE49-F238E27FC236}">
-                <a16:creationId xmlns:a16="http://schemas.microsoft.com/office/drawing/2014/main" xmlns="" id="{E8F31936-E705-4F3D-AEB5-88BFD410649C}"/>
+                <a16:creationId xmlns:a16="http://schemas.microsoft.com/office/drawing/2014/main" id="{E8F31936-E705-4F3D-AEB5-88BFD410649C}"/>
               </a:ext>
             </a:extLst>
           </p:cNvPr>
@@ -20829,7 +20825,7 @@
           <p:cNvPr id="20" name="직선 연결선 19">
             <a:extLst>
               <a:ext uri="{FF2B5EF4-FFF2-40B4-BE49-F238E27FC236}">
-                <a16:creationId xmlns:a16="http://schemas.microsoft.com/office/drawing/2014/main" xmlns="" id="{70185E5A-9B41-467B-B542-9A9695400643}"/>
+                <a16:creationId xmlns:a16="http://schemas.microsoft.com/office/drawing/2014/main" id="{70185E5A-9B41-467B-B542-9A9695400643}"/>
               </a:ext>
             </a:extLst>
           </p:cNvPr>
@@ -20872,7 +20868,7 @@
           <p:cNvPr id="21" name="TextBox 20">
             <a:extLst>
               <a:ext uri="{FF2B5EF4-FFF2-40B4-BE49-F238E27FC236}">
-                <a16:creationId xmlns:a16="http://schemas.microsoft.com/office/drawing/2014/main" xmlns="" id="{ED33F37B-C004-4E2F-8CE0-221C0B792292}"/>
+                <a16:creationId xmlns:a16="http://schemas.microsoft.com/office/drawing/2014/main" id="{ED33F37B-C004-4E2F-8CE0-221C0B792292}"/>
               </a:ext>
             </a:extLst>
           </p:cNvPr>
@@ -20908,7 +20904,7 @@
           <p:cNvPr id="22" name="TextBox 21">
             <a:extLst>
               <a:ext uri="{FF2B5EF4-FFF2-40B4-BE49-F238E27FC236}">
-                <a16:creationId xmlns:a16="http://schemas.microsoft.com/office/drawing/2014/main" xmlns="" id="{22D46A3B-40A2-4939-8628-3BDE8635CA3C}"/>
+                <a16:creationId xmlns:a16="http://schemas.microsoft.com/office/drawing/2014/main" id="{22D46A3B-40A2-4939-8628-3BDE8635CA3C}"/>
               </a:ext>
             </a:extLst>
           </p:cNvPr>
@@ -20944,7 +20940,7 @@
           <p:cNvPr id="24" name="직선 연결선 23">
             <a:extLst>
               <a:ext uri="{FF2B5EF4-FFF2-40B4-BE49-F238E27FC236}">
-                <a16:creationId xmlns:a16="http://schemas.microsoft.com/office/drawing/2014/main" xmlns="" id="{1DA35B7A-7837-473F-92E2-3CC8240F18D0}"/>
+                <a16:creationId xmlns:a16="http://schemas.microsoft.com/office/drawing/2014/main" id="{1DA35B7A-7837-473F-92E2-3CC8240F18D0}"/>
               </a:ext>
             </a:extLst>
           </p:cNvPr>
@@ -20989,7 +20985,7 @@
           <p:cNvPr id="26" name="TextBox 25">
             <a:extLst>
               <a:ext uri="{FF2B5EF4-FFF2-40B4-BE49-F238E27FC236}">
-                <a16:creationId xmlns:a16="http://schemas.microsoft.com/office/drawing/2014/main" xmlns="" id="{B7C43F5F-FF1D-4183-87C3-136053FCD213}"/>
+                <a16:creationId xmlns:a16="http://schemas.microsoft.com/office/drawing/2014/main" id="{B7C43F5F-FF1D-4183-87C3-136053FCD213}"/>
               </a:ext>
             </a:extLst>
           </p:cNvPr>
@@ -21025,7 +21021,7 @@
           <p:cNvPr id="28" name="TextBox 27">
             <a:extLst>
               <a:ext uri="{FF2B5EF4-FFF2-40B4-BE49-F238E27FC236}">
-                <a16:creationId xmlns:a16="http://schemas.microsoft.com/office/drawing/2014/main" xmlns="" id="{3E1E0AB3-2F87-44F0-92D6-385495778602}"/>
+                <a16:creationId xmlns:a16="http://schemas.microsoft.com/office/drawing/2014/main" id="{3E1E0AB3-2F87-44F0-92D6-385495778602}"/>
               </a:ext>
             </a:extLst>
           </p:cNvPr>
@@ -21061,7 +21057,7 @@
           <p:cNvPr id="29" name="직선 연결선 28">
             <a:extLst>
               <a:ext uri="{FF2B5EF4-FFF2-40B4-BE49-F238E27FC236}">
-                <a16:creationId xmlns:a16="http://schemas.microsoft.com/office/drawing/2014/main" xmlns="" id="{95982A8D-4D3E-44CB-A234-12536C058083}"/>
+                <a16:creationId xmlns:a16="http://schemas.microsoft.com/office/drawing/2014/main" id="{95982A8D-4D3E-44CB-A234-12536C058083}"/>
               </a:ext>
             </a:extLst>
           </p:cNvPr>
@@ -21106,7 +21102,7 @@
           <p:cNvPr id="30" name="TextBox 29">
             <a:extLst>
               <a:ext uri="{FF2B5EF4-FFF2-40B4-BE49-F238E27FC236}">
-                <a16:creationId xmlns:a16="http://schemas.microsoft.com/office/drawing/2014/main" xmlns="" id="{3937DEF3-FB57-4461-B0FB-C66DDEF130A8}"/>
+                <a16:creationId xmlns:a16="http://schemas.microsoft.com/office/drawing/2014/main" id="{3937DEF3-FB57-4461-B0FB-C66DDEF130A8}"/>
               </a:ext>
             </a:extLst>
           </p:cNvPr>
@@ -21142,7 +21138,7 @@
           <p:cNvPr id="31" name="TextBox 30">
             <a:extLst>
               <a:ext uri="{FF2B5EF4-FFF2-40B4-BE49-F238E27FC236}">
-                <a16:creationId xmlns:a16="http://schemas.microsoft.com/office/drawing/2014/main" xmlns="" id="{26C5FCFB-B163-4DED-917C-7A0E957BF788}"/>
+                <a16:creationId xmlns:a16="http://schemas.microsoft.com/office/drawing/2014/main" id="{26C5FCFB-B163-4DED-917C-7A0E957BF788}"/>
               </a:ext>
             </a:extLst>
           </p:cNvPr>
@@ -21178,7 +21174,7 @@
           <p:cNvPr id="34" name="직선 연결선 33">
             <a:extLst>
               <a:ext uri="{FF2B5EF4-FFF2-40B4-BE49-F238E27FC236}">
-                <a16:creationId xmlns:a16="http://schemas.microsoft.com/office/drawing/2014/main" xmlns="" id="{60AE86AB-A3AF-4663-840B-E135049029DB}"/>
+                <a16:creationId xmlns:a16="http://schemas.microsoft.com/office/drawing/2014/main" id="{60AE86AB-A3AF-4663-840B-E135049029DB}"/>
               </a:ext>
             </a:extLst>
           </p:cNvPr>
@@ -21223,7 +21219,7 @@
           <p:cNvPr id="35" name="TextBox 34">
             <a:extLst>
               <a:ext uri="{FF2B5EF4-FFF2-40B4-BE49-F238E27FC236}">
-                <a16:creationId xmlns:a16="http://schemas.microsoft.com/office/drawing/2014/main" xmlns="" id="{672A2DD9-5CDC-473E-9616-9E99CB280D2B}"/>
+                <a16:creationId xmlns:a16="http://schemas.microsoft.com/office/drawing/2014/main" id="{672A2DD9-5CDC-473E-9616-9E99CB280D2B}"/>
               </a:ext>
             </a:extLst>
           </p:cNvPr>
@@ -21259,7 +21255,7 @@
           <p:cNvPr id="36" name="TextBox 35">
             <a:extLst>
               <a:ext uri="{FF2B5EF4-FFF2-40B4-BE49-F238E27FC236}">
-                <a16:creationId xmlns:a16="http://schemas.microsoft.com/office/drawing/2014/main" xmlns="" id="{0CBD19C6-871D-4E5A-9E53-27F599C7E9BE}"/>
+                <a16:creationId xmlns:a16="http://schemas.microsoft.com/office/drawing/2014/main" id="{0CBD19C6-871D-4E5A-9E53-27F599C7E9BE}"/>
               </a:ext>
             </a:extLst>
           </p:cNvPr>
@@ -21295,7 +21291,7 @@
           <p:cNvPr id="47" name="그림 46">
             <a:extLst>
               <a:ext uri="{FF2B5EF4-FFF2-40B4-BE49-F238E27FC236}">
-                <a16:creationId xmlns:a16="http://schemas.microsoft.com/office/drawing/2014/main" xmlns="" id="{14ABE2F6-7531-4DED-90A9-A2F97FBA1D51}"/>
+                <a16:creationId xmlns:a16="http://schemas.microsoft.com/office/drawing/2014/main" id="{14ABE2F6-7531-4DED-90A9-A2F97FBA1D51}"/>
               </a:ext>
             </a:extLst>
           </p:cNvPr>
@@ -21325,7 +21321,7 @@
           <p:cNvPr id="50" name="직선 연결선 49">
             <a:extLst>
               <a:ext uri="{FF2B5EF4-FFF2-40B4-BE49-F238E27FC236}">
-                <a16:creationId xmlns:a16="http://schemas.microsoft.com/office/drawing/2014/main" xmlns="" id="{67129E18-33DA-4A92-B68C-3C26383FFF2F}"/>
+                <a16:creationId xmlns:a16="http://schemas.microsoft.com/office/drawing/2014/main" id="{67129E18-33DA-4A92-B68C-3C26383FFF2F}"/>
               </a:ext>
             </a:extLst>
           </p:cNvPr>
@@ -21370,7 +21366,7 @@
           <p:cNvPr id="55" name="TextBox 54">
             <a:extLst>
               <a:ext uri="{FF2B5EF4-FFF2-40B4-BE49-F238E27FC236}">
-                <a16:creationId xmlns:a16="http://schemas.microsoft.com/office/drawing/2014/main" xmlns="" id="{16EA9510-B4C1-4C46-A73F-617789AC4AFB}"/>
+                <a16:creationId xmlns:a16="http://schemas.microsoft.com/office/drawing/2014/main" id="{16EA9510-B4C1-4C46-A73F-617789AC4AFB}"/>
               </a:ext>
             </a:extLst>
           </p:cNvPr>
@@ -21406,7 +21402,7 @@
           <p:cNvPr id="56" name="TextBox 55">
             <a:extLst>
               <a:ext uri="{FF2B5EF4-FFF2-40B4-BE49-F238E27FC236}">
-                <a16:creationId xmlns:a16="http://schemas.microsoft.com/office/drawing/2014/main" xmlns="" id="{65C9C577-5D29-4498-84D7-19C69BD36B3D}"/>
+                <a16:creationId xmlns:a16="http://schemas.microsoft.com/office/drawing/2014/main" id="{65C9C577-5D29-4498-84D7-19C69BD36B3D}"/>
               </a:ext>
             </a:extLst>
           </p:cNvPr>
@@ -21442,7 +21438,7 @@
           <p:cNvPr id="57" name="직선 연결선 56">
             <a:extLst>
               <a:ext uri="{FF2B5EF4-FFF2-40B4-BE49-F238E27FC236}">
-                <a16:creationId xmlns:a16="http://schemas.microsoft.com/office/drawing/2014/main" xmlns="" id="{337BB1D0-FD5D-48E8-8CA2-0694145CE851}"/>
+                <a16:creationId xmlns:a16="http://schemas.microsoft.com/office/drawing/2014/main" id="{337BB1D0-FD5D-48E8-8CA2-0694145CE851}"/>
               </a:ext>
             </a:extLst>
           </p:cNvPr>
@@ -21486,7 +21482,7 @@
           <p:cNvPr id="60" name="TextBox 59">
             <a:extLst>
               <a:ext uri="{FF2B5EF4-FFF2-40B4-BE49-F238E27FC236}">
-                <a16:creationId xmlns:a16="http://schemas.microsoft.com/office/drawing/2014/main" xmlns="" id="{BBCF8009-4B63-4811-8731-8B7501AB0CED}"/>
+                <a16:creationId xmlns:a16="http://schemas.microsoft.com/office/drawing/2014/main" id="{BBCF8009-4B63-4811-8731-8B7501AB0CED}"/>
               </a:ext>
             </a:extLst>
           </p:cNvPr>
@@ -21522,7 +21518,7 @@
           <p:cNvPr id="61" name="TextBox 60">
             <a:extLst>
               <a:ext uri="{FF2B5EF4-FFF2-40B4-BE49-F238E27FC236}">
-                <a16:creationId xmlns:a16="http://schemas.microsoft.com/office/drawing/2014/main" xmlns="" id="{A1A991D0-D263-4A6B-B1A6-D4DE56E7FDD9}"/>
+                <a16:creationId xmlns:a16="http://schemas.microsoft.com/office/drawing/2014/main" id="{A1A991D0-D263-4A6B-B1A6-D4DE56E7FDD9}"/>
               </a:ext>
             </a:extLst>
           </p:cNvPr>
@@ -21747,7 +21743,7 @@
           <p:cNvPr id="2" name="슬라이드 번호 개체 틀 1">
             <a:extLst>
               <a:ext uri="{FF2B5EF4-FFF2-40B4-BE49-F238E27FC236}">
-                <a16:creationId xmlns:a16="http://schemas.microsoft.com/office/drawing/2014/main" xmlns="" id="{7A881AB0-6BA1-4F62-B570-84FF1DDEB869}"/>
+                <a16:creationId xmlns:a16="http://schemas.microsoft.com/office/drawing/2014/main" id="{7A881AB0-6BA1-4F62-B570-84FF1DDEB869}"/>
               </a:ext>
             </a:extLst>
           </p:cNvPr>
@@ -21776,7 +21772,7 @@
           <p:cNvPr id="3" name="TextBox 2">
             <a:extLst>
               <a:ext uri="{FF2B5EF4-FFF2-40B4-BE49-F238E27FC236}">
-                <a16:creationId xmlns:a16="http://schemas.microsoft.com/office/drawing/2014/main" xmlns="" id="{3B13009C-4E35-4871-8905-71DCD827884B}"/>
+                <a16:creationId xmlns:a16="http://schemas.microsoft.com/office/drawing/2014/main" id="{3B13009C-4E35-4871-8905-71DCD827884B}"/>
               </a:ext>
             </a:extLst>
           </p:cNvPr>
@@ -21815,7 +21811,7 @@
           <p:cNvPr id="15" name="TextBox 14">
             <a:extLst>
               <a:ext uri="{FF2B5EF4-FFF2-40B4-BE49-F238E27FC236}">
-                <a16:creationId xmlns:a16="http://schemas.microsoft.com/office/drawing/2014/main" xmlns="" id="{5B1EABB4-5257-4D21-BBF8-F35D5F469D13}"/>
+                <a16:creationId xmlns:a16="http://schemas.microsoft.com/office/drawing/2014/main" id="{5B1EABB4-5257-4D21-BBF8-F35D5F469D13}"/>
               </a:ext>
             </a:extLst>
           </p:cNvPr>
@@ -21854,7 +21850,7 @@
           <p:cNvPr id="4" name="그림 3">
             <a:extLst>
               <a:ext uri="{FF2B5EF4-FFF2-40B4-BE49-F238E27FC236}">
-                <a16:creationId xmlns:a16="http://schemas.microsoft.com/office/drawing/2014/main" xmlns="" id="{A1D08AE5-D7ED-4AEC-8B3C-A23E57495E89}"/>
+                <a16:creationId xmlns:a16="http://schemas.microsoft.com/office/drawing/2014/main" id="{A1D08AE5-D7ED-4AEC-8B3C-A23E57495E89}"/>
               </a:ext>
             </a:extLst>
           </p:cNvPr>
@@ -21884,7 +21880,7 @@
           <p:cNvPr id="7" name="그림 6">
             <a:extLst>
               <a:ext uri="{FF2B5EF4-FFF2-40B4-BE49-F238E27FC236}">
-                <a16:creationId xmlns:a16="http://schemas.microsoft.com/office/drawing/2014/main" xmlns="" id="{A9E50A00-DBE1-4123-A17E-10DA69C67952}"/>
+                <a16:creationId xmlns:a16="http://schemas.microsoft.com/office/drawing/2014/main" id="{A9E50A00-DBE1-4123-A17E-10DA69C67952}"/>
               </a:ext>
             </a:extLst>
           </p:cNvPr>
@@ -21914,7 +21910,7 @@
           <p:cNvPr id="8" name="그림 7">
             <a:extLst>
               <a:ext uri="{FF2B5EF4-FFF2-40B4-BE49-F238E27FC236}">
-                <a16:creationId xmlns:a16="http://schemas.microsoft.com/office/drawing/2014/main" xmlns="" id="{E7B6A7A8-3055-4B16-AE0B-5F82BCF1FD9B}"/>
+                <a16:creationId xmlns:a16="http://schemas.microsoft.com/office/drawing/2014/main" id="{E7B6A7A8-3055-4B16-AE0B-5F82BCF1FD9B}"/>
               </a:ext>
             </a:extLst>
           </p:cNvPr>
@@ -22133,7 +22129,7 @@
           <p:cNvPr id="2" name="슬라이드 번호 개체 틀 1">
             <a:extLst>
               <a:ext uri="{FF2B5EF4-FFF2-40B4-BE49-F238E27FC236}">
-                <a16:creationId xmlns:a16="http://schemas.microsoft.com/office/drawing/2014/main" xmlns="" id="{7A881AB0-6BA1-4F62-B570-84FF1DDEB869}"/>
+                <a16:creationId xmlns:a16="http://schemas.microsoft.com/office/drawing/2014/main" id="{7A881AB0-6BA1-4F62-B570-84FF1DDEB869}"/>
               </a:ext>
             </a:extLst>
           </p:cNvPr>
@@ -22162,7 +22158,7 @@
           <p:cNvPr id="3" name="TextBox 2">
             <a:extLst>
               <a:ext uri="{FF2B5EF4-FFF2-40B4-BE49-F238E27FC236}">
-                <a16:creationId xmlns:a16="http://schemas.microsoft.com/office/drawing/2014/main" xmlns="" id="{3B13009C-4E35-4871-8905-71DCD827884B}"/>
+                <a16:creationId xmlns:a16="http://schemas.microsoft.com/office/drawing/2014/main" id="{3B13009C-4E35-4871-8905-71DCD827884B}"/>
               </a:ext>
             </a:extLst>
           </p:cNvPr>
@@ -22201,7 +22197,7 @@
           <p:cNvPr id="23" name="그림 22">
             <a:extLst>
               <a:ext uri="{FF2B5EF4-FFF2-40B4-BE49-F238E27FC236}">
-                <a16:creationId xmlns:a16="http://schemas.microsoft.com/office/drawing/2014/main" xmlns="" id="{9C9813FA-E26E-46F8-81F3-C3A2F80D855B}"/>
+                <a16:creationId xmlns:a16="http://schemas.microsoft.com/office/drawing/2014/main" id="{9C9813FA-E26E-46F8-81F3-C3A2F80D855B}"/>
               </a:ext>
             </a:extLst>
           </p:cNvPr>
@@ -22237,7 +22233,7 @@
           <p:cNvPr id="25" name="그림 24">
             <a:extLst>
               <a:ext uri="{FF2B5EF4-FFF2-40B4-BE49-F238E27FC236}">
-                <a16:creationId xmlns:a16="http://schemas.microsoft.com/office/drawing/2014/main" xmlns="" id="{63B899A9-3E1E-41FE-AEF4-BB2358B7F98F}"/>
+                <a16:creationId xmlns:a16="http://schemas.microsoft.com/office/drawing/2014/main" id="{63B899A9-3E1E-41FE-AEF4-BB2358B7F98F}"/>
               </a:ext>
             </a:extLst>
           </p:cNvPr>
@@ -22273,7 +22269,7 @@
           <p:cNvPr id="27" name="그림 26">
             <a:extLst>
               <a:ext uri="{FF2B5EF4-FFF2-40B4-BE49-F238E27FC236}">
-                <a16:creationId xmlns:a16="http://schemas.microsoft.com/office/drawing/2014/main" xmlns="" id="{766FC2A9-B16E-4A52-827C-C160000F1C8E}"/>
+                <a16:creationId xmlns:a16="http://schemas.microsoft.com/office/drawing/2014/main" id="{766FC2A9-B16E-4A52-827C-C160000F1C8E}"/>
               </a:ext>
             </a:extLst>
           </p:cNvPr>
@@ -22309,7 +22305,7 @@
           <p:cNvPr id="15" name="TextBox 14">
             <a:extLst>
               <a:ext uri="{FF2B5EF4-FFF2-40B4-BE49-F238E27FC236}">
-                <a16:creationId xmlns:a16="http://schemas.microsoft.com/office/drawing/2014/main" xmlns="" id="{5B1EABB4-5257-4D21-BBF8-F35D5F469D13}"/>
+                <a16:creationId xmlns:a16="http://schemas.microsoft.com/office/drawing/2014/main" id="{5B1EABB4-5257-4D21-BBF8-F35D5F469D13}"/>
               </a:ext>
             </a:extLst>
           </p:cNvPr>
@@ -22348,7 +22344,7 @@
           <p:cNvPr id="10" name="그림 9">
             <a:extLst>
               <a:ext uri="{FF2B5EF4-FFF2-40B4-BE49-F238E27FC236}">
-                <a16:creationId xmlns:a16="http://schemas.microsoft.com/office/drawing/2014/main" xmlns="" id="{A2846E05-F5D2-47B4-941E-B635688D55F4}"/>
+                <a16:creationId xmlns:a16="http://schemas.microsoft.com/office/drawing/2014/main" id="{A2846E05-F5D2-47B4-941E-B635688D55F4}"/>
               </a:ext>
             </a:extLst>
           </p:cNvPr>
@@ -22378,7 +22374,7 @@
           <p:cNvPr id="12" name="그림 11">
             <a:extLst>
               <a:ext uri="{FF2B5EF4-FFF2-40B4-BE49-F238E27FC236}">
-                <a16:creationId xmlns:a16="http://schemas.microsoft.com/office/drawing/2014/main" xmlns="" id="{DFFDE8ED-2697-46C6-8DFC-AC7997C18148}"/>
+                <a16:creationId xmlns:a16="http://schemas.microsoft.com/office/drawing/2014/main" id="{DFFDE8ED-2697-46C6-8DFC-AC7997C18148}"/>
               </a:ext>
             </a:extLst>
           </p:cNvPr>
@@ -22408,7 +22404,7 @@
           <p:cNvPr id="16" name="그림 15">
             <a:extLst>
               <a:ext uri="{FF2B5EF4-FFF2-40B4-BE49-F238E27FC236}">
-                <a16:creationId xmlns:a16="http://schemas.microsoft.com/office/drawing/2014/main" xmlns="" id="{7C609FDE-4E67-4C05-B682-E18D90210341}"/>
+                <a16:creationId xmlns:a16="http://schemas.microsoft.com/office/drawing/2014/main" id="{7C609FDE-4E67-4C05-B682-E18D90210341}"/>
               </a:ext>
             </a:extLst>
           </p:cNvPr>
@@ -22438,7 +22434,7 @@
           <p:cNvPr id="21" name="직선 연결선 20">
             <a:extLst>
               <a:ext uri="{FF2B5EF4-FFF2-40B4-BE49-F238E27FC236}">
-                <a16:creationId xmlns:a16="http://schemas.microsoft.com/office/drawing/2014/main" xmlns="" id="{DAF31414-7013-4831-8AAE-1835DC73F38B}"/>
+                <a16:creationId xmlns:a16="http://schemas.microsoft.com/office/drawing/2014/main" id="{DAF31414-7013-4831-8AAE-1835DC73F38B}"/>
               </a:ext>
             </a:extLst>
           </p:cNvPr>
@@ -22483,7 +22479,7 @@
           <p:cNvPr id="22" name="TextBox 21">
             <a:extLst>
               <a:ext uri="{FF2B5EF4-FFF2-40B4-BE49-F238E27FC236}">
-                <a16:creationId xmlns:a16="http://schemas.microsoft.com/office/drawing/2014/main" xmlns="" id="{131A0C53-2AF8-4480-A197-78F14BA056C5}"/>
+                <a16:creationId xmlns:a16="http://schemas.microsoft.com/office/drawing/2014/main" id="{131A0C53-2AF8-4480-A197-78F14BA056C5}"/>
               </a:ext>
             </a:extLst>
           </p:cNvPr>
@@ -22519,7 +22515,7 @@
           <p:cNvPr id="24" name="TextBox 23">
             <a:extLst>
               <a:ext uri="{FF2B5EF4-FFF2-40B4-BE49-F238E27FC236}">
-                <a16:creationId xmlns:a16="http://schemas.microsoft.com/office/drawing/2014/main" xmlns="" id="{F2D9DA00-148A-45F3-8C4E-C57AE9D2EAF9}"/>
+                <a16:creationId xmlns:a16="http://schemas.microsoft.com/office/drawing/2014/main" id="{F2D9DA00-148A-45F3-8C4E-C57AE9D2EAF9}"/>
               </a:ext>
             </a:extLst>
           </p:cNvPr>
@@ -22555,7 +22551,7 @@
           <p:cNvPr id="28" name="직선 연결선 27">
             <a:extLst>
               <a:ext uri="{FF2B5EF4-FFF2-40B4-BE49-F238E27FC236}">
-                <a16:creationId xmlns:a16="http://schemas.microsoft.com/office/drawing/2014/main" xmlns="" id="{F7600AA8-CF62-4E20-ABC7-4CCCB4A93065}"/>
+                <a16:creationId xmlns:a16="http://schemas.microsoft.com/office/drawing/2014/main" id="{F7600AA8-CF62-4E20-ABC7-4CCCB4A93065}"/>
               </a:ext>
             </a:extLst>
           </p:cNvPr>
@@ -22599,7 +22595,7 @@
           <p:cNvPr id="29" name="TextBox 28">
             <a:extLst>
               <a:ext uri="{FF2B5EF4-FFF2-40B4-BE49-F238E27FC236}">
-                <a16:creationId xmlns:a16="http://schemas.microsoft.com/office/drawing/2014/main" xmlns="" id="{8C2A9B60-B38C-41A7-A235-AEDA8FFBBB92}"/>
+                <a16:creationId xmlns:a16="http://schemas.microsoft.com/office/drawing/2014/main" id="{8C2A9B60-B38C-41A7-A235-AEDA8FFBBB92}"/>
               </a:ext>
             </a:extLst>
           </p:cNvPr>
@@ -22635,7 +22631,7 @@
           <p:cNvPr id="30" name="TextBox 29">
             <a:extLst>
               <a:ext uri="{FF2B5EF4-FFF2-40B4-BE49-F238E27FC236}">
-                <a16:creationId xmlns:a16="http://schemas.microsoft.com/office/drawing/2014/main" xmlns="" id="{7CCE2300-B990-4CA3-82DC-BD6BC9E042E9}"/>
+                <a16:creationId xmlns:a16="http://schemas.microsoft.com/office/drawing/2014/main" id="{7CCE2300-B990-4CA3-82DC-BD6BC9E042E9}"/>
               </a:ext>
             </a:extLst>
           </p:cNvPr>
@@ -22860,7 +22856,7 @@
           <p:cNvPr id="2" name="슬라이드 번호 개체 틀 1">
             <a:extLst>
               <a:ext uri="{FF2B5EF4-FFF2-40B4-BE49-F238E27FC236}">
-                <a16:creationId xmlns:a16="http://schemas.microsoft.com/office/drawing/2014/main" xmlns="" id="{7A881AB0-6BA1-4F62-B570-84FF1DDEB869}"/>
+                <a16:creationId xmlns:a16="http://schemas.microsoft.com/office/drawing/2014/main" id="{7A881AB0-6BA1-4F62-B570-84FF1DDEB869}"/>
               </a:ext>
             </a:extLst>
           </p:cNvPr>
@@ -22889,7 +22885,7 @@
           <p:cNvPr id="3" name="TextBox 2">
             <a:extLst>
               <a:ext uri="{FF2B5EF4-FFF2-40B4-BE49-F238E27FC236}">
-                <a16:creationId xmlns:a16="http://schemas.microsoft.com/office/drawing/2014/main" xmlns="" id="{3B13009C-4E35-4871-8905-71DCD827884B}"/>
+                <a16:creationId xmlns:a16="http://schemas.microsoft.com/office/drawing/2014/main" id="{3B13009C-4E35-4871-8905-71DCD827884B}"/>
               </a:ext>
             </a:extLst>
           </p:cNvPr>
@@ -22928,7 +22924,7 @@
           <p:cNvPr id="5" name="그림 4">
             <a:extLst>
               <a:ext uri="{FF2B5EF4-FFF2-40B4-BE49-F238E27FC236}">
-                <a16:creationId xmlns:a16="http://schemas.microsoft.com/office/drawing/2014/main" xmlns="" id="{68A867D9-D079-4AFB-BEA4-BD018623B251}"/>
+                <a16:creationId xmlns:a16="http://schemas.microsoft.com/office/drawing/2014/main" id="{68A867D9-D079-4AFB-BEA4-BD018623B251}"/>
               </a:ext>
             </a:extLst>
           </p:cNvPr>
@@ -22964,7 +22960,7 @@
           <p:cNvPr id="8" name="그림 7">
             <a:extLst>
               <a:ext uri="{FF2B5EF4-FFF2-40B4-BE49-F238E27FC236}">
-                <a16:creationId xmlns:a16="http://schemas.microsoft.com/office/drawing/2014/main" xmlns="" id="{016A1C59-6316-46C8-9291-3FD4878B5221}"/>
+                <a16:creationId xmlns:a16="http://schemas.microsoft.com/office/drawing/2014/main" id="{016A1C59-6316-46C8-9291-3FD4878B5221}"/>
               </a:ext>
             </a:extLst>
           </p:cNvPr>
@@ -23000,7 +22996,7 @@
           <p:cNvPr id="10" name="그림 9">
             <a:extLst>
               <a:ext uri="{FF2B5EF4-FFF2-40B4-BE49-F238E27FC236}">
-                <a16:creationId xmlns:a16="http://schemas.microsoft.com/office/drawing/2014/main" xmlns="" id="{51CD1F26-DD7F-4FA0-84F6-B97B7D39DA73}"/>
+                <a16:creationId xmlns:a16="http://schemas.microsoft.com/office/drawing/2014/main" id="{51CD1F26-DD7F-4FA0-84F6-B97B7D39DA73}"/>
               </a:ext>
             </a:extLst>
           </p:cNvPr>
@@ -23036,7 +23032,7 @@
           <p:cNvPr id="13" name="그림 12">
             <a:extLst>
               <a:ext uri="{FF2B5EF4-FFF2-40B4-BE49-F238E27FC236}">
-                <a16:creationId xmlns:a16="http://schemas.microsoft.com/office/drawing/2014/main" xmlns="" id="{6755A036-7D6B-4003-88A5-005D401B1685}"/>
+                <a16:creationId xmlns:a16="http://schemas.microsoft.com/office/drawing/2014/main" id="{6755A036-7D6B-4003-88A5-005D401B1685}"/>
               </a:ext>
             </a:extLst>
           </p:cNvPr>
@@ -23072,7 +23068,7 @@
           <p:cNvPr id="16" name="그림 15">
             <a:extLst>
               <a:ext uri="{FF2B5EF4-FFF2-40B4-BE49-F238E27FC236}">
-                <a16:creationId xmlns:a16="http://schemas.microsoft.com/office/drawing/2014/main" xmlns="" id="{0A558D44-BE9F-4BF7-A573-729113081CFA}"/>
+                <a16:creationId xmlns:a16="http://schemas.microsoft.com/office/drawing/2014/main" id="{0A558D44-BE9F-4BF7-A573-729113081CFA}"/>
               </a:ext>
             </a:extLst>
           </p:cNvPr>
@@ -23108,7 +23104,7 @@
           <p:cNvPr id="26" name="직선 연결선 25">
             <a:extLst>
               <a:ext uri="{FF2B5EF4-FFF2-40B4-BE49-F238E27FC236}">
-                <a16:creationId xmlns:a16="http://schemas.microsoft.com/office/drawing/2014/main" xmlns="" id="{01F49801-1EC0-4A27-87C3-EA84017C87A0}"/>
+                <a16:creationId xmlns:a16="http://schemas.microsoft.com/office/drawing/2014/main" id="{01F49801-1EC0-4A27-87C3-EA84017C87A0}"/>
               </a:ext>
             </a:extLst>
           </p:cNvPr>
@@ -23152,7 +23148,7 @@
           <p:cNvPr id="27" name="TextBox 26">
             <a:extLst>
               <a:ext uri="{FF2B5EF4-FFF2-40B4-BE49-F238E27FC236}">
-                <a16:creationId xmlns:a16="http://schemas.microsoft.com/office/drawing/2014/main" xmlns="" id="{ABB8D79B-B2B5-4AFA-96B9-58588844D8DA}"/>
+                <a16:creationId xmlns:a16="http://schemas.microsoft.com/office/drawing/2014/main" id="{ABB8D79B-B2B5-4AFA-96B9-58588844D8DA}"/>
               </a:ext>
             </a:extLst>
           </p:cNvPr>
@@ -23188,7 +23184,7 @@
           <p:cNvPr id="29" name="TextBox 28">
             <a:extLst>
               <a:ext uri="{FF2B5EF4-FFF2-40B4-BE49-F238E27FC236}">
-                <a16:creationId xmlns:a16="http://schemas.microsoft.com/office/drawing/2014/main" xmlns="" id="{5467E774-642E-46DB-9AF9-21A554208102}"/>
+                <a16:creationId xmlns:a16="http://schemas.microsoft.com/office/drawing/2014/main" id="{5467E774-642E-46DB-9AF9-21A554208102}"/>
               </a:ext>
             </a:extLst>
           </p:cNvPr>
@@ -23224,7 +23220,7 @@
           <p:cNvPr id="32" name="직선 연결선 31">
             <a:extLst>
               <a:ext uri="{FF2B5EF4-FFF2-40B4-BE49-F238E27FC236}">
-                <a16:creationId xmlns:a16="http://schemas.microsoft.com/office/drawing/2014/main" xmlns="" id="{E5A40994-3BB6-4877-B9C6-342CC200B3AC}"/>
+                <a16:creationId xmlns:a16="http://schemas.microsoft.com/office/drawing/2014/main" id="{E5A40994-3BB6-4877-B9C6-342CC200B3AC}"/>
               </a:ext>
             </a:extLst>
           </p:cNvPr>
@@ -23269,7 +23265,7 @@
           <p:cNvPr id="33" name="TextBox 32">
             <a:extLst>
               <a:ext uri="{FF2B5EF4-FFF2-40B4-BE49-F238E27FC236}">
-                <a16:creationId xmlns:a16="http://schemas.microsoft.com/office/drawing/2014/main" xmlns="" id="{32FE8E6B-BE9B-484F-9F07-B728E0C7ADCC}"/>
+                <a16:creationId xmlns:a16="http://schemas.microsoft.com/office/drawing/2014/main" id="{32FE8E6B-BE9B-484F-9F07-B728E0C7ADCC}"/>
               </a:ext>
             </a:extLst>
           </p:cNvPr>
@@ -23305,7 +23301,7 @@
           <p:cNvPr id="34" name="TextBox 33">
             <a:extLst>
               <a:ext uri="{FF2B5EF4-FFF2-40B4-BE49-F238E27FC236}">
-                <a16:creationId xmlns:a16="http://schemas.microsoft.com/office/drawing/2014/main" xmlns="" id="{851AC4EB-A08C-4898-A819-2227FD06B115}"/>
+                <a16:creationId xmlns:a16="http://schemas.microsoft.com/office/drawing/2014/main" id="{851AC4EB-A08C-4898-A819-2227FD06B115}"/>
               </a:ext>
             </a:extLst>
           </p:cNvPr>
@@ -23341,7 +23337,7 @@
           <p:cNvPr id="45" name="직선 연결선 44">
             <a:extLst>
               <a:ext uri="{FF2B5EF4-FFF2-40B4-BE49-F238E27FC236}">
-                <a16:creationId xmlns:a16="http://schemas.microsoft.com/office/drawing/2014/main" xmlns="" id="{029DD06B-B250-4B11-B7E7-59E2D9797B26}"/>
+                <a16:creationId xmlns:a16="http://schemas.microsoft.com/office/drawing/2014/main" id="{029DD06B-B250-4B11-B7E7-59E2D9797B26}"/>
               </a:ext>
             </a:extLst>
           </p:cNvPr>
@@ -23386,7 +23382,7 @@
           <p:cNvPr id="46" name="TextBox 45">
             <a:extLst>
               <a:ext uri="{FF2B5EF4-FFF2-40B4-BE49-F238E27FC236}">
-                <a16:creationId xmlns:a16="http://schemas.microsoft.com/office/drawing/2014/main" xmlns="" id="{E8AAAE82-66BA-4307-9AC1-2746948943C8}"/>
+                <a16:creationId xmlns:a16="http://schemas.microsoft.com/office/drawing/2014/main" id="{E8AAAE82-66BA-4307-9AC1-2746948943C8}"/>
               </a:ext>
             </a:extLst>
           </p:cNvPr>
@@ -23422,7 +23418,7 @@
           <p:cNvPr id="47" name="TextBox 46">
             <a:extLst>
               <a:ext uri="{FF2B5EF4-FFF2-40B4-BE49-F238E27FC236}">
-                <a16:creationId xmlns:a16="http://schemas.microsoft.com/office/drawing/2014/main" xmlns="" id="{2922BB97-5734-409E-BDFD-552167D2E769}"/>
+                <a16:creationId xmlns:a16="http://schemas.microsoft.com/office/drawing/2014/main" id="{2922BB97-5734-409E-BDFD-552167D2E769}"/>
               </a:ext>
             </a:extLst>
           </p:cNvPr>
@@ -23458,7 +23454,7 @@
           <p:cNvPr id="50" name="직선 연결선 49">
             <a:extLst>
               <a:ext uri="{FF2B5EF4-FFF2-40B4-BE49-F238E27FC236}">
-                <a16:creationId xmlns:a16="http://schemas.microsoft.com/office/drawing/2014/main" xmlns="" id="{9FBA96F1-541E-4560-9046-BCBD5468F8D3}"/>
+                <a16:creationId xmlns:a16="http://schemas.microsoft.com/office/drawing/2014/main" id="{9FBA96F1-541E-4560-9046-BCBD5468F8D3}"/>
               </a:ext>
             </a:extLst>
           </p:cNvPr>
@@ -23503,7 +23499,7 @@
           <p:cNvPr id="51" name="TextBox 50">
             <a:extLst>
               <a:ext uri="{FF2B5EF4-FFF2-40B4-BE49-F238E27FC236}">
-                <a16:creationId xmlns:a16="http://schemas.microsoft.com/office/drawing/2014/main" xmlns="" id="{1FC3B7AD-A872-43CE-AA4F-6E3B15250E2B}"/>
+                <a16:creationId xmlns:a16="http://schemas.microsoft.com/office/drawing/2014/main" id="{1FC3B7AD-A872-43CE-AA4F-6E3B15250E2B}"/>
               </a:ext>
             </a:extLst>
           </p:cNvPr>
@@ -23539,7 +23535,7 @@
           <p:cNvPr id="52" name="TextBox 51">
             <a:extLst>
               <a:ext uri="{FF2B5EF4-FFF2-40B4-BE49-F238E27FC236}">
-                <a16:creationId xmlns:a16="http://schemas.microsoft.com/office/drawing/2014/main" xmlns="" id="{69F7D462-C28D-40EE-A99E-FF6E117185D1}"/>
+                <a16:creationId xmlns:a16="http://schemas.microsoft.com/office/drawing/2014/main" id="{69F7D462-C28D-40EE-A99E-FF6E117185D1}"/>
               </a:ext>
             </a:extLst>
           </p:cNvPr>
@@ -23575,7 +23571,7 @@
           <p:cNvPr id="55" name="TextBox 54">
             <a:extLst>
               <a:ext uri="{FF2B5EF4-FFF2-40B4-BE49-F238E27FC236}">
-                <a16:creationId xmlns:a16="http://schemas.microsoft.com/office/drawing/2014/main" xmlns="" id="{409DC086-2359-40CB-96E5-6FB67B31D3E4}"/>
+                <a16:creationId xmlns:a16="http://schemas.microsoft.com/office/drawing/2014/main" id="{409DC086-2359-40CB-96E5-6FB67B31D3E4}"/>
               </a:ext>
             </a:extLst>
           </p:cNvPr>
@@ -23803,7 +23799,7 @@
           <p:cNvPr id="3" name="TextBox 2">
             <a:extLst>
               <a:ext uri="{FF2B5EF4-FFF2-40B4-BE49-F238E27FC236}">
-                <a16:creationId xmlns:a16="http://schemas.microsoft.com/office/drawing/2014/main" xmlns="" id="{3B13009C-4E35-4871-8905-71DCD827884B}"/>
+                <a16:creationId xmlns:a16="http://schemas.microsoft.com/office/drawing/2014/main" id="{3B13009C-4E35-4871-8905-71DCD827884B}"/>
               </a:ext>
             </a:extLst>
           </p:cNvPr>
@@ -23842,7 +23838,7 @@
           <p:cNvPr id="55" name="TextBox 54">
             <a:extLst>
               <a:ext uri="{FF2B5EF4-FFF2-40B4-BE49-F238E27FC236}">
-                <a16:creationId xmlns:a16="http://schemas.microsoft.com/office/drawing/2014/main" xmlns="" id="{409DC086-2359-40CB-96E5-6FB67B31D3E4}"/>
+                <a16:creationId xmlns:a16="http://schemas.microsoft.com/office/drawing/2014/main" id="{409DC086-2359-40CB-96E5-6FB67B31D3E4}"/>
               </a:ext>
             </a:extLst>
           </p:cNvPr>
@@ -24091,42 +24087,42 @@
                 <a:gridCol w="810152">
                   <a:extLst>
                     <a:ext uri="{9D8B030D-6E8A-4147-A177-3AD203B41FA5}">
-                      <a16:colId xmlns:a16="http://schemas.microsoft.com/office/drawing/2014/main" xmlns="" val="20000"/>
+                      <a16:colId xmlns:a16="http://schemas.microsoft.com/office/drawing/2014/main" val="20000"/>
                     </a:ext>
                   </a:extLst>
                 </a:gridCol>
                 <a:gridCol w="1707006">
                   <a:extLst>
                     <a:ext uri="{9D8B030D-6E8A-4147-A177-3AD203B41FA5}">
-                      <a16:colId xmlns:a16="http://schemas.microsoft.com/office/drawing/2014/main" xmlns="" val="1303019445"/>
+                      <a16:colId xmlns:a16="http://schemas.microsoft.com/office/drawing/2014/main" val="1303019445"/>
                     </a:ext>
                   </a:extLst>
                 </a:gridCol>
                 <a:gridCol w="1707006">
                   <a:extLst>
                     <a:ext uri="{9D8B030D-6E8A-4147-A177-3AD203B41FA5}">
-                      <a16:colId xmlns:a16="http://schemas.microsoft.com/office/drawing/2014/main" xmlns="" val="1755411322"/>
+                      <a16:colId xmlns:a16="http://schemas.microsoft.com/office/drawing/2014/main" val="1755411322"/>
                     </a:ext>
                   </a:extLst>
                 </a:gridCol>
                 <a:gridCol w="1707006">
                   <a:extLst>
                     <a:ext uri="{9D8B030D-6E8A-4147-A177-3AD203B41FA5}">
-                      <a16:colId xmlns:a16="http://schemas.microsoft.com/office/drawing/2014/main" xmlns="" val="20001"/>
+                      <a16:colId xmlns:a16="http://schemas.microsoft.com/office/drawing/2014/main" val="20001"/>
                     </a:ext>
                   </a:extLst>
                 </a:gridCol>
                 <a:gridCol w="1707006">
                   <a:extLst>
                     <a:ext uri="{9D8B030D-6E8A-4147-A177-3AD203B41FA5}">
-                      <a16:colId xmlns:a16="http://schemas.microsoft.com/office/drawing/2014/main" xmlns="" val="20002"/>
+                      <a16:colId xmlns:a16="http://schemas.microsoft.com/office/drawing/2014/main" val="20002"/>
                     </a:ext>
                   </a:extLst>
                 </a:gridCol>
                 <a:gridCol w="1707006">
                   <a:extLst>
                     <a:ext uri="{9D8B030D-6E8A-4147-A177-3AD203B41FA5}">
-                      <a16:colId xmlns:a16="http://schemas.microsoft.com/office/drawing/2014/main" xmlns="" val="20003"/>
+                      <a16:colId xmlns:a16="http://schemas.microsoft.com/office/drawing/2014/main" val="20003"/>
                     </a:ext>
                   </a:extLst>
                 </a:gridCol>
@@ -24544,7 +24540,7 @@
                 </a:tc>
                 <a:extLst>
                   <a:ext uri="{0D108BD9-81ED-4DB2-BD59-A6C34878D82A}">
-                    <a16:rowId xmlns:a16="http://schemas.microsoft.com/office/drawing/2014/main" xmlns="" val="10000"/>
+                    <a16:rowId xmlns:a16="http://schemas.microsoft.com/office/drawing/2014/main" val="10000"/>
                   </a:ext>
                 </a:extLst>
               </a:tr>
@@ -24898,7 +24894,7 @@
                 </a:tc>
                 <a:extLst>
                   <a:ext uri="{0D108BD9-81ED-4DB2-BD59-A6C34878D82A}">
-                    <a16:rowId xmlns:a16="http://schemas.microsoft.com/office/drawing/2014/main" xmlns="" val="10001"/>
+                    <a16:rowId xmlns:a16="http://schemas.microsoft.com/office/drawing/2014/main" val="10001"/>
                   </a:ext>
                 </a:extLst>
               </a:tr>
@@ -25713,7 +25709,7 @@
                 </a:tc>
                 <a:extLst>
                   <a:ext uri="{0D108BD9-81ED-4DB2-BD59-A6C34878D82A}">
-                    <a16:rowId xmlns:a16="http://schemas.microsoft.com/office/drawing/2014/main" xmlns="" val="10002"/>
+                    <a16:rowId xmlns:a16="http://schemas.microsoft.com/office/drawing/2014/main" val="10002"/>
                   </a:ext>
                 </a:extLst>
               </a:tr>
@@ -26338,7 +26334,7 @@
                 </a:tc>
                 <a:extLst>
                   <a:ext uri="{0D108BD9-81ED-4DB2-BD59-A6C34878D82A}">
-                    <a16:rowId xmlns:a16="http://schemas.microsoft.com/office/drawing/2014/main" xmlns="" val="10003"/>
+                    <a16:rowId xmlns:a16="http://schemas.microsoft.com/office/drawing/2014/main" val="10003"/>
                   </a:ext>
                 </a:extLst>
               </a:tr>
@@ -26730,7 +26726,7 @@
                 </a:tc>
                 <a:extLst>
                   <a:ext uri="{0D108BD9-81ED-4DB2-BD59-A6C34878D82A}">
-                    <a16:rowId xmlns:a16="http://schemas.microsoft.com/office/drawing/2014/main" xmlns="" val="330181361"/>
+                    <a16:rowId xmlns:a16="http://schemas.microsoft.com/office/drawing/2014/main" val="330181361"/>
                   </a:ext>
                 </a:extLst>
               </a:tr>
@@ -26743,7 +26739,7 @@
           <p:cNvPr id="18" name="Picture 2" descr="ubuntuì ëí ì´ë¯¸ì§ ê²ìê²°ê³¼">
             <a:extLst>
               <a:ext uri="{FF2B5EF4-FFF2-40B4-BE49-F238E27FC236}">
-                <a16:creationId xmlns:a16="http://schemas.microsoft.com/office/drawing/2014/main" xmlns="" id="{472BEE54-8A7A-4BC1-9007-0621D569EF5E}"/>
+                <a16:creationId xmlns:a16="http://schemas.microsoft.com/office/drawing/2014/main" id="{472BEE54-8A7A-4BC1-9007-0621D569EF5E}"/>
               </a:ext>
             </a:extLst>
           </p:cNvPr>
@@ -26790,7 +26786,7 @@
           <p:cNvPr id="19" name="Picture 4" descr="ìëì°10ì ëí ì´ë¯¸ì§ ê²ìê²°ê³¼">
             <a:extLst>
               <a:ext uri="{FF2B5EF4-FFF2-40B4-BE49-F238E27FC236}">
-                <a16:creationId xmlns:a16="http://schemas.microsoft.com/office/drawing/2014/main" xmlns="" id="{37A2E0F2-3288-4048-9277-31B0907CEA54}"/>
+                <a16:creationId xmlns:a16="http://schemas.microsoft.com/office/drawing/2014/main" id="{37A2E0F2-3288-4048-9277-31B0907CEA54}"/>
               </a:ext>
             </a:extLst>
           </p:cNvPr>
@@ -26837,7 +26833,7 @@
           <p:cNvPr id="20" name="Picture 6" descr="ì´í´ë¦½ì¤ì ëí ì´ë¯¸ì§ ê²ìê²°ê³¼">
             <a:extLst>
               <a:ext uri="{FF2B5EF4-FFF2-40B4-BE49-F238E27FC236}">
-                <a16:creationId xmlns:a16="http://schemas.microsoft.com/office/drawing/2014/main" xmlns="" id="{881D6432-D02C-4F5B-9FFB-30E46DCA7F50}"/>
+                <a16:creationId xmlns:a16="http://schemas.microsoft.com/office/drawing/2014/main" id="{881D6432-D02C-4F5B-9FFB-30E46DCA7F50}"/>
               </a:ext>
             </a:extLst>
           </p:cNvPr>
@@ -26887,7 +26883,7 @@
           <p:cNvPr id="22" name="Picture 2" descr="javaì ëí ì´ë¯¸ì§ ê²ìê²°ê³¼">
             <a:extLst>
               <a:ext uri="{FF2B5EF4-FFF2-40B4-BE49-F238E27FC236}">
-                <a16:creationId xmlns:a16="http://schemas.microsoft.com/office/drawing/2014/main" xmlns="" id="{1EDDFDD2-E2D0-4BF3-833C-F7522751A101}"/>
+                <a16:creationId xmlns:a16="http://schemas.microsoft.com/office/drawing/2014/main" id="{1EDDFDD2-E2D0-4BF3-833C-F7522751A101}"/>
               </a:ext>
             </a:extLst>
           </p:cNvPr>
@@ -26934,7 +26930,7 @@
           <p:cNvPr id="23" name="Picture 4" descr="Mysqlì ëí ì´ë¯¸ì§ ê²ìê²°ê³¼">
             <a:extLst>
               <a:ext uri="{FF2B5EF4-FFF2-40B4-BE49-F238E27FC236}">
-                <a16:creationId xmlns:a16="http://schemas.microsoft.com/office/drawing/2014/main" xmlns="" id="{ED8A1D9F-EB98-43F7-B102-DE12C11A358E}"/>
+                <a16:creationId xmlns:a16="http://schemas.microsoft.com/office/drawing/2014/main" id="{ED8A1D9F-EB98-43F7-B102-DE12C11A358E}"/>
               </a:ext>
             </a:extLst>
           </p:cNvPr>
@@ -26981,7 +26977,7 @@
           <p:cNvPr id="24" name="Picture 6" descr="spring frameworkì ëí ì´ë¯¸ì§ ê²ìê²°ê³¼">
             <a:extLst>
               <a:ext uri="{FF2B5EF4-FFF2-40B4-BE49-F238E27FC236}">
-                <a16:creationId xmlns:a16="http://schemas.microsoft.com/office/drawing/2014/main" xmlns="" id="{6A6BD580-476D-4677-840B-1A4CE2445530}"/>
+                <a16:creationId xmlns:a16="http://schemas.microsoft.com/office/drawing/2014/main" id="{6A6BD580-476D-4677-840B-1A4CE2445530}"/>
               </a:ext>
             </a:extLst>
           </p:cNvPr>
@@ -27028,7 +27024,7 @@
           <p:cNvPr id="25" name="Picture 2" descr="ì ì´ì¿¼ë¦¬ì ëí ì´ë¯¸ì§ ê²ìê²°ê³¼">
             <a:extLst>
               <a:ext uri="{FF2B5EF4-FFF2-40B4-BE49-F238E27FC236}">
-                <a16:creationId xmlns:a16="http://schemas.microsoft.com/office/drawing/2014/main" xmlns="" id="{1422C85D-4240-4F60-8B21-446007CE7F9C}"/>
+                <a16:creationId xmlns:a16="http://schemas.microsoft.com/office/drawing/2014/main" id="{1422C85D-4240-4F60-8B21-446007CE7F9C}"/>
               </a:ext>
             </a:extLst>
           </p:cNvPr>
@@ -27075,7 +27071,7 @@
           <p:cNvPr id="26" name="Picture 4" descr="ajaxì ëí ì´ë¯¸ì§ ê²ìê²°ê³¼">
             <a:extLst>
               <a:ext uri="{FF2B5EF4-FFF2-40B4-BE49-F238E27FC236}">
-                <a16:creationId xmlns:a16="http://schemas.microsoft.com/office/drawing/2014/main" xmlns="" id="{C5FE2F5B-6D7E-4AEF-8E6A-FFA7A69ACDEC}"/>
+                <a16:creationId xmlns:a16="http://schemas.microsoft.com/office/drawing/2014/main" id="{C5FE2F5B-6D7E-4AEF-8E6A-FFA7A69ACDEC}"/>
               </a:ext>
             </a:extLst>
           </p:cNvPr>
@@ -27122,7 +27118,7 @@
           <p:cNvPr id="27" name="Picture 6" descr="html cssì ëí ì´ë¯¸ì§ ê²ìê²°ê³¼">
             <a:extLst>
               <a:ext uri="{FF2B5EF4-FFF2-40B4-BE49-F238E27FC236}">
-                <a16:creationId xmlns:a16="http://schemas.microsoft.com/office/drawing/2014/main" xmlns="" id="{15ABADAE-F14A-41A5-9F4A-D9B7811E18FC}"/>
+                <a16:creationId xmlns:a16="http://schemas.microsoft.com/office/drawing/2014/main" id="{15ABADAE-F14A-41A5-9F4A-D9B7811E18FC}"/>
               </a:ext>
             </a:extLst>
           </p:cNvPr>
@@ -27169,7 +27165,7 @@
           <p:cNvPr id="2" name="Picture 2" descr="ì ì°ì¤ ìë²ì ëí ì´ë¯¸ì§ ê²ìê²°ê³¼">
             <a:extLst>
               <a:ext uri="{FF2B5EF4-FFF2-40B4-BE49-F238E27FC236}">
-                <a16:creationId xmlns:a16="http://schemas.microsoft.com/office/drawing/2014/main" xmlns="" id="{85EEE95B-8F96-4B95-81B1-A408B270F1B8}"/>
+                <a16:creationId xmlns:a16="http://schemas.microsoft.com/office/drawing/2014/main" id="{85EEE95B-8F96-4B95-81B1-A408B270F1B8}"/>
               </a:ext>
             </a:extLst>
           </p:cNvPr>
@@ -27216,7 +27212,7 @@
           <p:cNvPr id="1028" name="Picture 4" descr="í°ìº£ì ëí ì´ë¯¸ì§ ê²ìê²°ê³¼">
             <a:extLst>
               <a:ext uri="{FF2B5EF4-FFF2-40B4-BE49-F238E27FC236}">
-                <a16:creationId xmlns:a16="http://schemas.microsoft.com/office/drawing/2014/main" xmlns="" id="{5826C3FA-D8C6-4F9D-8E7F-27A56D69F128}"/>
+                <a16:creationId xmlns:a16="http://schemas.microsoft.com/office/drawing/2014/main" id="{5826C3FA-D8C6-4F9D-8E7F-27A56D69F128}"/>
               </a:ext>
             </a:extLst>
           </p:cNvPr>
@@ -27304,7 +27300,7 @@
           <p:cNvPr id="28" name="Picture 2" descr="ë¤ì´ë² ìí´ë¼ì°ëì ëí ì´ë¯¸ì§ ê²ìê²°ê³¼">
             <a:extLst>
               <a:ext uri="{FF2B5EF4-FFF2-40B4-BE49-F238E27FC236}">
-                <a16:creationId xmlns:a16="http://schemas.microsoft.com/office/drawing/2014/main" xmlns="" id="{ADC1BA01-6537-46BA-AF4C-3F3ABA1AEE12}"/>
+                <a16:creationId xmlns:a16="http://schemas.microsoft.com/office/drawing/2014/main" id="{ADC1BA01-6537-46BA-AF4C-3F3ABA1AEE12}"/>
               </a:ext>
             </a:extLst>
           </p:cNvPr>
@@ -27351,7 +27347,7 @@
           <p:cNvPr id="4" name="슬라이드 번호 개체 틀 3">
             <a:extLst>
               <a:ext uri="{FF2B5EF4-FFF2-40B4-BE49-F238E27FC236}">
-                <a16:creationId xmlns:a16="http://schemas.microsoft.com/office/drawing/2014/main" xmlns="" id="{7909D91D-E0BE-426B-BFE5-609E83451B08}"/>
+                <a16:creationId xmlns:a16="http://schemas.microsoft.com/office/drawing/2014/main" id="{7909D91D-E0BE-426B-BFE5-609E83451B08}"/>
               </a:ext>
             </a:extLst>
           </p:cNvPr>
@@ -27410,7 +27406,7 @@
           <p:cNvPr id="2" name="Text Box 22">
             <a:extLst>
               <a:ext uri="{FF2B5EF4-FFF2-40B4-BE49-F238E27FC236}">
-                <a16:creationId xmlns:a16="http://schemas.microsoft.com/office/drawing/2014/main" xmlns="" id="{0AED736D-C06A-43FF-A2A6-009AEED1F56A}"/>
+                <a16:creationId xmlns:a16="http://schemas.microsoft.com/office/drawing/2014/main" id="{0AED736D-C06A-43FF-A2A6-009AEED1F56A}"/>
               </a:ext>
             </a:extLst>
           </p:cNvPr>
@@ -27575,7 +27571,7 @@
           <p:cNvPr id="20" name="그룹 19">
             <a:extLst>
               <a:ext uri="{FF2B5EF4-FFF2-40B4-BE49-F238E27FC236}">
-                <a16:creationId xmlns:a16="http://schemas.microsoft.com/office/drawing/2014/main" xmlns="" id="{A68DA86E-7D4E-4C66-A115-DA93A2A91212}"/>
+                <a16:creationId xmlns:a16="http://schemas.microsoft.com/office/drawing/2014/main" id="{A68DA86E-7D4E-4C66-A115-DA93A2A91212}"/>
               </a:ext>
             </a:extLst>
           </p:cNvPr>
@@ -27595,7 +27591,7 @@
             <p:cNvPr id="9" name="그래픽 8" descr="컴퓨터">
               <a:extLst>
                 <a:ext uri="{FF2B5EF4-FFF2-40B4-BE49-F238E27FC236}">
-                  <a16:creationId xmlns:a16="http://schemas.microsoft.com/office/drawing/2014/main" xmlns="" id="{01940FB8-3A72-4D5D-93D1-2FED852672AC}"/>
+                  <a16:creationId xmlns:a16="http://schemas.microsoft.com/office/drawing/2014/main" id="{01940FB8-3A72-4D5D-93D1-2FED852672AC}"/>
                 </a:ext>
               </a:extLst>
             </p:cNvPr>
@@ -27611,7 +27607,7 @@
                   <a14:useLocalDpi xmlns:a14="http://schemas.microsoft.com/office/drawing/2010/main" val="0"/>
                 </a:ext>
                 <a:ext uri="{96DAC541-7B7A-43D3-8B79-37D633B846F1}">
-                  <asvg:svgBlip xmlns:asvg="http://schemas.microsoft.com/office/drawing/2016/SVG/main" xmlns="" r:embed="rId3"/>
+                  <asvg:svgBlip xmlns:asvg="http://schemas.microsoft.com/office/drawing/2016/SVG/main" r:embed="rId3"/>
                 </a:ext>
               </a:extLst>
             </a:blip>
@@ -27634,7 +27630,7 @@
             <p:cNvPr id="21" name="TextBox 20">
               <a:extLst>
                 <a:ext uri="{FF2B5EF4-FFF2-40B4-BE49-F238E27FC236}">
-                  <a16:creationId xmlns:a16="http://schemas.microsoft.com/office/drawing/2014/main" xmlns="" id="{1B829166-201F-4FF5-BBDE-12F241D42506}"/>
+                  <a16:creationId xmlns:a16="http://schemas.microsoft.com/office/drawing/2014/main" id="{1B829166-201F-4FF5-BBDE-12F241D42506}"/>
                 </a:ext>
               </a:extLst>
             </p:cNvPr>
@@ -27699,7 +27695,7 @@
             <p:cNvPr id="24" name="TextBox 23">
               <a:extLst>
                 <a:ext uri="{FF2B5EF4-FFF2-40B4-BE49-F238E27FC236}">
-                  <a16:creationId xmlns:a16="http://schemas.microsoft.com/office/drawing/2014/main" xmlns="" id="{F9D5C457-1F0E-4129-8D22-89E35E7A29F4}"/>
+                  <a16:creationId xmlns:a16="http://schemas.microsoft.com/office/drawing/2014/main" id="{F9D5C457-1F0E-4129-8D22-89E35E7A29F4}"/>
                 </a:ext>
               </a:extLst>
             </p:cNvPr>
@@ -28051,7 +28047,7 @@
           <p:cNvPr id="28" name="그룹 27">
             <a:extLst>
               <a:ext uri="{FF2B5EF4-FFF2-40B4-BE49-F238E27FC236}">
-                <a16:creationId xmlns:a16="http://schemas.microsoft.com/office/drawing/2014/main" xmlns="" id="{389F2A0B-7D85-4D0B-9ACA-D6345F304E91}"/>
+                <a16:creationId xmlns:a16="http://schemas.microsoft.com/office/drawing/2014/main" id="{389F2A0B-7D85-4D0B-9ACA-D6345F304E91}"/>
               </a:ext>
             </a:extLst>
           </p:cNvPr>
@@ -28071,7 +28067,7 @@
             <p:cNvPr id="17" name="그래픽 16" descr="덮인 책">
               <a:extLst>
                 <a:ext uri="{FF2B5EF4-FFF2-40B4-BE49-F238E27FC236}">
-                  <a16:creationId xmlns:a16="http://schemas.microsoft.com/office/drawing/2014/main" xmlns="" id="{BE42FA97-0B7E-43A9-BD99-5476C8B23272}"/>
+                  <a16:creationId xmlns:a16="http://schemas.microsoft.com/office/drawing/2014/main" id="{BE42FA97-0B7E-43A9-BD99-5476C8B23272}"/>
                 </a:ext>
               </a:extLst>
             </p:cNvPr>
@@ -28087,7 +28083,7 @@
                   <a14:useLocalDpi xmlns:a14="http://schemas.microsoft.com/office/drawing/2010/main" val="0"/>
                 </a:ext>
                 <a:ext uri="{96DAC541-7B7A-43D3-8B79-37D633B846F1}">
-                  <asvg:svgBlip xmlns:asvg="http://schemas.microsoft.com/office/drawing/2016/SVG/main" xmlns="" r:embed="rId5"/>
+                  <asvg:svgBlip xmlns:asvg="http://schemas.microsoft.com/office/drawing/2016/SVG/main" r:embed="rId5"/>
                 </a:ext>
               </a:extLst>
             </a:blip>
@@ -28110,7 +28106,7 @@
             <p:cNvPr id="22" name="TextBox 21">
               <a:extLst>
                 <a:ext uri="{FF2B5EF4-FFF2-40B4-BE49-F238E27FC236}">
-                  <a16:creationId xmlns:a16="http://schemas.microsoft.com/office/drawing/2014/main" xmlns="" id="{5AD1A0D7-E647-4E9C-BD8E-12F58E5F57F9}"/>
+                  <a16:creationId xmlns:a16="http://schemas.microsoft.com/office/drawing/2014/main" id="{5AD1A0D7-E647-4E9C-BD8E-12F58E5F57F9}"/>
                 </a:ext>
               </a:extLst>
             </p:cNvPr>
@@ -28189,7 +28185,7 @@
             <p:cNvPr id="25" name="TextBox 24">
               <a:extLst>
                 <a:ext uri="{FF2B5EF4-FFF2-40B4-BE49-F238E27FC236}">
-                  <a16:creationId xmlns:a16="http://schemas.microsoft.com/office/drawing/2014/main" xmlns="" id="{74829BA7-AC6D-451C-A811-6CA15C88F2B8}"/>
+                  <a16:creationId xmlns:a16="http://schemas.microsoft.com/office/drawing/2014/main" id="{74829BA7-AC6D-451C-A811-6CA15C88F2B8}"/>
                 </a:ext>
               </a:extLst>
             </p:cNvPr>
@@ -28586,7 +28582,7 @@
           <p:cNvPr id="29" name="그룹 28">
             <a:extLst>
               <a:ext uri="{FF2B5EF4-FFF2-40B4-BE49-F238E27FC236}">
-                <a16:creationId xmlns:a16="http://schemas.microsoft.com/office/drawing/2014/main" xmlns="" id="{0B84A3C2-EEC7-41AA-9D46-01FBE39B6CF3}"/>
+                <a16:creationId xmlns:a16="http://schemas.microsoft.com/office/drawing/2014/main" id="{0B84A3C2-EEC7-41AA-9D46-01FBE39B6CF3}"/>
               </a:ext>
             </a:extLst>
           </p:cNvPr>
@@ -28606,7 +28602,7 @@
             <p:cNvPr id="19" name="그래픽 18" descr="조직도">
               <a:extLst>
                 <a:ext uri="{FF2B5EF4-FFF2-40B4-BE49-F238E27FC236}">
-                  <a16:creationId xmlns:a16="http://schemas.microsoft.com/office/drawing/2014/main" xmlns="" id="{F1102107-9A8F-4DC8-A7AB-15BC7522FBDE}"/>
+                  <a16:creationId xmlns:a16="http://schemas.microsoft.com/office/drawing/2014/main" id="{F1102107-9A8F-4DC8-A7AB-15BC7522FBDE}"/>
                 </a:ext>
               </a:extLst>
             </p:cNvPr>
@@ -28622,7 +28618,7 @@
                   <a14:useLocalDpi xmlns:a14="http://schemas.microsoft.com/office/drawing/2010/main" val="0"/>
                 </a:ext>
                 <a:ext uri="{96DAC541-7B7A-43D3-8B79-37D633B846F1}">
-                  <asvg:svgBlip xmlns:asvg="http://schemas.microsoft.com/office/drawing/2016/SVG/main" xmlns="" r:embed="rId7"/>
+                  <asvg:svgBlip xmlns:asvg="http://schemas.microsoft.com/office/drawing/2016/SVG/main" r:embed="rId7"/>
                 </a:ext>
               </a:extLst>
             </a:blip>
@@ -28645,7 +28641,7 @@
             <p:cNvPr id="23" name="TextBox 22">
               <a:extLst>
                 <a:ext uri="{FF2B5EF4-FFF2-40B4-BE49-F238E27FC236}">
-                  <a16:creationId xmlns:a16="http://schemas.microsoft.com/office/drawing/2014/main" xmlns="" id="{9967295D-391C-4CBC-8465-24EBDAAA3BC0}"/>
+                  <a16:creationId xmlns:a16="http://schemas.microsoft.com/office/drawing/2014/main" id="{9967295D-391C-4CBC-8465-24EBDAAA3BC0}"/>
                 </a:ext>
               </a:extLst>
             </p:cNvPr>
@@ -28710,7 +28706,7 @@
             <p:cNvPr id="26" name="TextBox 25">
               <a:extLst>
                 <a:ext uri="{FF2B5EF4-FFF2-40B4-BE49-F238E27FC236}">
-                  <a16:creationId xmlns:a16="http://schemas.microsoft.com/office/drawing/2014/main" xmlns="" id="{8381BA54-3055-4FDA-AB59-D0C696EB33BA}"/>
+                  <a16:creationId xmlns:a16="http://schemas.microsoft.com/office/drawing/2014/main" id="{8381BA54-3055-4FDA-AB59-D0C696EB33BA}"/>
                 </a:ext>
               </a:extLst>
             </p:cNvPr>
@@ -29007,7 +29003,7 @@
           <p:cNvPr id="3" name="슬라이드 번호 개체 틀 2">
             <a:extLst>
               <a:ext uri="{FF2B5EF4-FFF2-40B4-BE49-F238E27FC236}">
-                <a16:creationId xmlns:a16="http://schemas.microsoft.com/office/drawing/2014/main" xmlns="" id="{9A7E0E13-E4ED-4DA3-B765-5B7D26D9130C}"/>
+                <a16:creationId xmlns:a16="http://schemas.microsoft.com/office/drawing/2014/main" id="{9A7E0E13-E4ED-4DA3-B765-5B7D26D9130C}"/>
               </a:ext>
             </a:extLst>
           </p:cNvPr>
@@ -29066,7 +29062,7 @@
           <p:cNvPr id="2" name="Text Box 22">
             <a:extLst>
               <a:ext uri="{FF2B5EF4-FFF2-40B4-BE49-F238E27FC236}">
-                <a16:creationId xmlns:a16="http://schemas.microsoft.com/office/drawing/2014/main" xmlns="" id="{0AED736D-C06A-43FF-A2A6-009AEED1F56A}"/>
+                <a16:creationId xmlns:a16="http://schemas.microsoft.com/office/drawing/2014/main" id="{0AED736D-C06A-43FF-A2A6-009AEED1F56A}"/>
               </a:ext>
             </a:extLst>
           </p:cNvPr>
@@ -29231,7 +29227,7 @@
           <p:cNvPr id="18" name="그림 17">
             <a:extLst>
               <a:ext uri="{FF2B5EF4-FFF2-40B4-BE49-F238E27FC236}">
-                <a16:creationId xmlns:a16="http://schemas.microsoft.com/office/drawing/2014/main" xmlns="" id="{80BBA3FB-D761-48C7-A7B6-BD5D99B61825}"/>
+                <a16:creationId xmlns:a16="http://schemas.microsoft.com/office/drawing/2014/main" id="{80BBA3FB-D761-48C7-A7B6-BD5D99B61825}"/>
               </a:ext>
             </a:extLst>
           </p:cNvPr>
@@ -29266,7 +29262,7 @@
           <p:cNvPr id="27" name="TextBox 26">
             <a:extLst>
               <a:ext uri="{FF2B5EF4-FFF2-40B4-BE49-F238E27FC236}">
-                <a16:creationId xmlns:a16="http://schemas.microsoft.com/office/drawing/2014/main" xmlns="" id="{C6071089-D03A-41FA-9FA8-3B8683016CED}"/>
+                <a16:creationId xmlns:a16="http://schemas.microsoft.com/office/drawing/2014/main" id="{C6071089-D03A-41FA-9FA8-3B8683016CED}"/>
               </a:ext>
             </a:extLst>
           </p:cNvPr>
@@ -29620,7 +29616,7 @@
           <p:cNvPr id="30" name="TextBox 29">
             <a:extLst>
               <a:ext uri="{FF2B5EF4-FFF2-40B4-BE49-F238E27FC236}">
-                <a16:creationId xmlns:a16="http://schemas.microsoft.com/office/drawing/2014/main" xmlns="" id="{27F667D4-2669-423E-AA90-E15C9B292102}"/>
+                <a16:creationId xmlns:a16="http://schemas.microsoft.com/office/drawing/2014/main" id="{27F667D4-2669-423E-AA90-E15C9B292102}"/>
               </a:ext>
             </a:extLst>
           </p:cNvPr>
@@ -29690,7 +29686,7 @@
           <p:cNvPr id="3" name="슬라이드 번호 개체 틀 2">
             <a:extLst>
               <a:ext uri="{FF2B5EF4-FFF2-40B4-BE49-F238E27FC236}">
-                <a16:creationId xmlns:a16="http://schemas.microsoft.com/office/drawing/2014/main" xmlns="" id="{32E4A4C7-CF41-43E8-935E-C28DAC4019F3}"/>
+                <a16:creationId xmlns:a16="http://schemas.microsoft.com/office/drawing/2014/main" id="{32E4A4C7-CF41-43E8-935E-C28DAC4019F3}"/>
               </a:ext>
             </a:extLst>
           </p:cNvPr>
@@ -29749,7 +29745,7 @@
           <p:cNvPr id="2" name="Text Box 22">
             <a:extLst>
               <a:ext uri="{FF2B5EF4-FFF2-40B4-BE49-F238E27FC236}">
-                <a16:creationId xmlns:a16="http://schemas.microsoft.com/office/drawing/2014/main" xmlns="" id="{61F72C57-A937-494F-A7F0-9D10A07CFF2A}"/>
+                <a16:creationId xmlns:a16="http://schemas.microsoft.com/office/drawing/2014/main" id="{61F72C57-A937-494F-A7F0-9D10A07CFF2A}"/>
               </a:ext>
             </a:extLst>
           </p:cNvPr>
@@ -29994,7 +29990,7 @@
           <p:cNvPr id="3" name="Picture 2" descr="http://pds.saramin.co.kr/company/logo/201602/05/1454658242_b328-dc95d98b_logo.jpg">
             <a:extLst>
               <a:ext uri="{FF2B5EF4-FFF2-40B4-BE49-F238E27FC236}">
-                <a16:creationId xmlns:a16="http://schemas.microsoft.com/office/drawing/2014/main" xmlns="" id="{9B811836-378E-4759-A3B7-3DEC40B3AEED}"/>
+                <a16:creationId xmlns:a16="http://schemas.microsoft.com/office/drawing/2014/main" id="{9B811836-378E-4759-A3B7-3DEC40B3AEED}"/>
               </a:ext>
             </a:extLst>
           </p:cNvPr>
@@ -30044,7 +30040,7 @@
           <p:cNvPr id="4" name="Text Box 22">
             <a:extLst>
               <a:ext uri="{FF2B5EF4-FFF2-40B4-BE49-F238E27FC236}">
-                <a16:creationId xmlns:a16="http://schemas.microsoft.com/office/drawing/2014/main" xmlns="" id="{39958334-0670-4B8B-9A4B-94F4BA1CFFCA}"/>
+                <a16:creationId xmlns:a16="http://schemas.microsoft.com/office/drawing/2014/main" id="{39958334-0670-4B8B-9A4B-94F4BA1CFFCA}"/>
               </a:ext>
             </a:extLst>
           </p:cNvPr>
@@ -30243,7 +30239,7 @@
           <p:cNvPr id="6" name="슬라이드 번호 개체 틀 5">
             <a:extLst>
               <a:ext uri="{FF2B5EF4-FFF2-40B4-BE49-F238E27FC236}">
-                <a16:creationId xmlns:a16="http://schemas.microsoft.com/office/drawing/2014/main" xmlns="" id="{A5E85910-C2D8-4911-BD6C-66689864012F}"/>
+                <a16:creationId xmlns:a16="http://schemas.microsoft.com/office/drawing/2014/main" id="{A5E85910-C2D8-4911-BD6C-66689864012F}"/>
               </a:ext>
             </a:extLst>
           </p:cNvPr>
@@ -30302,7 +30298,7 @@
           <p:cNvPr id="2" name="Text Box 22">
             <a:extLst>
               <a:ext uri="{FF2B5EF4-FFF2-40B4-BE49-F238E27FC236}">
-                <a16:creationId xmlns:a16="http://schemas.microsoft.com/office/drawing/2014/main" xmlns="" id="{0AED736D-C06A-43FF-A2A6-009AEED1F56A}"/>
+                <a16:creationId xmlns:a16="http://schemas.microsoft.com/office/drawing/2014/main" id="{0AED736D-C06A-43FF-A2A6-009AEED1F56A}"/>
               </a:ext>
             </a:extLst>
           </p:cNvPr>
@@ -30467,7 +30463,7 @@
           <p:cNvPr id="4" name="슬라이드 번호 개체 틀 3">
             <a:extLst>
               <a:ext uri="{FF2B5EF4-FFF2-40B4-BE49-F238E27FC236}">
-                <a16:creationId xmlns:a16="http://schemas.microsoft.com/office/drawing/2014/main" xmlns="" id="{80EA5429-8BE5-48C3-9B53-7296F264D400}"/>
+                <a16:creationId xmlns:a16="http://schemas.microsoft.com/office/drawing/2014/main" id="{80EA5429-8BE5-48C3-9B53-7296F264D400}"/>
               </a:ext>
             </a:extLst>
           </p:cNvPr>
@@ -30496,7 +30492,7 @@
           <p:cNvPr id="5" name="Text Box 22">
             <a:extLst>
               <a:ext uri="{FF2B5EF4-FFF2-40B4-BE49-F238E27FC236}">
-                <a16:creationId xmlns:a16="http://schemas.microsoft.com/office/drawing/2014/main" xmlns="" id="{3D5A126D-CC6F-4623-8083-FD1C0C43445E}"/>
+                <a16:creationId xmlns:a16="http://schemas.microsoft.com/office/drawing/2014/main" id="{3D5A126D-CC6F-4623-8083-FD1C0C43445E}"/>
               </a:ext>
             </a:extLst>
           </p:cNvPr>
@@ -30669,7 +30665,7 @@
           <p:cNvPr id="6" name="TextBox 5">
             <a:extLst>
               <a:ext uri="{FF2B5EF4-FFF2-40B4-BE49-F238E27FC236}">
-                <a16:creationId xmlns:a16="http://schemas.microsoft.com/office/drawing/2014/main" xmlns="" id="{DAA76058-6FAA-4D30-AEEC-ADE27AFB9A79}"/>
+                <a16:creationId xmlns:a16="http://schemas.microsoft.com/office/drawing/2014/main" id="{DAA76058-6FAA-4D30-AEEC-ADE27AFB9A79}"/>
               </a:ext>
             </a:extLst>
           </p:cNvPr>
@@ -30709,7 +30705,7 @@
           <p:cNvPr id="7" name="TextBox 6">
             <a:extLst>
               <a:ext uri="{FF2B5EF4-FFF2-40B4-BE49-F238E27FC236}">
-                <a16:creationId xmlns:a16="http://schemas.microsoft.com/office/drawing/2014/main" xmlns="" id="{3A9851C4-B5E7-4D8B-B890-D77F18D24630}"/>
+                <a16:creationId xmlns:a16="http://schemas.microsoft.com/office/drawing/2014/main" id="{3A9851C4-B5E7-4D8B-B890-D77F18D24630}"/>
               </a:ext>
             </a:extLst>
           </p:cNvPr>
@@ -30744,7 +30740,7 @@
           <p:cNvPr id="8" name="TextBox 7">
             <a:extLst>
               <a:ext uri="{FF2B5EF4-FFF2-40B4-BE49-F238E27FC236}">
-                <a16:creationId xmlns:a16="http://schemas.microsoft.com/office/drawing/2014/main" xmlns="" id="{0E6AFE75-F968-4CB3-B73F-8D4D004BAC0B}"/>
+                <a16:creationId xmlns:a16="http://schemas.microsoft.com/office/drawing/2014/main" id="{0E6AFE75-F968-4CB3-B73F-8D4D004BAC0B}"/>
               </a:ext>
             </a:extLst>
           </p:cNvPr>
@@ -30788,7 +30784,7 @@
           <p:cNvPr id="9" name="TextBox 8">
             <a:extLst>
               <a:ext uri="{FF2B5EF4-FFF2-40B4-BE49-F238E27FC236}">
-                <a16:creationId xmlns:a16="http://schemas.microsoft.com/office/drawing/2014/main" xmlns="" id="{0B7CBEE1-4A9C-47B0-9CE3-37BF7D6A6057}"/>
+                <a16:creationId xmlns:a16="http://schemas.microsoft.com/office/drawing/2014/main" id="{0B7CBEE1-4A9C-47B0-9CE3-37BF7D6A6057}"/>
               </a:ext>
             </a:extLst>
           </p:cNvPr>
@@ -31146,35 +31142,35 @@
                 <a:gridCol w="944917">
                   <a:extLst>
                     <a:ext uri="{9D8B030D-6E8A-4147-A177-3AD203B41FA5}">
-                      <a16:colId xmlns:a16="http://schemas.microsoft.com/office/drawing/2014/main" xmlns="" val="20000"/>
+                      <a16:colId xmlns:a16="http://schemas.microsoft.com/office/drawing/2014/main" val="20000"/>
                     </a:ext>
                   </a:extLst>
                 </a:gridCol>
                 <a:gridCol w="1650118">
                   <a:extLst>
                     <a:ext uri="{9D8B030D-6E8A-4147-A177-3AD203B41FA5}">
-                      <a16:colId xmlns:a16="http://schemas.microsoft.com/office/drawing/2014/main" xmlns="" val="20001"/>
+                      <a16:colId xmlns:a16="http://schemas.microsoft.com/office/drawing/2014/main" val="20001"/>
                     </a:ext>
                   </a:extLst>
                 </a:gridCol>
                 <a:gridCol w="1759819">
                   <a:extLst>
                     <a:ext uri="{9D8B030D-6E8A-4147-A177-3AD203B41FA5}">
-                      <a16:colId xmlns:a16="http://schemas.microsoft.com/office/drawing/2014/main" xmlns="" val="20002"/>
+                      <a16:colId xmlns:a16="http://schemas.microsoft.com/office/drawing/2014/main" val="20002"/>
                     </a:ext>
                   </a:extLst>
                 </a:gridCol>
                 <a:gridCol w="1759819">
                   <a:extLst>
                     <a:ext uri="{9D8B030D-6E8A-4147-A177-3AD203B41FA5}">
-                      <a16:colId xmlns:a16="http://schemas.microsoft.com/office/drawing/2014/main" xmlns="" val="20003"/>
+                      <a16:colId xmlns:a16="http://schemas.microsoft.com/office/drawing/2014/main" val="20003"/>
                     </a:ext>
                   </a:extLst>
                 </a:gridCol>
                 <a:gridCol w="1759819">
                   <a:extLst>
                     <a:ext uri="{9D8B030D-6E8A-4147-A177-3AD203B41FA5}">
-                      <a16:colId xmlns:a16="http://schemas.microsoft.com/office/drawing/2014/main" xmlns="" val="1567166912"/>
+                      <a16:colId xmlns:a16="http://schemas.microsoft.com/office/drawing/2014/main" val="1567166912"/>
                     </a:ext>
                   </a:extLst>
                 </a:gridCol>
@@ -31634,7 +31630,7 @@
                 </a:tc>
                 <a:extLst>
                   <a:ext uri="{0D108BD9-81ED-4DB2-BD59-A6C34878D82A}">
-                    <a16:rowId xmlns:a16="http://schemas.microsoft.com/office/drawing/2014/main" xmlns="" val="10000"/>
+                    <a16:rowId xmlns:a16="http://schemas.microsoft.com/office/drawing/2014/main" val="10000"/>
                   </a:ext>
                 </a:extLst>
               </a:tr>
@@ -31861,20 +31857,6 @@
                           <a:ea typeface="+mn-ea"/>
                         </a:rPr>
                         <a:t> 형상관리</a:t>
-                      </a:r>
-                      <a:r>
-                        <a:rPr kumimoji="1" lang="en-US" altLang="ko-KR" sz="1300" b="0" i="0" u="none" strike="noStrike" cap="none" normalizeH="0" baseline="0" dirty="0">
-                          <a:ln>
-                            <a:noFill/>
-                          </a:ln>
-                          <a:solidFill>
-                            <a:schemeClr val="tx1"/>
-                          </a:solidFill>
-                          <a:effectLst/>
-                          <a:latin typeface="+mn-ea"/>
-                          <a:ea typeface="+mn-ea"/>
-                        </a:rPr>
-                        <a:t/>
                       </a:r>
                       <a:br>
                         <a:rPr kumimoji="1" lang="en-US" altLang="ko-KR" sz="1300" b="0" i="0" u="none" strike="noStrike" cap="none" normalizeH="0" baseline="0" dirty="0">
@@ -32277,7 +32259,7 @@
                 </a:tc>
                 <a:extLst>
                   <a:ext uri="{0D108BD9-81ED-4DB2-BD59-A6C34878D82A}">
-                    <a16:rowId xmlns:a16="http://schemas.microsoft.com/office/drawing/2014/main" xmlns="" val="10001"/>
+                    <a16:rowId xmlns:a16="http://schemas.microsoft.com/office/drawing/2014/main" val="10001"/>
                   </a:ext>
                 </a:extLst>
               </a:tr>
@@ -32856,7 +32838,7 @@
                 </a:tc>
                 <a:extLst>
                   <a:ext uri="{0D108BD9-81ED-4DB2-BD59-A6C34878D82A}">
-                    <a16:rowId xmlns:a16="http://schemas.microsoft.com/office/drawing/2014/main" xmlns="" val="10002"/>
+                    <a16:rowId xmlns:a16="http://schemas.microsoft.com/office/drawing/2014/main" val="10002"/>
                   </a:ext>
                 </a:extLst>
               </a:tr>
@@ -33582,7 +33564,7 @@
                 </a:tc>
                 <a:extLst>
                   <a:ext uri="{0D108BD9-81ED-4DB2-BD59-A6C34878D82A}">
-                    <a16:rowId xmlns:a16="http://schemas.microsoft.com/office/drawing/2014/main" xmlns="" val="10003"/>
+                    <a16:rowId xmlns:a16="http://schemas.microsoft.com/office/drawing/2014/main" val="10003"/>
                   </a:ext>
                 </a:extLst>
               </a:tr>
@@ -33935,7 +33917,7 @@
                 </a:tc>
                 <a:extLst>
                   <a:ext uri="{0D108BD9-81ED-4DB2-BD59-A6C34878D82A}">
-                    <a16:rowId xmlns:a16="http://schemas.microsoft.com/office/drawing/2014/main" xmlns="" val="10004"/>
+                    <a16:rowId xmlns:a16="http://schemas.microsoft.com/office/drawing/2014/main" val="10004"/>
                   </a:ext>
                 </a:extLst>
               </a:tr>
@@ -33948,7 +33930,7 @@
           <p:cNvPr id="2" name="슬라이드 번호 개체 틀 1">
             <a:extLst>
               <a:ext uri="{FF2B5EF4-FFF2-40B4-BE49-F238E27FC236}">
-                <a16:creationId xmlns:a16="http://schemas.microsoft.com/office/drawing/2014/main" xmlns="" id="{D764FAA6-E665-4006-994B-965DD168A532}"/>
+                <a16:creationId xmlns:a16="http://schemas.microsoft.com/office/drawing/2014/main" id="{D764FAA6-E665-4006-994B-965DD168A532}"/>
               </a:ext>
             </a:extLst>
           </p:cNvPr>
@@ -34030,63 +34012,63 @@
                 <a:gridCol w="1312387">
                   <a:extLst>
                     <a:ext uri="{9D8B030D-6E8A-4147-A177-3AD203B41FA5}">
-                      <a16:colId xmlns:a16="http://schemas.microsoft.com/office/drawing/2014/main" xmlns="" val="20000"/>
+                      <a16:colId xmlns:a16="http://schemas.microsoft.com/office/drawing/2014/main" val="20000"/>
                     </a:ext>
                   </a:extLst>
                 </a:gridCol>
                 <a:gridCol w="836077">
                   <a:extLst>
                     <a:ext uri="{9D8B030D-6E8A-4147-A177-3AD203B41FA5}">
-                      <a16:colId xmlns:a16="http://schemas.microsoft.com/office/drawing/2014/main" xmlns="" val="20001"/>
+                      <a16:colId xmlns:a16="http://schemas.microsoft.com/office/drawing/2014/main" val="20001"/>
                     </a:ext>
                   </a:extLst>
                 </a:gridCol>
                 <a:gridCol w="836077">
                   <a:extLst>
                     <a:ext uri="{9D8B030D-6E8A-4147-A177-3AD203B41FA5}">
-                      <a16:colId xmlns:a16="http://schemas.microsoft.com/office/drawing/2014/main" xmlns="" val="20002"/>
+                      <a16:colId xmlns:a16="http://schemas.microsoft.com/office/drawing/2014/main" val="20002"/>
                     </a:ext>
                   </a:extLst>
                 </a:gridCol>
                 <a:gridCol w="836077">
                   <a:extLst>
                     <a:ext uri="{9D8B030D-6E8A-4147-A177-3AD203B41FA5}">
-                      <a16:colId xmlns:a16="http://schemas.microsoft.com/office/drawing/2014/main" xmlns="" val="20003"/>
+                      <a16:colId xmlns:a16="http://schemas.microsoft.com/office/drawing/2014/main" val="20003"/>
                     </a:ext>
                   </a:extLst>
                 </a:gridCol>
                 <a:gridCol w="836077">
                   <a:extLst>
                     <a:ext uri="{9D8B030D-6E8A-4147-A177-3AD203B41FA5}">
-                      <a16:colId xmlns:a16="http://schemas.microsoft.com/office/drawing/2014/main" xmlns="" val="20004"/>
+                      <a16:colId xmlns:a16="http://schemas.microsoft.com/office/drawing/2014/main" val="20004"/>
                     </a:ext>
                   </a:extLst>
                 </a:gridCol>
                 <a:gridCol w="836077">
                   <a:extLst>
                     <a:ext uri="{9D8B030D-6E8A-4147-A177-3AD203B41FA5}">
-                      <a16:colId xmlns:a16="http://schemas.microsoft.com/office/drawing/2014/main" xmlns="" val="20005"/>
+                      <a16:colId xmlns:a16="http://schemas.microsoft.com/office/drawing/2014/main" val="20005"/>
                     </a:ext>
                   </a:extLst>
                 </a:gridCol>
                 <a:gridCol w="836077">
                   <a:extLst>
                     <a:ext uri="{9D8B030D-6E8A-4147-A177-3AD203B41FA5}">
-                      <a16:colId xmlns:a16="http://schemas.microsoft.com/office/drawing/2014/main" xmlns="" val="20006"/>
+                      <a16:colId xmlns:a16="http://schemas.microsoft.com/office/drawing/2014/main" val="20006"/>
                     </a:ext>
                   </a:extLst>
                 </a:gridCol>
                 <a:gridCol w="836077">
                   <a:extLst>
                     <a:ext uri="{9D8B030D-6E8A-4147-A177-3AD203B41FA5}">
-                      <a16:colId xmlns:a16="http://schemas.microsoft.com/office/drawing/2014/main" xmlns="" val="707521670"/>
+                      <a16:colId xmlns:a16="http://schemas.microsoft.com/office/drawing/2014/main" val="707521670"/>
                     </a:ext>
                   </a:extLst>
                 </a:gridCol>
                 <a:gridCol w="836077">
                   <a:extLst>
                     <a:ext uri="{9D8B030D-6E8A-4147-A177-3AD203B41FA5}">
-                      <a16:colId xmlns:a16="http://schemas.microsoft.com/office/drawing/2014/main" xmlns="" val="1737538463"/>
+                      <a16:colId xmlns:a16="http://schemas.microsoft.com/office/drawing/2014/main" val="1737538463"/>
                     </a:ext>
                   </a:extLst>
                 </a:gridCol>
@@ -34901,7 +34883,7 @@
                 </a:tc>
                 <a:extLst>
                   <a:ext uri="{0D108BD9-81ED-4DB2-BD59-A6C34878D82A}">
-                    <a16:rowId xmlns:a16="http://schemas.microsoft.com/office/drawing/2014/main" xmlns="" val="10000"/>
+                    <a16:rowId xmlns:a16="http://schemas.microsoft.com/office/drawing/2014/main" val="10000"/>
                   </a:ext>
                 </a:extLst>
               </a:tr>
@@ -35648,7 +35630,7 @@
                 </a:tc>
                 <a:extLst>
                   <a:ext uri="{0D108BD9-81ED-4DB2-BD59-A6C34878D82A}">
-                    <a16:rowId xmlns:a16="http://schemas.microsoft.com/office/drawing/2014/main" xmlns="" val="10001"/>
+                    <a16:rowId xmlns:a16="http://schemas.microsoft.com/office/drawing/2014/main" val="10001"/>
                   </a:ext>
                 </a:extLst>
               </a:tr>
@@ -36387,7 +36369,7 @@
                 </a:tc>
                 <a:extLst>
                   <a:ext uri="{0D108BD9-81ED-4DB2-BD59-A6C34878D82A}">
-                    <a16:rowId xmlns:a16="http://schemas.microsoft.com/office/drawing/2014/main" xmlns="" val="10002"/>
+                    <a16:rowId xmlns:a16="http://schemas.microsoft.com/office/drawing/2014/main" val="10002"/>
                   </a:ext>
                 </a:extLst>
               </a:tr>
@@ -37142,7 +37124,7 @@
                 </a:tc>
                 <a:extLst>
                   <a:ext uri="{0D108BD9-81ED-4DB2-BD59-A6C34878D82A}">
-                    <a16:rowId xmlns:a16="http://schemas.microsoft.com/office/drawing/2014/main" xmlns="" val="10003"/>
+                    <a16:rowId xmlns:a16="http://schemas.microsoft.com/office/drawing/2014/main" val="10003"/>
                   </a:ext>
                 </a:extLst>
               </a:tr>
@@ -37905,7 +37887,7 @@
                 </a:tc>
                 <a:extLst>
                   <a:ext uri="{0D108BD9-81ED-4DB2-BD59-A6C34878D82A}">
-                    <a16:rowId xmlns:a16="http://schemas.microsoft.com/office/drawing/2014/main" xmlns="" val="10004"/>
+                    <a16:rowId xmlns:a16="http://schemas.microsoft.com/office/drawing/2014/main" val="10004"/>
                   </a:ext>
                 </a:extLst>
               </a:tr>
@@ -38660,7 +38642,7 @@
                 </a:tc>
                 <a:extLst>
                   <a:ext uri="{0D108BD9-81ED-4DB2-BD59-A6C34878D82A}">
-                    <a16:rowId xmlns:a16="http://schemas.microsoft.com/office/drawing/2014/main" xmlns="" val="10005"/>
+                    <a16:rowId xmlns:a16="http://schemas.microsoft.com/office/drawing/2014/main" val="10005"/>
                   </a:ext>
                 </a:extLst>
               </a:tr>
@@ -39415,7 +39397,7 @@
                 </a:tc>
                 <a:extLst>
                   <a:ext uri="{0D108BD9-81ED-4DB2-BD59-A6C34878D82A}">
-                    <a16:rowId xmlns:a16="http://schemas.microsoft.com/office/drawing/2014/main" xmlns="" val="10006"/>
+                    <a16:rowId xmlns:a16="http://schemas.microsoft.com/office/drawing/2014/main" val="10006"/>
                   </a:ext>
                 </a:extLst>
               </a:tr>
@@ -40350,7 +40332,7 @@
           <p:cNvPr id="3" name="슬라이드 번호 개체 틀 2">
             <a:extLst>
               <a:ext uri="{FF2B5EF4-FFF2-40B4-BE49-F238E27FC236}">
-                <a16:creationId xmlns:a16="http://schemas.microsoft.com/office/drawing/2014/main" xmlns="" id="{C761FB45-671C-4F41-B290-A83E298CEFBF}"/>
+                <a16:creationId xmlns:a16="http://schemas.microsoft.com/office/drawing/2014/main" id="{C761FB45-671C-4F41-B290-A83E298CEFBF}"/>
               </a:ext>
             </a:extLst>
           </p:cNvPr>
@@ -40954,7 +40936,7 @@
           <p:cNvPr id="9" name="슬라이드 번호 개체 틀 8">
             <a:extLst>
               <a:ext uri="{FF2B5EF4-FFF2-40B4-BE49-F238E27FC236}">
-                <a16:creationId xmlns:a16="http://schemas.microsoft.com/office/drawing/2014/main" xmlns="" id="{99330B3F-ED74-4F30-B827-2ECD88CE630C}"/>
+                <a16:creationId xmlns:a16="http://schemas.microsoft.com/office/drawing/2014/main" id="{99330B3F-ED74-4F30-B827-2ECD88CE630C}"/>
               </a:ext>
             </a:extLst>
           </p:cNvPr>
@@ -41172,7 +41154,7 @@
           <p:cNvPr id="7" name="그룹 6">
             <a:extLst>
               <a:ext uri="{FF2B5EF4-FFF2-40B4-BE49-F238E27FC236}">
-                <a16:creationId xmlns:a16="http://schemas.microsoft.com/office/drawing/2014/main" xmlns="" id="{8C2D8FB4-F57A-469F-BD21-ABA847448F28}"/>
+                <a16:creationId xmlns:a16="http://schemas.microsoft.com/office/drawing/2014/main" id="{8C2D8FB4-F57A-469F-BD21-ABA847448F28}"/>
               </a:ext>
             </a:extLst>
           </p:cNvPr>
@@ -41192,7 +41174,7 @@
             <p:cNvPr id="3" name="그래픽 2" descr="문서">
               <a:extLst>
                 <a:ext uri="{FF2B5EF4-FFF2-40B4-BE49-F238E27FC236}">
-                  <a16:creationId xmlns:a16="http://schemas.microsoft.com/office/drawing/2014/main" xmlns="" id="{12572580-F38C-4CCF-AA4E-3D888C2F1FC6}"/>
+                  <a16:creationId xmlns:a16="http://schemas.microsoft.com/office/drawing/2014/main" id="{12572580-F38C-4CCF-AA4E-3D888C2F1FC6}"/>
                 </a:ext>
               </a:extLst>
             </p:cNvPr>
@@ -41208,7 +41190,7 @@
                   <a14:useLocalDpi xmlns:a14="http://schemas.microsoft.com/office/drawing/2010/main" val="0"/>
                 </a:ext>
                 <a:ext uri="{96DAC541-7B7A-43D3-8B79-37D633B846F1}">
-                  <asvg:svgBlip xmlns:asvg="http://schemas.microsoft.com/office/drawing/2016/SVG/main" xmlns="" r:embed="rId3"/>
+                  <asvg:svgBlip xmlns:asvg="http://schemas.microsoft.com/office/drawing/2016/SVG/main" r:embed="rId3"/>
                 </a:ext>
               </a:extLst>
             </a:blip>
@@ -41231,7 +41213,7 @@
             <p:cNvPr id="25" name="TextBox 24">
               <a:extLst>
                 <a:ext uri="{FF2B5EF4-FFF2-40B4-BE49-F238E27FC236}">
-                  <a16:creationId xmlns:a16="http://schemas.microsoft.com/office/drawing/2014/main" xmlns="" id="{60B19E6F-FDFE-4371-954B-EE8357458425}"/>
+                  <a16:creationId xmlns:a16="http://schemas.microsoft.com/office/drawing/2014/main" id="{60B19E6F-FDFE-4371-954B-EE8357458425}"/>
                 </a:ext>
               </a:extLst>
             </p:cNvPr>
@@ -41286,7 +41268,7 @@
           <p:cNvPr id="8" name="그룹 7">
             <a:extLst>
               <a:ext uri="{FF2B5EF4-FFF2-40B4-BE49-F238E27FC236}">
-                <a16:creationId xmlns:a16="http://schemas.microsoft.com/office/drawing/2014/main" xmlns="" id="{2D6C53EF-3ADC-484A-AF97-C640DB7202C2}"/>
+                <a16:creationId xmlns:a16="http://schemas.microsoft.com/office/drawing/2014/main" id="{2D6C53EF-3ADC-484A-AF97-C640DB7202C2}"/>
               </a:ext>
             </a:extLst>
           </p:cNvPr>
@@ -41306,7 +41288,7 @@
             <p:cNvPr id="6" name="그래픽 5" descr="책">
               <a:extLst>
                 <a:ext uri="{FF2B5EF4-FFF2-40B4-BE49-F238E27FC236}">
-                  <a16:creationId xmlns:a16="http://schemas.microsoft.com/office/drawing/2014/main" xmlns="" id="{559937BB-D551-408D-8122-6DD364F7652C}"/>
+                  <a16:creationId xmlns:a16="http://schemas.microsoft.com/office/drawing/2014/main" id="{559937BB-D551-408D-8122-6DD364F7652C}"/>
                 </a:ext>
               </a:extLst>
             </p:cNvPr>
@@ -41322,7 +41304,7 @@
                   <a14:useLocalDpi xmlns:a14="http://schemas.microsoft.com/office/drawing/2010/main" val="0"/>
                 </a:ext>
                 <a:ext uri="{96DAC541-7B7A-43D3-8B79-37D633B846F1}">
-                  <asvg:svgBlip xmlns:asvg="http://schemas.microsoft.com/office/drawing/2016/SVG/main" xmlns="" r:embed="rId7"/>
+                  <asvg:svgBlip xmlns:asvg="http://schemas.microsoft.com/office/drawing/2016/SVG/main" r:embed="rId7"/>
                 </a:ext>
               </a:extLst>
             </a:blip>
@@ -41345,7 +41327,7 @@
             <p:cNvPr id="44" name="TextBox 43">
               <a:extLst>
                 <a:ext uri="{FF2B5EF4-FFF2-40B4-BE49-F238E27FC236}">
-                  <a16:creationId xmlns:a16="http://schemas.microsoft.com/office/drawing/2014/main" xmlns="" id="{6E74769D-A361-4137-A5DA-5BBEC595177D}"/>
+                  <a16:creationId xmlns:a16="http://schemas.microsoft.com/office/drawing/2014/main" id="{6E74769D-A361-4137-A5DA-5BBEC595177D}"/>
                 </a:ext>
               </a:extLst>
             </p:cNvPr>
@@ -41459,7 +41441,7 @@
           <p:cNvPr id="9" name="그룹 8">
             <a:extLst>
               <a:ext uri="{FF2B5EF4-FFF2-40B4-BE49-F238E27FC236}">
-                <a16:creationId xmlns:a16="http://schemas.microsoft.com/office/drawing/2014/main" xmlns="" id="{866A1227-A3B5-4B65-9EE1-D38F3B0C2A3E}"/>
+                <a16:creationId xmlns:a16="http://schemas.microsoft.com/office/drawing/2014/main" id="{866A1227-A3B5-4B65-9EE1-D38F3B0C2A3E}"/>
               </a:ext>
             </a:extLst>
           </p:cNvPr>
@@ -41479,7 +41461,7 @@
             <p:cNvPr id="10" name="그림 9">
               <a:extLst>
                 <a:ext uri="{FF2B5EF4-FFF2-40B4-BE49-F238E27FC236}">
-                  <a16:creationId xmlns:a16="http://schemas.microsoft.com/office/drawing/2014/main" xmlns="" id="{9DCCF8A0-4C7B-4242-834C-023BEACFD549}"/>
+                  <a16:creationId xmlns:a16="http://schemas.microsoft.com/office/drawing/2014/main" id="{9DCCF8A0-4C7B-4242-834C-023BEACFD549}"/>
                 </a:ext>
               </a:extLst>
             </p:cNvPr>
@@ -41515,7 +41497,7 @@
             <p:cNvPr id="45" name="TextBox 44">
               <a:extLst>
                 <a:ext uri="{FF2B5EF4-FFF2-40B4-BE49-F238E27FC236}">
-                  <a16:creationId xmlns:a16="http://schemas.microsoft.com/office/drawing/2014/main" xmlns="" id="{D0AAB0CA-8872-49A1-B7C0-E2F801281DAF}"/>
+                  <a16:creationId xmlns:a16="http://schemas.microsoft.com/office/drawing/2014/main" id="{D0AAB0CA-8872-49A1-B7C0-E2F801281DAF}"/>
                 </a:ext>
               </a:extLst>
             </p:cNvPr>
@@ -41564,7 +41546,7 @@
           <p:cNvPr id="2" name="슬라이드 번호 개체 틀 1">
             <a:extLst>
               <a:ext uri="{FF2B5EF4-FFF2-40B4-BE49-F238E27FC236}">
-                <a16:creationId xmlns:a16="http://schemas.microsoft.com/office/drawing/2014/main" xmlns="" id="{2BCC8B5B-A6D0-4D48-A711-6859A55D65B1}"/>
+                <a16:creationId xmlns:a16="http://schemas.microsoft.com/office/drawing/2014/main" id="{2BCC8B5B-A6D0-4D48-A711-6859A55D65B1}"/>
               </a:ext>
             </a:extLst>
           </p:cNvPr>
@@ -41685,7 +41667,7 @@
           <p:cNvPr id="3" name="슬라이드 번호 개체 틀 2">
             <a:extLst>
               <a:ext uri="{FF2B5EF4-FFF2-40B4-BE49-F238E27FC236}">
-                <a16:creationId xmlns:a16="http://schemas.microsoft.com/office/drawing/2014/main" xmlns="" id="{99AB7930-9A7C-48F3-AFA5-037E04E1AA4C}"/>
+                <a16:creationId xmlns:a16="http://schemas.microsoft.com/office/drawing/2014/main" id="{99AB7930-9A7C-48F3-AFA5-037E04E1AA4C}"/>
               </a:ext>
             </a:extLst>
           </p:cNvPr>
@@ -41744,7 +41726,7 @@
           <p:cNvPr id="2" name="Text Box 22">
             <a:extLst>
               <a:ext uri="{FF2B5EF4-FFF2-40B4-BE49-F238E27FC236}">
-                <a16:creationId xmlns:a16="http://schemas.microsoft.com/office/drawing/2014/main" xmlns="" id="{61F72C57-A937-494F-A7F0-9D10A07CFF2A}"/>
+                <a16:creationId xmlns:a16="http://schemas.microsoft.com/office/drawing/2014/main" id="{61F72C57-A937-494F-A7F0-9D10A07CFF2A}"/>
               </a:ext>
             </a:extLst>
           </p:cNvPr>
@@ -41917,7 +41899,7 @@
           <p:cNvPr id="4" name="Text Box 22">
             <a:extLst>
               <a:ext uri="{FF2B5EF4-FFF2-40B4-BE49-F238E27FC236}">
-                <a16:creationId xmlns:a16="http://schemas.microsoft.com/office/drawing/2014/main" xmlns="" id="{39958334-0670-4B8B-9A4B-94F4BA1CFFCA}"/>
+                <a16:creationId xmlns:a16="http://schemas.microsoft.com/office/drawing/2014/main" id="{39958334-0670-4B8B-9A4B-94F4BA1CFFCA}"/>
               </a:ext>
             </a:extLst>
           </p:cNvPr>
@@ -42116,7 +42098,7 @@
           <p:cNvPr id="7" name="TextBox 6">
             <a:extLst>
               <a:ext uri="{FF2B5EF4-FFF2-40B4-BE49-F238E27FC236}">
-                <a16:creationId xmlns:a16="http://schemas.microsoft.com/office/drawing/2014/main" xmlns="" id="{ED451419-CB2D-4CCB-BFDD-B24D6A3E95D2}"/>
+                <a16:creationId xmlns:a16="http://schemas.microsoft.com/office/drawing/2014/main" id="{ED451419-CB2D-4CCB-BFDD-B24D6A3E95D2}"/>
               </a:ext>
             </a:extLst>
           </p:cNvPr>
@@ -42151,7 +42133,7 @@
           <p:cNvPr id="8" name="TextBox 7">
             <a:extLst>
               <a:ext uri="{FF2B5EF4-FFF2-40B4-BE49-F238E27FC236}">
-                <a16:creationId xmlns:a16="http://schemas.microsoft.com/office/drawing/2014/main" xmlns="" id="{21B77E87-BDDE-4DFA-B650-2AEDDA5B43DC}"/>
+                <a16:creationId xmlns:a16="http://schemas.microsoft.com/office/drawing/2014/main" id="{21B77E87-BDDE-4DFA-B650-2AEDDA5B43DC}"/>
               </a:ext>
             </a:extLst>
           </p:cNvPr>
@@ -42186,7 +42168,7 @@
           <p:cNvPr id="9" name="슬라이드 번호 개체 틀 8">
             <a:extLst>
               <a:ext uri="{FF2B5EF4-FFF2-40B4-BE49-F238E27FC236}">
-                <a16:creationId xmlns:a16="http://schemas.microsoft.com/office/drawing/2014/main" xmlns="" id="{9283DD15-EC06-4B7E-8E4F-3C67A6F6420D}"/>
+                <a16:creationId xmlns:a16="http://schemas.microsoft.com/office/drawing/2014/main" id="{9283DD15-EC06-4B7E-8E4F-3C67A6F6420D}"/>
               </a:ext>
             </a:extLst>
           </p:cNvPr>
@@ -42215,7 +42197,7 @@
           <p:cNvPr id="10" name="TextBox 9">
             <a:extLst>
               <a:ext uri="{FF2B5EF4-FFF2-40B4-BE49-F238E27FC236}">
-                <a16:creationId xmlns:a16="http://schemas.microsoft.com/office/drawing/2014/main" xmlns="" id="{35D63B36-29EB-4953-831E-84AEDC8757BA}"/>
+                <a16:creationId xmlns:a16="http://schemas.microsoft.com/office/drawing/2014/main" id="{35D63B36-29EB-4953-831E-84AEDC8757BA}"/>
               </a:ext>
             </a:extLst>
           </p:cNvPr>
@@ -42259,7 +42241,7 @@
           <p:cNvPr id="11" name="TextBox 10">
             <a:extLst>
               <a:ext uri="{FF2B5EF4-FFF2-40B4-BE49-F238E27FC236}">
-                <a16:creationId xmlns:a16="http://schemas.microsoft.com/office/drawing/2014/main" xmlns="" id="{8BD8B48A-29AB-4E6A-ADC7-B7EFF833EB22}"/>
+                <a16:creationId xmlns:a16="http://schemas.microsoft.com/office/drawing/2014/main" id="{8BD8B48A-29AB-4E6A-ADC7-B7EFF833EB22}"/>
               </a:ext>
             </a:extLst>
           </p:cNvPr>
@@ -42507,7 +42489,7 @@
           <p:cNvPr id="2" name="Text Box 22">
             <a:extLst>
               <a:ext uri="{FF2B5EF4-FFF2-40B4-BE49-F238E27FC236}">
-                <a16:creationId xmlns:a16="http://schemas.microsoft.com/office/drawing/2014/main" xmlns="" id="{61F72C57-A937-494F-A7F0-9D10A07CFF2A}"/>
+                <a16:creationId xmlns:a16="http://schemas.microsoft.com/office/drawing/2014/main" id="{61F72C57-A937-494F-A7F0-9D10A07CFF2A}"/>
               </a:ext>
             </a:extLst>
           </p:cNvPr>
@@ -42680,7 +42662,7 @@
           <p:cNvPr id="4" name="Text Box 22">
             <a:extLst>
               <a:ext uri="{FF2B5EF4-FFF2-40B4-BE49-F238E27FC236}">
-                <a16:creationId xmlns:a16="http://schemas.microsoft.com/office/drawing/2014/main" xmlns="" id="{39958334-0670-4B8B-9A4B-94F4BA1CFFCA}"/>
+                <a16:creationId xmlns:a16="http://schemas.microsoft.com/office/drawing/2014/main" id="{39958334-0670-4B8B-9A4B-94F4BA1CFFCA}"/>
               </a:ext>
             </a:extLst>
           </p:cNvPr>
@@ -42879,7 +42861,7 @@
           <p:cNvPr id="7" name="TextBox 6">
             <a:extLst>
               <a:ext uri="{FF2B5EF4-FFF2-40B4-BE49-F238E27FC236}">
-                <a16:creationId xmlns:a16="http://schemas.microsoft.com/office/drawing/2014/main" xmlns="" id="{ED451419-CB2D-4CCB-BFDD-B24D6A3E95D2}"/>
+                <a16:creationId xmlns:a16="http://schemas.microsoft.com/office/drawing/2014/main" id="{ED451419-CB2D-4CCB-BFDD-B24D6A3E95D2}"/>
               </a:ext>
             </a:extLst>
           </p:cNvPr>
@@ -42914,7 +42896,7 @@
           <p:cNvPr id="8" name="TextBox 7">
             <a:extLst>
               <a:ext uri="{FF2B5EF4-FFF2-40B4-BE49-F238E27FC236}">
-                <a16:creationId xmlns:a16="http://schemas.microsoft.com/office/drawing/2014/main" xmlns="" id="{21B77E87-BDDE-4DFA-B650-2AEDDA5B43DC}"/>
+                <a16:creationId xmlns:a16="http://schemas.microsoft.com/office/drawing/2014/main" id="{21B77E87-BDDE-4DFA-B650-2AEDDA5B43DC}"/>
               </a:ext>
             </a:extLst>
           </p:cNvPr>
@@ -42949,7 +42931,7 @@
           <p:cNvPr id="9" name="슬라이드 번호 개체 틀 8">
             <a:extLst>
               <a:ext uri="{FF2B5EF4-FFF2-40B4-BE49-F238E27FC236}">
-                <a16:creationId xmlns:a16="http://schemas.microsoft.com/office/drawing/2014/main" xmlns="" id="{9283DD15-EC06-4B7E-8E4F-3C67A6F6420D}"/>
+                <a16:creationId xmlns:a16="http://schemas.microsoft.com/office/drawing/2014/main" id="{9283DD15-EC06-4B7E-8E4F-3C67A6F6420D}"/>
               </a:ext>
             </a:extLst>
           </p:cNvPr>
@@ -42978,7 +42960,7 @@
           <p:cNvPr id="10" name="TextBox 9">
             <a:extLst>
               <a:ext uri="{FF2B5EF4-FFF2-40B4-BE49-F238E27FC236}">
-                <a16:creationId xmlns:a16="http://schemas.microsoft.com/office/drawing/2014/main" xmlns="" id="{35D63B36-29EB-4953-831E-84AEDC8757BA}"/>
+                <a16:creationId xmlns:a16="http://schemas.microsoft.com/office/drawing/2014/main" id="{35D63B36-29EB-4953-831E-84AEDC8757BA}"/>
               </a:ext>
             </a:extLst>
           </p:cNvPr>
@@ -43022,7 +43004,7 @@
           <p:cNvPr id="11" name="TextBox 10">
             <a:extLst>
               <a:ext uri="{FF2B5EF4-FFF2-40B4-BE49-F238E27FC236}">
-                <a16:creationId xmlns:a16="http://schemas.microsoft.com/office/drawing/2014/main" xmlns="" id="{8BD8B48A-29AB-4E6A-ADC7-B7EFF833EB22}"/>
+                <a16:creationId xmlns:a16="http://schemas.microsoft.com/office/drawing/2014/main" id="{8BD8B48A-29AB-4E6A-ADC7-B7EFF833EB22}"/>
               </a:ext>
             </a:extLst>
           </p:cNvPr>
@@ -43160,7 +43142,7 @@
           <p:cNvPr id="2" name="Text Box 22">
             <a:extLst>
               <a:ext uri="{FF2B5EF4-FFF2-40B4-BE49-F238E27FC236}">
-                <a16:creationId xmlns:a16="http://schemas.microsoft.com/office/drawing/2014/main" xmlns="" id="{61F72C57-A937-494F-A7F0-9D10A07CFF2A}"/>
+                <a16:creationId xmlns:a16="http://schemas.microsoft.com/office/drawing/2014/main" id="{61F72C57-A937-494F-A7F0-9D10A07CFF2A}"/>
               </a:ext>
             </a:extLst>
           </p:cNvPr>
@@ -43333,7 +43315,7 @@
           <p:cNvPr id="4" name="Text Box 22">
             <a:extLst>
               <a:ext uri="{FF2B5EF4-FFF2-40B4-BE49-F238E27FC236}">
-                <a16:creationId xmlns:a16="http://schemas.microsoft.com/office/drawing/2014/main" xmlns="" id="{39958334-0670-4B8B-9A4B-94F4BA1CFFCA}"/>
+                <a16:creationId xmlns:a16="http://schemas.microsoft.com/office/drawing/2014/main" id="{39958334-0670-4B8B-9A4B-94F4BA1CFFCA}"/>
               </a:ext>
             </a:extLst>
           </p:cNvPr>
@@ -43532,7 +43514,7 @@
           <p:cNvPr id="7" name="TextBox 6">
             <a:extLst>
               <a:ext uri="{FF2B5EF4-FFF2-40B4-BE49-F238E27FC236}">
-                <a16:creationId xmlns:a16="http://schemas.microsoft.com/office/drawing/2014/main" xmlns="" id="{ED451419-CB2D-4CCB-BFDD-B24D6A3E95D2}"/>
+                <a16:creationId xmlns:a16="http://schemas.microsoft.com/office/drawing/2014/main" id="{ED451419-CB2D-4CCB-BFDD-B24D6A3E95D2}"/>
               </a:ext>
             </a:extLst>
           </p:cNvPr>
@@ -43567,7 +43549,7 @@
           <p:cNvPr id="8" name="TextBox 7">
             <a:extLst>
               <a:ext uri="{FF2B5EF4-FFF2-40B4-BE49-F238E27FC236}">
-                <a16:creationId xmlns:a16="http://schemas.microsoft.com/office/drawing/2014/main" xmlns="" id="{21B77E87-BDDE-4DFA-B650-2AEDDA5B43DC}"/>
+                <a16:creationId xmlns:a16="http://schemas.microsoft.com/office/drawing/2014/main" id="{21B77E87-BDDE-4DFA-B650-2AEDDA5B43DC}"/>
               </a:ext>
             </a:extLst>
           </p:cNvPr>
@@ -43602,7 +43584,7 @@
           <p:cNvPr id="9" name="슬라이드 번호 개체 틀 8">
             <a:extLst>
               <a:ext uri="{FF2B5EF4-FFF2-40B4-BE49-F238E27FC236}">
-                <a16:creationId xmlns:a16="http://schemas.microsoft.com/office/drawing/2014/main" xmlns="" id="{9283DD15-EC06-4B7E-8E4F-3C67A6F6420D}"/>
+                <a16:creationId xmlns:a16="http://schemas.microsoft.com/office/drawing/2014/main" id="{9283DD15-EC06-4B7E-8E4F-3C67A6F6420D}"/>
               </a:ext>
             </a:extLst>
           </p:cNvPr>
@@ -43631,7 +43613,7 @@
           <p:cNvPr id="10" name="TextBox 9">
             <a:extLst>
               <a:ext uri="{FF2B5EF4-FFF2-40B4-BE49-F238E27FC236}">
-                <a16:creationId xmlns:a16="http://schemas.microsoft.com/office/drawing/2014/main" xmlns="" id="{35D63B36-29EB-4953-831E-84AEDC8757BA}"/>
+                <a16:creationId xmlns:a16="http://schemas.microsoft.com/office/drawing/2014/main" id="{35D63B36-29EB-4953-831E-84AEDC8757BA}"/>
               </a:ext>
             </a:extLst>
           </p:cNvPr>
@@ -43675,7 +43657,7 @@
           <p:cNvPr id="11" name="TextBox 10">
             <a:extLst>
               <a:ext uri="{FF2B5EF4-FFF2-40B4-BE49-F238E27FC236}">
-                <a16:creationId xmlns:a16="http://schemas.microsoft.com/office/drawing/2014/main" xmlns="" id="{8BD8B48A-29AB-4E6A-ADC7-B7EFF833EB22}"/>
+                <a16:creationId xmlns:a16="http://schemas.microsoft.com/office/drawing/2014/main" id="{8BD8B48A-29AB-4E6A-ADC7-B7EFF833EB22}"/>
               </a:ext>
             </a:extLst>
           </p:cNvPr>
@@ -43853,7 +43835,7 @@
           <p:cNvPr id="2" name="Text Box 22">
             <a:extLst>
               <a:ext uri="{FF2B5EF4-FFF2-40B4-BE49-F238E27FC236}">
-                <a16:creationId xmlns:a16="http://schemas.microsoft.com/office/drawing/2014/main" xmlns="" id="{61F72C57-A937-494F-A7F0-9D10A07CFF2A}"/>
+                <a16:creationId xmlns:a16="http://schemas.microsoft.com/office/drawing/2014/main" id="{61F72C57-A937-494F-A7F0-9D10A07CFF2A}"/>
               </a:ext>
             </a:extLst>
           </p:cNvPr>
@@ -44026,7 +44008,7 @@
           <p:cNvPr id="4" name="Text Box 22">
             <a:extLst>
               <a:ext uri="{FF2B5EF4-FFF2-40B4-BE49-F238E27FC236}">
-                <a16:creationId xmlns:a16="http://schemas.microsoft.com/office/drawing/2014/main" xmlns="" id="{39958334-0670-4B8B-9A4B-94F4BA1CFFCA}"/>
+                <a16:creationId xmlns:a16="http://schemas.microsoft.com/office/drawing/2014/main" id="{39958334-0670-4B8B-9A4B-94F4BA1CFFCA}"/>
               </a:ext>
             </a:extLst>
           </p:cNvPr>
@@ -44225,7 +44207,7 @@
           <p:cNvPr id="7" name="TextBox 6">
             <a:extLst>
               <a:ext uri="{FF2B5EF4-FFF2-40B4-BE49-F238E27FC236}">
-                <a16:creationId xmlns:a16="http://schemas.microsoft.com/office/drawing/2014/main" xmlns="" id="{ED451419-CB2D-4CCB-BFDD-B24D6A3E95D2}"/>
+                <a16:creationId xmlns:a16="http://schemas.microsoft.com/office/drawing/2014/main" id="{ED451419-CB2D-4CCB-BFDD-B24D6A3E95D2}"/>
               </a:ext>
             </a:extLst>
           </p:cNvPr>
@@ -44260,7 +44242,7 @@
           <p:cNvPr id="8" name="TextBox 7">
             <a:extLst>
               <a:ext uri="{FF2B5EF4-FFF2-40B4-BE49-F238E27FC236}">
-                <a16:creationId xmlns:a16="http://schemas.microsoft.com/office/drawing/2014/main" xmlns="" id="{21B77E87-BDDE-4DFA-B650-2AEDDA5B43DC}"/>
+                <a16:creationId xmlns:a16="http://schemas.microsoft.com/office/drawing/2014/main" id="{21B77E87-BDDE-4DFA-B650-2AEDDA5B43DC}"/>
               </a:ext>
             </a:extLst>
           </p:cNvPr>
@@ -44295,7 +44277,7 @@
           <p:cNvPr id="9" name="슬라이드 번호 개체 틀 8">
             <a:extLst>
               <a:ext uri="{FF2B5EF4-FFF2-40B4-BE49-F238E27FC236}">
-                <a16:creationId xmlns:a16="http://schemas.microsoft.com/office/drawing/2014/main" xmlns="" id="{9283DD15-EC06-4B7E-8E4F-3C67A6F6420D}"/>
+                <a16:creationId xmlns:a16="http://schemas.microsoft.com/office/drawing/2014/main" id="{9283DD15-EC06-4B7E-8E4F-3C67A6F6420D}"/>
               </a:ext>
             </a:extLst>
           </p:cNvPr>
@@ -44324,7 +44306,7 @@
           <p:cNvPr id="10" name="TextBox 9">
             <a:extLst>
               <a:ext uri="{FF2B5EF4-FFF2-40B4-BE49-F238E27FC236}">
-                <a16:creationId xmlns:a16="http://schemas.microsoft.com/office/drawing/2014/main" xmlns="" id="{35D63B36-29EB-4953-831E-84AEDC8757BA}"/>
+                <a16:creationId xmlns:a16="http://schemas.microsoft.com/office/drawing/2014/main" id="{35D63B36-29EB-4953-831E-84AEDC8757BA}"/>
               </a:ext>
             </a:extLst>
           </p:cNvPr>
@@ -44368,7 +44350,7 @@
           <p:cNvPr id="11" name="TextBox 10">
             <a:extLst>
               <a:ext uri="{FF2B5EF4-FFF2-40B4-BE49-F238E27FC236}">
-                <a16:creationId xmlns:a16="http://schemas.microsoft.com/office/drawing/2014/main" xmlns="" id="{8BD8B48A-29AB-4E6A-ADC7-B7EFF833EB22}"/>
+                <a16:creationId xmlns:a16="http://schemas.microsoft.com/office/drawing/2014/main" id="{8BD8B48A-29AB-4E6A-ADC7-B7EFF833EB22}"/>
               </a:ext>
             </a:extLst>
           </p:cNvPr>
@@ -44552,7 +44534,7 @@
           <p:cNvPr id="2" name="Text Box 22">
             <a:extLst>
               <a:ext uri="{FF2B5EF4-FFF2-40B4-BE49-F238E27FC236}">
-                <a16:creationId xmlns:a16="http://schemas.microsoft.com/office/drawing/2014/main" xmlns="" id="{61F72C57-A937-494F-A7F0-9D10A07CFF2A}"/>
+                <a16:creationId xmlns:a16="http://schemas.microsoft.com/office/drawing/2014/main" id="{61F72C57-A937-494F-A7F0-9D10A07CFF2A}"/>
               </a:ext>
             </a:extLst>
           </p:cNvPr>
@@ -44725,7 +44707,7 @@
           <p:cNvPr id="4" name="Text Box 22">
             <a:extLst>
               <a:ext uri="{FF2B5EF4-FFF2-40B4-BE49-F238E27FC236}">
-                <a16:creationId xmlns:a16="http://schemas.microsoft.com/office/drawing/2014/main" xmlns="" id="{39958334-0670-4B8B-9A4B-94F4BA1CFFCA}"/>
+                <a16:creationId xmlns:a16="http://schemas.microsoft.com/office/drawing/2014/main" id="{39958334-0670-4B8B-9A4B-94F4BA1CFFCA}"/>
               </a:ext>
             </a:extLst>
           </p:cNvPr>
@@ -44924,7 +44906,7 @@
           <p:cNvPr id="7" name="TextBox 6">
             <a:extLst>
               <a:ext uri="{FF2B5EF4-FFF2-40B4-BE49-F238E27FC236}">
-                <a16:creationId xmlns:a16="http://schemas.microsoft.com/office/drawing/2014/main" xmlns="" id="{ED451419-CB2D-4CCB-BFDD-B24D6A3E95D2}"/>
+                <a16:creationId xmlns:a16="http://schemas.microsoft.com/office/drawing/2014/main" id="{ED451419-CB2D-4CCB-BFDD-B24D6A3E95D2}"/>
               </a:ext>
             </a:extLst>
           </p:cNvPr>
@@ -44959,7 +44941,7 @@
           <p:cNvPr id="8" name="TextBox 7">
             <a:extLst>
               <a:ext uri="{FF2B5EF4-FFF2-40B4-BE49-F238E27FC236}">
-                <a16:creationId xmlns:a16="http://schemas.microsoft.com/office/drawing/2014/main" xmlns="" id="{21B77E87-BDDE-4DFA-B650-2AEDDA5B43DC}"/>
+                <a16:creationId xmlns:a16="http://schemas.microsoft.com/office/drawing/2014/main" id="{21B77E87-BDDE-4DFA-B650-2AEDDA5B43DC}"/>
               </a:ext>
             </a:extLst>
           </p:cNvPr>
@@ -44994,7 +44976,7 @@
           <p:cNvPr id="9" name="슬라이드 번호 개체 틀 8">
             <a:extLst>
               <a:ext uri="{FF2B5EF4-FFF2-40B4-BE49-F238E27FC236}">
-                <a16:creationId xmlns:a16="http://schemas.microsoft.com/office/drawing/2014/main" xmlns="" id="{9283DD15-EC06-4B7E-8E4F-3C67A6F6420D}"/>
+                <a16:creationId xmlns:a16="http://schemas.microsoft.com/office/drawing/2014/main" id="{9283DD15-EC06-4B7E-8E4F-3C67A6F6420D}"/>
               </a:ext>
             </a:extLst>
           </p:cNvPr>
@@ -45023,7 +45005,7 @@
           <p:cNvPr id="10" name="TextBox 9">
             <a:extLst>
               <a:ext uri="{FF2B5EF4-FFF2-40B4-BE49-F238E27FC236}">
-                <a16:creationId xmlns:a16="http://schemas.microsoft.com/office/drawing/2014/main" xmlns="" id="{35D63B36-29EB-4953-831E-84AEDC8757BA}"/>
+                <a16:creationId xmlns:a16="http://schemas.microsoft.com/office/drawing/2014/main" id="{35D63B36-29EB-4953-831E-84AEDC8757BA}"/>
               </a:ext>
             </a:extLst>
           </p:cNvPr>
@@ -45062,7 +45044,7 @@
           <p:cNvPr id="11" name="TextBox 10">
             <a:extLst>
               <a:ext uri="{FF2B5EF4-FFF2-40B4-BE49-F238E27FC236}">
-                <a16:creationId xmlns:a16="http://schemas.microsoft.com/office/drawing/2014/main" xmlns="" id="{8BD8B48A-29AB-4E6A-ADC7-B7EFF833EB22}"/>
+                <a16:creationId xmlns:a16="http://schemas.microsoft.com/office/drawing/2014/main" id="{8BD8B48A-29AB-4E6A-ADC7-B7EFF833EB22}"/>
               </a:ext>
             </a:extLst>
           </p:cNvPr>
@@ -45120,20 +45102,12 @@
               <a:buChar char="•"/>
             </a:pPr>
             <a:r>
-              <a:rPr lang="en-US" altLang="ko-KR" sz="2800" b="1" dirty="0" err="1">
+              <a:rPr lang="en-US" altLang="ko-KR" sz="2800" b="1" dirty="0">
                 <a:solidFill>
                   <a:srgbClr val="FF0000"/>
                 </a:solidFill>
               </a:rPr>
-              <a:t>Xxpage</a:t>
-            </a:r>
-            <a:r>
-              <a:rPr lang="en-US" altLang="ko-KR" sz="2800" b="1" dirty="0">
-                <a:solidFill>
-                  <a:srgbClr val="FF0000"/>
-                </a:solidFill>
-              </a:rPr>
-              <a:t> </a:t>
+              <a:t>13page </a:t>
             </a:r>
             <a:r>
               <a:rPr lang="ko-KR" altLang="en-US" sz="2800" b="1" dirty="0">
@@ -45379,7 +45353,7 @@
           <p:cNvPr id="4" name="그룹 3">
             <a:extLst>
               <a:ext uri="{FF2B5EF4-FFF2-40B4-BE49-F238E27FC236}">
-                <a16:creationId xmlns:a16="http://schemas.microsoft.com/office/drawing/2014/main" xmlns="" id="{D8FC4019-450C-4E12-A39F-700486215240}"/>
+                <a16:creationId xmlns:a16="http://schemas.microsoft.com/office/drawing/2014/main" id="{D8FC4019-450C-4E12-A39F-700486215240}"/>
               </a:ext>
             </a:extLst>
           </p:cNvPr>
@@ -45467,7 +45441,7 @@
           <p:cNvPr id="5" name="그룹 4">
             <a:extLst>
               <a:ext uri="{FF2B5EF4-FFF2-40B4-BE49-F238E27FC236}">
-                <a16:creationId xmlns:a16="http://schemas.microsoft.com/office/drawing/2014/main" xmlns="" id="{7D9D48F5-C89C-4163-BC86-D52BFA0112F1}"/>
+                <a16:creationId xmlns:a16="http://schemas.microsoft.com/office/drawing/2014/main" id="{7D9D48F5-C89C-4163-BC86-D52BFA0112F1}"/>
               </a:ext>
             </a:extLst>
           </p:cNvPr>
@@ -45564,7 +45538,7 @@
           <p:cNvPr id="2" name="그룹 1">
             <a:extLst>
               <a:ext uri="{FF2B5EF4-FFF2-40B4-BE49-F238E27FC236}">
-                <a16:creationId xmlns:a16="http://schemas.microsoft.com/office/drawing/2014/main" xmlns="" id="{C0648DAD-12A3-47CA-8028-B93B0736AC4D}"/>
+                <a16:creationId xmlns:a16="http://schemas.microsoft.com/office/drawing/2014/main" id="{C0648DAD-12A3-47CA-8028-B93B0736AC4D}"/>
               </a:ext>
             </a:extLst>
           </p:cNvPr>
@@ -45627,7 +45601,7 @@
             <p:cNvPr id="29" name="TextBox 28">
               <a:extLst>
                 <a:ext uri="{FF2B5EF4-FFF2-40B4-BE49-F238E27FC236}">
-                  <a16:creationId xmlns:a16="http://schemas.microsoft.com/office/drawing/2014/main" xmlns="" id="{953BEEA3-CD66-4D73-9C53-4ECE5CE0E746}"/>
+                  <a16:creationId xmlns:a16="http://schemas.microsoft.com/office/drawing/2014/main" id="{953BEEA3-CD66-4D73-9C53-4ECE5CE0E746}"/>
                 </a:ext>
               </a:extLst>
             </p:cNvPr>
@@ -45696,7 +45670,7 @@
           <p:cNvPr id="31" name="TextBox 30">
             <a:extLst>
               <a:ext uri="{FF2B5EF4-FFF2-40B4-BE49-F238E27FC236}">
-                <a16:creationId xmlns:a16="http://schemas.microsoft.com/office/drawing/2014/main" xmlns="" id="{BF212B17-A047-41A3-9787-E0AD2FE76A25}"/>
+                <a16:creationId xmlns:a16="http://schemas.microsoft.com/office/drawing/2014/main" id="{BF212B17-A047-41A3-9787-E0AD2FE76A25}"/>
               </a:ext>
             </a:extLst>
           </p:cNvPr>
@@ -45755,7 +45729,7 @@
           <p:cNvPr id="34" name="TextBox 33">
             <a:extLst>
               <a:ext uri="{FF2B5EF4-FFF2-40B4-BE49-F238E27FC236}">
-                <a16:creationId xmlns:a16="http://schemas.microsoft.com/office/drawing/2014/main" xmlns="" id="{8C11D110-40CC-4860-8B58-C8C3A0300A4D}"/>
+                <a16:creationId xmlns:a16="http://schemas.microsoft.com/office/drawing/2014/main" id="{8C11D110-40CC-4860-8B58-C8C3A0300A4D}"/>
               </a:ext>
             </a:extLst>
           </p:cNvPr>
@@ -45832,7 +45806,7 @@
           <p:cNvPr id="39" name="TextBox 38">
             <a:extLst>
               <a:ext uri="{FF2B5EF4-FFF2-40B4-BE49-F238E27FC236}">
-                <a16:creationId xmlns:a16="http://schemas.microsoft.com/office/drawing/2014/main" xmlns="" id="{7D290A1F-FBB4-4131-8E60-D8E0EA41ADBD}"/>
+                <a16:creationId xmlns:a16="http://schemas.microsoft.com/office/drawing/2014/main" id="{7D290A1F-FBB4-4131-8E60-D8E0EA41ADBD}"/>
               </a:ext>
             </a:extLst>
           </p:cNvPr>
@@ -45900,7 +45874,7 @@
           <p:cNvPr id="40" name="TextBox 39">
             <a:extLst>
               <a:ext uri="{FF2B5EF4-FFF2-40B4-BE49-F238E27FC236}">
-                <a16:creationId xmlns:a16="http://schemas.microsoft.com/office/drawing/2014/main" xmlns="" id="{D51FF75A-AEC6-420D-B39E-8CB7992298F8}"/>
+                <a16:creationId xmlns:a16="http://schemas.microsoft.com/office/drawing/2014/main" id="{D51FF75A-AEC6-420D-B39E-8CB7992298F8}"/>
               </a:ext>
             </a:extLst>
           </p:cNvPr>
@@ -45977,7 +45951,7 @@
           <p:cNvPr id="41" name="TextBox 40">
             <a:extLst>
               <a:ext uri="{FF2B5EF4-FFF2-40B4-BE49-F238E27FC236}">
-                <a16:creationId xmlns:a16="http://schemas.microsoft.com/office/drawing/2014/main" xmlns="" id="{4F8F65B6-5674-4FBC-BFE2-1C6C53503FB5}"/>
+                <a16:creationId xmlns:a16="http://schemas.microsoft.com/office/drawing/2014/main" id="{4F8F65B6-5674-4FBC-BFE2-1C6C53503FB5}"/>
               </a:ext>
             </a:extLst>
           </p:cNvPr>
@@ -46036,7 +46010,7 @@
           <p:cNvPr id="42" name="TextBox 41">
             <a:extLst>
               <a:ext uri="{FF2B5EF4-FFF2-40B4-BE49-F238E27FC236}">
-                <a16:creationId xmlns:a16="http://schemas.microsoft.com/office/drawing/2014/main" xmlns="" id="{D172B7EA-4E0A-456C-A1B0-A84D87B5F3B9}"/>
+                <a16:creationId xmlns:a16="http://schemas.microsoft.com/office/drawing/2014/main" id="{D172B7EA-4E0A-456C-A1B0-A84D87B5F3B9}"/>
               </a:ext>
             </a:extLst>
           </p:cNvPr>
@@ -46104,7 +46078,7 @@
           <p:cNvPr id="43" name="TextBox 42">
             <a:extLst>
               <a:ext uri="{FF2B5EF4-FFF2-40B4-BE49-F238E27FC236}">
-                <a16:creationId xmlns:a16="http://schemas.microsoft.com/office/drawing/2014/main" xmlns="" id="{D53D90B5-6A60-40D5-9400-68698E994A19}"/>
+                <a16:creationId xmlns:a16="http://schemas.microsoft.com/office/drawing/2014/main" id="{D53D90B5-6A60-40D5-9400-68698E994A19}"/>
               </a:ext>
             </a:extLst>
           </p:cNvPr>
@@ -46172,7 +46146,7 @@
           <p:cNvPr id="3" name="슬라이드 번호 개체 틀 2">
             <a:extLst>
               <a:ext uri="{FF2B5EF4-FFF2-40B4-BE49-F238E27FC236}">
-                <a16:creationId xmlns:a16="http://schemas.microsoft.com/office/drawing/2014/main" xmlns="" id="{8F1F7F64-2291-4AF0-BA14-ED34CD5C74F4}"/>
+                <a16:creationId xmlns:a16="http://schemas.microsoft.com/office/drawing/2014/main" id="{8F1F7F64-2291-4AF0-BA14-ED34CD5C74F4}"/>
               </a:ext>
             </a:extLst>
           </p:cNvPr>
@@ -46994,18 +46968,18 @@
 
 <file path=customXml/item1.xml><?xml version="1.0" encoding="utf-8"?>
 <Control xmlns="http://schemas.microsoft.com/VisualStudio/2011/storyboarding/control">
-  <Id Name="System.Storyboarding.WindowsAppIcons.Paste" Revision="1" Stencil="System.Storyboarding.WindowsAppIcons" StencilVersion="0.1"/>
+  <Id Name="System.Storyboarding.Icons.CheckCircle" Revision="1" Stencil="System.Storyboarding.Icons" StencilVersion="0.1"/>
 </Control>
 </file>
 
 <file path=customXml/item2.xml><?xml version="1.0" encoding="utf-8"?>
 <Control xmlns="http://schemas.microsoft.com/VisualStudio/2011/storyboarding/control">
-  <Id Name="System.Storyboarding.Icons.CheckCircle" Revision="1" Stencil="System.Storyboarding.Icons" StencilVersion="0.1"/>
+  <Id Name="System.Storyboarding.WindowsAppIcons.Paste" Revision="1" Stencil="System.Storyboarding.WindowsAppIcons" StencilVersion="0.1"/>
 </Control>
 </file>
 
 <file path=customXml/itemProps1.xml><?xml version="1.0" encoding="utf-8"?>
-<ds:datastoreItem xmlns:ds="http://schemas.openxmlformats.org/officeDocument/2006/customXml" ds:itemID="{52266879-4E94-44A1-A54A-A7163A1198C4}">
+<ds:datastoreItem xmlns:ds="http://schemas.openxmlformats.org/officeDocument/2006/customXml" ds:itemID="{D3DA86E8-34BE-44E8-91C9-A4F4C9D9BF5C}">
   <ds:schemaRefs>
     <ds:schemaRef ds:uri="http://schemas.microsoft.com/VisualStudio/2011/storyboarding/control"/>
   </ds:schemaRefs>
@@ -47013,7 +46987,7 @@
 </file>
 
 <file path=customXml/itemProps2.xml><?xml version="1.0" encoding="utf-8"?>
-<ds:datastoreItem xmlns:ds="http://schemas.openxmlformats.org/officeDocument/2006/customXml" ds:itemID="{D3DA86E8-34BE-44E8-91C9-A4F4C9D9BF5C}">
+<ds:datastoreItem xmlns:ds="http://schemas.openxmlformats.org/officeDocument/2006/customXml" ds:itemID="{52266879-4E94-44A1-A54A-A7163A1198C4}">
   <ds:schemaRefs>
     <ds:schemaRef ds:uri="http://schemas.microsoft.com/VisualStudio/2011/storyboarding/control"/>
   </ds:schemaRefs>

</xml_diff>

<commit_message>
--2019.03.24 JeongChan Lee "설계서 작성중"
</commit_message>
<xml_diff>
--- a/resources/졸작설계서.pptx
+++ b/resources/졸작설계서.pptx
@@ -2882,7 +2882,7 @@
           <a:p>
             <a:fld id="{55C1C2EC-08DE-4AE3-9D58-8409DB890493}" type="datetimeFigureOut">
               <a:rPr lang="ko-KR" altLang="en-US" smtClean="0"/>
-              <a:t>2019-02-21</a:t>
+              <a:t>2019-03-24</a:t>
             </a:fld>
             <a:endParaRPr lang="ko-KR" altLang="en-US"/>
           </a:p>
@@ -3048,7 +3048,7 @@
           <a:p>
             <a:fld id="{7B0C47E4-26E9-4C74-A846-469F09AE2EBB}" type="datetimeFigureOut">
               <a:rPr lang="ko-KR" altLang="en-US" smtClean="0"/>
-              <a:t>2019-02-21</a:t>
+              <a:t>2019-03-24</a:t>
             </a:fld>
             <a:endParaRPr lang="ko-KR" altLang="en-US"/>
           </a:p>
@@ -30674,8 +30674,8 @@
         </p:nvSpPr>
         <p:spPr>
           <a:xfrm>
-            <a:off x="426125" y="975848"/>
-            <a:ext cx="8211848" cy="400110"/>
+            <a:off x="435002" y="1419732"/>
+            <a:ext cx="8211848" cy="4708981"/>
           </a:xfrm>
           <a:prstGeom prst="rect">
             <a:avLst/>
@@ -30693,237 +30693,169 @@
               <a:buChar char="•"/>
             </a:pPr>
             <a:r>
-              <a:rPr lang="ko-KR" altLang="en-US" sz="2000" dirty="0"/>
-              <a:t>실제 운영되는 서비스를 기능별로 하나씩 테스트하면서 시연할 계획</a:t>
-            </a:r>
-            <a:endParaRPr lang="en-US" altLang="ko-KR" sz="2000" dirty="0"/>
+              <a:rPr lang="ko-KR" altLang="en-US" sz="2000" b="1" dirty="0"/>
+              <a:t>로컬 환경에서 접속하여 실행</a:t>
+            </a:r>
+            <a:endParaRPr lang="en-US" altLang="ko-KR" sz="2000" b="1" dirty="0"/>
           </a:p>
-        </p:txBody>
-      </p:sp>
-      <p:sp>
-        <p:nvSpPr>
-          <p:cNvPr id="7" name="TextBox 6">
-            <a:extLst>
-              <a:ext uri="{FF2B5EF4-FFF2-40B4-BE49-F238E27FC236}">
-                <a16:creationId xmlns:a16="http://schemas.microsoft.com/office/drawing/2014/main" id="{3A9851C4-B5E7-4D8B-B890-D77F18D24630}"/>
-              </a:ext>
-            </a:extLst>
-          </p:cNvPr>
-          <p:cNvSpPr txBox="1"/>
-          <p:nvPr/>
-        </p:nvSpPr>
-        <p:spPr>
-          <a:xfrm>
-            <a:off x="426125" y="2541652"/>
-            <a:ext cx="3737499" cy="369332"/>
-          </a:xfrm>
-          <a:prstGeom prst="rect">
-            <a:avLst/>
-          </a:prstGeom>
-          <a:noFill/>
-        </p:spPr>
-        <p:txBody>
-          <a:bodyPr wrap="square" rtlCol="0">
-            <a:spAutoFit/>
-          </a:bodyPr>
-          <a:lstStyle/>
           <a:p>
-            <a:r>
-              <a:rPr lang="ko-KR" altLang="en-US" dirty="0"/>
-              <a:t>지적 사항 답변</a:t>
-            </a:r>
-          </a:p>
-        </p:txBody>
-      </p:sp>
-      <p:sp>
-        <p:nvSpPr>
-          <p:cNvPr id="8" name="TextBox 7">
-            <a:extLst>
-              <a:ext uri="{FF2B5EF4-FFF2-40B4-BE49-F238E27FC236}">
-                <a16:creationId xmlns:a16="http://schemas.microsoft.com/office/drawing/2014/main" id="{0E6AFE75-F968-4CB3-B73F-8D4D004BAC0B}"/>
-              </a:ext>
-            </a:extLst>
-          </p:cNvPr>
-          <p:cNvSpPr txBox="1"/>
-          <p:nvPr/>
-        </p:nvSpPr>
-        <p:spPr>
-          <a:xfrm>
-            <a:off x="426125" y="1665472"/>
-            <a:ext cx="8625870" cy="584775"/>
-          </a:xfrm>
-          <a:prstGeom prst="rect">
-            <a:avLst/>
-          </a:prstGeom>
-          <a:noFill/>
-        </p:spPr>
-        <p:txBody>
-          <a:bodyPr wrap="square" rtlCol="0">
-            <a:spAutoFit/>
-          </a:bodyPr>
-          <a:lstStyle/>
-          <a:p>
-            <a:r>
-              <a:rPr lang="en-US" altLang="ko-KR" sz="3200" b="1" dirty="0"/>
-              <a:t>Q3. </a:t>
-            </a:r>
-            <a:r>
-              <a:rPr lang="ko-KR" altLang="en-US" sz="3200" b="1" dirty="0"/>
-              <a:t>기록지를 사용하지 않을 수 있는가</a:t>
-            </a:r>
-            <a:r>
-              <a:rPr lang="en-US" altLang="ko-KR" sz="3200" b="1" dirty="0"/>
-              <a:t>?</a:t>
-            </a:r>
-            <a:endParaRPr lang="ko-KR" altLang="en-US" sz="3200" b="1" dirty="0"/>
-          </a:p>
-        </p:txBody>
-      </p:sp>
-      <p:sp>
-        <p:nvSpPr>
-          <p:cNvPr id="9" name="TextBox 8">
-            <a:extLst>
-              <a:ext uri="{FF2B5EF4-FFF2-40B4-BE49-F238E27FC236}">
-                <a16:creationId xmlns:a16="http://schemas.microsoft.com/office/drawing/2014/main" id="{0B7CBEE1-4A9C-47B0-9CE3-37BF7D6A6057}"/>
-              </a:ext>
-            </a:extLst>
-          </p:cNvPr>
-          <p:cNvSpPr txBox="1"/>
-          <p:nvPr/>
-        </p:nvSpPr>
-        <p:spPr>
-          <a:xfrm>
-            <a:off x="426124" y="3048500"/>
-            <a:ext cx="8832176" cy="2246769"/>
-          </a:xfrm>
-          <a:prstGeom prst="rect">
-            <a:avLst/>
-          </a:prstGeom>
-          <a:noFill/>
-        </p:spPr>
-        <p:txBody>
-          <a:bodyPr wrap="square" rtlCol="0">
-            <a:spAutoFit/>
-          </a:bodyPr>
-          <a:lstStyle/>
-          <a:p>
-            <a:pPr marL="457200" indent="-457200">
+            <a:pPr marL="285750" indent="-285750">
               <a:buFont typeface="Arial" panose="020B0604020202020204" pitchFamily="34" charset="0"/>
               <a:buChar char="•"/>
             </a:pPr>
-            <a:r>
-              <a:rPr lang="ko-KR" altLang="en-US" sz="2800" b="1" dirty="0">
-                <a:solidFill>
-                  <a:srgbClr val="FF0000"/>
-                </a:solidFill>
-              </a:rPr>
-              <a:t>기록지 </a:t>
-            </a:r>
-            <a:r>
-              <a:rPr lang="ko-KR" altLang="en-US" sz="2800" b="1" dirty="0" err="1">
-                <a:solidFill>
-                  <a:srgbClr val="FF0000"/>
-                </a:solidFill>
-              </a:rPr>
-              <a:t>미사용</a:t>
-            </a:r>
-            <a:endParaRPr lang="en-US" altLang="ko-KR" sz="2800" b="1" dirty="0">
-              <a:solidFill>
-                <a:srgbClr val="FF0000"/>
-              </a:solidFill>
-            </a:endParaRPr>
+            <a:endParaRPr lang="en-US" altLang="ko-KR" sz="2000" dirty="0"/>
           </a:p>
           <a:p>
-            <a:pPr marL="457200" indent="-457200">
+            <a:pPr marL="285750" indent="-285750">
               <a:buFont typeface="Arial" panose="020B0604020202020204" pitchFamily="34" charset="0"/>
               <a:buChar char="•"/>
             </a:pPr>
-            <a:endParaRPr lang="en-US" altLang="ko-KR" sz="2800" b="1" dirty="0">
-              <a:solidFill>
-                <a:srgbClr val="FF0000"/>
-              </a:solidFill>
-            </a:endParaRPr>
+            <a:r>
+              <a:rPr lang="ko-KR" altLang="en-US" sz="2000" b="1" dirty="0"/>
+              <a:t>구현 모듈 별 데모 실행</a:t>
+            </a:r>
+            <a:endParaRPr lang="en-US" altLang="ko-KR" sz="2000" b="1" dirty="0"/>
           </a:p>
           <a:p>
-            <a:pPr marL="457200" indent="-457200">
+            <a:pPr marL="285750" indent="-285750">
               <a:buFont typeface="Arial" panose="020B0604020202020204" pitchFamily="34" charset="0"/>
               <a:buChar char="•"/>
             </a:pPr>
-            <a:r>
-              <a:rPr lang="ko-KR" altLang="en-US" sz="2800" b="1" dirty="0">
-                <a:solidFill>
-                  <a:srgbClr val="FF0000"/>
-                </a:solidFill>
-              </a:rPr>
-              <a:t>실시간 키 맵핑</a:t>
-            </a:r>
-            <a:r>
-              <a:rPr lang="en-US" altLang="ko-KR" sz="2800" b="1" dirty="0">
-                <a:solidFill>
-                  <a:srgbClr val="FF0000"/>
-                </a:solidFill>
-              </a:rPr>
-              <a:t> =&gt; </a:t>
-            </a:r>
-            <a:r>
-              <a:rPr lang="ko-KR" altLang="en-US" sz="2800" b="1" dirty="0">
-                <a:solidFill>
-                  <a:srgbClr val="FF0000"/>
-                </a:solidFill>
-              </a:rPr>
-              <a:t>기록 실시</a:t>
-            </a:r>
-            <a:endParaRPr lang="en-US" altLang="ko-KR" sz="2800" b="1" dirty="0">
-              <a:solidFill>
-                <a:srgbClr val="FF0000"/>
-              </a:solidFill>
-            </a:endParaRPr>
+            <a:endParaRPr lang="en-US" altLang="ko-KR" sz="2000" dirty="0"/>
           </a:p>
           <a:p>
-            <a:pPr marL="457200" indent="-457200">
+            <a:pPr marL="285750" indent="-285750">
               <a:buFont typeface="Arial" panose="020B0604020202020204" pitchFamily="34" charset="0"/>
               <a:buChar char="•"/>
             </a:pPr>
-            <a:endParaRPr lang="en-US" altLang="ko-KR" sz="2800" b="1" dirty="0">
-              <a:solidFill>
-                <a:srgbClr val="FF0000"/>
-              </a:solidFill>
-            </a:endParaRPr>
+            <a:r>
+              <a:rPr lang="ko-KR" altLang="en-US" sz="2000" b="1" dirty="0"/>
+              <a:t>리그 기록 관리 모듈</a:t>
+            </a:r>
+            <a:endParaRPr lang="en-US" altLang="ko-KR" sz="2000" b="1" dirty="0"/>
           </a:p>
           <a:p>
-            <a:pPr marL="457200" indent="-457200">
+            <a:endParaRPr lang="en-US" altLang="ko-KR" sz="2000" b="1" dirty="0"/>
+          </a:p>
+          <a:p>
+            <a:pPr marL="914400" lvl="1" indent="-457200">
+              <a:buFont typeface="+mj-ea"/>
+              <a:buAutoNum type="circleNumDbPlain"/>
+            </a:pPr>
+            <a:r>
+              <a:rPr lang="ko-KR" altLang="en-US" sz="2000" dirty="0"/>
+              <a:t>실제 </a:t>
+            </a:r>
+            <a:r>
+              <a:rPr lang="ko-KR" altLang="en-US" sz="2000" b="1" dirty="0">
+                <a:solidFill>
+                  <a:srgbClr val="FF0000"/>
+                </a:solidFill>
+              </a:rPr>
+              <a:t>편집한 야구 플레이 영상 </a:t>
+            </a:r>
+            <a:r>
+              <a:rPr lang="en-US" altLang="ko-KR" sz="2000" dirty="0"/>
+              <a:t>1</a:t>
+            </a:r>
+            <a:r>
+              <a:rPr lang="ko-KR" altLang="en-US" sz="2000" dirty="0" err="1"/>
+              <a:t>회초</a:t>
+            </a:r>
+            <a:r>
+              <a:rPr lang="en-US" altLang="ko-KR" sz="2000" dirty="0"/>
+              <a:t>~2</a:t>
+            </a:r>
+            <a:r>
+              <a:rPr lang="ko-KR" altLang="en-US" sz="2000" dirty="0" err="1"/>
+              <a:t>회초</a:t>
+            </a:r>
+            <a:r>
+              <a:rPr lang="ko-KR" altLang="en-US" sz="2000" dirty="0"/>
+              <a:t> 실행</a:t>
+            </a:r>
+            <a:endParaRPr lang="en-US" altLang="ko-KR" sz="2000" dirty="0"/>
+          </a:p>
+          <a:p>
+            <a:pPr marL="914400" lvl="1" indent="-457200">
+              <a:buFont typeface="+mj-ea"/>
+              <a:buAutoNum type="circleNumDbPlain"/>
+            </a:pPr>
+            <a:r>
+              <a:rPr lang="en-US" altLang="ko-KR" sz="2000" dirty="0"/>
+              <a:t>KPU</a:t>
+            </a:r>
+            <a:r>
+              <a:rPr lang="ko-KR" altLang="en-US" sz="2000" dirty="0"/>
+              <a:t>리그를 추가 </a:t>
+            </a:r>
+            <a:r>
+              <a:rPr lang="en-US" altLang="ko-KR" sz="2000" dirty="0"/>
+              <a:t>+ </a:t>
+            </a:r>
+            <a:r>
+              <a:rPr lang="ko-KR" altLang="en-US" sz="2000" dirty="0"/>
+              <a:t>선수 추가</a:t>
+            </a:r>
+            <a:endParaRPr lang="en-US" altLang="ko-KR" sz="2000" dirty="0"/>
+          </a:p>
+          <a:p>
+            <a:pPr marL="914400" lvl="1" indent="-457200">
+              <a:buFont typeface="+mj-ea"/>
+              <a:buAutoNum type="circleNumDbPlain"/>
+            </a:pPr>
+            <a:r>
+              <a:rPr lang="ko-KR" altLang="en-US" sz="2000" dirty="0"/>
+              <a:t>각 플레이에 따라 기록</a:t>
+            </a:r>
+            <a:endParaRPr lang="en-US" altLang="ko-KR" sz="2000" b="1" dirty="0"/>
+          </a:p>
+          <a:p>
+            <a:pPr marL="285750" indent="-285750">
               <a:buFont typeface="Arial" panose="020B0604020202020204" pitchFamily="34" charset="0"/>
               <a:buChar char="•"/>
             </a:pPr>
-            <a:r>
-              <a:rPr lang="en-US" altLang="ko-KR" sz="2800" b="1" dirty="0" err="1">
-                <a:solidFill>
-                  <a:srgbClr val="FF0000"/>
-                </a:solidFill>
-              </a:rPr>
-              <a:t>Xxpage</a:t>
-            </a:r>
-            <a:r>
-              <a:rPr lang="en-US" altLang="ko-KR" sz="2800" b="1" dirty="0">
-                <a:solidFill>
-                  <a:srgbClr val="FF0000"/>
-                </a:solidFill>
-              </a:rPr>
-              <a:t> </a:t>
-            </a:r>
-            <a:r>
-              <a:rPr lang="ko-KR" altLang="en-US" sz="2800" b="1" dirty="0">
-                <a:solidFill>
-                  <a:srgbClr val="FF0000"/>
-                </a:solidFill>
-              </a:rPr>
-              <a:t>키 맵핑 참고</a:t>
-            </a:r>
-            <a:endParaRPr lang="en-US" altLang="ko-KR" sz="2800" b="1" dirty="0">
-              <a:solidFill>
-                <a:srgbClr val="FF0000"/>
-              </a:solidFill>
-            </a:endParaRPr>
+            <a:endParaRPr lang="en-US" altLang="ko-KR" sz="2000" b="1" dirty="0"/>
+          </a:p>
+          <a:p>
+            <a:pPr marL="285750" indent="-285750">
+              <a:buFont typeface="Arial" panose="020B0604020202020204" pitchFamily="34" charset="0"/>
+              <a:buChar char="•"/>
+            </a:pPr>
+            <a:r>
+              <a:rPr lang="en-US" altLang="ko-KR" sz="2000" b="1" dirty="0"/>
+              <a:t>IF </a:t>
+            </a:r>
+            <a:r>
+              <a:rPr lang="ko-KR" altLang="en-US" sz="2000" b="1" dirty="0"/>
+              <a:t>시간 여유</a:t>
+            </a:r>
+            <a:endParaRPr lang="en-US" altLang="ko-KR" sz="2000" b="1" dirty="0"/>
+          </a:p>
+          <a:p>
+            <a:endParaRPr lang="en-US" altLang="ko-KR" sz="2000" b="1" dirty="0"/>
+          </a:p>
+          <a:p>
+            <a:pPr marL="914400" lvl="1" indent="-457200">
+              <a:buFont typeface="+mj-ea"/>
+              <a:buAutoNum type="circleNumDbPlain"/>
+            </a:pPr>
+            <a:r>
+              <a:rPr lang="ko-KR" altLang="en-US" sz="2000" dirty="0"/>
+              <a:t>각 기능 모듈 보여주기</a:t>
+            </a:r>
+            <a:endParaRPr lang="en-US" altLang="ko-KR" sz="2000" dirty="0"/>
+          </a:p>
+          <a:p>
+            <a:pPr marL="285750" indent="-285750">
+              <a:buFont typeface="Arial" panose="020B0604020202020204" pitchFamily="34" charset="0"/>
+              <a:buChar char="•"/>
+            </a:pPr>
+            <a:endParaRPr lang="en-US" altLang="ko-KR" sz="2000" b="1" dirty="0"/>
+          </a:p>
+          <a:p>
+            <a:pPr lvl="1"/>
+            <a:endParaRPr lang="en-US" altLang="ko-KR" sz="2000" dirty="0"/>
           </a:p>
         </p:txBody>
       </p:sp>
@@ -46968,18 +46900,18 @@
 
 <file path=customXml/item1.xml><?xml version="1.0" encoding="utf-8"?>
 <Control xmlns="http://schemas.microsoft.com/VisualStudio/2011/storyboarding/control">
-  <Id Name="System.Storyboarding.Icons.CheckCircle" Revision="1" Stencil="System.Storyboarding.Icons" StencilVersion="0.1"/>
+  <Id Name="System.Storyboarding.WindowsAppIcons.Paste" Revision="1" Stencil="System.Storyboarding.WindowsAppIcons" StencilVersion="0.1"/>
 </Control>
 </file>
 
 <file path=customXml/item2.xml><?xml version="1.0" encoding="utf-8"?>
 <Control xmlns="http://schemas.microsoft.com/VisualStudio/2011/storyboarding/control">
-  <Id Name="System.Storyboarding.WindowsAppIcons.Paste" Revision="1" Stencil="System.Storyboarding.WindowsAppIcons" StencilVersion="0.1"/>
+  <Id Name="System.Storyboarding.Icons.CheckCircle" Revision="1" Stencil="System.Storyboarding.Icons" StencilVersion="0.1"/>
 </Control>
 </file>
 
 <file path=customXml/itemProps1.xml><?xml version="1.0" encoding="utf-8"?>
-<ds:datastoreItem xmlns:ds="http://schemas.openxmlformats.org/officeDocument/2006/customXml" ds:itemID="{D3DA86E8-34BE-44E8-91C9-A4F4C9D9BF5C}">
+<ds:datastoreItem xmlns:ds="http://schemas.openxmlformats.org/officeDocument/2006/customXml" ds:itemID="{52266879-4E94-44A1-A54A-A7163A1198C4}">
   <ds:schemaRefs>
     <ds:schemaRef ds:uri="http://schemas.microsoft.com/VisualStudio/2011/storyboarding/control"/>
   </ds:schemaRefs>
@@ -46987,7 +46919,7 @@
 </file>
 
 <file path=customXml/itemProps2.xml><?xml version="1.0" encoding="utf-8"?>
-<ds:datastoreItem xmlns:ds="http://schemas.openxmlformats.org/officeDocument/2006/customXml" ds:itemID="{52266879-4E94-44A1-A54A-A7163A1198C4}">
+<ds:datastoreItem xmlns:ds="http://schemas.openxmlformats.org/officeDocument/2006/customXml" ds:itemID="{D3DA86E8-34BE-44E8-91C9-A4F4C9D9BF5C}">
   <ds:schemaRefs>
     <ds:schemaRef ds:uri="http://schemas.microsoft.com/VisualStudio/2011/storyboarding/control"/>
   </ds:schemaRefs>

</xml_diff>